<commit_message>
Remove Gotec from exercise location slide
</commit_message>
<xml_diff>
--- a/Requirements-Engineering/RE-L00-Organization.pptx
+++ b/Requirements-Engineering/RE-L00-Organization.pptx
@@ -90,205 +90,7 @@
                 </a:solidFill>
                 <a:latin typeface="Arial"/>
               </a:rPr>
-              <a:t>C</a:t>
-            </a:r>
-            <a:r>
-              <a:rPr b="0" lang="en-US" sz="4400" spc="-1" strike="noStrike">
-                <a:solidFill>
-                  <a:srgbClr val="000000"/>
-                </a:solidFill>
-                <a:latin typeface="Arial"/>
-              </a:rPr>
-              <a:t>l</a:t>
-            </a:r>
-            <a:r>
-              <a:rPr b="0" lang="en-US" sz="4400" spc="-1" strike="noStrike">
-                <a:solidFill>
-                  <a:srgbClr val="000000"/>
-                </a:solidFill>
-                <a:latin typeface="Arial"/>
-              </a:rPr>
-              <a:t>i</a:t>
-            </a:r>
-            <a:r>
-              <a:rPr b="0" lang="en-US" sz="4400" spc="-1" strike="noStrike">
-                <a:solidFill>
-                  <a:srgbClr val="000000"/>
-                </a:solidFill>
-                <a:latin typeface="Arial"/>
-              </a:rPr>
-              <a:t>c</a:t>
-            </a:r>
-            <a:r>
-              <a:rPr b="0" lang="en-US" sz="4400" spc="-1" strike="noStrike">
-                <a:solidFill>
-                  <a:srgbClr val="000000"/>
-                </a:solidFill>
-                <a:latin typeface="Arial"/>
-              </a:rPr>
-              <a:t>k</a:t>
-            </a:r>
-            <a:r>
-              <a:rPr b="0" lang="en-US" sz="4400" spc="-1" strike="noStrike">
-                <a:solidFill>
-                  <a:srgbClr val="000000"/>
-                </a:solidFill>
-                <a:latin typeface="Arial"/>
-              </a:rPr>
-              <a:t> </a:t>
-            </a:r>
-            <a:r>
-              <a:rPr b="0" lang="en-US" sz="4400" spc="-1" strike="noStrike">
-                <a:solidFill>
-                  <a:srgbClr val="000000"/>
-                </a:solidFill>
-                <a:latin typeface="Arial"/>
-              </a:rPr>
-              <a:t>t</a:t>
-            </a:r>
-            <a:r>
-              <a:rPr b="0" lang="en-US" sz="4400" spc="-1" strike="noStrike">
-                <a:solidFill>
-                  <a:srgbClr val="000000"/>
-                </a:solidFill>
-                <a:latin typeface="Arial"/>
-              </a:rPr>
-              <a:t>o</a:t>
-            </a:r>
-            <a:r>
-              <a:rPr b="0" lang="en-US" sz="4400" spc="-1" strike="noStrike">
-                <a:solidFill>
-                  <a:srgbClr val="000000"/>
-                </a:solidFill>
-                <a:latin typeface="Arial"/>
-              </a:rPr>
-              <a:t> </a:t>
-            </a:r>
-            <a:r>
-              <a:rPr b="0" lang="en-US" sz="4400" spc="-1" strike="noStrike">
-                <a:solidFill>
-                  <a:srgbClr val="000000"/>
-                </a:solidFill>
-                <a:latin typeface="Arial"/>
-              </a:rPr>
-              <a:t>m</a:t>
-            </a:r>
-            <a:r>
-              <a:rPr b="0" lang="en-US" sz="4400" spc="-1" strike="noStrike">
-                <a:solidFill>
-                  <a:srgbClr val="000000"/>
-                </a:solidFill>
-                <a:latin typeface="Arial"/>
-              </a:rPr>
-              <a:t>o</a:t>
-            </a:r>
-            <a:r>
-              <a:rPr b="0" lang="en-US" sz="4400" spc="-1" strike="noStrike">
-                <a:solidFill>
-                  <a:srgbClr val="000000"/>
-                </a:solidFill>
-                <a:latin typeface="Arial"/>
-              </a:rPr>
-              <a:t>v</a:t>
-            </a:r>
-            <a:r>
-              <a:rPr b="0" lang="en-US" sz="4400" spc="-1" strike="noStrike">
-                <a:solidFill>
-                  <a:srgbClr val="000000"/>
-                </a:solidFill>
-                <a:latin typeface="Arial"/>
-              </a:rPr>
-              <a:t>e</a:t>
-            </a:r>
-            <a:r>
-              <a:rPr b="0" lang="en-US" sz="4400" spc="-1" strike="noStrike">
-                <a:solidFill>
-                  <a:srgbClr val="000000"/>
-                </a:solidFill>
-                <a:latin typeface="Arial"/>
-              </a:rPr>
-              <a:t> </a:t>
-            </a:r>
-            <a:r>
-              <a:rPr b="0" lang="en-US" sz="4400" spc="-1" strike="noStrike">
-                <a:solidFill>
-                  <a:srgbClr val="000000"/>
-                </a:solidFill>
-                <a:latin typeface="Arial"/>
-              </a:rPr>
-              <a:t>t</a:t>
-            </a:r>
-            <a:r>
-              <a:rPr b="0" lang="en-US" sz="4400" spc="-1" strike="noStrike">
-                <a:solidFill>
-                  <a:srgbClr val="000000"/>
-                </a:solidFill>
-                <a:latin typeface="Arial"/>
-              </a:rPr>
-              <a:t>h</a:t>
-            </a:r>
-            <a:r>
-              <a:rPr b="0" lang="en-US" sz="4400" spc="-1" strike="noStrike">
-                <a:solidFill>
-                  <a:srgbClr val="000000"/>
-                </a:solidFill>
-                <a:latin typeface="Arial"/>
-              </a:rPr>
-              <a:t>e</a:t>
-            </a:r>
-            <a:r>
-              <a:rPr b="0" lang="en-US" sz="4400" spc="-1" strike="noStrike">
-                <a:solidFill>
-                  <a:srgbClr val="000000"/>
-                </a:solidFill>
-                <a:latin typeface="Arial"/>
-              </a:rPr>
-              <a:t> </a:t>
-            </a:r>
-            <a:r>
-              <a:rPr b="0" lang="en-US" sz="4400" spc="-1" strike="noStrike">
-                <a:solidFill>
-                  <a:srgbClr val="000000"/>
-                </a:solidFill>
-                <a:latin typeface="Arial"/>
-              </a:rPr>
-              <a:t>s</a:t>
-            </a:r>
-            <a:r>
-              <a:rPr b="0" lang="en-US" sz="4400" spc="-1" strike="noStrike">
-                <a:solidFill>
-                  <a:srgbClr val="000000"/>
-                </a:solidFill>
-                <a:latin typeface="Arial"/>
-              </a:rPr>
-              <a:t>l</a:t>
-            </a:r>
-            <a:r>
-              <a:rPr b="0" lang="en-US" sz="4400" spc="-1" strike="noStrike">
-                <a:solidFill>
-                  <a:srgbClr val="000000"/>
-                </a:solidFill>
-                <a:latin typeface="Arial"/>
-              </a:rPr>
-              <a:t>i</a:t>
-            </a:r>
-            <a:r>
-              <a:rPr b="0" lang="en-US" sz="4400" spc="-1" strike="noStrike">
-                <a:solidFill>
-                  <a:srgbClr val="000000"/>
-                </a:solidFill>
-                <a:latin typeface="Arial"/>
-              </a:rPr>
-              <a:t>d</a:t>
-            </a:r>
-            <a:r>
-              <a:rPr b="0" lang="en-US" sz="4400" spc="-1" strike="noStrike">
-                <a:solidFill>
-                  <a:srgbClr val="000000"/>
-                </a:solidFill>
-                <a:latin typeface="Arial"/>
-              </a:rPr>
-              <a:t>e</a:t>
+              <a:t>Click to move the slide</a:t>
             </a:r>
             <a:endParaRPr b="0" lang="en-US" sz="4400" spc="-1" strike="noStrike">
               <a:solidFill>
@@ -337,268 +139,7 @@
                 </a:solidFill>
                 <a:latin typeface="Arial"/>
               </a:rPr>
-              <a:t>C</a:t>
-            </a:r>
-            <a:r>
-              <a:rPr b="0" lang="en-US" sz="2000" spc="-1" strike="noStrike">
-                <a:solidFill>
-                  <a:srgbClr val="000000"/>
-                </a:solidFill>
-                <a:latin typeface="Arial"/>
-              </a:rPr>
-              <a:t>l</a:t>
-            </a:r>
-            <a:r>
-              <a:rPr b="0" lang="en-US" sz="2000" spc="-1" strike="noStrike">
-                <a:solidFill>
-                  <a:srgbClr val="000000"/>
-                </a:solidFill>
-                <a:latin typeface="Arial"/>
-              </a:rPr>
-              <a:t>i</a:t>
-            </a:r>
-            <a:r>
-              <a:rPr b="0" lang="en-US" sz="2000" spc="-1" strike="noStrike">
-                <a:solidFill>
-                  <a:srgbClr val="000000"/>
-                </a:solidFill>
-                <a:latin typeface="Arial"/>
-              </a:rPr>
-              <a:t>c</a:t>
-            </a:r>
-            <a:r>
-              <a:rPr b="0" lang="en-US" sz="2000" spc="-1" strike="noStrike">
-                <a:solidFill>
-                  <a:srgbClr val="000000"/>
-                </a:solidFill>
-                <a:latin typeface="Arial"/>
-              </a:rPr>
-              <a:t>k</a:t>
-            </a:r>
-            <a:r>
-              <a:rPr b="0" lang="en-US" sz="2000" spc="-1" strike="noStrike">
-                <a:solidFill>
-                  <a:srgbClr val="000000"/>
-                </a:solidFill>
-                <a:latin typeface="Arial"/>
-              </a:rPr>
-              <a:t> </a:t>
-            </a:r>
-            <a:r>
-              <a:rPr b="0" lang="en-US" sz="2000" spc="-1" strike="noStrike">
-                <a:solidFill>
-                  <a:srgbClr val="000000"/>
-                </a:solidFill>
-                <a:latin typeface="Arial"/>
-              </a:rPr>
-              <a:t>t</a:t>
-            </a:r>
-            <a:r>
-              <a:rPr b="0" lang="en-US" sz="2000" spc="-1" strike="noStrike">
-                <a:solidFill>
-                  <a:srgbClr val="000000"/>
-                </a:solidFill>
-                <a:latin typeface="Arial"/>
-              </a:rPr>
-              <a:t>o</a:t>
-            </a:r>
-            <a:r>
-              <a:rPr b="0" lang="en-US" sz="2000" spc="-1" strike="noStrike">
-                <a:solidFill>
-                  <a:srgbClr val="000000"/>
-                </a:solidFill>
-                <a:latin typeface="Arial"/>
-              </a:rPr>
-              <a:t> </a:t>
-            </a:r>
-            <a:r>
-              <a:rPr b="0" lang="en-US" sz="2000" spc="-1" strike="noStrike">
-                <a:solidFill>
-                  <a:srgbClr val="000000"/>
-                </a:solidFill>
-                <a:latin typeface="Arial"/>
-              </a:rPr>
-              <a:t>e</a:t>
-            </a:r>
-            <a:r>
-              <a:rPr b="0" lang="en-US" sz="2000" spc="-1" strike="noStrike">
-                <a:solidFill>
-                  <a:srgbClr val="000000"/>
-                </a:solidFill>
-                <a:latin typeface="Arial"/>
-              </a:rPr>
-              <a:t>d</a:t>
-            </a:r>
-            <a:r>
-              <a:rPr b="0" lang="en-US" sz="2000" spc="-1" strike="noStrike">
-                <a:solidFill>
-                  <a:srgbClr val="000000"/>
-                </a:solidFill>
-                <a:latin typeface="Arial"/>
-              </a:rPr>
-              <a:t>i</a:t>
-            </a:r>
-            <a:r>
-              <a:rPr b="0" lang="en-US" sz="2000" spc="-1" strike="noStrike">
-                <a:solidFill>
-                  <a:srgbClr val="000000"/>
-                </a:solidFill>
-                <a:latin typeface="Arial"/>
-              </a:rPr>
-              <a:t>t</a:t>
-            </a:r>
-            <a:r>
-              <a:rPr b="0" lang="en-US" sz="2000" spc="-1" strike="noStrike">
-                <a:solidFill>
-                  <a:srgbClr val="000000"/>
-                </a:solidFill>
-                <a:latin typeface="Arial"/>
-              </a:rPr>
-              <a:t> </a:t>
-            </a:r>
-            <a:r>
-              <a:rPr b="0" lang="en-US" sz="2000" spc="-1" strike="noStrike">
-                <a:solidFill>
-                  <a:srgbClr val="000000"/>
-                </a:solidFill>
-                <a:latin typeface="Arial"/>
-              </a:rPr>
-              <a:t>t</a:t>
-            </a:r>
-            <a:r>
-              <a:rPr b="0" lang="en-US" sz="2000" spc="-1" strike="noStrike">
-                <a:solidFill>
-                  <a:srgbClr val="000000"/>
-                </a:solidFill>
-                <a:latin typeface="Arial"/>
-              </a:rPr>
-              <a:t>h</a:t>
-            </a:r>
-            <a:r>
-              <a:rPr b="0" lang="en-US" sz="2000" spc="-1" strike="noStrike">
-                <a:solidFill>
-                  <a:srgbClr val="000000"/>
-                </a:solidFill>
-                <a:latin typeface="Arial"/>
-              </a:rPr>
-              <a:t>e</a:t>
-            </a:r>
-            <a:r>
-              <a:rPr b="0" lang="en-US" sz="2000" spc="-1" strike="noStrike">
-                <a:solidFill>
-                  <a:srgbClr val="000000"/>
-                </a:solidFill>
-                <a:latin typeface="Arial"/>
-              </a:rPr>
-              <a:t> </a:t>
-            </a:r>
-            <a:r>
-              <a:rPr b="0" lang="en-US" sz="2000" spc="-1" strike="noStrike">
-                <a:solidFill>
-                  <a:srgbClr val="000000"/>
-                </a:solidFill>
-                <a:latin typeface="Arial"/>
-              </a:rPr>
-              <a:t>n</a:t>
-            </a:r>
-            <a:r>
-              <a:rPr b="0" lang="en-US" sz="2000" spc="-1" strike="noStrike">
-                <a:solidFill>
-                  <a:srgbClr val="000000"/>
-                </a:solidFill>
-                <a:latin typeface="Arial"/>
-              </a:rPr>
-              <a:t>o</a:t>
-            </a:r>
-            <a:r>
-              <a:rPr b="0" lang="en-US" sz="2000" spc="-1" strike="noStrike">
-                <a:solidFill>
-                  <a:srgbClr val="000000"/>
-                </a:solidFill>
-                <a:latin typeface="Arial"/>
-              </a:rPr>
-              <a:t>t</a:t>
-            </a:r>
-            <a:r>
-              <a:rPr b="0" lang="en-US" sz="2000" spc="-1" strike="noStrike">
-                <a:solidFill>
-                  <a:srgbClr val="000000"/>
-                </a:solidFill>
-                <a:latin typeface="Arial"/>
-              </a:rPr>
-              <a:t>e</a:t>
-            </a:r>
-            <a:r>
-              <a:rPr b="0" lang="en-US" sz="2000" spc="-1" strike="noStrike">
-                <a:solidFill>
-                  <a:srgbClr val="000000"/>
-                </a:solidFill>
-                <a:latin typeface="Arial"/>
-              </a:rPr>
-              <a:t>s</a:t>
-            </a:r>
-            <a:r>
-              <a:rPr b="0" lang="en-US" sz="2000" spc="-1" strike="noStrike">
-                <a:solidFill>
-                  <a:srgbClr val="000000"/>
-                </a:solidFill>
-                <a:latin typeface="Arial"/>
-              </a:rPr>
-              <a:t> </a:t>
-            </a:r>
-            <a:r>
-              <a:rPr b="0" lang="en-US" sz="2000" spc="-1" strike="noStrike">
-                <a:solidFill>
-                  <a:srgbClr val="000000"/>
-                </a:solidFill>
-                <a:latin typeface="Arial"/>
-              </a:rPr>
-              <a:t>f</a:t>
-            </a:r>
-            <a:r>
-              <a:rPr b="0" lang="en-US" sz="2000" spc="-1" strike="noStrike">
-                <a:solidFill>
-                  <a:srgbClr val="000000"/>
-                </a:solidFill>
-                <a:latin typeface="Arial"/>
-              </a:rPr>
-              <a:t>o</a:t>
-            </a:r>
-            <a:r>
-              <a:rPr b="0" lang="en-US" sz="2000" spc="-1" strike="noStrike">
-                <a:solidFill>
-                  <a:srgbClr val="000000"/>
-                </a:solidFill>
-                <a:latin typeface="Arial"/>
-              </a:rPr>
-              <a:t>r</a:t>
-            </a:r>
-            <a:r>
-              <a:rPr b="0" lang="en-US" sz="2000" spc="-1" strike="noStrike">
-                <a:solidFill>
-                  <a:srgbClr val="000000"/>
-                </a:solidFill>
-                <a:latin typeface="Arial"/>
-              </a:rPr>
-              <a:t>m</a:t>
-            </a:r>
-            <a:r>
-              <a:rPr b="0" lang="en-US" sz="2000" spc="-1" strike="noStrike">
-                <a:solidFill>
-                  <a:srgbClr val="000000"/>
-                </a:solidFill>
-                <a:latin typeface="Arial"/>
-              </a:rPr>
-              <a:t>a</a:t>
-            </a:r>
-            <a:r>
-              <a:rPr b="0" lang="en-US" sz="2000" spc="-1" strike="noStrike">
-                <a:solidFill>
-                  <a:srgbClr val="000000"/>
-                </a:solidFill>
-                <a:latin typeface="Arial"/>
-              </a:rPr>
-              <a:t>t</a:t>
+              <a:t>Click to edit the notes format</a:t>
             </a:r>
             <a:endParaRPr b="0" lang="en-US" sz="2000" spc="-1" strike="noStrike">
               <a:solidFill>
@@ -820,7 +361,7 @@
             <a:pPr indent="0" algn="r">
               <a:buNone/>
             </a:pPr>
-            <a:fld id="{0281366C-7C07-4D69-8FFF-023F8B32C281}" type="slidenum">
+            <a:fld id="{452BB564-69B1-497D-9407-52905F72E664}" type="slidenum">
               <a:rPr b="0" lang="en-US" sz="1400" spc="-1" strike="noStrike">
                 <a:solidFill>
                   <a:srgbClr val="000000"/>
@@ -874,7 +415,7 @@
         <p:spPr>
           <a:xfrm>
             <a:off x="533520" y="763560"/>
-            <a:ext cx="6697800" cy="3765960"/>
+            <a:ext cx="6697440" cy="3765600"/>
           </a:xfrm>
           <a:prstGeom prst="rect">
             <a:avLst/>
@@ -897,7 +438,7 @@
         <p:spPr>
           <a:xfrm>
             <a:off x="777240" y="4777560"/>
-            <a:ext cx="6211440" cy="4519800"/>
+            <a:ext cx="6211080" cy="4519440"/>
           </a:xfrm>
           <a:prstGeom prst="rect">
             <a:avLst/>
@@ -933,7 +474,7 @@
         <p:spPr>
           <a:xfrm>
             <a:off x="4399200" y="9555480"/>
-            <a:ext cx="3366720" cy="496440"/>
+            <a:ext cx="3366360" cy="496080"/>
           </a:xfrm>
           <a:prstGeom prst="rect">
             <a:avLst/>
@@ -959,7 +500,7 @@
                 <a:spcPct val="100000"/>
               </a:lnSpc>
             </a:pPr>
-            <a:fld id="{2AB9C222-74B4-4A3E-BDFC-03145F14A567}" type="slidenum">
+            <a:fld id="{4FD15DD2-E033-4D19-96B2-2289E2C56DFC}" type="slidenum">
               <a:rPr b="0" lang="en-GB" sz="1800" spc="-1" strike="noStrike">
                 <a:solidFill>
                   <a:srgbClr val="000000"/>
@@ -967,7 +508,7 @@
                 <a:latin typeface="+mn-lt"/>
                 <a:ea typeface="+mn-ea"/>
               </a:rPr>
-              <a:t>6</a:t>
+              <a:t>&lt;number&gt;</a:t>
             </a:fld>
             <a:endParaRPr b="0" lang="en-US" sz="1800" spc="-1" strike="noStrike">
               <a:solidFill>
@@ -1013,7 +554,7 @@
         <p:spPr>
           <a:xfrm>
             <a:off x="533520" y="763560"/>
-            <a:ext cx="6697800" cy="3765960"/>
+            <a:ext cx="6697440" cy="3765600"/>
           </a:xfrm>
           <a:prstGeom prst="rect">
             <a:avLst/>
@@ -1036,7 +577,7 @@
         <p:spPr>
           <a:xfrm>
             <a:off x="777240" y="4777560"/>
-            <a:ext cx="6211440" cy="4519800"/>
+            <a:ext cx="6211080" cy="4519440"/>
           </a:xfrm>
           <a:prstGeom prst="rect">
             <a:avLst/>
@@ -1072,7 +613,7 @@
         <p:spPr>
           <a:xfrm>
             <a:off x="4399200" y="9555480"/>
-            <a:ext cx="3366720" cy="496440"/>
+            <a:ext cx="3366360" cy="496080"/>
           </a:xfrm>
           <a:prstGeom prst="rect">
             <a:avLst/>
@@ -1098,7 +639,7 @@
                 <a:spcPct val="100000"/>
               </a:lnSpc>
             </a:pPr>
-            <a:fld id="{0224EE8B-07E6-4F75-BA7B-27C24C27B6DB}" type="slidenum">
+            <a:fld id="{F80090E1-6F21-46D2-8303-0D6301D4F875}" type="slidenum">
               <a:rPr b="0" lang="en-GB" sz="1800" spc="-1" strike="noStrike">
                 <a:solidFill>
                   <a:srgbClr val="000000"/>
@@ -1106,7 +647,7 @@
                 <a:latin typeface="+mn-lt"/>
                 <a:ea typeface="+mn-ea"/>
               </a:rPr>
-              <a:t>6</a:t>
+              <a:t>&lt;number&gt;</a:t>
             </a:fld>
             <a:endParaRPr b="0" lang="en-US" sz="1800" spc="-1" strike="noStrike">
               <a:solidFill>
@@ -1152,7 +693,7 @@
         <p:spPr>
           <a:xfrm>
             <a:off x="533520" y="763560"/>
-            <a:ext cx="6697800" cy="3765960"/>
+            <a:ext cx="6697440" cy="3765600"/>
           </a:xfrm>
           <a:prstGeom prst="rect">
             <a:avLst/>
@@ -1175,7 +716,7 @@
         <p:spPr>
           <a:xfrm>
             <a:off x="777240" y="4777560"/>
-            <a:ext cx="6211440" cy="4519800"/>
+            <a:ext cx="6211080" cy="4519440"/>
           </a:xfrm>
           <a:prstGeom prst="rect">
             <a:avLst/>
@@ -1211,7 +752,7 @@
         <p:spPr>
           <a:xfrm>
             <a:off x="4399200" y="9555480"/>
-            <a:ext cx="3366720" cy="496440"/>
+            <a:ext cx="3366360" cy="496080"/>
           </a:xfrm>
           <a:prstGeom prst="rect">
             <a:avLst/>
@@ -1237,7 +778,7 @@
                 <a:spcPct val="100000"/>
               </a:lnSpc>
             </a:pPr>
-            <a:fld id="{560D1E7F-F397-49A4-90DD-2F2BF328DB09}" type="slidenum">
+            <a:fld id="{E3621469-01A3-4422-851B-F2B4C8ADF5CB}" type="slidenum">
               <a:rPr b="0" lang="en-GB" sz="1800" spc="-1" strike="noStrike">
                 <a:solidFill>
                   <a:srgbClr val="000000"/>
@@ -1245,7 +786,7 @@
                 <a:latin typeface="+mn-lt"/>
                 <a:ea typeface="+mn-ea"/>
               </a:rPr>
-              <a:t>6</a:t>
+              <a:t>&lt;number&gt;</a:t>
             </a:fld>
             <a:endParaRPr b="0" lang="en-US" sz="1800" spc="-1" strike="noStrike">
               <a:solidFill>
@@ -1291,7 +832,7 @@
         <p:spPr>
           <a:xfrm>
             <a:off x="533520" y="763560"/>
-            <a:ext cx="6697800" cy="3765960"/>
+            <a:ext cx="6697440" cy="3765600"/>
           </a:xfrm>
           <a:prstGeom prst="rect">
             <a:avLst/>
@@ -1314,7 +855,7 @@
         <p:spPr>
           <a:xfrm>
             <a:off x="777240" y="4777560"/>
-            <a:ext cx="6211440" cy="4519800"/>
+            <a:ext cx="6211080" cy="4519440"/>
           </a:xfrm>
           <a:prstGeom prst="rect">
             <a:avLst/>
@@ -1350,7 +891,7 @@
         <p:spPr>
           <a:xfrm>
             <a:off x="4399200" y="9555480"/>
-            <a:ext cx="3366720" cy="496440"/>
+            <a:ext cx="3366360" cy="496080"/>
           </a:xfrm>
           <a:prstGeom prst="rect">
             <a:avLst/>
@@ -1376,7 +917,7 @@
                 <a:spcPct val="100000"/>
               </a:lnSpc>
             </a:pPr>
-            <a:fld id="{098FECDE-F32F-4F5E-99D8-F2F4A8FBCA56}" type="slidenum">
+            <a:fld id="{5CE52C95-3F83-4C71-ACEC-6A4D2D450492}" type="slidenum">
               <a:rPr b="0" lang="en-GB" sz="1800" spc="-1" strike="noStrike">
                 <a:solidFill>
                   <a:srgbClr val="000000"/>
@@ -1384,7 +925,7 @@
                 <a:latin typeface="+mn-lt"/>
                 <a:ea typeface="+mn-ea"/>
               </a:rPr>
-              <a:t>6</a:t>
+              <a:t>&lt;number&gt;</a:t>
             </a:fld>
             <a:endParaRPr b="0" lang="en-US" sz="1800" spc="-1" strike="noStrike">
               <a:solidFill>
@@ -4981,7 +4522,7 @@
         <p:spPr>
           <a:xfrm>
             <a:off x="11444760" y="0"/>
-            <a:ext cx="744840" cy="6853680"/>
+            <a:ext cx="744480" cy="6853320"/>
           </a:xfrm>
           <a:prstGeom prst="rect">
             <a:avLst/>
@@ -5030,7 +4571,7 @@
         <p:spPr>
           <a:xfrm>
             <a:off x="11438640" y="6453360"/>
-            <a:ext cx="761760" cy="363960"/>
+            <a:ext cx="761400" cy="363960"/>
           </a:xfrm>
           <a:prstGeom prst="rect">
             <a:avLst/>
@@ -5056,7 +4597,7 @@
                 <a:spcPct val="100000"/>
               </a:lnSpc>
             </a:pPr>
-            <a:fld id="{6015A372-4B95-49A6-90A0-4A4C2652276C}" type="slidenum">
+            <a:fld id="{8E4545E5-0263-4960-97AA-5AC6D21CD6A8}" type="slidenum">
               <a:rPr b="0" lang="en-US" sz="1800" spc="-1" strike="noStrike">
                 <a:solidFill>
                   <a:srgbClr val="808080"/>
@@ -5084,7 +4625,7 @@
         <p:spPr>
           <a:xfrm>
             <a:off x="912240" y="1268280"/>
-            <a:ext cx="9211680" cy="365040"/>
+            <a:ext cx="9211320" cy="364680"/>
           </a:xfrm>
           <a:prstGeom prst="rect">
             <a:avLst/>
@@ -5133,7 +4674,7 @@
         <p:spPr>
           <a:xfrm>
             <a:off x="0" y="0"/>
-            <a:ext cx="3055680" cy="565560"/>
+            <a:ext cx="3055320" cy="565200"/>
           </a:xfrm>
           <a:prstGeom prst="rect">
             <a:avLst/>
@@ -5156,7 +4697,7 @@
         <p:spPr>
           <a:xfrm>
             <a:off x="7430400" y="134640"/>
-            <a:ext cx="3701520" cy="517680"/>
+            <a:ext cx="3701160" cy="517320"/>
           </a:xfrm>
           <a:prstGeom prst="rect">
             <a:avLst/>
@@ -5175,7 +4716,7 @@
         <p:spPr>
           <a:xfrm>
             <a:off x="912240" y="1268280"/>
-            <a:ext cx="9211680" cy="365040"/>
+            <a:ext cx="9211320" cy="364680"/>
           </a:xfrm>
           <a:prstGeom prst="rect">
             <a:avLst/>
@@ -5220,7 +4761,7 @@
         <p:spPr>
           <a:xfrm>
             <a:off x="11444760" y="0"/>
-            <a:ext cx="744840" cy="6853680"/>
+            <a:ext cx="744480" cy="6853320"/>
           </a:xfrm>
           <a:prstGeom prst="rect">
             <a:avLst/>
@@ -5269,7 +4810,7 @@
         <p:spPr>
           <a:xfrm>
             <a:off x="0" y="6642720"/>
-            <a:ext cx="12187800" cy="211320"/>
+            <a:ext cx="12187440" cy="211320"/>
           </a:xfrm>
           <a:prstGeom prst="rect">
             <a:avLst/>
@@ -5352,313 +4893,7 @@
                 </a:solidFill>
                 <a:latin typeface="Arial"/>
               </a:rPr>
-              <a:t>C</a:t>
-            </a:r>
-            <a:r>
-              <a:rPr b="0" lang="en-US" sz="4400" spc="-1" strike="noStrike">
-                <a:solidFill>
-                  <a:srgbClr val="000000"/>
-                </a:solidFill>
-                <a:latin typeface="Arial"/>
-              </a:rPr>
-              <a:t>l</a:t>
-            </a:r>
-            <a:r>
-              <a:rPr b="0" lang="en-US" sz="4400" spc="-1" strike="noStrike">
-                <a:solidFill>
-                  <a:srgbClr val="000000"/>
-                </a:solidFill>
-                <a:latin typeface="Arial"/>
-              </a:rPr>
-              <a:t>i</a:t>
-            </a:r>
-            <a:r>
-              <a:rPr b="0" lang="en-US" sz="4400" spc="-1" strike="noStrike">
-                <a:solidFill>
-                  <a:srgbClr val="000000"/>
-                </a:solidFill>
-                <a:latin typeface="Arial"/>
-              </a:rPr>
-              <a:t>c</a:t>
-            </a:r>
-            <a:r>
-              <a:rPr b="0" lang="en-US" sz="4400" spc="-1" strike="noStrike">
-                <a:solidFill>
-                  <a:srgbClr val="000000"/>
-                </a:solidFill>
-                <a:latin typeface="Arial"/>
-              </a:rPr>
-              <a:t>k</a:t>
-            </a:r>
-            <a:r>
-              <a:rPr b="0" lang="en-US" sz="4400" spc="-1" strike="noStrike">
-                <a:solidFill>
-                  <a:srgbClr val="000000"/>
-                </a:solidFill>
-                <a:latin typeface="Arial"/>
-              </a:rPr>
-              <a:t> </a:t>
-            </a:r>
-            <a:r>
-              <a:rPr b="0" lang="en-US" sz="4400" spc="-1" strike="noStrike">
-                <a:solidFill>
-                  <a:srgbClr val="000000"/>
-                </a:solidFill>
-                <a:latin typeface="Arial"/>
-              </a:rPr>
-              <a:t>t</a:t>
-            </a:r>
-            <a:r>
-              <a:rPr b="0" lang="en-US" sz="4400" spc="-1" strike="noStrike">
-                <a:solidFill>
-                  <a:srgbClr val="000000"/>
-                </a:solidFill>
-                <a:latin typeface="Arial"/>
-              </a:rPr>
-              <a:t>o</a:t>
-            </a:r>
-            <a:r>
-              <a:rPr b="0" lang="en-US" sz="4400" spc="-1" strike="noStrike">
-                <a:solidFill>
-                  <a:srgbClr val="000000"/>
-                </a:solidFill>
-                <a:latin typeface="Arial"/>
-              </a:rPr>
-              <a:t> </a:t>
-            </a:r>
-            <a:r>
-              <a:rPr b="0" lang="en-US" sz="4400" spc="-1" strike="noStrike">
-                <a:solidFill>
-                  <a:srgbClr val="000000"/>
-                </a:solidFill>
-                <a:latin typeface="Arial"/>
-              </a:rPr>
-              <a:t>e</a:t>
-            </a:r>
-            <a:r>
-              <a:rPr b="0" lang="en-US" sz="4400" spc="-1" strike="noStrike">
-                <a:solidFill>
-                  <a:srgbClr val="000000"/>
-                </a:solidFill>
-                <a:latin typeface="Arial"/>
-              </a:rPr>
-              <a:t>d</a:t>
-            </a:r>
-            <a:r>
-              <a:rPr b="0" lang="en-US" sz="4400" spc="-1" strike="noStrike">
-                <a:solidFill>
-                  <a:srgbClr val="000000"/>
-                </a:solidFill>
-                <a:latin typeface="Arial"/>
-              </a:rPr>
-              <a:t>i</a:t>
-            </a:r>
-            <a:r>
-              <a:rPr b="0" lang="en-US" sz="4400" spc="-1" strike="noStrike">
-                <a:solidFill>
-                  <a:srgbClr val="000000"/>
-                </a:solidFill>
-                <a:latin typeface="Arial"/>
-              </a:rPr>
-              <a:t>t</a:t>
-            </a:r>
-            <a:r>
-              <a:rPr b="0" lang="en-US" sz="4400" spc="-1" strike="noStrike">
-                <a:solidFill>
-                  <a:srgbClr val="000000"/>
-                </a:solidFill>
-                <a:latin typeface="Arial"/>
-              </a:rPr>
-              <a:t> </a:t>
-            </a:r>
-            <a:r>
-              <a:rPr b="0" lang="en-US" sz="4400" spc="-1" strike="noStrike">
-                <a:solidFill>
-                  <a:srgbClr val="000000"/>
-                </a:solidFill>
-                <a:latin typeface="Arial"/>
-              </a:rPr>
-              <a:t>t</a:t>
-            </a:r>
-            <a:r>
-              <a:rPr b="0" lang="en-US" sz="4400" spc="-1" strike="noStrike">
-                <a:solidFill>
-                  <a:srgbClr val="000000"/>
-                </a:solidFill>
-                <a:latin typeface="Arial"/>
-              </a:rPr>
-              <a:t>h</a:t>
-            </a:r>
-            <a:r>
-              <a:rPr b="0" lang="en-US" sz="4400" spc="-1" strike="noStrike">
-                <a:solidFill>
-                  <a:srgbClr val="000000"/>
-                </a:solidFill>
-                <a:latin typeface="Arial"/>
-              </a:rPr>
-              <a:t>e</a:t>
-            </a:r>
-            <a:r>
-              <a:rPr b="0" lang="en-US" sz="4400" spc="-1" strike="noStrike">
-                <a:solidFill>
-                  <a:srgbClr val="000000"/>
-                </a:solidFill>
-                <a:latin typeface="Arial"/>
-              </a:rPr>
-              <a:t> </a:t>
-            </a:r>
-            <a:r>
-              <a:rPr b="0" lang="en-US" sz="4400" spc="-1" strike="noStrike">
-                <a:solidFill>
-                  <a:srgbClr val="000000"/>
-                </a:solidFill>
-                <a:latin typeface="Arial"/>
-              </a:rPr>
-              <a:t>t</a:t>
-            </a:r>
-            <a:r>
-              <a:rPr b="0" lang="en-US" sz="4400" spc="-1" strike="noStrike">
-                <a:solidFill>
-                  <a:srgbClr val="000000"/>
-                </a:solidFill>
-                <a:latin typeface="Arial"/>
-              </a:rPr>
-              <a:t>i</a:t>
-            </a:r>
-            <a:r>
-              <a:rPr b="0" lang="en-US" sz="4400" spc="-1" strike="noStrike">
-                <a:solidFill>
-                  <a:srgbClr val="000000"/>
-                </a:solidFill>
-                <a:latin typeface="Arial"/>
-              </a:rPr>
-              <a:t>t</a:t>
-            </a:r>
-            <a:r>
-              <a:rPr b="0" lang="en-US" sz="4400" spc="-1" strike="noStrike">
-                <a:solidFill>
-                  <a:srgbClr val="000000"/>
-                </a:solidFill>
-                <a:latin typeface="Arial"/>
-              </a:rPr>
-              <a:t>l</a:t>
-            </a:r>
-            <a:r>
-              <a:rPr b="0" lang="en-US" sz="4400" spc="-1" strike="noStrike">
-                <a:solidFill>
-                  <a:srgbClr val="000000"/>
-                </a:solidFill>
-                <a:latin typeface="Arial"/>
-              </a:rPr>
-              <a:t>e</a:t>
-            </a:r>
-            <a:r>
-              <a:rPr b="0" lang="en-US" sz="4400" spc="-1" strike="noStrike">
-                <a:solidFill>
-                  <a:srgbClr val="000000"/>
-                </a:solidFill>
-                <a:latin typeface="Arial"/>
-              </a:rPr>
-              <a:t> </a:t>
-            </a:r>
-            <a:r>
-              <a:rPr b="0" lang="en-US" sz="4400" spc="-1" strike="noStrike">
-                <a:solidFill>
-                  <a:srgbClr val="000000"/>
-                </a:solidFill>
-                <a:latin typeface="Arial"/>
-              </a:rPr>
-              <a:t>t</a:t>
-            </a:r>
-            <a:r>
-              <a:rPr b="0" lang="en-US" sz="4400" spc="-1" strike="noStrike">
-                <a:solidFill>
-                  <a:srgbClr val="000000"/>
-                </a:solidFill>
-                <a:latin typeface="Arial"/>
-              </a:rPr>
-              <a:t>e</a:t>
-            </a:r>
-            <a:r>
-              <a:rPr b="0" lang="en-US" sz="4400" spc="-1" strike="noStrike">
-                <a:solidFill>
-                  <a:srgbClr val="000000"/>
-                </a:solidFill>
-                <a:latin typeface="Arial"/>
-              </a:rPr>
-              <a:t>x</a:t>
-            </a:r>
-            <a:r>
-              <a:rPr b="0" lang="en-US" sz="4400" spc="-1" strike="noStrike">
-                <a:solidFill>
-                  <a:srgbClr val="000000"/>
-                </a:solidFill>
-                <a:latin typeface="Arial"/>
-              </a:rPr>
-              <a:t>t</a:t>
-            </a:r>
-            <a:r>
-              <a:rPr b="0" lang="en-US" sz="4400" spc="-1" strike="noStrike">
-                <a:solidFill>
-                  <a:srgbClr val="000000"/>
-                </a:solidFill>
-                <a:latin typeface="Arial"/>
-              </a:rPr>
-              <a:t> </a:t>
-            </a:r>
-            <a:r>
-              <a:rPr b="0" lang="en-US" sz="4400" spc="-1" strike="noStrike">
-                <a:solidFill>
-                  <a:srgbClr val="000000"/>
-                </a:solidFill>
-                <a:latin typeface="Arial"/>
-              </a:rPr>
-              <a:t>f</a:t>
-            </a:r>
-            <a:r>
-              <a:rPr b="0" lang="en-US" sz="4400" spc="-1" strike="noStrike">
-                <a:solidFill>
-                  <a:srgbClr val="000000"/>
-                </a:solidFill>
-                <a:latin typeface="Arial"/>
-              </a:rPr>
-              <a:t>o</a:t>
-            </a:r>
-            <a:r>
-              <a:rPr b="0" lang="en-US" sz="4400" spc="-1" strike="noStrike">
-                <a:solidFill>
-                  <a:srgbClr val="000000"/>
-                </a:solidFill>
-                <a:latin typeface="Arial"/>
-              </a:rPr>
-              <a:t>r</a:t>
-            </a:r>
-            <a:r>
-              <a:rPr b="0" lang="en-US" sz="4400" spc="-1" strike="noStrike">
-                <a:solidFill>
-                  <a:srgbClr val="000000"/>
-                </a:solidFill>
-                <a:latin typeface="Arial"/>
-              </a:rPr>
-              <a:t>m</a:t>
-            </a:r>
-            <a:r>
-              <a:rPr b="0" lang="en-US" sz="4400" spc="-1" strike="noStrike">
-                <a:solidFill>
-                  <a:srgbClr val="000000"/>
-                </a:solidFill>
-                <a:latin typeface="Arial"/>
-              </a:rPr>
-              <a:t>a</a:t>
-            </a:r>
-            <a:r>
-              <a:rPr b="0" lang="en-US" sz="4400" spc="-1" strike="noStrike">
-                <a:solidFill>
-                  <a:srgbClr val="000000"/>
-                </a:solidFill>
-                <a:latin typeface="Arial"/>
-              </a:rPr>
-              <a:t>t</a:t>
+              <a:t>Click to edit the title text format</a:t>
             </a:r>
             <a:endParaRPr b="0" lang="en-US" sz="4400" spc="-1" strike="noStrike">
               <a:solidFill>
@@ -5947,7 +5182,7 @@
         <p:spPr>
           <a:xfrm>
             <a:off x="11444760" y="0"/>
-            <a:ext cx="744840" cy="6853680"/>
+            <a:ext cx="744480" cy="6853320"/>
           </a:xfrm>
           <a:prstGeom prst="rect">
             <a:avLst/>
@@ -5996,7 +5231,7 @@
         <p:spPr>
           <a:xfrm>
             <a:off x="11438640" y="6453360"/>
-            <a:ext cx="761760" cy="363960"/>
+            <a:ext cx="761400" cy="363960"/>
           </a:xfrm>
           <a:prstGeom prst="rect">
             <a:avLst/>
@@ -6022,7 +5257,7 @@
                 <a:spcPct val="100000"/>
               </a:lnSpc>
             </a:pPr>
-            <a:fld id="{102CED4A-9B36-432C-9E21-071C90EC06E2}" type="slidenum">
+            <a:fld id="{2E37165B-D40A-41D4-804C-294510F4118C}" type="slidenum">
               <a:rPr b="0" lang="en-US" sz="1800" spc="-1" strike="noStrike">
                 <a:solidFill>
                   <a:srgbClr val="808080"/>
@@ -6050,7 +5285,7 @@
         <p:spPr>
           <a:xfrm>
             <a:off x="912240" y="1268280"/>
-            <a:ext cx="9211680" cy="365040"/>
+            <a:ext cx="9211320" cy="364680"/>
           </a:xfrm>
           <a:prstGeom prst="rect">
             <a:avLst/>
@@ -6099,7 +5334,7 @@
         <p:spPr>
           <a:xfrm>
             <a:off x="0" y="0"/>
-            <a:ext cx="3055680" cy="565560"/>
+            <a:ext cx="3055320" cy="565200"/>
           </a:xfrm>
           <a:prstGeom prst="rect">
             <a:avLst/>
@@ -6122,7 +5357,7 @@
         <p:spPr>
           <a:xfrm>
             <a:off x="7430400" y="134640"/>
-            <a:ext cx="3701520" cy="517680"/>
+            <a:ext cx="3701160" cy="517320"/>
           </a:xfrm>
           <a:prstGeom prst="rect">
             <a:avLst/>
@@ -6141,7 +5376,7 @@
         <p:spPr>
           <a:xfrm>
             <a:off x="11444760" y="0"/>
-            <a:ext cx="744840" cy="6853680"/>
+            <a:ext cx="744480" cy="6853320"/>
           </a:xfrm>
           <a:prstGeom prst="rect">
             <a:avLst/>
@@ -6190,7 +5425,7 @@
         <p:spPr>
           <a:xfrm>
             <a:off x="11438640" y="6453360"/>
-            <a:ext cx="761760" cy="363960"/>
+            <a:ext cx="761400" cy="363960"/>
           </a:xfrm>
           <a:prstGeom prst="rect">
             <a:avLst/>
@@ -6216,7 +5451,7 @@
                 <a:spcPct val="100000"/>
               </a:lnSpc>
             </a:pPr>
-            <a:fld id="{91062C85-66D0-415B-83B6-947607EABBBE}" type="slidenum">
+            <a:fld id="{27FBBD12-2C67-4BD0-9090-30FC675DAE85}" type="slidenum">
               <a:rPr b="0" lang="en-US" sz="1800" spc="-1" strike="noStrike">
                 <a:solidFill>
                   <a:srgbClr val="808080"/>
@@ -6244,7 +5479,7 @@
         <p:spPr>
           <a:xfrm>
             <a:off x="0" y="6642720"/>
-            <a:ext cx="12187800" cy="211320"/>
+            <a:ext cx="12187440" cy="211320"/>
           </a:xfrm>
           <a:prstGeom prst="rect">
             <a:avLst/>
@@ -6609,7 +5844,7 @@
         <p:spPr>
           <a:xfrm>
             <a:off x="527400" y="1412640"/>
-            <a:ext cx="10364760" cy="1151280"/>
+            <a:ext cx="10364400" cy="1150920"/>
           </a:xfrm>
           <a:prstGeom prst="rect">
             <a:avLst/>
@@ -6663,7 +5898,7 @@
         <p:spPr>
           <a:xfrm>
             <a:off x="527400" y="2852640"/>
-            <a:ext cx="10364760" cy="2372040"/>
+            <a:ext cx="10364400" cy="2371680"/>
           </a:xfrm>
           <a:prstGeom prst="rect">
             <a:avLst/>
@@ -6868,7 +6103,7 @@
         <p:spPr>
           <a:xfrm>
             <a:off x="539640" y="764640"/>
-            <a:ext cx="10748880" cy="499680"/>
+            <a:ext cx="10748520" cy="499320"/>
           </a:xfrm>
           <a:prstGeom prst="rect">
             <a:avLst/>
@@ -6922,7 +6157,7 @@
         <p:spPr>
           <a:xfrm>
             <a:off x="539640" y="1268640"/>
-            <a:ext cx="10748880" cy="5036400"/>
+            <a:ext cx="10748520" cy="5036040"/>
           </a:xfrm>
           <a:prstGeom prst="rect">
             <a:avLst/>
@@ -7239,7 +6474,7 @@
         <p:spPr>
           <a:xfrm>
             <a:off x="539640" y="764640"/>
-            <a:ext cx="10742040" cy="492840"/>
+            <a:ext cx="10741680" cy="492480"/>
           </a:xfrm>
           <a:prstGeom prst="rect">
             <a:avLst/>
@@ -7293,7 +6528,7 @@
         <p:spPr>
           <a:xfrm>
             <a:off x="539640" y="1268280"/>
-            <a:ext cx="10742040" cy="5029560"/>
+            <a:ext cx="10741680" cy="5029200"/>
           </a:xfrm>
           <a:prstGeom prst="rect">
             <a:avLst/>
@@ -7314,19 +6549,13 @@
             <a:noAutofit/>
           </a:bodyPr>
           <a:p>
-            <a:pPr marL="216000" indent="-216000">
+            <a:pPr>
               <a:lnSpc>
                 <a:spcPct val="100000"/>
               </a:lnSpc>
               <a:spcBef>
                 <a:spcPts val="360"/>
               </a:spcBef>
-              <a:buClr>
-                <a:srgbClr val="008c4f"/>
-              </a:buClr>
-              <a:buSzPct val="45000"/>
-              <a:buFont typeface="DejaVu Sans"/>
-              <a:buChar char="◾"/>
             </a:pPr>
             <a:endParaRPr b="0" lang="en-US" sz="1800" spc="-1" strike="noStrike">
               <a:solidFill>
@@ -7758,7 +6987,7 @@
         <p:spPr>
           <a:xfrm>
             <a:off x="539640" y="764640"/>
-            <a:ext cx="10740600" cy="491400"/>
+            <a:ext cx="10740240" cy="491040"/>
           </a:xfrm>
           <a:prstGeom prst="rect">
             <a:avLst/>
@@ -7838,7 +7067,7 @@
         <p:spPr>
           <a:xfrm>
             <a:off x="539640" y="1268640"/>
-            <a:ext cx="10740600" cy="5028120"/>
+            <a:ext cx="10740240" cy="5027760"/>
           </a:xfrm>
           <a:prstGeom prst="rect">
             <a:avLst/>
@@ -7859,6 +7088,22 @@
             <a:noAutofit/>
           </a:bodyPr>
           <a:p>
+            <a:pPr>
+              <a:lnSpc>
+                <a:spcPct val="100000"/>
+              </a:lnSpc>
+              <a:spcBef>
+                <a:spcPts val="360"/>
+              </a:spcBef>
+            </a:pPr>
+            <a:endParaRPr b="0" lang="en-US" sz="1800" spc="-1" strike="noStrike">
+              <a:solidFill>
+                <a:srgbClr val="000000"/>
+              </a:solidFill>
+              <a:latin typeface="Arial"/>
+            </a:endParaRPr>
+          </a:p>
+          <a:p>
             <a:pPr marL="216000" indent="-216000">
               <a:lnSpc>
                 <a:spcPct val="100000"/>
@@ -7873,6 +7118,209 @@
               <a:buFont typeface="DejaVu Sans"/>
               <a:buChar char="◾"/>
             </a:pPr>
+            <a:r>
+              <a:rPr b="0" lang="en-GB" sz="1800" spc="-1" strike="noStrike" u="sng">
+                <a:solidFill>
+                  <a:srgbClr val="000000"/>
+                </a:solidFill>
+                <a:uFillTx/>
+                <a:latin typeface="DejaVu Sans"/>
+                <a:ea typeface="DejaVu Sans"/>
+              </a:rPr>
+              <a:t>Lecture:</a:t>
+            </a:r>
+            <a:endParaRPr b="0" lang="en-US" sz="1800" spc="-1" strike="noStrike">
+              <a:solidFill>
+                <a:srgbClr val="000000"/>
+              </a:solidFill>
+              <a:latin typeface="Arial"/>
+            </a:endParaRPr>
+          </a:p>
+          <a:p>
+            <a:pPr lvl="1" marL="432000" indent="-216000">
+              <a:lnSpc>
+                <a:spcPct val="100000"/>
+              </a:lnSpc>
+              <a:spcBef>
+                <a:spcPts val="360"/>
+              </a:spcBef>
+              <a:buClr>
+                <a:srgbClr val="008c4f"/>
+              </a:buClr>
+              <a:buSzPct val="60000"/>
+              <a:buFont typeface="DejaVu Sans"/>
+              <a:buChar char="—"/>
+            </a:pPr>
+            <a:r>
+              <a:rPr b="0" lang="en-GB" sz="1800" spc="-1" strike="noStrike">
+                <a:solidFill>
+                  <a:srgbClr val="000000"/>
+                </a:solidFill>
+                <a:latin typeface="DejaVu Sans"/>
+                <a:ea typeface="DejaVu Sans"/>
+              </a:rPr>
+              <a:t>Wednesday </a:t>
+            </a:r>
+            <a:r>
+              <a:rPr b="1" lang="en-GB" sz="1800" spc="-1" strike="noStrike">
+                <a:solidFill>
+                  <a:srgbClr val="000000"/>
+                </a:solidFill>
+                <a:latin typeface="DejaVu Sans"/>
+                <a:ea typeface="DejaVu Sans"/>
+              </a:rPr>
+              <a:t>2:15 pm to 3:45 pm</a:t>
+            </a:r>
+            <a:r>
+              <a:rPr b="0" lang="en-GB" sz="1800" spc="-1" strike="noStrike">
+                <a:solidFill>
+                  <a:srgbClr val="000000"/>
+                </a:solidFill>
+                <a:latin typeface="DejaVu Sans"/>
+                <a:ea typeface="DejaVu Sans"/>
+              </a:rPr>
+              <a:t> (Berlin time) – </a:t>
+            </a:r>
+            <a:r>
+              <a:rPr b="1" lang="en-GB" sz="1800" spc="-1" strike="noStrike">
+                <a:solidFill>
+                  <a:srgbClr val="000000"/>
+                </a:solidFill>
+                <a:latin typeface="DejaVu Sans"/>
+                <a:ea typeface="DejaVu Sans"/>
+              </a:rPr>
+              <a:t>02.11</a:t>
+            </a:r>
+            <a:r>
+              <a:rPr b="0" lang="en-GB" sz="1800" spc="-1" strike="noStrike">
+                <a:solidFill>
+                  <a:srgbClr val="000000"/>
+                </a:solidFill>
+                <a:latin typeface="DejaVu Sans"/>
+                <a:ea typeface="DejaVu Sans"/>
+              </a:rPr>
+              <a:t>.</a:t>
+            </a:r>
+            <a:r>
+              <a:rPr b="1" lang="en-GB" sz="1800" spc="-1" strike="noStrike">
+                <a:solidFill>
+                  <a:srgbClr val="000000"/>
+                </a:solidFill>
+                <a:latin typeface="DejaVu Sans"/>
+                <a:ea typeface="DejaVu Sans"/>
+              </a:rPr>
+              <a:t>2022</a:t>
+            </a:r>
+            <a:r>
+              <a:rPr b="0" lang="en-GB" sz="1800" spc="-1" strike="noStrike">
+                <a:solidFill>
+                  <a:srgbClr val="000000"/>
+                </a:solidFill>
+                <a:latin typeface="DejaVu Sans"/>
+                <a:ea typeface="DejaVu Sans"/>
+              </a:rPr>
+              <a:t> to </a:t>
+            </a:r>
+            <a:r>
+              <a:rPr b="1" lang="en-GB" sz="1800" spc="-1" strike="noStrike">
+                <a:solidFill>
+                  <a:srgbClr val="000000"/>
+                </a:solidFill>
+                <a:latin typeface="DejaVu Sans"/>
+                <a:ea typeface="DejaVu Sans"/>
+              </a:rPr>
+              <a:t>08.02</a:t>
+            </a:r>
+            <a:r>
+              <a:rPr b="0" lang="en-GB" sz="1800" spc="-1" strike="noStrike">
+                <a:solidFill>
+                  <a:srgbClr val="000000"/>
+                </a:solidFill>
+                <a:latin typeface="DejaVu Sans"/>
+                <a:ea typeface="DejaVu Sans"/>
+              </a:rPr>
+              <a:t>.</a:t>
+            </a:r>
+            <a:r>
+              <a:rPr b="1" lang="en-GB" sz="1800" spc="-1" strike="noStrike">
+                <a:solidFill>
+                  <a:srgbClr val="000000"/>
+                </a:solidFill>
+                <a:latin typeface="DejaVu Sans"/>
+                <a:ea typeface="DejaVu Sans"/>
+              </a:rPr>
+              <a:t>2023</a:t>
+            </a:r>
+            <a:endParaRPr b="0" lang="en-US" sz="1800" spc="-1" strike="noStrike">
+              <a:solidFill>
+                <a:srgbClr val="000000"/>
+              </a:solidFill>
+              <a:latin typeface="Arial"/>
+            </a:endParaRPr>
+          </a:p>
+          <a:p>
+            <a:pPr lvl="1" marL="432000" indent="-216000">
+              <a:lnSpc>
+                <a:spcPct val="100000"/>
+              </a:lnSpc>
+              <a:spcBef>
+                <a:spcPts val="360"/>
+              </a:spcBef>
+              <a:buClr>
+                <a:srgbClr val="008c4f"/>
+              </a:buClr>
+              <a:buSzPct val="60000"/>
+              <a:buFont typeface="DejaVu Sans"/>
+              <a:buChar char="—"/>
+            </a:pPr>
+            <a:r>
+              <a:rPr b="0" lang="en-GB" sz="1800" spc="-1" strike="noStrike">
+                <a:solidFill>
+                  <a:srgbClr val="000000"/>
+                </a:solidFill>
+                <a:latin typeface="DejaVu Sans"/>
+                <a:ea typeface="DejaVu Sans"/>
+              </a:rPr>
+              <a:t>Location: Goslar Gotec (Am Stollen 19 C, 38640 Goslar, Germany) or via BigBlueButton (</a:t>
+            </a:r>
+            <a:r>
+              <a:rPr b="0" lang="en-GB" sz="1800" spc="-1" strike="noStrike" u="sng">
+                <a:solidFill>
+                  <a:srgbClr val="0000ff"/>
+                </a:solidFill>
+                <a:uFillTx/>
+                <a:latin typeface="DejaVu Sans"/>
+                <a:ea typeface="DejaVu Sans"/>
+                <a:hlinkClick r:id="rId1"/>
+              </a:rPr>
+              <a:t>Link</a:t>
+            </a:r>
+            <a:r>
+              <a:rPr b="0" lang="en-GB" sz="1800" spc="-1" strike="noStrike">
+                <a:solidFill>
+                  <a:srgbClr val="000000"/>
+                </a:solidFill>
+                <a:latin typeface="DejaVu Sans"/>
+                <a:ea typeface="DejaVu Sans"/>
+              </a:rPr>
+              <a:t>)</a:t>
+            </a:r>
+            <a:endParaRPr b="0" lang="en-US" sz="1800" spc="-1" strike="noStrike">
+              <a:solidFill>
+                <a:srgbClr val="000000"/>
+              </a:solidFill>
+              <a:latin typeface="Arial"/>
+            </a:endParaRPr>
+          </a:p>
+          <a:p>
+            <a:pPr>
+              <a:lnSpc>
+                <a:spcPct val="100000"/>
+              </a:lnSpc>
+              <a:spcBef>
+                <a:spcPts val="360"/>
+              </a:spcBef>
+            </a:pPr>
             <a:endParaRPr b="0" lang="en-US" sz="1800" spc="-1" strike="noStrike">
               <a:solidFill>
                 <a:srgbClr val="000000"/>
@@ -7904,7 +7352,7 @@
                 <a:latin typeface="DejaVu Sans"/>
                 <a:ea typeface="DejaVu Sans"/>
               </a:rPr>
-              <a:t>Lecture:</a:t>
+              <a:t>Exercise / Q&amp;A:</a:t>
             </a:r>
             <a:endParaRPr b="0" lang="en-US" sz="1800" spc="-1" strike="noStrike">
               <a:solidFill>
@@ -7946,7 +7394,7 @@
                 <a:latin typeface="DejaVu Sans"/>
                 <a:ea typeface="DejaVu Sans"/>
               </a:rPr>
-              <a:t>2:15 pm to 3:45 pm</a:t>
+              <a:t>4 pm to 5:30 pm</a:t>
             </a:r>
             <a:r>
               <a:rPr b="0" lang="en-GB" sz="1800" spc="-1" strike="noStrike">
@@ -8058,238 +7506,7 @@
                 <a:latin typeface="DejaVu Sans"/>
                 <a:ea typeface="DejaVu Sans"/>
               </a:rPr>
-              <a:t>Location: Goslar Gotec (Am Stollen 19 C, 38640 Goslar, Germany) or via BigBlueButton (</a:t>
-            </a:r>
-            <a:r>
-              <a:rPr b="0" lang="en-GB" sz="1800" spc="-1" strike="noStrike" u="sng">
-                <a:solidFill>
-                  <a:srgbClr val="0000ff"/>
-                </a:solidFill>
-                <a:uFillTx/>
-                <a:latin typeface="DejaVu Sans"/>
-                <a:ea typeface="DejaVu Sans"/>
-                <a:hlinkClick r:id="rId1"/>
-              </a:rPr>
-              <a:t>Link</a:t>
-            </a:r>
-            <a:r>
-              <a:rPr b="0" lang="en-GB" sz="1800" spc="-1" strike="noStrike">
-                <a:solidFill>
-                  <a:srgbClr val="000000"/>
-                </a:solidFill>
-                <a:latin typeface="DejaVu Sans"/>
-                <a:ea typeface="DejaVu Sans"/>
-              </a:rPr>
-              <a:t>)</a:t>
-            </a:r>
-            <a:endParaRPr b="0" lang="en-US" sz="1800" spc="-1" strike="noStrike">
-              <a:solidFill>
-                <a:srgbClr val="000000"/>
-              </a:solidFill>
-              <a:latin typeface="Arial"/>
-            </a:endParaRPr>
-          </a:p>
-          <a:p>
-            <a:pPr marL="216000" indent="-216000">
-              <a:lnSpc>
-                <a:spcPct val="100000"/>
-              </a:lnSpc>
-              <a:spcBef>
-                <a:spcPts val="360"/>
-              </a:spcBef>
-              <a:buClr>
-                <a:srgbClr val="008c4f"/>
-              </a:buClr>
-              <a:buSzPct val="45000"/>
-              <a:buFont typeface="DejaVu Sans"/>
-              <a:buChar char="◾"/>
-            </a:pPr>
-            <a:endParaRPr b="0" lang="en-US" sz="1800" spc="-1" strike="noStrike">
-              <a:solidFill>
-                <a:srgbClr val="000000"/>
-              </a:solidFill>
-              <a:latin typeface="Arial"/>
-            </a:endParaRPr>
-          </a:p>
-          <a:p>
-            <a:pPr marL="216000" indent="-216000">
-              <a:lnSpc>
-                <a:spcPct val="100000"/>
-              </a:lnSpc>
-              <a:spcBef>
-                <a:spcPts val="360"/>
-              </a:spcBef>
-              <a:buClr>
-                <a:srgbClr val="008c4f"/>
-              </a:buClr>
-              <a:buSzPct val="45000"/>
-              <a:buFont typeface="DejaVu Sans"/>
-              <a:buChar char="◾"/>
-            </a:pPr>
-            <a:r>
-              <a:rPr b="0" lang="en-GB" sz="1800" spc="-1" strike="noStrike" u="sng">
-                <a:solidFill>
-                  <a:srgbClr val="000000"/>
-                </a:solidFill>
-                <a:uFillTx/>
-                <a:latin typeface="DejaVu Sans"/>
-                <a:ea typeface="DejaVu Sans"/>
-              </a:rPr>
-              <a:t>Exercise / Q&amp;A:</a:t>
-            </a:r>
-            <a:endParaRPr b="0" lang="en-US" sz="1800" spc="-1" strike="noStrike">
-              <a:solidFill>
-                <a:srgbClr val="000000"/>
-              </a:solidFill>
-              <a:latin typeface="Arial"/>
-            </a:endParaRPr>
-          </a:p>
-          <a:p>
-            <a:pPr lvl="1" marL="432000" indent="-216000">
-              <a:lnSpc>
-                <a:spcPct val="100000"/>
-              </a:lnSpc>
-              <a:spcBef>
-                <a:spcPts val="360"/>
-              </a:spcBef>
-              <a:buClr>
-                <a:srgbClr val="008c4f"/>
-              </a:buClr>
-              <a:buSzPct val="60000"/>
-              <a:buFont typeface="DejaVu Sans"/>
-              <a:buChar char="—"/>
-            </a:pPr>
-            <a:r>
-              <a:rPr b="0" lang="en-GB" sz="1800" spc="-1" strike="noStrike">
-                <a:solidFill>
-                  <a:srgbClr val="000000"/>
-                </a:solidFill>
-                <a:latin typeface="DejaVu Sans"/>
-                <a:ea typeface="DejaVu Sans"/>
-              </a:rPr>
-              <a:t>Wednesday </a:t>
-            </a:r>
-            <a:r>
-              <a:rPr b="1" lang="en-GB" sz="1800" spc="-1" strike="noStrike">
-                <a:solidFill>
-                  <a:srgbClr val="000000"/>
-                </a:solidFill>
-                <a:latin typeface="DejaVu Sans"/>
-                <a:ea typeface="DejaVu Sans"/>
-              </a:rPr>
-              <a:t>4 pm to 5:30 pm</a:t>
-            </a:r>
-            <a:r>
-              <a:rPr b="0" lang="en-GB" sz="1800" spc="-1" strike="noStrike">
-                <a:solidFill>
-                  <a:srgbClr val="000000"/>
-                </a:solidFill>
-                <a:latin typeface="DejaVu Sans"/>
-                <a:ea typeface="DejaVu Sans"/>
-              </a:rPr>
-              <a:t> (Berlin time) – </a:t>
-            </a:r>
-            <a:r>
-              <a:rPr b="1" lang="en-GB" sz="1800" spc="-1" strike="noStrike">
-                <a:solidFill>
-                  <a:srgbClr val="000000"/>
-                </a:solidFill>
-                <a:latin typeface="DejaVu Sans"/>
-                <a:ea typeface="DejaVu Sans"/>
-              </a:rPr>
-              <a:t>02.11</a:t>
-            </a:r>
-            <a:r>
-              <a:rPr b="0" lang="en-GB" sz="1800" spc="-1" strike="noStrike">
-                <a:solidFill>
-                  <a:srgbClr val="000000"/>
-                </a:solidFill>
-                <a:latin typeface="DejaVu Sans"/>
-                <a:ea typeface="DejaVu Sans"/>
-              </a:rPr>
-              <a:t>.</a:t>
-            </a:r>
-            <a:r>
-              <a:rPr b="1" lang="en-GB" sz="1800" spc="-1" strike="noStrike">
-                <a:solidFill>
-                  <a:srgbClr val="000000"/>
-                </a:solidFill>
-                <a:latin typeface="DejaVu Sans"/>
-                <a:ea typeface="DejaVu Sans"/>
-              </a:rPr>
-              <a:t>2022</a:t>
-            </a:r>
-            <a:r>
-              <a:rPr b="0" lang="en-GB" sz="1800" spc="-1" strike="noStrike">
-                <a:solidFill>
-                  <a:srgbClr val="000000"/>
-                </a:solidFill>
-                <a:latin typeface="DejaVu Sans"/>
-                <a:ea typeface="DejaVu Sans"/>
-              </a:rPr>
-              <a:t> to </a:t>
-            </a:r>
-            <a:r>
-              <a:rPr b="1" lang="en-GB" sz="1800" spc="-1" strike="noStrike">
-                <a:solidFill>
-                  <a:srgbClr val="000000"/>
-                </a:solidFill>
-                <a:latin typeface="DejaVu Sans"/>
-                <a:ea typeface="DejaVu Sans"/>
-              </a:rPr>
-              <a:t>08.02</a:t>
-            </a:r>
-            <a:r>
-              <a:rPr b="0" lang="en-GB" sz="1800" spc="-1" strike="noStrike">
-                <a:solidFill>
-                  <a:srgbClr val="000000"/>
-                </a:solidFill>
-                <a:latin typeface="DejaVu Sans"/>
-                <a:ea typeface="DejaVu Sans"/>
-              </a:rPr>
-              <a:t>.</a:t>
-            </a:r>
-            <a:r>
-              <a:rPr b="1" lang="en-GB" sz="1800" spc="-1" strike="noStrike">
-                <a:solidFill>
-                  <a:srgbClr val="000000"/>
-                </a:solidFill>
-                <a:latin typeface="DejaVu Sans"/>
-                <a:ea typeface="DejaVu Sans"/>
-              </a:rPr>
-              <a:t>2023</a:t>
-            </a:r>
-            <a:endParaRPr b="0" lang="en-US" sz="1800" spc="-1" strike="noStrike">
-              <a:solidFill>
-                <a:srgbClr val="000000"/>
-              </a:solidFill>
-              <a:latin typeface="Arial"/>
-            </a:endParaRPr>
-          </a:p>
-          <a:p>
-            <a:pPr lvl="1" marL="432000" indent="-216000">
-              <a:lnSpc>
-                <a:spcPct val="100000"/>
-              </a:lnSpc>
-              <a:spcBef>
-                <a:spcPts val="360"/>
-              </a:spcBef>
-              <a:buClr>
-                <a:srgbClr val="008c4f"/>
-              </a:buClr>
-              <a:buSzPct val="60000"/>
-              <a:buFont typeface="DejaVu Sans"/>
-              <a:buChar char="—"/>
-            </a:pPr>
-            <a:r>
-              <a:rPr b="0" lang="en-GB" sz="1800" spc="-1" strike="noStrike">
-                <a:solidFill>
-                  <a:srgbClr val="000000"/>
-                </a:solidFill>
-                <a:latin typeface="DejaVu Sans"/>
-                <a:ea typeface="DejaVu Sans"/>
-              </a:rPr>
-              <a:t>Location: Goslar Gotec (Am Stollen 19 C, 38640 Goslar, Germany) or via BigBlueButton (</a:t>
+              <a:t>Only via BigBlueButton (</a:t>
             </a:r>
             <a:r>
               <a:rPr b="0" lang="en-GB" sz="1800" spc="-1" strike="noStrike" u="sng">
@@ -8361,7 +7578,7 @@
         <p:spPr>
           <a:xfrm>
             <a:off x="539640" y="764640"/>
-            <a:ext cx="10748880" cy="499680"/>
+            <a:ext cx="10748520" cy="499320"/>
           </a:xfrm>
           <a:prstGeom prst="rect">
             <a:avLst/>
@@ -8415,7 +7632,7 @@
         <p:spPr>
           <a:xfrm>
             <a:off x="539640" y="1268280"/>
-            <a:ext cx="10748880" cy="5036400"/>
+            <a:ext cx="10748520" cy="5036040"/>
           </a:xfrm>
           <a:prstGeom prst="rect">
             <a:avLst/>
@@ -8436,10 +7653,26 @@
             <a:noAutofit/>
           </a:bodyPr>
           <a:p>
+            <a:pPr>
+              <a:lnSpc>
+                <a:spcPct val="100000"/>
+              </a:lnSpc>
+            </a:pPr>
+            <a:endParaRPr b="0" lang="en-US" sz="1800" spc="-1" strike="noStrike">
+              <a:solidFill>
+                <a:srgbClr val="000000"/>
+              </a:solidFill>
+              <a:latin typeface="Arial"/>
+            </a:endParaRPr>
+          </a:p>
+          <a:p>
             <a:pPr marL="216000" indent="-216000">
               <a:lnSpc>
                 <a:spcPct val="100000"/>
               </a:lnSpc>
+              <a:spcBef>
+                <a:spcPts val="360"/>
+              </a:spcBef>
               <a:buClr>
                 <a:srgbClr val="008c4f"/>
               </a:buClr>
@@ -8447,28 +7680,6 @@
               <a:buFont typeface="DejaVu Sans"/>
               <a:buChar char="◾"/>
             </a:pPr>
-            <a:endParaRPr b="0" lang="en-US" sz="1800" spc="-1" strike="noStrike">
-              <a:solidFill>
-                <a:srgbClr val="000000"/>
-              </a:solidFill>
-              <a:latin typeface="Arial"/>
-            </a:endParaRPr>
-          </a:p>
-          <a:p>
-            <a:pPr marL="216000" indent="-216000">
-              <a:lnSpc>
-                <a:spcPct val="100000"/>
-              </a:lnSpc>
-              <a:spcBef>
-                <a:spcPts val="360"/>
-              </a:spcBef>
-              <a:buClr>
-                <a:srgbClr val="008c4f"/>
-              </a:buClr>
-              <a:buSzPct val="45000"/>
-              <a:buFont typeface="DejaVu Sans"/>
-              <a:buChar char="◾"/>
-            </a:pPr>
             <a:r>
               <a:rPr b="0" lang="en-GB" sz="1800" spc="-1" strike="noStrike">
                 <a:solidFill>
@@ -8667,7 +7878,7 @@
             </a:endParaRPr>
           </a:p>
           <a:p>
-            <a:pPr marL="360" algn="ctr">
+            <a:pPr marL="360" indent="-216000" algn="ctr">
               <a:lnSpc>
                 <a:spcPct val="100000"/>
               </a:lnSpc>
@@ -8749,7 +7960,7 @@
         <p:spPr>
           <a:xfrm>
             <a:off x="539640" y="764640"/>
-            <a:ext cx="10742040" cy="492840"/>
+            <a:ext cx="10741680" cy="492480"/>
           </a:xfrm>
           <a:prstGeom prst="rect">
             <a:avLst/>
@@ -8803,7 +8014,7 @@
         <p:spPr>
           <a:xfrm>
             <a:off x="539640" y="1268280"/>
-            <a:ext cx="10742040" cy="5029560"/>
+            <a:ext cx="10741680" cy="5029200"/>
           </a:xfrm>
           <a:prstGeom prst="rect">
             <a:avLst/>
@@ -9019,7 +8230,7 @@
         <p:spPr>
           <a:xfrm>
             <a:off x="539640" y="764640"/>
-            <a:ext cx="10742040" cy="492840"/>
+            <a:ext cx="10741680" cy="492480"/>
           </a:xfrm>
           <a:prstGeom prst="rect">
             <a:avLst/>
@@ -9073,7 +8284,7 @@
         <p:spPr>
           <a:xfrm>
             <a:off x="698760" y="1316880"/>
-            <a:ext cx="10360800" cy="475920"/>
+            <a:ext cx="10360440" cy="475560"/>
           </a:xfrm>
           <a:prstGeom prst="rect">
             <a:avLst/>
@@ -9113,7 +8324,7 @@
               <a:solidFill>
                 <a:srgbClr val="000000"/>
               </a:solidFill>
-              <a:latin typeface="DejaVu Sans"/>
+              <a:latin typeface="Arial"/>
             </a:endParaRPr>
           </a:p>
         </p:txBody>
@@ -9181,7 +8392,7 @@
         <p:spPr>
           <a:xfrm>
             <a:off x="2057400" y="2111400"/>
-            <a:ext cx="7314480" cy="4059720"/>
+            <a:ext cx="7314120" cy="4059360"/>
           </a:xfrm>
           <a:prstGeom prst="rect">
             <a:avLst/>
@@ -9230,7 +8441,7 @@
         <p:spPr>
           <a:xfrm>
             <a:off x="539640" y="764640"/>
-            <a:ext cx="10742040" cy="492840"/>
+            <a:ext cx="10741680" cy="492480"/>
           </a:xfrm>
           <a:prstGeom prst="rect">
             <a:avLst/>
@@ -9284,7 +8495,7 @@
         <p:spPr>
           <a:xfrm>
             <a:off x="698760" y="1316880"/>
-            <a:ext cx="5443560" cy="440640"/>
+            <a:ext cx="5443200" cy="440280"/>
           </a:xfrm>
           <a:prstGeom prst="rect">
             <a:avLst/>
@@ -9335,7 +8546,7 @@
               <a:solidFill>
                 <a:srgbClr val="000000"/>
               </a:solidFill>
-              <a:latin typeface="DejaVu Sans"/>
+              <a:latin typeface="Arial"/>
             </a:endParaRPr>
           </a:p>
         </p:txBody>
@@ -9353,7 +8564,7 @@
         <p:spPr>
           <a:xfrm>
             <a:off x="2513520" y="1828800"/>
-            <a:ext cx="6858360" cy="4737240"/>
+            <a:ext cx="6858000" cy="4736880"/>
           </a:xfrm>
           <a:prstGeom prst="rect">
             <a:avLst/>
@@ -9402,7 +8613,7 @@
         <p:spPr>
           <a:xfrm>
             <a:off x="539640" y="764640"/>
-            <a:ext cx="10742040" cy="492840"/>
+            <a:ext cx="10741680" cy="492480"/>
           </a:xfrm>
           <a:prstGeom prst="rect">
             <a:avLst/>
@@ -9456,7 +8667,7 @@
         <p:spPr>
           <a:xfrm>
             <a:off x="698760" y="1316880"/>
-            <a:ext cx="5214960" cy="440640"/>
+            <a:ext cx="5214600" cy="440280"/>
           </a:xfrm>
           <a:prstGeom prst="rect">
             <a:avLst/>
@@ -9514,7 +8725,7 @@
         <p:spPr>
           <a:xfrm>
             <a:off x="1600200" y="2073600"/>
-            <a:ext cx="7699680" cy="3755520"/>
+            <a:ext cx="7699320" cy="3755160"/>
           </a:xfrm>
           <a:prstGeom prst="rect">
             <a:avLst/>
@@ -9568,7 +8779,7 @@
         <p:spPr>
           <a:xfrm>
             <a:off x="937800" y="3069000"/>
-            <a:ext cx="8868960" cy="2921040"/>
+            <a:ext cx="8868600" cy="2920680"/>
           </a:xfrm>
           <a:prstGeom prst="rect">
             <a:avLst/>
@@ -9587,7 +8798,7 @@
         <p:spPr>
           <a:xfrm>
             <a:off x="539640" y="764640"/>
-            <a:ext cx="10742040" cy="492840"/>
+            <a:ext cx="10741680" cy="492480"/>
           </a:xfrm>
           <a:prstGeom prst="rect">
             <a:avLst/>
@@ -9627,7 +8838,7 @@
               <a:solidFill>
                 <a:srgbClr val="000000"/>
               </a:solidFill>
-              <a:latin typeface="DejaVu Sans"/>
+              <a:latin typeface="Arial"/>
             </a:endParaRPr>
           </a:p>
         </p:txBody>
@@ -9641,7 +8852,7 @@
         <p:spPr>
           <a:xfrm>
             <a:off x="698760" y="1312200"/>
-            <a:ext cx="1731960" cy="363240"/>
+            <a:ext cx="1731600" cy="362880"/>
           </a:xfrm>
           <a:prstGeom prst="rect">
             <a:avLst/>
@@ -9681,7 +8892,7 @@
               <a:solidFill>
                 <a:srgbClr val="000000"/>
               </a:solidFill>
-              <a:latin typeface="DejaVu Sans"/>
+              <a:latin typeface="Arial"/>
             </a:endParaRPr>
           </a:p>
           <a:p>
@@ -9694,7 +8905,7 @@
               <a:solidFill>
                 <a:srgbClr val="000000"/>
               </a:solidFill>
-              <a:latin typeface="DejaVu Sans"/>
+              <a:latin typeface="Arial"/>
             </a:endParaRPr>
           </a:p>
           <a:p>
@@ -9707,7 +8918,7 @@
               <a:solidFill>
                 <a:srgbClr val="000000"/>
               </a:solidFill>
-              <a:latin typeface="DejaVu Sans"/>
+              <a:latin typeface="Arial"/>
             </a:endParaRPr>
           </a:p>
         </p:txBody>
@@ -9747,7 +8958,7 @@
           <a:fontRef idx="minor"/>
         </p:style>
         <p:txBody>
-          <a:bodyPr lIns="90000" rIns="90000" tIns="180000" bIns="180000" anchor="t" anchorCtr="1">
+          <a:bodyPr lIns="90000" rIns="90000" tIns="310320" bIns="310320" anchor="t" anchorCtr="1">
             <a:noAutofit/>
           </a:bodyPr>
           <a:p>
@@ -9796,7 +9007,7 @@
           <a:fontRef idx="minor"/>
         </p:style>
         <p:txBody>
-          <a:bodyPr lIns="90000" rIns="90000" tIns="180000" bIns="180000" anchor="t" anchorCtr="1">
+          <a:bodyPr lIns="90000" rIns="90000" tIns="310320" bIns="310320" anchor="t" anchorCtr="1">
             <a:noAutofit/>
           </a:bodyPr>
           <a:p>
@@ -9868,7 +9079,7 @@
         <p:spPr>
           <a:xfrm>
             <a:off x="846720" y="1679400"/>
-            <a:ext cx="8297280" cy="1187640"/>
+            <a:ext cx="8296920" cy="1186920"/>
           </a:xfrm>
           <a:prstGeom prst="rect">
             <a:avLst/>
@@ -9908,7 +9119,7 @@
               <a:solidFill>
                 <a:srgbClr val="000000"/>
               </a:solidFill>
-              <a:latin typeface="DejaVu Sans"/>
+              <a:latin typeface="Arial"/>
             </a:endParaRPr>
           </a:p>
           <a:p>
@@ -9931,7 +9142,7 @@
               <a:solidFill>
                 <a:srgbClr val="000000"/>
               </a:solidFill>
-              <a:latin typeface="DejaVu Sans"/>
+              <a:latin typeface="Arial"/>
             </a:endParaRPr>
           </a:p>
           <a:p>
@@ -9954,7 +9165,7 @@
               <a:solidFill>
                 <a:srgbClr val="000000"/>
               </a:solidFill>
-              <a:latin typeface="DejaVu Sans"/>
+              <a:latin typeface="Arial"/>
             </a:endParaRPr>
           </a:p>
           <a:p>
@@ -9977,7 +9188,7 @@
               <a:solidFill>
                 <a:srgbClr val="000000"/>
               </a:solidFill>
-              <a:latin typeface="DejaVu Sans"/>
+              <a:latin typeface="Arial"/>
             </a:endParaRPr>
           </a:p>
         </p:txBody>
@@ -9991,7 +9202,7 @@
         <p:spPr>
           <a:xfrm>
             <a:off x="7839360" y="1679400"/>
-            <a:ext cx="2613960" cy="426600"/>
+            <a:ext cx="2613600" cy="426240"/>
           </a:xfrm>
           <a:prstGeom prst="rect">
             <a:avLst/>
@@ -10036,7 +9247,7 @@
         <p:spPr>
           <a:xfrm>
             <a:off x="9109440" y="3583440"/>
-            <a:ext cx="278640" cy="363960"/>
+            <a:ext cx="278280" cy="363960"/>
           </a:xfrm>
           <a:prstGeom prst="rect">
             <a:avLst/>
@@ -10090,7 +9301,7 @@
         <p:spPr>
           <a:xfrm>
             <a:off x="9789840" y="4188960"/>
-            <a:ext cx="278640" cy="363960"/>
+            <a:ext cx="278280" cy="363960"/>
           </a:xfrm>
           <a:prstGeom prst="rect">
             <a:avLst/>
@@ -10144,7 +9355,7 @@
         <p:spPr>
           <a:xfrm>
             <a:off x="7531920" y="5741280"/>
-            <a:ext cx="279000" cy="363960"/>
+            <a:ext cx="278640" cy="363960"/>
           </a:xfrm>
           <a:prstGeom prst="rect">
             <a:avLst/>
@@ -10247,7 +9458,7 @@
         <p:spPr>
           <a:xfrm>
             <a:off x="1310760" y="5770800"/>
-            <a:ext cx="279000" cy="363960"/>
+            <a:ext cx="278640" cy="363960"/>
           </a:xfrm>
           <a:prstGeom prst="rect">
             <a:avLst/>
@@ -10331,7 +9542,7 @@
         <p:spPr>
           <a:xfrm>
             <a:off x="539640" y="764640"/>
-            <a:ext cx="10748880" cy="499680"/>
+            <a:ext cx="10748520" cy="499320"/>
           </a:xfrm>
           <a:prstGeom prst="rect">
             <a:avLst/>
@@ -10385,7 +9596,7 @@
         <p:spPr>
           <a:xfrm>
             <a:off x="539640" y="1268640"/>
-            <a:ext cx="10748880" cy="5036400"/>
+            <a:ext cx="10748520" cy="5036040"/>
           </a:xfrm>
           <a:prstGeom prst="rect">
             <a:avLst/>
@@ -10585,19 +9796,13 @@
             </a:endParaRPr>
           </a:p>
           <a:p>
-            <a:pPr marL="216000" indent="-216000">
+            <a:pPr>
               <a:lnSpc>
                 <a:spcPct val="100000"/>
               </a:lnSpc>
               <a:spcBef>
                 <a:spcPts val="360"/>
               </a:spcBef>
-              <a:buClr>
-                <a:srgbClr val="008c4f"/>
-              </a:buClr>
-              <a:buSzPct val="45000"/>
-              <a:buFont typeface="DejaVu Sans"/>
-              <a:buChar char="◾"/>
             </a:pPr>
             <a:endParaRPr b="0" lang="en-US" sz="1800" spc="-1" strike="noStrike">
               <a:solidFill>
@@ -10743,7 +9948,7 @@
         <p:spPr>
           <a:xfrm>
             <a:off x="539640" y="764640"/>
-            <a:ext cx="10748880" cy="499680"/>
+            <a:ext cx="10748520" cy="499320"/>
           </a:xfrm>
           <a:prstGeom prst="rect">
             <a:avLst/>
@@ -10801,7 +10006,7 @@
         <p:spPr>
           <a:xfrm>
             <a:off x="2684520" y="1323360"/>
-            <a:ext cx="1471680" cy="2172960"/>
+            <a:ext cx="1471320" cy="2172600"/>
           </a:xfrm>
           <a:prstGeom prst="rect">
             <a:avLst/>
@@ -10824,7 +10029,7 @@
         <p:spPr>
           <a:xfrm>
             <a:off x="7269840" y="1716120"/>
-            <a:ext cx="1785600" cy="1777680"/>
+            <a:ext cx="1785240" cy="1777320"/>
           </a:xfrm>
           <a:prstGeom prst="rect">
             <a:avLst/>
@@ -10843,7 +10048,7 @@
         <p:spPr>
           <a:xfrm>
             <a:off x="1620000" y="3439440"/>
-            <a:ext cx="3636360" cy="677880"/>
+            <a:ext cx="3636000" cy="677520"/>
           </a:xfrm>
           <a:prstGeom prst="rect">
             <a:avLst/>
@@ -10900,7 +10105,7 @@
         <p:spPr>
           <a:xfrm>
             <a:off x="6322680" y="3460320"/>
-            <a:ext cx="3636360" cy="677880"/>
+            <a:ext cx="3636000" cy="677520"/>
           </a:xfrm>
           <a:prstGeom prst="rect">
             <a:avLst/>
@@ -10961,7 +10166,7 @@
         <p:spPr>
           <a:xfrm>
             <a:off x="4845960" y="4206240"/>
-            <a:ext cx="1778760" cy="1770840"/>
+            <a:ext cx="1778400" cy="1770480"/>
           </a:xfrm>
           <a:prstGeom prst="rect">
             <a:avLst/>
@@ -10980,7 +10185,7 @@
         <p:spPr>
           <a:xfrm>
             <a:off x="1311840" y="5920200"/>
-            <a:ext cx="3629520" cy="671040"/>
+            <a:ext cx="3629160" cy="670680"/>
           </a:xfrm>
           <a:prstGeom prst="rect">
             <a:avLst/>
@@ -11025,7 +10230,7 @@
         <p:spPr>
           <a:xfrm>
             <a:off x="3950280" y="5903280"/>
-            <a:ext cx="3629520" cy="671040"/>
+            <a:ext cx="3629160" cy="670680"/>
           </a:xfrm>
           <a:prstGeom prst="rect">
             <a:avLst/>
@@ -11112,7 +10317,7 @@
         <p:spPr>
           <a:xfrm>
             <a:off x="539640" y="764640"/>
-            <a:ext cx="10748880" cy="499680"/>
+            <a:ext cx="10748520" cy="499320"/>
           </a:xfrm>
           <a:prstGeom prst="rect">
             <a:avLst/>
@@ -11166,7 +10371,7 @@
         <p:spPr>
           <a:xfrm>
             <a:off x="539640" y="1268280"/>
-            <a:ext cx="10748880" cy="5036400"/>
+            <a:ext cx="10748520" cy="5036040"/>
           </a:xfrm>
           <a:prstGeom prst="rect">
             <a:avLst/>
@@ -11313,7 +10518,7 @@
         <p:spPr>
           <a:xfrm>
             <a:off x="6489720" y="2132640"/>
-            <a:ext cx="518400" cy="498240"/>
+            <a:ext cx="518040" cy="497880"/>
           </a:xfrm>
           <a:prstGeom prst="star5">
             <a:avLst>
@@ -11374,7 +10579,7 @@
         <p:spPr>
           <a:xfrm>
             <a:off x="4294080" y="2247480"/>
-            <a:ext cx="2286720" cy="363960"/>
+            <a:ext cx="2286360" cy="363960"/>
           </a:xfrm>
           <a:prstGeom prst="rect">
             <a:avLst/>
@@ -11458,7 +10663,7 @@
         <p:spPr>
           <a:xfrm>
             <a:off x="539640" y="764640"/>
-            <a:ext cx="10748880" cy="499680"/>
+            <a:ext cx="10748520" cy="499320"/>
           </a:xfrm>
           <a:prstGeom prst="rect">
             <a:avLst/>
@@ -11512,7 +10717,7 @@
         <p:spPr>
           <a:xfrm>
             <a:off x="539640" y="1268640"/>
-            <a:ext cx="10748880" cy="5036400"/>
+            <a:ext cx="10748520" cy="5036040"/>
           </a:xfrm>
           <a:prstGeom prst="rect">
             <a:avLst/>
@@ -11869,7 +11074,7 @@
         <p:spPr>
           <a:xfrm>
             <a:off x="335520" y="1268640"/>
-            <a:ext cx="10748880" cy="5036400"/>
+            <a:ext cx="10748520" cy="5036040"/>
           </a:xfrm>
           <a:prstGeom prst="rect">
             <a:avLst/>
@@ -11929,7 +11134,7 @@
         <p:spPr>
           <a:xfrm>
             <a:off x="335520" y="764640"/>
-            <a:ext cx="10748880" cy="499680"/>
+            <a:ext cx="10748520" cy="499320"/>
           </a:xfrm>
           <a:prstGeom prst="rect">
             <a:avLst/>
@@ -12004,7 +11209,7 @@
         <p:spPr>
           <a:xfrm>
             <a:off x="542880" y="721800"/>
-            <a:ext cx="10354680" cy="495360"/>
+            <a:ext cx="10354320" cy="495000"/>
           </a:xfrm>
           <a:prstGeom prst="rect">
             <a:avLst/>
@@ -12058,7 +11263,7 @@
         <p:spPr>
           <a:xfrm>
             <a:off x="451800" y="1709280"/>
-            <a:ext cx="8222040" cy="4350240"/>
+            <a:ext cx="8221680" cy="4349880"/>
           </a:xfrm>
           <a:prstGeom prst="rect">
             <a:avLst/>
@@ -12103,7 +11308,7 @@
         <p:spPr>
           <a:xfrm>
             <a:off x="609480" y="1769400"/>
-            <a:ext cx="10585080" cy="4853160"/>
+            <a:ext cx="10584720" cy="4852800"/>
           </a:xfrm>
           <a:prstGeom prst="rect">
             <a:avLst/>
@@ -12554,7 +11759,7 @@
         <p:spPr>
           <a:xfrm>
             <a:off x="542880" y="721800"/>
-            <a:ext cx="10354680" cy="495360"/>
+            <a:ext cx="10354320" cy="495000"/>
           </a:xfrm>
           <a:prstGeom prst="rect">
             <a:avLst/>
@@ -12608,7 +11813,7 @@
         <p:spPr>
           <a:xfrm>
             <a:off x="451800" y="1709280"/>
-            <a:ext cx="8222040" cy="4350240"/>
+            <a:ext cx="8221680" cy="4349880"/>
           </a:xfrm>
           <a:prstGeom prst="rect">
             <a:avLst/>
@@ -12653,7 +11858,7 @@
         <p:spPr>
           <a:xfrm>
             <a:off x="609480" y="1769400"/>
-            <a:ext cx="10585080" cy="4853160"/>
+            <a:ext cx="10584720" cy="4852800"/>
           </a:xfrm>
           <a:prstGeom prst="rect">
             <a:avLst/>
@@ -12846,12 +12051,31 @@
             </a:endParaRPr>
           </a:p>
           <a:p>
-            <a:pPr marL="228600" indent="-228240">
+            <a:pPr>
               <a:lnSpc>
                 <a:spcPct val="90000"/>
               </a:lnSpc>
               <a:spcBef>
                 <a:spcPts val="1417"/>
+              </a:spcBef>
+              <a:tabLst>
+                <a:tab algn="l" pos="0"/>
+              </a:tabLst>
+            </a:pPr>
+            <a:endParaRPr b="0" lang="en-US" sz="1800" spc="-1" strike="noStrike">
+              <a:solidFill>
+                <a:srgbClr val="000000"/>
+              </a:solidFill>
+              <a:latin typeface="Arial"/>
+            </a:endParaRPr>
+          </a:p>
+          <a:p>
+            <a:pPr marL="216000" indent="-216000">
+              <a:lnSpc>
+                <a:spcPct val="90000"/>
+              </a:lnSpc>
+              <a:spcBef>
+                <a:spcPts val="1009"/>
               </a:spcBef>
               <a:buClr>
                 <a:srgbClr val="008c4f"/>
@@ -12863,31 +12087,6 @@
                 <a:tab algn="l" pos="0"/>
               </a:tabLst>
             </a:pPr>
-            <a:endParaRPr b="0" lang="en-US" sz="1800" spc="-1" strike="noStrike">
-              <a:solidFill>
-                <a:srgbClr val="000000"/>
-              </a:solidFill>
-              <a:latin typeface="Arial"/>
-            </a:endParaRPr>
-          </a:p>
-          <a:p>
-            <a:pPr marL="216000" indent="-216000">
-              <a:lnSpc>
-                <a:spcPct val="90000"/>
-              </a:lnSpc>
-              <a:spcBef>
-                <a:spcPts val="1009"/>
-              </a:spcBef>
-              <a:buClr>
-                <a:srgbClr val="008c4f"/>
-              </a:buClr>
-              <a:buSzPct val="45000"/>
-              <a:buFont typeface="DejaVu Sans"/>
-              <a:buChar char="◾"/>
-              <a:tabLst>
-                <a:tab algn="l" pos="0"/>
-              </a:tabLst>
-            </a:pPr>
             <a:r>
               <a:rPr b="0" lang="en-GB" sz="2000" spc="-1" strike="noStrike">
                 <a:solidFill>
@@ -13020,19 +12219,13 @@
             </a:endParaRPr>
           </a:p>
           <a:p>
-            <a:pPr marL="228600" indent="-228240">
+            <a:pPr>
               <a:lnSpc>
                 <a:spcPct val="90000"/>
               </a:lnSpc>
               <a:spcBef>
                 <a:spcPts val="1417"/>
               </a:spcBef>
-              <a:buClr>
-                <a:srgbClr val="008c4f"/>
-              </a:buClr>
-              <a:buSzPct val="45000"/>
-              <a:buFont typeface="DejaVu Sans"/>
-              <a:buChar char="◾"/>
               <a:tabLst>
                 <a:tab algn="l" pos="0"/>
               </a:tabLst>
@@ -13165,7 +12358,7 @@
         <p:spPr>
           <a:xfrm>
             <a:off x="542880" y="721800"/>
-            <a:ext cx="10354680" cy="495360"/>
+            <a:ext cx="10354320" cy="495000"/>
           </a:xfrm>
           <a:prstGeom prst="rect">
             <a:avLst/>
@@ -13219,7 +12412,7 @@
         <p:spPr>
           <a:xfrm>
             <a:off x="451800" y="1709280"/>
-            <a:ext cx="8222040" cy="4350240"/>
+            <a:ext cx="8221680" cy="4349880"/>
           </a:xfrm>
           <a:prstGeom prst="rect">
             <a:avLst/>
@@ -13264,7 +12457,7 @@
         <p:spPr>
           <a:xfrm>
             <a:off x="609480" y="1769400"/>
-            <a:ext cx="10585080" cy="4853160"/>
+            <a:ext cx="10584720" cy="4852800"/>
           </a:xfrm>
           <a:prstGeom prst="rect">
             <a:avLst/>
@@ -13613,7 +12806,7 @@
         <p:spPr>
           <a:xfrm>
             <a:off x="542880" y="721800"/>
-            <a:ext cx="10354680" cy="495360"/>
+            <a:ext cx="10354320" cy="495000"/>
           </a:xfrm>
           <a:prstGeom prst="rect">
             <a:avLst/>
@@ -13667,7 +12860,7 @@
         <p:spPr>
           <a:xfrm>
             <a:off x="451800" y="1709280"/>
-            <a:ext cx="8222040" cy="4350240"/>
+            <a:ext cx="8221680" cy="4349880"/>
           </a:xfrm>
           <a:prstGeom prst="rect">
             <a:avLst/>
@@ -13712,7 +12905,7 @@
         <p:spPr>
           <a:xfrm>
             <a:off x="609480" y="1769400"/>
-            <a:ext cx="10585080" cy="4853160"/>
+            <a:ext cx="10584720" cy="4852800"/>
           </a:xfrm>
           <a:prstGeom prst="rect">
             <a:avLst/>
@@ -13917,7 +13110,7 @@
         <p:spPr>
           <a:xfrm>
             <a:off x="539640" y="764640"/>
-            <a:ext cx="10748880" cy="499680"/>
+            <a:ext cx="10748520" cy="499320"/>
           </a:xfrm>
           <a:prstGeom prst="rect">
             <a:avLst/>
@@ -13971,7 +13164,7 @@
         <p:spPr>
           <a:xfrm>
             <a:off x="539640" y="1268280"/>
-            <a:ext cx="10748880" cy="5036400"/>
+            <a:ext cx="10748520" cy="5036040"/>
           </a:xfrm>
           <a:prstGeom prst="rect">
             <a:avLst/>
@@ -14044,19 +13237,13 @@
             </a:endParaRPr>
           </a:p>
           <a:p>
-            <a:pPr marL="216000" indent="-216000">
+            <a:pPr>
               <a:lnSpc>
                 <a:spcPct val="100000"/>
               </a:lnSpc>
               <a:spcBef>
                 <a:spcPts val="360"/>
               </a:spcBef>
-              <a:buClr>
-                <a:srgbClr val="008c4f"/>
-              </a:buClr>
-              <a:buSzPct val="45000"/>
-              <a:buFont typeface="DejaVu Sans"/>
-              <a:buChar char="◾"/>
             </a:pPr>
             <a:endParaRPr b="0" lang="en-US" sz="1800" spc="-1" strike="noStrike">
               <a:solidFill>
@@ -14138,7 +13325,7 @@
         <p:spPr>
           <a:xfrm>
             <a:off x="542880" y="721800"/>
-            <a:ext cx="10357560" cy="498240"/>
+            <a:ext cx="10357200" cy="497880"/>
           </a:xfrm>
           <a:prstGeom prst="rect">
             <a:avLst/>
@@ -14196,7 +13383,7 @@
         <p:spPr>
           <a:xfrm>
             <a:off x="542880" y="2387520"/>
-            <a:ext cx="10102680" cy="2080080"/>
+            <a:ext cx="10102320" cy="2079720"/>
           </a:xfrm>
           <a:prstGeom prst="rect">
             <a:avLst/>
@@ -14245,7 +13432,7 @@
         <p:spPr>
           <a:xfrm>
             <a:off x="539640" y="764640"/>
-            <a:ext cx="10742040" cy="492840"/>
+            <a:ext cx="10741680" cy="492480"/>
           </a:xfrm>
           <a:prstGeom prst="rect">
             <a:avLst/>
@@ -14299,7 +13486,7 @@
         <p:spPr>
           <a:xfrm>
             <a:off x="539640" y="1268640"/>
-            <a:ext cx="10742040" cy="5029560"/>
+            <a:ext cx="10741680" cy="5029200"/>
           </a:xfrm>
           <a:prstGeom prst="rect">
             <a:avLst/>

</xml_diff>

<commit_message>
changed exercise numbers from five to seven.
</commit_message>
<xml_diff>
--- a/Requirements-Engineering/RE-L00-Organization.pptx
+++ b/Requirements-Engineering/RE-L00-Organization.pptx
@@ -361,7 +361,7 @@
             <a:pPr indent="0" algn="r">
               <a:buNone/>
             </a:pPr>
-            <a:fld id="{452BB564-69B1-497D-9407-52905F72E664}" type="slidenum">
+            <a:fld id="{8CDF1CCD-7444-464F-B5F5-3C1ADABB8A90}" type="slidenum">
               <a:rPr b="0" lang="en-US" sz="1400" spc="-1" strike="noStrike">
                 <a:solidFill>
                   <a:srgbClr val="000000"/>
@@ -500,7 +500,7 @@
                 <a:spcPct val="100000"/>
               </a:lnSpc>
             </a:pPr>
-            <a:fld id="{4FD15DD2-E033-4D19-96B2-2289E2C56DFC}" type="slidenum">
+            <a:fld id="{336D1B9D-D691-4415-BD26-AA437D5FDB49}" type="slidenum">
               <a:rPr b="0" lang="en-GB" sz="1800" spc="-1" strike="noStrike">
                 <a:solidFill>
                   <a:srgbClr val="000000"/>
@@ -508,7 +508,7 @@
                 <a:latin typeface="+mn-lt"/>
                 <a:ea typeface="+mn-ea"/>
               </a:rPr>
-              <a:t>&lt;number&gt;</a:t>
+              <a:t>6</a:t>
             </a:fld>
             <a:endParaRPr b="0" lang="en-US" sz="1800" spc="-1" strike="noStrike">
               <a:solidFill>
@@ -639,7 +639,7 @@
                 <a:spcPct val="100000"/>
               </a:lnSpc>
             </a:pPr>
-            <a:fld id="{F80090E1-6F21-46D2-8303-0D6301D4F875}" type="slidenum">
+            <a:fld id="{92350BD9-EE2C-4292-945E-FA0489128349}" type="slidenum">
               <a:rPr b="0" lang="en-GB" sz="1800" spc="-1" strike="noStrike">
                 <a:solidFill>
                   <a:srgbClr val="000000"/>
@@ -647,7 +647,7 @@
                 <a:latin typeface="+mn-lt"/>
                 <a:ea typeface="+mn-ea"/>
               </a:rPr>
-              <a:t>&lt;number&gt;</a:t>
+              <a:t>6</a:t>
             </a:fld>
             <a:endParaRPr b="0" lang="en-US" sz="1800" spc="-1" strike="noStrike">
               <a:solidFill>
@@ -778,7 +778,7 @@
                 <a:spcPct val="100000"/>
               </a:lnSpc>
             </a:pPr>
-            <a:fld id="{E3621469-01A3-4422-851B-F2B4C8ADF5CB}" type="slidenum">
+            <a:fld id="{03208CA3-0788-4F74-B3D0-56528ED5AF1C}" type="slidenum">
               <a:rPr b="0" lang="en-GB" sz="1800" spc="-1" strike="noStrike">
                 <a:solidFill>
                   <a:srgbClr val="000000"/>
@@ -917,7 +917,7 @@
                 <a:spcPct val="100000"/>
               </a:lnSpc>
             </a:pPr>
-            <a:fld id="{5CE52C95-3F83-4C71-ACEC-6A4D2D450492}" type="slidenum">
+            <a:fld id="{E9AB138B-4DF3-4FE2-AD59-A95687009ADC}" type="slidenum">
               <a:rPr b="0" lang="en-GB" sz="1800" spc="-1" strike="noStrike">
                 <a:solidFill>
                   <a:srgbClr val="000000"/>
@@ -4597,7 +4597,7 @@
                 <a:spcPct val="100000"/>
               </a:lnSpc>
             </a:pPr>
-            <a:fld id="{8E4545E5-0263-4960-97AA-5AC6D21CD6A8}" type="slidenum">
+            <a:fld id="{593DB9DE-0721-4C9E-AE01-91862C771F44}" type="slidenum">
               <a:rPr b="0" lang="en-US" sz="1800" spc="-1" strike="noStrike">
                 <a:solidFill>
                   <a:srgbClr val="808080"/>
@@ -4893,7 +4893,61 @@
                 </a:solidFill>
                 <a:latin typeface="Arial"/>
               </a:rPr>
-              <a:t>Click to edit the title text format</a:t>
+              <a:t>Click </a:t>
+            </a:r>
+            <a:r>
+              <a:rPr b="0" lang="en-US" sz="4400" spc="-1" strike="noStrike">
+                <a:solidFill>
+                  <a:srgbClr val="000000"/>
+                </a:solidFill>
+                <a:latin typeface="Arial"/>
+              </a:rPr>
+              <a:t>to edit </a:t>
+            </a:r>
+            <a:r>
+              <a:rPr b="0" lang="en-US" sz="4400" spc="-1" strike="noStrike">
+                <a:solidFill>
+                  <a:srgbClr val="000000"/>
+                </a:solidFill>
+                <a:latin typeface="Arial"/>
+              </a:rPr>
+              <a:t>the </a:t>
+            </a:r>
+            <a:r>
+              <a:rPr b="0" lang="en-US" sz="4400" spc="-1" strike="noStrike">
+                <a:solidFill>
+                  <a:srgbClr val="000000"/>
+                </a:solidFill>
+                <a:latin typeface="Arial"/>
+              </a:rPr>
+              <a:t>title </a:t>
+            </a:r>
+            <a:r>
+              <a:rPr b="0" lang="en-US" sz="4400" spc="-1" strike="noStrike">
+                <a:solidFill>
+                  <a:srgbClr val="000000"/>
+                </a:solidFill>
+                <a:latin typeface="Arial"/>
+              </a:rPr>
+              <a:t>text </a:t>
+            </a:r>
+            <a:r>
+              <a:rPr b="0" lang="en-US" sz="4400" spc="-1" strike="noStrike">
+                <a:solidFill>
+                  <a:srgbClr val="000000"/>
+                </a:solidFill>
+                <a:latin typeface="Arial"/>
+              </a:rPr>
+              <a:t>forma</a:t>
+            </a:r>
+            <a:r>
+              <a:rPr b="0" lang="en-US" sz="4400" spc="-1" strike="noStrike">
+                <a:solidFill>
+                  <a:srgbClr val="000000"/>
+                </a:solidFill>
+                <a:latin typeface="Arial"/>
+              </a:rPr>
+              <a:t>t</a:t>
             </a:r>
             <a:endParaRPr b="0" lang="en-US" sz="4400" spc="-1" strike="noStrike">
               <a:solidFill>
@@ -5257,7 +5311,7 @@
                 <a:spcPct val="100000"/>
               </a:lnSpc>
             </a:pPr>
-            <a:fld id="{2E37165B-D40A-41D4-804C-294510F4118C}" type="slidenum">
+            <a:fld id="{452A815D-04F0-47A8-89CF-D773549CE23F}" type="slidenum">
               <a:rPr b="0" lang="en-US" sz="1800" spc="-1" strike="noStrike">
                 <a:solidFill>
                   <a:srgbClr val="808080"/>
@@ -5451,7 +5505,7 @@
                 <a:spcPct val="100000"/>
               </a:lnSpc>
             </a:pPr>
-            <a:fld id="{27FBBD12-2C67-4BD0-9090-30FC675DAE85}" type="slidenum">
+            <a:fld id="{6EF44C3B-FE7B-42E5-9B3F-844CC41EF172}" type="slidenum">
               <a:rPr b="0" lang="en-US" sz="1800" spc="-1" strike="noStrike">
                 <a:solidFill>
                   <a:srgbClr val="808080"/>
@@ -7870,28 +7924,6 @@
               </a:rPr>
               <a:t>Submission of each exercise is mandatory</a:t>
             </a:r>
-            <a:endParaRPr b="0" lang="en-US" sz="1800" spc="-1" strike="noStrike">
-              <a:solidFill>
-                <a:srgbClr val="000000"/>
-              </a:solidFill>
-              <a:latin typeface="Arial"/>
-            </a:endParaRPr>
-          </a:p>
-          <a:p>
-            <a:pPr marL="360" indent="-216000" algn="ctr">
-              <a:lnSpc>
-                <a:spcPct val="100000"/>
-              </a:lnSpc>
-              <a:spcBef>
-                <a:spcPts val="360"/>
-              </a:spcBef>
-              <a:buClr>
-                <a:srgbClr val="008c4f"/>
-              </a:buClr>
-              <a:buSzPct val="45000"/>
-              <a:buFont typeface="DejaVu Sans"/>
-              <a:buChar char="◾"/>
-            </a:pPr>
             <a:r>
               <a:rPr b="1" lang="en-GB" sz="1800" spc="-1" strike="noStrike">
                 <a:solidFill>
@@ -7900,17 +7932,7 @@
                 <a:latin typeface="DejaVu Sans"/>
                 <a:ea typeface="DejaVu Sans"/>
               </a:rPr>
-              <a:t> </a:t>
-            </a:r>
-            <a:r>
-              <a:rPr b="1" lang="en-GB" sz="1800" spc="-1" strike="noStrike">
-                <a:solidFill>
-                  <a:srgbClr val="ffffff"/>
-                </a:solidFill>
-                <a:latin typeface="DejaVu Sans"/>
-                <a:ea typeface="DejaVu Sans"/>
-              </a:rPr>
-              <a:t>follow on the next slides (Examination)</a:t>
+              <a:t>ow on the next slides (Examination)</a:t>
             </a:r>
             <a:endParaRPr b="0" lang="en-US" sz="1800" spc="-1" strike="noStrike">
               <a:solidFill>
@@ -9701,7 +9723,7 @@
                 <a:latin typeface="DejaVu Sans"/>
                 <a:ea typeface="DejaVu Sans"/>
               </a:rPr>
-              <a:t>Successful completion of the compulsory five exercises</a:t>
+              <a:t>Successful completion of the compulsory seven exercises</a:t>
             </a:r>
             <a:endParaRPr b="0" lang="en-US" sz="1800" spc="-1" strike="noStrike">
               <a:solidFill>

</xml_diff>

<commit_message>
Updated RE L00 and RE L03 to reflect altered timetable.
</commit_message>
<xml_diff>
--- a/Requirements-Engineering/RE-L00-Organization.pptx
+++ b/Requirements-Engineering/RE-L00-Organization.pptx
@@ -361,7 +361,7 @@
             <a:pPr indent="0" algn="r">
               <a:buNone/>
             </a:pPr>
-            <a:fld id="{8CDF1CCD-7444-464F-B5F5-3C1ADABB8A90}" type="slidenum">
+            <a:fld id="{8E34E5D2-FF39-442D-B2E3-1D89AC1204B4}" type="slidenum">
               <a:rPr b="0" lang="en-US" sz="1400" spc="-1" strike="noStrike">
                 <a:solidFill>
                   <a:srgbClr val="000000"/>
@@ -415,7 +415,7 @@
         <p:spPr>
           <a:xfrm>
             <a:off x="533520" y="763560"/>
-            <a:ext cx="6697440" cy="3765600"/>
+            <a:ext cx="6697080" cy="3765240"/>
           </a:xfrm>
           <a:prstGeom prst="rect">
             <a:avLst/>
@@ -438,7 +438,7 @@
         <p:spPr>
           <a:xfrm>
             <a:off x="777240" y="4777560"/>
-            <a:ext cx="6211080" cy="4519440"/>
+            <a:ext cx="6210720" cy="4519080"/>
           </a:xfrm>
           <a:prstGeom prst="rect">
             <a:avLst/>
@@ -474,7 +474,7 @@
         <p:spPr>
           <a:xfrm>
             <a:off x="4399200" y="9555480"/>
-            <a:ext cx="3366360" cy="496080"/>
+            <a:ext cx="3366000" cy="495720"/>
           </a:xfrm>
           <a:prstGeom prst="rect">
             <a:avLst/>
@@ -500,7 +500,7 @@
                 <a:spcPct val="100000"/>
               </a:lnSpc>
             </a:pPr>
-            <a:fld id="{336D1B9D-D691-4415-BD26-AA437D5FDB49}" type="slidenum">
+            <a:fld id="{9A0F455C-26CA-4774-BE5B-84BD9E2067B8}" type="slidenum">
               <a:rPr b="0" lang="en-GB" sz="1800" spc="-1" strike="noStrike">
                 <a:solidFill>
                   <a:srgbClr val="000000"/>
@@ -554,7 +554,7 @@
         <p:spPr>
           <a:xfrm>
             <a:off x="533520" y="763560"/>
-            <a:ext cx="6697440" cy="3765600"/>
+            <a:ext cx="6697080" cy="3765240"/>
           </a:xfrm>
           <a:prstGeom prst="rect">
             <a:avLst/>
@@ -577,7 +577,7 @@
         <p:spPr>
           <a:xfrm>
             <a:off x="777240" y="4777560"/>
-            <a:ext cx="6211080" cy="4519440"/>
+            <a:ext cx="6210720" cy="4519080"/>
           </a:xfrm>
           <a:prstGeom prst="rect">
             <a:avLst/>
@@ -613,7 +613,7 @@
         <p:spPr>
           <a:xfrm>
             <a:off x="4399200" y="9555480"/>
-            <a:ext cx="3366360" cy="496080"/>
+            <a:ext cx="3366000" cy="495720"/>
           </a:xfrm>
           <a:prstGeom prst="rect">
             <a:avLst/>
@@ -639,7 +639,7 @@
                 <a:spcPct val="100000"/>
               </a:lnSpc>
             </a:pPr>
-            <a:fld id="{92350BD9-EE2C-4292-945E-FA0489128349}" type="slidenum">
+            <a:fld id="{166C3ED1-8F9A-40F7-AFF4-85320946D5D6}" type="slidenum">
               <a:rPr b="0" lang="en-GB" sz="1800" spc="-1" strike="noStrike">
                 <a:solidFill>
                   <a:srgbClr val="000000"/>
@@ -693,7 +693,7 @@
         <p:spPr>
           <a:xfrm>
             <a:off x="533520" y="763560"/>
-            <a:ext cx="6697440" cy="3765600"/>
+            <a:ext cx="6697080" cy="3765240"/>
           </a:xfrm>
           <a:prstGeom prst="rect">
             <a:avLst/>
@@ -716,7 +716,7 @@
         <p:spPr>
           <a:xfrm>
             <a:off x="777240" y="4777560"/>
-            <a:ext cx="6211080" cy="4519440"/>
+            <a:ext cx="6210720" cy="4519080"/>
           </a:xfrm>
           <a:prstGeom prst="rect">
             <a:avLst/>
@@ -752,7 +752,7 @@
         <p:spPr>
           <a:xfrm>
             <a:off x="4399200" y="9555480"/>
-            <a:ext cx="3366360" cy="496080"/>
+            <a:ext cx="3366000" cy="495720"/>
           </a:xfrm>
           <a:prstGeom prst="rect">
             <a:avLst/>
@@ -778,7 +778,7 @@
                 <a:spcPct val="100000"/>
               </a:lnSpc>
             </a:pPr>
-            <a:fld id="{03208CA3-0788-4F74-B3D0-56528ED5AF1C}" type="slidenum">
+            <a:fld id="{8C58E9A8-2617-47D3-9BA5-464DBBD6944C}" type="slidenum">
               <a:rPr b="0" lang="en-GB" sz="1800" spc="-1" strike="noStrike">
                 <a:solidFill>
                   <a:srgbClr val="000000"/>
@@ -832,7 +832,7 @@
         <p:spPr>
           <a:xfrm>
             <a:off x="533520" y="763560"/>
-            <a:ext cx="6697440" cy="3765600"/>
+            <a:ext cx="6697080" cy="3765240"/>
           </a:xfrm>
           <a:prstGeom prst="rect">
             <a:avLst/>
@@ -855,7 +855,7 @@
         <p:spPr>
           <a:xfrm>
             <a:off x="777240" y="4777560"/>
-            <a:ext cx="6211080" cy="4519440"/>
+            <a:ext cx="6210720" cy="4519080"/>
           </a:xfrm>
           <a:prstGeom prst="rect">
             <a:avLst/>
@@ -891,7 +891,7 @@
         <p:spPr>
           <a:xfrm>
             <a:off x="4399200" y="9555480"/>
-            <a:ext cx="3366360" cy="496080"/>
+            <a:ext cx="3366000" cy="495720"/>
           </a:xfrm>
           <a:prstGeom prst="rect">
             <a:avLst/>
@@ -917,7 +917,7 @@
                 <a:spcPct val="100000"/>
               </a:lnSpc>
             </a:pPr>
-            <a:fld id="{E9AB138B-4DF3-4FE2-AD59-A95687009ADC}" type="slidenum">
+            <a:fld id="{7D58F418-82EC-4394-9950-E1AD9D6F9582}" type="slidenum">
               <a:rPr b="0" lang="en-GB" sz="1800" spc="-1" strike="noStrike">
                 <a:solidFill>
                   <a:srgbClr val="000000"/>
@@ -4522,7 +4522,7 @@
         <p:spPr>
           <a:xfrm>
             <a:off x="11444760" y="0"/>
-            <a:ext cx="744480" cy="6853320"/>
+            <a:ext cx="744120" cy="6852960"/>
           </a:xfrm>
           <a:prstGeom prst="rect">
             <a:avLst/>
@@ -4571,7 +4571,7 @@
         <p:spPr>
           <a:xfrm>
             <a:off x="11438640" y="6453360"/>
-            <a:ext cx="761400" cy="363960"/>
+            <a:ext cx="761040" cy="363960"/>
           </a:xfrm>
           <a:prstGeom prst="rect">
             <a:avLst/>
@@ -4597,7 +4597,7 @@
                 <a:spcPct val="100000"/>
               </a:lnSpc>
             </a:pPr>
-            <a:fld id="{593DB9DE-0721-4C9E-AE01-91862C771F44}" type="slidenum">
+            <a:fld id="{0A8A5EDC-FF26-44E3-8E99-E4604F0480D6}" type="slidenum">
               <a:rPr b="0" lang="en-US" sz="1800" spc="-1" strike="noStrike">
                 <a:solidFill>
                   <a:srgbClr val="808080"/>
@@ -4625,7 +4625,7 @@
         <p:spPr>
           <a:xfrm>
             <a:off x="912240" y="1268280"/>
-            <a:ext cx="9211320" cy="364680"/>
+            <a:ext cx="9210960" cy="364320"/>
           </a:xfrm>
           <a:prstGeom prst="rect">
             <a:avLst/>
@@ -4674,7 +4674,7 @@
         <p:spPr>
           <a:xfrm>
             <a:off x="0" y="0"/>
-            <a:ext cx="3055320" cy="565200"/>
+            <a:ext cx="3054960" cy="564840"/>
           </a:xfrm>
           <a:prstGeom prst="rect">
             <a:avLst/>
@@ -4697,7 +4697,7 @@
         <p:spPr>
           <a:xfrm>
             <a:off x="7430400" y="134640"/>
-            <a:ext cx="3701160" cy="517320"/>
+            <a:ext cx="3700800" cy="516960"/>
           </a:xfrm>
           <a:prstGeom prst="rect">
             <a:avLst/>
@@ -4716,7 +4716,7 @@
         <p:spPr>
           <a:xfrm>
             <a:off x="912240" y="1268280"/>
-            <a:ext cx="9211320" cy="364680"/>
+            <a:ext cx="9210960" cy="364320"/>
           </a:xfrm>
           <a:prstGeom prst="rect">
             <a:avLst/>
@@ -4761,7 +4761,7 @@
         <p:spPr>
           <a:xfrm>
             <a:off x="11444760" y="0"/>
-            <a:ext cx="744480" cy="6853320"/>
+            <a:ext cx="744120" cy="6852960"/>
           </a:xfrm>
           <a:prstGeom prst="rect">
             <a:avLst/>
@@ -4810,7 +4810,7 @@
         <p:spPr>
           <a:xfrm>
             <a:off x="0" y="6642720"/>
-            <a:ext cx="12187440" cy="211320"/>
+            <a:ext cx="12187080" cy="211320"/>
           </a:xfrm>
           <a:prstGeom prst="rect">
             <a:avLst/>
@@ -4893,61 +4893,7 @@
                 </a:solidFill>
                 <a:latin typeface="Arial"/>
               </a:rPr>
-              <a:t>Click </a:t>
-            </a:r>
-            <a:r>
-              <a:rPr b="0" lang="en-US" sz="4400" spc="-1" strike="noStrike">
-                <a:solidFill>
-                  <a:srgbClr val="000000"/>
-                </a:solidFill>
-                <a:latin typeface="Arial"/>
-              </a:rPr>
-              <a:t>to edit </a:t>
-            </a:r>
-            <a:r>
-              <a:rPr b="0" lang="en-US" sz="4400" spc="-1" strike="noStrike">
-                <a:solidFill>
-                  <a:srgbClr val="000000"/>
-                </a:solidFill>
-                <a:latin typeface="Arial"/>
-              </a:rPr>
-              <a:t>the </a:t>
-            </a:r>
-            <a:r>
-              <a:rPr b="0" lang="en-US" sz="4400" spc="-1" strike="noStrike">
-                <a:solidFill>
-                  <a:srgbClr val="000000"/>
-                </a:solidFill>
-                <a:latin typeface="Arial"/>
-              </a:rPr>
-              <a:t>title </a:t>
-            </a:r>
-            <a:r>
-              <a:rPr b="0" lang="en-US" sz="4400" spc="-1" strike="noStrike">
-                <a:solidFill>
-                  <a:srgbClr val="000000"/>
-                </a:solidFill>
-                <a:latin typeface="Arial"/>
-              </a:rPr>
-              <a:t>text </a:t>
-            </a:r>
-            <a:r>
-              <a:rPr b="0" lang="en-US" sz="4400" spc="-1" strike="noStrike">
-                <a:solidFill>
-                  <a:srgbClr val="000000"/>
-                </a:solidFill>
-                <a:latin typeface="Arial"/>
-              </a:rPr>
-              <a:t>forma</a:t>
-            </a:r>
-            <a:r>
-              <a:rPr b="0" lang="en-US" sz="4400" spc="-1" strike="noStrike">
-                <a:solidFill>
-                  <a:srgbClr val="000000"/>
-                </a:solidFill>
-                <a:latin typeface="Arial"/>
-              </a:rPr>
-              <a:t>t</a:t>
+              <a:t>Click to edit the title text format</a:t>
             </a:r>
             <a:endParaRPr b="0" lang="en-US" sz="4400" spc="-1" strike="noStrike">
               <a:solidFill>
@@ -5236,7 +5182,7 @@
         <p:spPr>
           <a:xfrm>
             <a:off x="11444760" y="0"/>
-            <a:ext cx="744480" cy="6853320"/>
+            <a:ext cx="744120" cy="6852960"/>
           </a:xfrm>
           <a:prstGeom prst="rect">
             <a:avLst/>
@@ -5285,7 +5231,7 @@
         <p:spPr>
           <a:xfrm>
             <a:off x="11438640" y="6453360"/>
-            <a:ext cx="761400" cy="363960"/>
+            <a:ext cx="761040" cy="363960"/>
           </a:xfrm>
           <a:prstGeom prst="rect">
             <a:avLst/>
@@ -5311,7 +5257,7 @@
                 <a:spcPct val="100000"/>
               </a:lnSpc>
             </a:pPr>
-            <a:fld id="{452A815D-04F0-47A8-89CF-D773549CE23F}" type="slidenum">
+            <a:fld id="{A503B81D-5FB8-4514-BDF1-F91BC2DE14E2}" type="slidenum">
               <a:rPr b="0" lang="en-US" sz="1800" spc="-1" strike="noStrike">
                 <a:solidFill>
                   <a:srgbClr val="808080"/>
@@ -5339,7 +5285,7 @@
         <p:spPr>
           <a:xfrm>
             <a:off x="912240" y="1268280"/>
-            <a:ext cx="9211320" cy="364680"/>
+            <a:ext cx="9210960" cy="364320"/>
           </a:xfrm>
           <a:prstGeom prst="rect">
             <a:avLst/>
@@ -5388,7 +5334,7 @@
         <p:spPr>
           <a:xfrm>
             <a:off x="0" y="0"/>
-            <a:ext cx="3055320" cy="565200"/>
+            <a:ext cx="3054960" cy="564840"/>
           </a:xfrm>
           <a:prstGeom prst="rect">
             <a:avLst/>
@@ -5411,7 +5357,7 @@
         <p:spPr>
           <a:xfrm>
             <a:off x="7430400" y="134640"/>
-            <a:ext cx="3701160" cy="517320"/>
+            <a:ext cx="3700800" cy="516960"/>
           </a:xfrm>
           <a:prstGeom prst="rect">
             <a:avLst/>
@@ -5430,7 +5376,7 @@
         <p:spPr>
           <a:xfrm>
             <a:off x="11444760" y="0"/>
-            <a:ext cx="744480" cy="6853320"/>
+            <a:ext cx="744120" cy="6852960"/>
           </a:xfrm>
           <a:prstGeom prst="rect">
             <a:avLst/>
@@ -5479,7 +5425,7 @@
         <p:spPr>
           <a:xfrm>
             <a:off x="11438640" y="6453360"/>
-            <a:ext cx="761400" cy="363960"/>
+            <a:ext cx="761040" cy="363960"/>
           </a:xfrm>
           <a:prstGeom prst="rect">
             <a:avLst/>
@@ -5505,7 +5451,7 @@
                 <a:spcPct val="100000"/>
               </a:lnSpc>
             </a:pPr>
-            <a:fld id="{6EF44C3B-FE7B-42E5-9B3F-844CC41EF172}" type="slidenum">
+            <a:fld id="{0CFCF3C7-3572-4E86-813A-89F51A5FD7CA}" type="slidenum">
               <a:rPr b="0" lang="en-US" sz="1800" spc="-1" strike="noStrike">
                 <a:solidFill>
                   <a:srgbClr val="808080"/>
@@ -5533,7 +5479,7 @@
         <p:spPr>
           <a:xfrm>
             <a:off x="0" y="6642720"/>
-            <a:ext cx="12187440" cy="211320"/>
+            <a:ext cx="12187080" cy="211320"/>
           </a:xfrm>
           <a:prstGeom prst="rect">
             <a:avLst/>
@@ -5898,7 +5844,7 @@
         <p:spPr>
           <a:xfrm>
             <a:off x="527400" y="1412640"/>
-            <a:ext cx="10364400" cy="1150920"/>
+            <a:ext cx="10364040" cy="1150560"/>
           </a:xfrm>
           <a:prstGeom prst="rect">
             <a:avLst/>
@@ -5952,7 +5898,7 @@
         <p:spPr>
           <a:xfrm>
             <a:off x="527400" y="2852640"/>
-            <a:ext cx="10364400" cy="2371680"/>
+            <a:ext cx="10364040" cy="2371320"/>
           </a:xfrm>
           <a:prstGeom prst="rect">
             <a:avLst/>
@@ -6157,7 +6103,7 @@
         <p:spPr>
           <a:xfrm>
             <a:off x="539640" y="764640"/>
-            <a:ext cx="10748520" cy="499320"/>
+            <a:ext cx="10748160" cy="498960"/>
           </a:xfrm>
           <a:prstGeom prst="rect">
             <a:avLst/>
@@ -6211,7 +6157,7 @@
         <p:spPr>
           <a:xfrm>
             <a:off x="539640" y="1268640"/>
-            <a:ext cx="10748520" cy="5036040"/>
+            <a:ext cx="10748160" cy="5035680"/>
           </a:xfrm>
           <a:prstGeom prst="rect">
             <a:avLst/>
@@ -6382,7 +6328,7 @@
                 <a:latin typeface="DejaVu Sans"/>
                 <a:ea typeface="DejaVu Sans"/>
               </a:rPr>
-              <a:t>21.12.2022 → Exercise 05 – Coloured Petri Nets I</a:t>
+              <a:t>21.12.2022 → No Exercise</a:t>
             </a:r>
             <a:endParaRPr b="0" lang="en-US" sz="1800" spc="-1" strike="noStrike">
               <a:solidFill>
@@ -6414,7 +6360,17 @@
                 <a:latin typeface="DejaVu Sans"/>
                 <a:ea typeface="DejaVu Sans"/>
               </a:rPr>
-              <a:t>11.01.2023 → Exercise 06 – Coloured Petri Nets II</a:t>
+              <a:t>11.01.2023 → </a:t>
+            </a:r>
+            <a:r>
+              <a:rPr b="0" lang="en-GB" sz="1800" spc="-1" strike="noStrike">
+                <a:solidFill>
+                  <a:srgbClr val="000000"/>
+                </a:solidFill>
+                <a:latin typeface="DejaVu Sans"/>
+                <a:ea typeface="DejaVu Sans"/>
+              </a:rPr>
+              <a:t>Exercise 05 – Coloured Petri Nets I</a:t>
             </a:r>
             <a:endParaRPr b="0" lang="en-US" sz="1800" spc="-1" strike="noStrike">
               <a:solidFill>
@@ -6446,7 +6402,17 @@
                 <a:latin typeface="DejaVu Sans"/>
                 <a:ea typeface="DejaVu Sans"/>
               </a:rPr>
-              <a:t>18.01.2023 → Bonus Task</a:t>
+              <a:t>18.01.2023 → </a:t>
+            </a:r>
+            <a:r>
+              <a:rPr b="0" lang="en-GB" sz="1800" spc="-1" strike="noStrike">
+                <a:solidFill>
+                  <a:srgbClr val="000000"/>
+                </a:solidFill>
+                <a:latin typeface="DejaVu Sans"/>
+                <a:ea typeface="DejaVu Sans"/>
+              </a:rPr>
+              <a:t>Exercise 06 – Coloured Petri Nets II</a:t>
             </a:r>
             <a:endParaRPr b="0" lang="en-US" sz="1800" spc="-1" strike="noStrike">
               <a:solidFill>
@@ -6478,7 +6444,49 @@
                 <a:latin typeface="DejaVu Sans"/>
                 <a:ea typeface="DejaVu Sans"/>
               </a:rPr>
-              <a:t>25.01.2023 → Exercise 07 – Management and Traceability (MC)</a:t>
+              <a:t>25.01.2023 → </a:t>
+            </a:r>
+            <a:r>
+              <a:rPr b="0" lang="en-GB" sz="1800" spc="-1" strike="noStrike">
+                <a:solidFill>
+                  <a:srgbClr val="000000"/>
+                </a:solidFill>
+                <a:latin typeface="DejaVu Sans"/>
+                <a:ea typeface="DejaVu Sans"/>
+              </a:rPr>
+              <a:t>Bonus Task</a:t>
+            </a:r>
+            <a:endParaRPr b="0" lang="en-US" sz="1800" spc="-1" strike="noStrike">
+              <a:solidFill>
+                <a:srgbClr val="000000"/>
+              </a:solidFill>
+              <a:latin typeface="Arial"/>
+            </a:endParaRPr>
+          </a:p>
+          <a:p>
+            <a:pPr marL="195120" indent="-193680">
+              <a:lnSpc>
+                <a:spcPct val="100000"/>
+              </a:lnSpc>
+              <a:spcBef>
+                <a:spcPts val="360"/>
+              </a:spcBef>
+              <a:buClr>
+                <a:srgbClr val="008c4f"/>
+              </a:buClr>
+              <a:buSzPct val="80000"/>
+              <a:buFont typeface="Wingdings" charset="2"/>
+              <a:buChar char=""/>
+            </a:pPr>
+            <a:r>
+              <a:rPr b="0" lang="en-GB" sz="1800" spc="-1" strike="noStrike">
+                <a:solidFill>
+                  <a:srgbClr val="000000"/>
+                </a:solidFill>
+                <a:latin typeface="DejaVu Sans"/>
+                <a:ea typeface="DejaVu Sans"/>
+              </a:rPr>
+              <a:t>01.02.2023 → Exercise 07 – Management and Traceability (MC) </a:t>
             </a:r>
             <a:endParaRPr b="0" lang="en-US" sz="1800" spc="-1" strike="noStrike">
               <a:solidFill>
@@ -6528,7 +6536,7 @@
         <p:spPr>
           <a:xfrm>
             <a:off x="539640" y="764640"/>
-            <a:ext cx="10741680" cy="492480"/>
+            <a:ext cx="10741320" cy="492120"/>
           </a:xfrm>
           <a:prstGeom prst="rect">
             <a:avLst/>
@@ -6582,7 +6590,7 @@
         <p:spPr>
           <a:xfrm>
             <a:off x="539640" y="1268280"/>
-            <a:ext cx="10741680" cy="5029200"/>
+            <a:ext cx="10741320" cy="5028840"/>
           </a:xfrm>
           <a:prstGeom prst="rect">
             <a:avLst/>
@@ -7041,7 +7049,7 @@
         <p:spPr>
           <a:xfrm>
             <a:off x="539640" y="764640"/>
-            <a:ext cx="10740240" cy="491040"/>
+            <a:ext cx="10739880" cy="490680"/>
           </a:xfrm>
           <a:prstGeom prst="rect">
             <a:avLst/>
@@ -7121,7 +7129,7 @@
         <p:spPr>
           <a:xfrm>
             <a:off x="539640" y="1268640"/>
-            <a:ext cx="10740240" cy="5027760"/>
+            <a:ext cx="10739880" cy="5027400"/>
           </a:xfrm>
           <a:prstGeom prst="rect">
             <a:avLst/>
@@ -7632,7 +7640,7 @@
         <p:spPr>
           <a:xfrm>
             <a:off x="539640" y="764640"/>
-            <a:ext cx="10748520" cy="499320"/>
+            <a:ext cx="10748160" cy="498960"/>
           </a:xfrm>
           <a:prstGeom prst="rect">
             <a:avLst/>
@@ -7686,7 +7694,7 @@
         <p:spPr>
           <a:xfrm>
             <a:off x="539640" y="1268280"/>
-            <a:ext cx="10748520" cy="5036040"/>
+            <a:ext cx="10748160" cy="5035680"/>
           </a:xfrm>
           <a:prstGeom prst="rect">
             <a:avLst/>
@@ -7982,7 +7990,7 @@
         <p:spPr>
           <a:xfrm>
             <a:off x="539640" y="764640"/>
-            <a:ext cx="10741680" cy="492480"/>
+            <a:ext cx="10741320" cy="492120"/>
           </a:xfrm>
           <a:prstGeom prst="rect">
             <a:avLst/>
@@ -8036,7 +8044,7 @@
         <p:spPr>
           <a:xfrm>
             <a:off x="539640" y="1268280"/>
-            <a:ext cx="10741680" cy="5029200"/>
+            <a:ext cx="10741320" cy="5028840"/>
           </a:xfrm>
           <a:prstGeom prst="rect">
             <a:avLst/>
@@ -8252,7 +8260,7 @@
         <p:spPr>
           <a:xfrm>
             <a:off x="539640" y="764640"/>
-            <a:ext cx="10741680" cy="492480"/>
+            <a:ext cx="10741320" cy="492120"/>
           </a:xfrm>
           <a:prstGeom prst="rect">
             <a:avLst/>
@@ -8306,7 +8314,7 @@
         <p:spPr>
           <a:xfrm>
             <a:off x="698760" y="1316880"/>
-            <a:ext cx="10360440" cy="475560"/>
+            <a:ext cx="10360080" cy="475200"/>
           </a:xfrm>
           <a:prstGeom prst="rect">
             <a:avLst/>
@@ -8414,7 +8422,7 @@
         <p:spPr>
           <a:xfrm>
             <a:off x="2057400" y="2111400"/>
-            <a:ext cx="7314120" cy="4059360"/>
+            <a:ext cx="7313760" cy="4059000"/>
           </a:xfrm>
           <a:prstGeom prst="rect">
             <a:avLst/>
@@ -8463,7 +8471,7 @@
         <p:spPr>
           <a:xfrm>
             <a:off x="539640" y="764640"/>
-            <a:ext cx="10741680" cy="492480"/>
+            <a:ext cx="10741320" cy="492120"/>
           </a:xfrm>
           <a:prstGeom prst="rect">
             <a:avLst/>
@@ -8517,7 +8525,7 @@
         <p:spPr>
           <a:xfrm>
             <a:off x="698760" y="1316880"/>
-            <a:ext cx="5443200" cy="440280"/>
+            <a:ext cx="5442840" cy="439920"/>
           </a:xfrm>
           <a:prstGeom prst="rect">
             <a:avLst/>
@@ -8586,7 +8594,7 @@
         <p:spPr>
           <a:xfrm>
             <a:off x="2513520" y="1828800"/>
-            <a:ext cx="6858000" cy="4736880"/>
+            <a:ext cx="6857640" cy="4736520"/>
           </a:xfrm>
           <a:prstGeom prst="rect">
             <a:avLst/>
@@ -8635,7 +8643,7 @@
         <p:spPr>
           <a:xfrm>
             <a:off x="539640" y="764640"/>
-            <a:ext cx="10741680" cy="492480"/>
+            <a:ext cx="10741320" cy="492120"/>
           </a:xfrm>
           <a:prstGeom prst="rect">
             <a:avLst/>
@@ -8689,7 +8697,7 @@
         <p:spPr>
           <a:xfrm>
             <a:off x="698760" y="1316880"/>
-            <a:ext cx="5214600" cy="440280"/>
+            <a:ext cx="5214240" cy="439920"/>
           </a:xfrm>
           <a:prstGeom prst="rect">
             <a:avLst/>
@@ -8747,7 +8755,7 @@
         <p:spPr>
           <a:xfrm>
             <a:off x="1600200" y="2073600"/>
-            <a:ext cx="7699320" cy="3755160"/>
+            <a:ext cx="7698960" cy="3754800"/>
           </a:xfrm>
           <a:prstGeom prst="rect">
             <a:avLst/>
@@ -8801,7 +8809,7 @@
         <p:spPr>
           <a:xfrm>
             <a:off x="937800" y="3069000"/>
-            <a:ext cx="8868600" cy="2920680"/>
+            <a:ext cx="8868240" cy="2920320"/>
           </a:xfrm>
           <a:prstGeom prst="rect">
             <a:avLst/>
@@ -8820,7 +8828,7 @@
         <p:spPr>
           <a:xfrm>
             <a:off x="539640" y="764640"/>
-            <a:ext cx="10741680" cy="492480"/>
+            <a:ext cx="10741320" cy="492120"/>
           </a:xfrm>
           <a:prstGeom prst="rect">
             <a:avLst/>
@@ -8874,7 +8882,7 @@
         <p:spPr>
           <a:xfrm>
             <a:off x="698760" y="1312200"/>
-            <a:ext cx="1731600" cy="362880"/>
+            <a:ext cx="1731240" cy="362520"/>
           </a:xfrm>
           <a:prstGeom prst="rect">
             <a:avLst/>
@@ -9101,7 +9109,7 @@
         <p:spPr>
           <a:xfrm>
             <a:off x="846720" y="1679400"/>
-            <a:ext cx="8296920" cy="1186920"/>
+            <a:ext cx="8296560" cy="1186920"/>
           </a:xfrm>
           <a:prstGeom prst="rect">
             <a:avLst/>
@@ -9224,7 +9232,7 @@
         <p:spPr>
           <a:xfrm>
             <a:off x="7839360" y="1679400"/>
-            <a:ext cx="2613600" cy="426240"/>
+            <a:ext cx="2613240" cy="425880"/>
           </a:xfrm>
           <a:prstGeom prst="rect">
             <a:avLst/>
@@ -9269,7 +9277,7 @@
         <p:spPr>
           <a:xfrm>
             <a:off x="9109440" y="3583440"/>
-            <a:ext cx="278280" cy="363960"/>
+            <a:ext cx="277920" cy="363960"/>
           </a:xfrm>
           <a:prstGeom prst="rect">
             <a:avLst/>
@@ -9323,7 +9331,7 @@
         <p:spPr>
           <a:xfrm>
             <a:off x="9789840" y="4188960"/>
-            <a:ext cx="278280" cy="363960"/>
+            <a:ext cx="277920" cy="363960"/>
           </a:xfrm>
           <a:prstGeom prst="rect">
             <a:avLst/>
@@ -9377,7 +9385,7 @@
         <p:spPr>
           <a:xfrm>
             <a:off x="7531920" y="5741280"/>
-            <a:ext cx="278640" cy="363960"/>
+            <a:ext cx="278280" cy="363960"/>
           </a:xfrm>
           <a:prstGeom prst="rect">
             <a:avLst/>
@@ -9480,7 +9488,7 @@
         <p:spPr>
           <a:xfrm>
             <a:off x="1310760" y="5770800"/>
-            <a:ext cx="278640" cy="363960"/>
+            <a:ext cx="278280" cy="363960"/>
           </a:xfrm>
           <a:prstGeom prst="rect">
             <a:avLst/>
@@ -9564,7 +9572,7 @@
         <p:spPr>
           <a:xfrm>
             <a:off x="539640" y="764640"/>
-            <a:ext cx="10748520" cy="499320"/>
+            <a:ext cx="10748160" cy="498960"/>
           </a:xfrm>
           <a:prstGeom prst="rect">
             <a:avLst/>
@@ -9618,7 +9626,7 @@
         <p:spPr>
           <a:xfrm>
             <a:off x="539640" y="1268640"/>
-            <a:ext cx="10748520" cy="5036040"/>
+            <a:ext cx="10748160" cy="5035680"/>
           </a:xfrm>
           <a:prstGeom prst="rect">
             <a:avLst/>
@@ -9970,7 +9978,7 @@
         <p:spPr>
           <a:xfrm>
             <a:off x="539640" y="764640"/>
-            <a:ext cx="10748520" cy="499320"/>
+            <a:ext cx="10748160" cy="498960"/>
           </a:xfrm>
           <a:prstGeom prst="rect">
             <a:avLst/>
@@ -10028,7 +10036,7 @@
         <p:spPr>
           <a:xfrm>
             <a:off x="2684520" y="1323360"/>
-            <a:ext cx="1471320" cy="2172600"/>
+            <a:ext cx="1470960" cy="2172240"/>
           </a:xfrm>
           <a:prstGeom prst="rect">
             <a:avLst/>
@@ -10051,7 +10059,7 @@
         <p:spPr>
           <a:xfrm>
             <a:off x="7269840" y="1716120"/>
-            <a:ext cx="1785240" cy="1777320"/>
+            <a:ext cx="1784880" cy="1776960"/>
           </a:xfrm>
           <a:prstGeom prst="rect">
             <a:avLst/>
@@ -10070,7 +10078,7 @@
         <p:spPr>
           <a:xfrm>
             <a:off x="1620000" y="3439440"/>
-            <a:ext cx="3636000" cy="677520"/>
+            <a:ext cx="3635640" cy="677160"/>
           </a:xfrm>
           <a:prstGeom prst="rect">
             <a:avLst/>
@@ -10127,7 +10135,7 @@
         <p:spPr>
           <a:xfrm>
             <a:off x="6322680" y="3460320"/>
-            <a:ext cx="3636000" cy="677520"/>
+            <a:ext cx="3635640" cy="677160"/>
           </a:xfrm>
           <a:prstGeom prst="rect">
             <a:avLst/>
@@ -10188,7 +10196,7 @@
         <p:spPr>
           <a:xfrm>
             <a:off x="4845960" y="4206240"/>
-            <a:ext cx="1778400" cy="1770480"/>
+            <a:ext cx="1778040" cy="1770120"/>
           </a:xfrm>
           <a:prstGeom prst="rect">
             <a:avLst/>
@@ -10207,7 +10215,7 @@
         <p:spPr>
           <a:xfrm>
             <a:off x="1311840" y="5920200"/>
-            <a:ext cx="3629160" cy="670680"/>
+            <a:ext cx="3628800" cy="670320"/>
           </a:xfrm>
           <a:prstGeom prst="rect">
             <a:avLst/>
@@ -10252,7 +10260,7 @@
         <p:spPr>
           <a:xfrm>
             <a:off x="3950280" y="5903280"/>
-            <a:ext cx="3629160" cy="670680"/>
+            <a:ext cx="3628800" cy="670320"/>
           </a:xfrm>
           <a:prstGeom prst="rect">
             <a:avLst/>
@@ -10339,7 +10347,7 @@
         <p:spPr>
           <a:xfrm>
             <a:off x="539640" y="764640"/>
-            <a:ext cx="10748520" cy="499320"/>
+            <a:ext cx="10748160" cy="498960"/>
           </a:xfrm>
           <a:prstGeom prst="rect">
             <a:avLst/>
@@ -10393,7 +10401,7 @@
         <p:spPr>
           <a:xfrm>
             <a:off x="539640" y="1268280"/>
-            <a:ext cx="10748520" cy="5036040"/>
+            <a:ext cx="10748160" cy="5035680"/>
           </a:xfrm>
           <a:prstGeom prst="rect">
             <a:avLst/>
@@ -10540,7 +10548,7 @@
         <p:spPr>
           <a:xfrm>
             <a:off x="6489720" y="2132640"/>
-            <a:ext cx="518040" cy="497880"/>
+            <a:ext cx="517680" cy="497520"/>
           </a:xfrm>
           <a:prstGeom prst="star5">
             <a:avLst>
@@ -10601,7 +10609,7 @@
         <p:spPr>
           <a:xfrm>
             <a:off x="4294080" y="2247480"/>
-            <a:ext cx="2286360" cy="363960"/>
+            <a:ext cx="2286000" cy="363960"/>
           </a:xfrm>
           <a:prstGeom prst="rect">
             <a:avLst/>
@@ -10685,7 +10693,7 @@
         <p:spPr>
           <a:xfrm>
             <a:off x="539640" y="764640"/>
-            <a:ext cx="10748520" cy="499320"/>
+            <a:ext cx="10748160" cy="498960"/>
           </a:xfrm>
           <a:prstGeom prst="rect">
             <a:avLst/>
@@ -10739,7 +10747,7 @@
         <p:spPr>
           <a:xfrm>
             <a:off x="539640" y="1268640"/>
-            <a:ext cx="10748520" cy="5036040"/>
+            <a:ext cx="10748160" cy="5035680"/>
           </a:xfrm>
           <a:prstGeom prst="rect">
             <a:avLst/>
@@ -11096,7 +11104,7 @@
         <p:spPr>
           <a:xfrm>
             <a:off x="335520" y="1268640"/>
-            <a:ext cx="10748520" cy="5036040"/>
+            <a:ext cx="10748160" cy="5035680"/>
           </a:xfrm>
           <a:prstGeom prst="rect">
             <a:avLst/>
@@ -11156,7 +11164,7 @@
         <p:spPr>
           <a:xfrm>
             <a:off x="335520" y="764640"/>
-            <a:ext cx="10748520" cy="499320"/>
+            <a:ext cx="10748160" cy="498960"/>
           </a:xfrm>
           <a:prstGeom prst="rect">
             <a:avLst/>
@@ -11231,7 +11239,7 @@
         <p:spPr>
           <a:xfrm>
             <a:off x="542880" y="721800"/>
-            <a:ext cx="10354320" cy="495000"/>
+            <a:ext cx="10353960" cy="494640"/>
           </a:xfrm>
           <a:prstGeom prst="rect">
             <a:avLst/>
@@ -11285,7 +11293,7 @@
         <p:spPr>
           <a:xfrm>
             <a:off x="451800" y="1709280"/>
-            <a:ext cx="8221680" cy="4349880"/>
+            <a:ext cx="8221320" cy="4349520"/>
           </a:xfrm>
           <a:prstGeom prst="rect">
             <a:avLst/>
@@ -11330,7 +11338,7 @@
         <p:spPr>
           <a:xfrm>
             <a:off x="609480" y="1769400"/>
-            <a:ext cx="10584720" cy="4852800"/>
+            <a:ext cx="10584360" cy="4852440"/>
           </a:xfrm>
           <a:prstGeom prst="rect">
             <a:avLst/>
@@ -11781,7 +11789,7 @@
         <p:spPr>
           <a:xfrm>
             <a:off x="542880" y="721800"/>
-            <a:ext cx="10354320" cy="495000"/>
+            <a:ext cx="10353960" cy="494640"/>
           </a:xfrm>
           <a:prstGeom prst="rect">
             <a:avLst/>
@@ -11835,7 +11843,7 @@
         <p:spPr>
           <a:xfrm>
             <a:off x="451800" y="1709280"/>
-            <a:ext cx="8221680" cy="4349880"/>
+            <a:ext cx="8221320" cy="4349520"/>
           </a:xfrm>
           <a:prstGeom prst="rect">
             <a:avLst/>
@@ -11880,7 +11888,7 @@
         <p:spPr>
           <a:xfrm>
             <a:off x="609480" y="1769400"/>
-            <a:ext cx="10584720" cy="4852800"/>
+            <a:ext cx="10584360" cy="4852440"/>
           </a:xfrm>
           <a:prstGeom prst="rect">
             <a:avLst/>
@@ -12380,7 +12388,7 @@
         <p:spPr>
           <a:xfrm>
             <a:off x="542880" y="721800"/>
-            <a:ext cx="10354320" cy="495000"/>
+            <a:ext cx="10353960" cy="494640"/>
           </a:xfrm>
           <a:prstGeom prst="rect">
             <a:avLst/>
@@ -12434,7 +12442,7 @@
         <p:spPr>
           <a:xfrm>
             <a:off x="451800" y="1709280"/>
-            <a:ext cx="8221680" cy="4349880"/>
+            <a:ext cx="8221320" cy="4349520"/>
           </a:xfrm>
           <a:prstGeom prst="rect">
             <a:avLst/>
@@ -12479,7 +12487,7 @@
         <p:spPr>
           <a:xfrm>
             <a:off x="609480" y="1769400"/>
-            <a:ext cx="10584720" cy="4852800"/>
+            <a:ext cx="10584360" cy="4852440"/>
           </a:xfrm>
           <a:prstGeom prst="rect">
             <a:avLst/>
@@ -12828,7 +12836,7 @@
         <p:spPr>
           <a:xfrm>
             <a:off x="542880" y="721800"/>
-            <a:ext cx="10354320" cy="495000"/>
+            <a:ext cx="10353960" cy="494640"/>
           </a:xfrm>
           <a:prstGeom prst="rect">
             <a:avLst/>
@@ -12882,7 +12890,7 @@
         <p:spPr>
           <a:xfrm>
             <a:off x="451800" y="1709280"/>
-            <a:ext cx="8221680" cy="4349880"/>
+            <a:ext cx="8221320" cy="4349520"/>
           </a:xfrm>
           <a:prstGeom prst="rect">
             <a:avLst/>
@@ -12927,7 +12935,7 @@
         <p:spPr>
           <a:xfrm>
             <a:off x="609480" y="1769400"/>
-            <a:ext cx="10584720" cy="4852800"/>
+            <a:ext cx="10584360" cy="4852440"/>
           </a:xfrm>
           <a:prstGeom prst="rect">
             <a:avLst/>
@@ -13132,7 +13140,7 @@
         <p:spPr>
           <a:xfrm>
             <a:off x="539640" y="764640"/>
-            <a:ext cx="10748520" cy="499320"/>
+            <a:ext cx="10748160" cy="498960"/>
           </a:xfrm>
           <a:prstGeom prst="rect">
             <a:avLst/>
@@ -13186,7 +13194,7 @@
         <p:spPr>
           <a:xfrm>
             <a:off x="539640" y="1268280"/>
-            <a:ext cx="10748520" cy="5036040"/>
+            <a:ext cx="10748160" cy="5035680"/>
           </a:xfrm>
           <a:prstGeom prst="rect">
             <a:avLst/>
@@ -13347,7 +13355,7 @@
         <p:spPr>
           <a:xfrm>
             <a:off x="542880" y="721800"/>
-            <a:ext cx="10357200" cy="497880"/>
+            <a:ext cx="10356840" cy="497520"/>
           </a:xfrm>
           <a:prstGeom prst="rect">
             <a:avLst/>
@@ -13405,7 +13413,7 @@
         <p:spPr>
           <a:xfrm>
             <a:off x="542880" y="2387520"/>
-            <a:ext cx="10102320" cy="2079720"/>
+            <a:ext cx="10101960" cy="2079360"/>
           </a:xfrm>
           <a:prstGeom prst="rect">
             <a:avLst/>
@@ -13454,7 +13462,7 @@
         <p:spPr>
           <a:xfrm>
             <a:off x="539640" y="764640"/>
-            <a:ext cx="10741680" cy="492480"/>
+            <a:ext cx="10741320" cy="492120"/>
           </a:xfrm>
           <a:prstGeom prst="rect">
             <a:avLst/>
@@ -13508,7 +13516,7 @@
         <p:spPr>
           <a:xfrm>
             <a:off x="539640" y="1268640"/>
-            <a:ext cx="10741680" cy="5029200"/>
+            <a:ext cx="10741320" cy="5028840"/>
           </a:xfrm>
           <a:prstGeom prst="rect">
             <a:avLst/>
@@ -13807,7 +13815,7 @@
                 <a:latin typeface="DejaVu Sans"/>
                 <a:ea typeface="DejaVu Sans"/>
               </a:rPr>
-              <a:t>21.12.2022 → Documentation – Formal Requirements Specification (L09)</a:t>
+              <a:t>21.12.2022 → No Lecture</a:t>
             </a:r>
             <a:endParaRPr b="0" lang="en-US" sz="1800" spc="-1" strike="noStrike">
               <a:solidFill>
@@ -13839,7 +13847,17 @@
                 <a:latin typeface="DejaVu Sans"/>
                 <a:ea typeface="DejaVu Sans"/>
               </a:rPr>
-              <a:t>11.01.2023 → Validation (L10)</a:t>
+              <a:t>11.01.2023 → </a:t>
+            </a:r>
+            <a:r>
+              <a:rPr b="0" lang="en-GB" sz="1800" spc="-1" strike="noStrike">
+                <a:solidFill>
+                  <a:srgbClr val="000000"/>
+                </a:solidFill>
+                <a:latin typeface="DejaVu Sans"/>
+                <a:ea typeface="DejaVu Sans"/>
+              </a:rPr>
+              <a:t>Documentation – Formal Requirements Specification (L09)</a:t>
             </a:r>
             <a:endParaRPr b="0" lang="en-US" sz="1800" spc="-1" strike="noStrike">
               <a:solidFill>
@@ -13871,7 +13889,17 @@
                 <a:latin typeface="DejaVu Sans"/>
                 <a:ea typeface="DejaVu Sans"/>
               </a:rPr>
-              <a:t>18.01.2023 → Traceability (L11)</a:t>
+              <a:t>18.01.2023 → </a:t>
+            </a:r>
+            <a:r>
+              <a:rPr b="0" lang="en-GB" sz="1800" spc="-1" strike="noStrike">
+                <a:solidFill>
+                  <a:srgbClr val="000000"/>
+                </a:solidFill>
+                <a:latin typeface="DejaVu Sans"/>
+                <a:ea typeface="DejaVu Sans"/>
+              </a:rPr>
+              <a:t>Validation (L10)</a:t>
             </a:r>
             <a:endParaRPr b="0" lang="en-US" sz="1800" spc="-1" strike="noStrike">
               <a:solidFill>
@@ -13903,7 +13931,17 @@
                 <a:latin typeface="DejaVu Sans"/>
                 <a:ea typeface="DejaVu Sans"/>
               </a:rPr>
-              <a:t>25.01.2023 → Requirements Management (L12) and Tool Support (L13)</a:t>
+              <a:t>25.01.2023 → </a:t>
+            </a:r>
+            <a:r>
+              <a:rPr b="0" lang="en-GB" sz="1800" spc="-1" strike="noStrike">
+                <a:solidFill>
+                  <a:srgbClr val="000000"/>
+                </a:solidFill>
+                <a:latin typeface="DejaVu Sans"/>
+                <a:ea typeface="DejaVu Sans"/>
+              </a:rPr>
+              <a:t>Traceability (L11)</a:t>
             </a:r>
             <a:endParaRPr b="0" lang="en-US" sz="1800" spc="-1" strike="noStrike">
               <a:solidFill>
@@ -13935,7 +13973,17 @@
                 <a:latin typeface="DejaVu Sans"/>
                 <a:ea typeface="DejaVu Sans"/>
               </a:rPr>
-              <a:t>01.02.2023 → No lecture</a:t>
+              <a:t>01.02.2023 → </a:t>
+            </a:r>
+            <a:r>
+              <a:rPr b="0" lang="en-GB" sz="1800" spc="-1" strike="noStrike">
+                <a:solidFill>
+                  <a:srgbClr val="000000"/>
+                </a:solidFill>
+                <a:latin typeface="DejaVu Sans"/>
+                <a:ea typeface="DejaVu Sans"/>
+              </a:rPr>
+              <a:t>Requirements Management (L12) and Tool Support (L13)</a:t>
             </a:r>
             <a:endParaRPr b="0" lang="en-US" sz="1800" spc="-1" strike="noStrike">
               <a:solidFill>

</xml_diff>

<commit_message>
* updated lecture schedul in L00 * updated L10 and L11
</commit_message>
<xml_diff>
--- a/Requirements-Engineering/RE-L00-Organization.pptx
+++ b/Requirements-Engineering/RE-L00-Organization.pptx
@@ -84,7 +84,7 @@
           <a:p>
             <a:pPr algn="ctr"/>
             <a:r>
-              <a:rPr b="0" lang="en-US" sz="4400" spc="-1" strike="noStrike">
+              <a:rPr b="0" lang="en-GB" sz="4400" spc="-1" strike="noStrike">
                 <a:solidFill>
                   <a:srgbClr val="000000"/>
                 </a:solidFill>
@@ -92,7 +92,7 @@
               </a:rPr>
               <a:t>Click to move the slide</a:t>
             </a:r>
-            <a:endParaRPr b="0" lang="en-US" sz="4400" spc="-1" strike="noStrike">
+            <a:endParaRPr b="0" lang="en-GB" sz="4400" spc="-1" strike="noStrike">
               <a:solidFill>
                 <a:srgbClr val="000000"/>
               </a:solidFill>
@@ -133,15 +133,15 @@
               <a:buNone/>
             </a:pPr>
             <a:r>
-              <a:rPr b="0" lang="en-US" sz="2000" spc="-1" strike="noStrike">
+              <a:rPr b="0" lang="en-GB" sz="2000" spc="-1" strike="noStrike">
                 <a:solidFill>
                   <a:srgbClr val="000000"/>
                 </a:solidFill>
                 <a:latin typeface="Arial"/>
               </a:rPr>
-              <a:t>Click to edit the notes format</a:t>
-            </a:r>
-            <a:endParaRPr b="0" lang="en-US" sz="2000" spc="-1" strike="noStrike">
+              <a:t>Click to edit the notes' format</a:t>
+            </a:r>
+            <a:endParaRPr b="0" lang="en-GB" sz="2000" spc="-1" strike="noStrike">
               <a:solidFill>
                 <a:srgbClr val="000000"/>
               </a:solidFill>
@@ -182,7 +182,7 @@
               <a:buNone/>
             </a:pPr>
             <a:r>
-              <a:rPr b="0" lang="en-US" sz="1400" spc="-1" strike="noStrike">
+              <a:rPr b="0" lang="en-GB" sz="1400" spc="-1" strike="noStrike">
                 <a:solidFill>
                   <a:srgbClr val="000000"/>
                 </a:solidFill>
@@ -190,7 +190,7 @@
               </a:rPr>
               <a:t>&lt;header&gt;</a:t>
             </a:r>
-            <a:endParaRPr b="0" lang="en-US" sz="1400" spc="-1" strike="noStrike">
+            <a:endParaRPr b="0" lang="en-GB" sz="1400" spc="-1" strike="noStrike">
               <a:solidFill>
                 <a:srgbClr val="000000"/>
               </a:solidFill>
@@ -229,7 +229,7 @@
           <a:lstStyle>
             <a:lvl1pPr indent="0" algn="r">
               <a:buNone/>
-              <a:defRPr b="0" lang="en-US" sz="1400" spc="-1" strike="noStrike">
+              <a:defRPr b="0" lang="en-GB" sz="1400" spc="-1" strike="noStrike">
                 <a:solidFill>
                   <a:srgbClr val="000000"/>
                 </a:solidFill>
@@ -242,7 +242,7 @@
               <a:buNone/>
             </a:pPr>
             <a:r>
-              <a:rPr b="0" lang="en-US" sz="1400" spc="-1" strike="noStrike">
+              <a:rPr b="0" lang="en-GB" sz="1400" spc="-1" strike="noStrike">
                 <a:solidFill>
                   <a:srgbClr val="000000"/>
                 </a:solidFill>
@@ -250,7 +250,7 @@
               </a:rPr>
               <a:t>&lt;date/time&gt;</a:t>
             </a:r>
-            <a:endParaRPr b="0" lang="en-US" sz="1400" spc="-1" strike="noStrike">
+            <a:endParaRPr b="0" lang="en-GB" sz="1400" spc="-1" strike="noStrike">
               <a:solidFill>
                 <a:srgbClr val="000000"/>
               </a:solidFill>
@@ -289,7 +289,7 @@
           <a:lstStyle>
             <a:lvl1pPr indent="0">
               <a:buNone/>
-              <a:defRPr b="0" lang="en-US" sz="1400" spc="-1" strike="noStrike">
+              <a:defRPr b="0" lang="en-GB" sz="1400" spc="-1" strike="noStrike">
                 <a:solidFill>
                   <a:srgbClr val="000000"/>
                 </a:solidFill>
@@ -302,7 +302,7 @@
               <a:buNone/>
             </a:pPr>
             <a:r>
-              <a:rPr b="0" lang="en-US" sz="1400" spc="-1" strike="noStrike">
+              <a:rPr b="0" lang="en-GB" sz="1400" spc="-1" strike="noStrike">
                 <a:solidFill>
                   <a:srgbClr val="000000"/>
                 </a:solidFill>
@@ -310,7 +310,7 @@
               </a:rPr>
               <a:t>&lt;footer&gt;</a:t>
             </a:r>
-            <a:endParaRPr b="0" lang="en-US" sz="1400" spc="-1" strike="noStrike">
+            <a:endParaRPr b="0" lang="en-GB" sz="1400" spc="-1" strike="noStrike">
               <a:solidFill>
                 <a:srgbClr val="000000"/>
               </a:solidFill>
@@ -349,7 +349,7 @@
           <a:lstStyle>
             <a:lvl1pPr indent="0" algn="r">
               <a:buNone/>
-              <a:defRPr b="0" lang="en-US" sz="1400" spc="-1" strike="noStrike">
+              <a:defRPr b="0" lang="en-GB" sz="1400" spc="-1" strike="noStrike">
                 <a:solidFill>
                   <a:srgbClr val="000000"/>
                 </a:solidFill>
@@ -361,8 +361,8 @@
             <a:pPr indent="0" algn="r">
               <a:buNone/>
             </a:pPr>
-            <a:fld id="{8E34E5D2-FF39-442D-B2E3-1D89AC1204B4}" type="slidenum">
-              <a:rPr b="0" lang="en-US" sz="1400" spc="-1" strike="noStrike">
+            <a:fld id="{A7DEC66B-97AC-4D35-849A-A83F374B9CBD}" type="slidenum">
+              <a:rPr b="0" lang="en-GB" sz="1400" spc="-1" strike="noStrike">
                 <a:solidFill>
                   <a:srgbClr val="000000"/>
                 </a:solidFill>
@@ -370,7 +370,7 @@
               </a:rPr>
               <a:t>&lt;number&gt;</a:t>
             </a:fld>
-            <a:endParaRPr b="0" lang="en-US" sz="1400" spc="-1" strike="noStrike">
+            <a:endParaRPr b="0" lang="en-GB" sz="1400" spc="-1" strike="noStrike">
               <a:solidFill>
                 <a:srgbClr val="000000"/>
               </a:solidFill>
@@ -415,7 +415,7 @@
         <p:spPr>
           <a:xfrm>
             <a:off x="533520" y="763560"/>
-            <a:ext cx="6697080" cy="3765240"/>
+            <a:ext cx="6696720" cy="3764880"/>
           </a:xfrm>
           <a:prstGeom prst="rect">
             <a:avLst/>
@@ -438,7 +438,7 @@
         <p:spPr>
           <a:xfrm>
             <a:off x="777240" y="4777560"/>
-            <a:ext cx="6210720" cy="4519080"/>
+            <a:ext cx="6210360" cy="4518720"/>
           </a:xfrm>
           <a:prstGeom prst="rect">
             <a:avLst/>
@@ -456,7 +456,7 @@
             <a:pPr marL="216000" indent="0">
               <a:buNone/>
             </a:pPr>
-            <a:endParaRPr b="0" lang="en-US" sz="1800" spc="-1" strike="noStrike">
+            <a:endParaRPr b="0" lang="en-GB" sz="1800" spc="-1" strike="noStrike">
               <a:solidFill>
                 <a:srgbClr val="000000"/>
               </a:solidFill>
@@ -474,7 +474,7 @@
         <p:spPr>
           <a:xfrm>
             <a:off x="4399200" y="9555480"/>
-            <a:ext cx="3366000" cy="495720"/>
+            <a:ext cx="3365640" cy="495360"/>
           </a:xfrm>
           <a:prstGeom prst="rect">
             <a:avLst/>
@@ -500,7 +500,7 @@
                 <a:spcPct val="100000"/>
               </a:lnSpc>
             </a:pPr>
-            <a:fld id="{9A0F455C-26CA-4774-BE5B-84BD9E2067B8}" type="slidenum">
+            <a:fld id="{82BE1F02-3E89-4A1A-9A97-566352937200}" type="slidenum">
               <a:rPr b="0" lang="en-GB" sz="1800" spc="-1" strike="noStrike">
                 <a:solidFill>
                   <a:srgbClr val="000000"/>
@@ -510,7 +510,7 @@
               </a:rPr>
               <a:t>6</a:t>
             </a:fld>
-            <a:endParaRPr b="0" lang="en-US" sz="1800" spc="-1" strike="noStrike">
+            <a:endParaRPr b="0" lang="en-GB" sz="1800" spc="-1" strike="noStrike">
               <a:solidFill>
                 <a:srgbClr val="000000"/>
               </a:solidFill>
@@ -554,7 +554,7 @@
         <p:spPr>
           <a:xfrm>
             <a:off x="533520" y="763560"/>
-            <a:ext cx="6697080" cy="3765240"/>
+            <a:ext cx="6696720" cy="3764880"/>
           </a:xfrm>
           <a:prstGeom prst="rect">
             <a:avLst/>
@@ -577,7 +577,7 @@
         <p:spPr>
           <a:xfrm>
             <a:off x="777240" y="4777560"/>
-            <a:ext cx="6210720" cy="4519080"/>
+            <a:ext cx="6210360" cy="4518720"/>
           </a:xfrm>
           <a:prstGeom prst="rect">
             <a:avLst/>
@@ -595,7 +595,7 @@
             <a:pPr marL="216000" indent="0">
               <a:buNone/>
             </a:pPr>
-            <a:endParaRPr b="0" lang="en-US" sz="1800" spc="-1" strike="noStrike">
+            <a:endParaRPr b="0" lang="en-GB" sz="1800" spc="-1" strike="noStrike">
               <a:solidFill>
                 <a:srgbClr val="000000"/>
               </a:solidFill>
@@ -613,7 +613,7 @@
         <p:spPr>
           <a:xfrm>
             <a:off x="4399200" y="9555480"/>
-            <a:ext cx="3366000" cy="495720"/>
+            <a:ext cx="3365640" cy="495360"/>
           </a:xfrm>
           <a:prstGeom prst="rect">
             <a:avLst/>
@@ -639,7 +639,7 @@
                 <a:spcPct val="100000"/>
               </a:lnSpc>
             </a:pPr>
-            <a:fld id="{166C3ED1-8F9A-40F7-AFF4-85320946D5D6}" type="slidenum">
+            <a:fld id="{D755A0CB-2E90-4BC9-B226-A81F5A5DA3A4}" type="slidenum">
               <a:rPr b="0" lang="en-GB" sz="1800" spc="-1" strike="noStrike">
                 <a:solidFill>
                   <a:srgbClr val="000000"/>
@@ -649,7 +649,7 @@
               </a:rPr>
               <a:t>6</a:t>
             </a:fld>
-            <a:endParaRPr b="0" lang="en-US" sz="1800" spc="-1" strike="noStrike">
+            <a:endParaRPr b="0" lang="en-GB" sz="1800" spc="-1" strike="noStrike">
               <a:solidFill>
                 <a:srgbClr val="000000"/>
               </a:solidFill>
@@ -693,7 +693,7 @@
         <p:spPr>
           <a:xfrm>
             <a:off x="533520" y="763560"/>
-            <a:ext cx="6697080" cy="3765240"/>
+            <a:ext cx="6696720" cy="3764880"/>
           </a:xfrm>
           <a:prstGeom prst="rect">
             <a:avLst/>
@@ -716,7 +716,7 @@
         <p:spPr>
           <a:xfrm>
             <a:off x="777240" y="4777560"/>
-            <a:ext cx="6210720" cy="4519080"/>
+            <a:ext cx="6210360" cy="4518720"/>
           </a:xfrm>
           <a:prstGeom prst="rect">
             <a:avLst/>
@@ -734,7 +734,7 @@
             <a:pPr marL="216000" indent="0">
               <a:buNone/>
             </a:pPr>
-            <a:endParaRPr b="0" lang="en-US" sz="1800" spc="-1" strike="noStrike">
+            <a:endParaRPr b="0" lang="en-GB" sz="1800" spc="-1" strike="noStrike">
               <a:solidFill>
                 <a:srgbClr val="000000"/>
               </a:solidFill>
@@ -752,7 +752,7 @@
         <p:spPr>
           <a:xfrm>
             <a:off x="4399200" y="9555480"/>
-            <a:ext cx="3366000" cy="495720"/>
+            <a:ext cx="3365640" cy="495360"/>
           </a:xfrm>
           <a:prstGeom prst="rect">
             <a:avLst/>
@@ -778,7 +778,7 @@
                 <a:spcPct val="100000"/>
               </a:lnSpc>
             </a:pPr>
-            <a:fld id="{8C58E9A8-2617-47D3-9BA5-464DBBD6944C}" type="slidenum">
+            <a:fld id="{C83930AE-62F3-47E2-8E9D-745D4C9843B6}" type="slidenum">
               <a:rPr b="0" lang="en-GB" sz="1800" spc="-1" strike="noStrike">
                 <a:solidFill>
                   <a:srgbClr val="000000"/>
@@ -788,7 +788,7 @@
               </a:rPr>
               <a:t>&lt;number&gt;</a:t>
             </a:fld>
-            <a:endParaRPr b="0" lang="en-US" sz="1800" spc="-1" strike="noStrike">
+            <a:endParaRPr b="0" lang="en-GB" sz="1800" spc="-1" strike="noStrike">
               <a:solidFill>
                 <a:srgbClr val="000000"/>
               </a:solidFill>
@@ -832,7 +832,7 @@
         <p:spPr>
           <a:xfrm>
             <a:off x="533520" y="763560"/>
-            <a:ext cx="6697080" cy="3765240"/>
+            <a:ext cx="6696720" cy="3764880"/>
           </a:xfrm>
           <a:prstGeom prst="rect">
             <a:avLst/>
@@ -855,7 +855,7 @@
         <p:spPr>
           <a:xfrm>
             <a:off x="777240" y="4777560"/>
-            <a:ext cx="6210720" cy="4519080"/>
+            <a:ext cx="6210360" cy="4518720"/>
           </a:xfrm>
           <a:prstGeom prst="rect">
             <a:avLst/>
@@ -873,7 +873,7 @@
             <a:pPr marL="216000" indent="0">
               <a:buNone/>
             </a:pPr>
-            <a:endParaRPr b="0" lang="en-US" sz="1800" spc="-1" strike="noStrike">
+            <a:endParaRPr b="0" lang="en-GB" sz="1800" spc="-1" strike="noStrike">
               <a:solidFill>
                 <a:srgbClr val="000000"/>
               </a:solidFill>
@@ -891,7 +891,7 @@
         <p:spPr>
           <a:xfrm>
             <a:off x="4399200" y="9555480"/>
-            <a:ext cx="3366000" cy="495720"/>
+            <a:ext cx="3365640" cy="495360"/>
           </a:xfrm>
           <a:prstGeom prst="rect">
             <a:avLst/>
@@ -917,7 +917,7 @@
                 <a:spcPct val="100000"/>
               </a:lnSpc>
             </a:pPr>
-            <a:fld id="{7D58F418-82EC-4394-9950-E1AD9D6F9582}" type="slidenum">
+            <a:fld id="{323E7989-88DB-4D81-854F-2B10496F4E5E}" type="slidenum">
               <a:rPr b="0" lang="en-GB" sz="1800" spc="-1" strike="noStrike">
                 <a:solidFill>
                   <a:srgbClr val="000000"/>
@@ -927,7 +927,7 @@
               </a:rPr>
               <a:t>&lt;number&gt;</a:t>
             </a:fld>
-            <a:endParaRPr b="0" lang="en-US" sz="1800" spc="-1" strike="noStrike">
+            <a:endParaRPr b="0" lang="en-GB" sz="1800" spc="-1" strike="noStrike">
               <a:solidFill>
                 <a:srgbClr val="000000"/>
               </a:solidFill>
@@ -1011,7 +1011,7 @@
             <a:pPr indent="0" algn="ctr">
               <a:buNone/>
             </a:pPr>
-            <a:endParaRPr b="0" lang="en-US" sz="4400" spc="-1" strike="noStrike">
+            <a:endParaRPr b="0" lang="en-GB" sz="4400" spc="-1" strike="noStrike">
               <a:solidFill>
                 <a:srgbClr val="000000"/>
               </a:solidFill>
@@ -1054,7 +1054,7 @@
               </a:spcBef>
               <a:buNone/>
             </a:pPr>
-            <a:endParaRPr b="0" lang="en-US" sz="3200" spc="-1" strike="noStrike">
+            <a:endParaRPr b="0" lang="en-GB" sz="3200" spc="-1" strike="noStrike">
               <a:solidFill>
                 <a:srgbClr val="000000"/>
               </a:solidFill>
@@ -1097,7 +1097,7 @@
               </a:spcBef>
               <a:buNone/>
             </a:pPr>
-            <a:endParaRPr b="0" lang="en-US" sz="3200" spc="-1" strike="noStrike">
+            <a:endParaRPr b="0" lang="en-GB" sz="3200" spc="-1" strike="noStrike">
               <a:solidFill>
                 <a:srgbClr val="000000"/>
               </a:solidFill>
@@ -1159,7 +1159,7 @@
             <a:pPr indent="0" algn="ctr">
               <a:buNone/>
             </a:pPr>
-            <a:endParaRPr b="0" lang="en-US" sz="4400" spc="-1" strike="noStrike">
+            <a:endParaRPr b="0" lang="en-GB" sz="4400" spc="-1" strike="noStrike">
               <a:solidFill>
                 <a:srgbClr val="000000"/>
               </a:solidFill>
@@ -1202,7 +1202,7 @@
               </a:spcBef>
               <a:buNone/>
             </a:pPr>
-            <a:endParaRPr b="0" lang="en-US" sz="3200" spc="-1" strike="noStrike">
+            <a:endParaRPr b="0" lang="en-GB" sz="3200" spc="-1" strike="noStrike">
               <a:solidFill>
                 <a:srgbClr val="000000"/>
               </a:solidFill>
@@ -1245,7 +1245,7 @@
               </a:spcBef>
               <a:buNone/>
             </a:pPr>
-            <a:endParaRPr b="0" lang="en-US" sz="3200" spc="-1" strike="noStrike">
+            <a:endParaRPr b="0" lang="en-GB" sz="3200" spc="-1" strike="noStrike">
               <a:solidFill>
                 <a:srgbClr val="000000"/>
               </a:solidFill>
@@ -1288,7 +1288,7 @@
               </a:spcBef>
               <a:buNone/>
             </a:pPr>
-            <a:endParaRPr b="0" lang="en-US" sz="3200" spc="-1" strike="noStrike">
+            <a:endParaRPr b="0" lang="en-GB" sz="3200" spc="-1" strike="noStrike">
               <a:solidFill>
                 <a:srgbClr val="000000"/>
               </a:solidFill>
@@ -1331,7 +1331,7 @@
               </a:spcBef>
               <a:buNone/>
             </a:pPr>
-            <a:endParaRPr b="0" lang="en-US" sz="3200" spc="-1" strike="noStrike">
+            <a:endParaRPr b="0" lang="en-GB" sz="3200" spc="-1" strike="noStrike">
               <a:solidFill>
                 <a:srgbClr val="000000"/>
               </a:solidFill>
@@ -1393,7 +1393,7 @@
             <a:pPr indent="0" algn="ctr">
               <a:buNone/>
             </a:pPr>
-            <a:endParaRPr b="0" lang="en-US" sz="4400" spc="-1" strike="noStrike">
+            <a:endParaRPr b="0" lang="en-GB" sz="4400" spc="-1" strike="noStrike">
               <a:solidFill>
                 <a:srgbClr val="000000"/>
               </a:solidFill>
@@ -1436,7 +1436,7 @@
               </a:spcBef>
               <a:buNone/>
             </a:pPr>
-            <a:endParaRPr b="0" lang="en-US" sz="3200" spc="-1" strike="noStrike">
+            <a:endParaRPr b="0" lang="en-GB" sz="3200" spc="-1" strike="noStrike">
               <a:solidFill>
                 <a:srgbClr val="000000"/>
               </a:solidFill>
@@ -1479,7 +1479,7 @@
               </a:spcBef>
               <a:buNone/>
             </a:pPr>
-            <a:endParaRPr b="0" lang="en-US" sz="3200" spc="-1" strike="noStrike">
+            <a:endParaRPr b="0" lang="en-GB" sz="3200" spc="-1" strike="noStrike">
               <a:solidFill>
                 <a:srgbClr val="000000"/>
               </a:solidFill>
@@ -1522,7 +1522,7 @@
               </a:spcBef>
               <a:buNone/>
             </a:pPr>
-            <a:endParaRPr b="0" lang="en-US" sz="3200" spc="-1" strike="noStrike">
+            <a:endParaRPr b="0" lang="en-GB" sz="3200" spc="-1" strike="noStrike">
               <a:solidFill>
                 <a:srgbClr val="000000"/>
               </a:solidFill>
@@ -1565,7 +1565,7 @@
               </a:spcBef>
               <a:buNone/>
             </a:pPr>
-            <a:endParaRPr b="0" lang="en-US" sz="3200" spc="-1" strike="noStrike">
+            <a:endParaRPr b="0" lang="en-GB" sz="3200" spc="-1" strike="noStrike">
               <a:solidFill>
                 <a:srgbClr val="000000"/>
               </a:solidFill>
@@ -1608,7 +1608,7 @@
               </a:spcBef>
               <a:buNone/>
             </a:pPr>
-            <a:endParaRPr b="0" lang="en-US" sz="3200" spc="-1" strike="noStrike">
+            <a:endParaRPr b="0" lang="en-GB" sz="3200" spc="-1" strike="noStrike">
               <a:solidFill>
                 <a:srgbClr val="000000"/>
               </a:solidFill>
@@ -1651,7 +1651,7 @@
               </a:spcBef>
               <a:buNone/>
             </a:pPr>
-            <a:endParaRPr b="0" lang="en-US" sz="3200" spc="-1" strike="noStrike">
+            <a:endParaRPr b="0" lang="en-GB" sz="3200" spc="-1" strike="noStrike">
               <a:solidFill>
                 <a:srgbClr val="000000"/>
               </a:solidFill>
@@ -1735,7 +1735,7 @@
             <a:pPr indent="0" algn="ctr">
               <a:buNone/>
             </a:pPr>
-            <a:endParaRPr b="0" lang="en-US" sz="4400" spc="-1" strike="noStrike">
+            <a:endParaRPr b="0" lang="en-GB" sz="4400" spc="-1" strike="noStrike">
               <a:solidFill>
                 <a:srgbClr val="000000"/>
               </a:solidFill>
@@ -1775,7 +1775,7 @@
             <a:pPr indent="0" algn="ctr">
               <a:buNone/>
             </a:pPr>
-            <a:endParaRPr b="0" lang="en-US" sz="3200" spc="-1" strike="noStrike">
+            <a:endParaRPr b="0" lang="en-GB" sz="3200" spc="-1" strike="noStrike">
               <a:solidFill>
                 <a:srgbClr val="000000"/>
               </a:solidFill>
@@ -1837,7 +1837,7 @@
             <a:pPr indent="0" algn="ctr">
               <a:buNone/>
             </a:pPr>
-            <a:endParaRPr b="0" lang="en-US" sz="4400" spc="-1" strike="noStrike">
+            <a:endParaRPr b="0" lang="en-GB" sz="4400" spc="-1" strike="noStrike">
               <a:solidFill>
                 <a:srgbClr val="000000"/>
               </a:solidFill>
@@ -1880,7 +1880,7 @@
               </a:spcBef>
               <a:buNone/>
             </a:pPr>
-            <a:endParaRPr b="0" lang="en-US" sz="3200" spc="-1" strike="noStrike">
+            <a:endParaRPr b="0" lang="en-GB" sz="3200" spc="-1" strike="noStrike">
               <a:solidFill>
                 <a:srgbClr val="000000"/>
               </a:solidFill>
@@ -1942,7 +1942,7 @@
             <a:pPr indent="0" algn="ctr">
               <a:buNone/>
             </a:pPr>
-            <a:endParaRPr b="0" lang="en-US" sz="4400" spc="-1" strike="noStrike">
+            <a:endParaRPr b="0" lang="en-GB" sz="4400" spc="-1" strike="noStrike">
               <a:solidFill>
                 <a:srgbClr val="000000"/>
               </a:solidFill>
@@ -1985,7 +1985,7 @@
               </a:spcBef>
               <a:buNone/>
             </a:pPr>
-            <a:endParaRPr b="0" lang="en-US" sz="3200" spc="-1" strike="noStrike">
+            <a:endParaRPr b="0" lang="en-GB" sz="3200" spc="-1" strike="noStrike">
               <a:solidFill>
                 <a:srgbClr val="000000"/>
               </a:solidFill>
@@ -2028,7 +2028,7 @@
               </a:spcBef>
               <a:buNone/>
             </a:pPr>
-            <a:endParaRPr b="0" lang="en-US" sz="3200" spc="-1" strike="noStrike">
+            <a:endParaRPr b="0" lang="en-GB" sz="3200" spc="-1" strike="noStrike">
               <a:solidFill>
                 <a:srgbClr val="000000"/>
               </a:solidFill>
@@ -2090,7 +2090,7 @@
             <a:pPr indent="0" algn="ctr">
               <a:buNone/>
             </a:pPr>
-            <a:endParaRPr b="0" lang="en-US" sz="4400" spc="-1" strike="noStrike">
+            <a:endParaRPr b="0" lang="en-GB" sz="4400" spc="-1" strike="noStrike">
               <a:solidFill>
                 <a:srgbClr val="000000"/>
               </a:solidFill>
@@ -2150,7 +2150,7 @@
           </a:bodyPr>
           <a:p>
             <a:pPr algn="ctr"/>
-            <a:endParaRPr b="0" lang="en-US" sz="3200" spc="-1" strike="noStrike">
+            <a:endParaRPr b="0" lang="en-GB" sz="3200" spc="-1" strike="noStrike">
               <a:solidFill>
                 <a:srgbClr val="000000"/>
               </a:solidFill>
@@ -2212,7 +2212,7 @@
             <a:pPr indent="0" algn="ctr">
               <a:buNone/>
             </a:pPr>
-            <a:endParaRPr b="0" lang="en-US" sz="4400" spc="-1" strike="noStrike">
+            <a:endParaRPr b="0" lang="en-GB" sz="4400" spc="-1" strike="noStrike">
               <a:solidFill>
                 <a:srgbClr val="000000"/>
               </a:solidFill>
@@ -2255,7 +2255,7 @@
               </a:spcBef>
               <a:buNone/>
             </a:pPr>
-            <a:endParaRPr b="0" lang="en-US" sz="3200" spc="-1" strike="noStrike">
+            <a:endParaRPr b="0" lang="en-GB" sz="3200" spc="-1" strike="noStrike">
               <a:solidFill>
                 <a:srgbClr val="000000"/>
               </a:solidFill>
@@ -2298,7 +2298,7 @@
               </a:spcBef>
               <a:buNone/>
             </a:pPr>
-            <a:endParaRPr b="0" lang="en-US" sz="3200" spc="-1" strike="noStrike">
+            <a:endParaRPr b="0" lang="en-GB" sz="3200" spc="-1" strike="noStrike">
               <a:solidFill>
                 <a:srgbClr val="000000"/>
               </a:solidFill>
@@ -2341,7 +2341,7 @@
               </a:spcBef>
               <a:buNone/>
             </a:pPr>
-            <a:endParaRPr b="0" lang="en-US" sz="3200" spc="-1" strike="noStrike">
+            <a:endParaRPr b="0" lang="en-GB" sz="3200" spc="-1" strike="noStrike">
               <a:solidFill>
                 <a:srgbClr val="000000"/>
               </a:solidFill>
@@ -2403,7 +2403,7 @@
             <a:pPr indent="0" algn="ctr">
               <a:buNone/>
             </a:pPr>
-            <a:endParaRPr b="0" lang="en-US" sz="4400" spc="-1" strike="noStrike">
+            <a:endParaRPr b="0" lang="en-GB" sz="4400" spc="-1" strike="noStrike">
               <a:solidFill>
                 <a:srgbClr val="000000"/>
               </a:solidFill>
@@ -2443,7 +2443,7 @@
             <a:pPr indent="0" algn="ctr">
               <a:buNone/>
             </a:pPr>
-            <a:endParaRPr b="0" lang="en-US" sz="3200" spc="-1" strike="noStrike">
+            <a:endParaRPr b="0" lang="en-GB" sz="3200" spc="-1" strike="noStrike">
               <a:solidFill>
                 <a:srgbClr val="000000"/>
               </a:solidFill>
@@ -2505,7 +2505,7 @@
             <a:pPr indent="0" algn="ctr">
               <a:buNone/>
             </a:pPr>
-            <a:endParaRPr b="0" lang="en-US" sz="4400" spc="-1" strike="noStrike">
+            <a:endParaRPr b="0" lang="en-GB" sz="4400" spc="-1" strike="noStrike">
               <a:solidFill>
                 <a:srgbClr val="000000"/>
               </a:solidFill>
@@ -2548,7 +2548,7 @@
               </a:spcBef>
               <a:buNone/>
             </a:pPr>
-            <a:endParaRPr b="0" lang="en-US" sz="3200" spc="-1" strike="noStrike">
+            <a:endParaRPr b="0" lang="en-GB" sz="3200" spc="-1" strike="noStrike">
               <a:solidFill>
                 <a:srgbClr val="000000"/>
               </a:solidFill>
@@ -2591,7 +2591,7 @@
               </a:spcBef>
               <a:buNone/>
             </a:pPr>
-            <a:endParaRPr b="0" lang="en-US" sz="3200" spc="-1" strike="noStrike">
+            <a:endParaRPr b="0" lang="en-GB" sz="3200" spc="-1" strike="noStrike">
               <a:solidFill>
                 <a:srgbClr val="000000"/>
               </a:solidFill>
@@ -2634,7 +2634,7 @@
               </a:spcBef>
               <a:buNone/>
             </a:pPr>
-            <a:endParaRPr b="0" lang="en-US" sz="3200" spc="-1" strike="noStrike">
+            <a:endParaRPr b="0" lang="en-GB" sz="3200" spc="-1" strike="noStrike">
               <a:solidFill>
                 <a:srgbClr val="000000"/>
               </a:solidFill>
@@ -2696,7 +2696,7 @@
             <a:pPr indent="0" algn="ctr">
               <a:buNone/>
             </a:pPr>
-            <a:endParaRPr b="0" lang="en-US" sz="4400" spc="-1" strike="noStrike">
+            <a:endParaRPr b="0" lang="en-GB" sz="4400" spc="-1" strike="noStrike">
               <a:solidFill>
                 <a:srgbClr val="000000"/>
               </a:solidFill>
@@ -2739,7 +2739,7 @@
               </a:spcBef>
               <a:buNone/>
             </a:pPr>
-            <a:endParaRPr b="0" lang="en-US" sz="3200" spc="-1" strike="noStrike">
+            <a:endParaRPr b="0" lang="en-GB" sz="3200" spc="-1" strike="noStrike">
               <a:solidFill>
                 <a:srgbClr val="000000"/>
               </a:solidFill>
@@ -2782,7 +2782,7 @@
               </a:spcBef>
               <a:buNone/>
             </a:pPr>
-            <a:endParaRPr b="0" lang="en-US" sz="3200" spc="-1" strike="noStrike">
+            <a:endParaRPr b="0" lang="en-GB" sz="3200" spc="-1" strike="noStrike">
               <a:solidFill>
                 <a:srgbClr val="000000"/>
               </a:solidFill>
@@ -2825,7 +2825,7 @@
               </a:spcBef>
               <a:buNone/>
             </a:pPr>
-            <a:endParaRPr b="0" lang="en-US" sz="3200" spc="-1" strike="noStrike">
+            <a:endParaRPr b="0" lang="en-GB" sz="3200" spc="-1" strike="noStrike">
               <a:solidFill>
                 <a:srgbClr val="000000"/>
               </a:solidFill>
@@ -2887,7 +2887,7 @@
             <a:pPr indent="0" algn="ctr">
               <a:buNone/>
             </a:pPr>
-            <a:endParaRPr b="0" lang="en-US" sz="4400" spc="-1" strike="noStrike">
+            <a:endParaRPr b="0" lang="en-GB" sz="4400" spc="-1" strike="noStrike">
               <a:solidFill>
                 <a:srgbClr val="000000"/>
               </a:solidFill>
@@ -2930,7 +2930,7 @@
               </a:spcBef>
               <a:buNone/>
             </a:pPr>
-            <a:endParaRPr b="0" lang="en-US" sz="3200" spc="-1" strike="noStrike">
+            <a:endParaRPr b="0" lang="en-GB" sz="3200" spc="-1" strike="noStrike">
               <a:solidFill>
                 <a:srgbClr val="000000"/>
               </a:solidFill>
@@ -2973,7 +2973,7 @@
               </a:spcBef>
               <a:buNone/>
             </a:pPr>
-            <a:endParaRPr b="0" lang="en-US" sz="3200" spc="-1" strike="noStrike">
+            <a:endParaRPr b="0" lang="en-GB" sz="3200" spc="-1" strike="noStrike">
               <a:solidFill>
                 <a:srgbClr val="000000"/>
               </a:solidFill>
@@ -3035,7 +3035,7 @@
             <a:pPr indent="0" algn="ctr">
               <a:buNone/>
             </a:pPr>
-            <a:endParaRPr b="0" lang="en-US" sz="4400" spc="-1" strike="noStrike">
+            <a:endParaRPr b="0" lang="en-GB" sz="4400" spc="-1" strike="noStrike">
               <a:solidFill>
                 <a:srgbClr val="000000"/>
               </a:solidFill>
@@ -3078,7 +3078,7 @@
               </a:spcBef>
               <a:buNone/>
             </a:pPr>
-            <a:endParaRPr b="0" lang="en-US" sz="3200" spc="-1" strike="noStrike">
+            <a:endParaRPr b="0" lang="en-GB" sz="3200" spc="-1" strike="noStrike">
               <a:solidFill>
                 <a:srgbClr val="000000"/>
               </a:solidFill>
@@ -3121,7 +3121,7 @@
               </a:spcBef>
               <a:buNone/>
             </a:pPr>
-            <a:endParaRPr b="0" lang="en-US" sz="3200" spc="-1" strike="noStrike">
+            <a:endParaRPr b="0" lang="en-GB" sz="3200" spc="-1" strike="noStrike">
               <a:solidFill>
                 <a:srgbClr val="000000"/>
               </a:solidFill>
@@ -3164,7 +3164,7 @@
               </a:spcBef>
               <a:buNone/>
             </a:pPr>
-            <a:endParaRPr b="0" lang="en-US" sz="3200" spc="-1" strike="noStrike">
+            <a:endParaRPr b="0" lang="en-GB" sz="3200" spc="-1" strike="noStrike">
               <a:solidFill>
                 <a:srgbClr val="000000"/>
               </a:solidFill>
@@ -3207,7 +3207,7 @@
               </a:spcBef>
               <a:buNone/>
             </a:pPr>
-            <a:endParaRPr b="0" lang="en-US" sz="3200" spc="-1" strike="noStrike">
+            <a:endParaRPr b="0" lang="en-GB" sz="3200" spc="-1" strike="noStrike">
               <a:solidFill>
                 <a:srgbClr val="000000"/>
               </a:solidFill>
@@ -3269,7 +3269,7 @@
             <a:pPr indent="0" algn="ctr">
               <a:buNone/>
             </a:pPr>
-            <a:endParaRPr b="0" lang="en-US" sz="4400" spc="-1" strike="noStrike">
+            <a:endParaRPr b="0" lang="en-GB" sz="4400" spc="-1" strike="noStrike">
               <a:solidFill>
                 <a:srgbClr val="000000"/>
               </a:solidFill>
@@ -3312,7 +3312,7 @@
               </a:spcBef>
               <a:buNone/>
             </a:pPr>
-            <a:endParaRPr b="0" lang="en-US" sz="3200" spc="-1" strike="noStrike">
+            <a:endParaRPr b="0" lang="en-GB" sz="3200" spc="-1" strike="noStrike">
               <a:solidFill>
                 <a:srgbClr val="000000"/>
               </a:solidFill>
@@ -3355,7 +3355,7 @@
               </a:spcBef>
               <a:buNone/>
             </a:pPr>
-            <a:endParaRPr b="0" lang="en-US" sz="3200" spc="-1" strike="noStrike">
+            <a:endParaRPr b="0" lang="en-GB" sz="3200" spc="-1" strike="noStrike">
               <a:solidFill>
                 <a:srgbClr val="000000"/>
               </a:solidFill>
@@ -3398,7 +3398,7 @@
               </a:spcBef>
               <a:buNone/>
             </a:pPr>
-            <a:endParaRPr b="0" lang="en-US" sz="3200" spc="-1" strike="noStrike">
+            <a:endParaRPr b="0" lang="en-GB" sz="3200" spc="-1" strike="noStrike">
               <a:solidFill>
                 <a:srgbClr val="000000"/>
               </a:solidFill>
@@ -3441,7 +3441,7 @@
               </a:spcBef>
               <a:buNone/>
             </a:pPr>
-            <a:endParaRPr b="0" lang="en-US" sz="3200" spc="-1" strike="noStrike">
+            <a:endParaRPr b="0" lang="en-GB" sz="3200" spc="-1" strike="noStrike">
               <a:solidFill>
                 <a:srgbClr val="000000"/>
               </a:solidFill>
@@ -3484,7 +3484,7 @@
               </a:spcBef>
               <a:buNone/>
             </a:pPr>
-            <a:endParaRPr b="0" lang="en-US" sz="3200" spc="-1" strike="noStrike">
+            <a:endParaRPr b="0" lang="en-GB" sz="3200" spc="-1" strike="noStrike">
               <a:solidFill>
                 <a:srgbClr val="000000"/>
               </a:solidFill>
@@ -3527,7 +3527,7 @@
               </a:spcBef>
               <a:buNone/>
             </a:pPr>
-            <a:endParaRPr b="0" lang="en-US" sz="3200" spc="-1" strike="noStrike">
+            <a:endParaRPr b="0" lang="en-GB" sz="3200" spc="-1" strike="noStrike">
               <a:solidFill>
                 <a:srgbClr val="000000"/>
               </a:solidFill>
@@ -3589,7 +3589,7 @@
             <a:pPr indent="0" algn="ctr">
               <a:buNone/>
             </a:pPr>
-            <a:endParaRPr b="0" lang="en-US" sz="4400" spc="-1" strike="noStrike">
+            <a:endParaRPr b="0" lang="en-GB" sz="4400" spc="-1" strike="noStrike">
               <a:solidFill>
                 <a:srgbClr val="000000"/>
               </a:solidFill>
@@ -3632,7 +3632,7 @@
               </a:spcBef>
               <a:buNone/>
             </a:pPr>
-            <a:endParaRPr b="0" lang="en-US" sz="3200" spc="-1" strike="noStrike">
+            <a:endParaRPr b="0" lang="en-GB" sz="3200" spc="-1" strike="noStrike">
               <a:solidFill>
                 <a:srgbClr val="000000"/>
               </a:solidFill>
@@ -3694,7 +3694,7 @@
             <a:pPr indent="0" algn="ctr">
               <a:buNone/>
             </a:pPr>
-            <a:endParaRPr b="0" lang="en-US" sz="4400" spc="-1" strike="noStrike">
+            <a:endParaRPr b="0" lang="en-GB" sz="4400" spc="-1" strike="noStrike">
               <a:solidFill>
                 <a:srgbClr val="000000"/>
               </a:solidFill>
@@ -3737,7 +3737,7 @@
               </a:spcBef>
               <a:buNone/>
             </a:pPr>
-            <a:endParaRPr b="0" lang="en-US" sz="3200" spc="-1" strike="noStrike">
+            <a:endParaRPr b="0" lang="en-GB" sz="3200" spc="-1" strike="noStrike">
               <a:solidFill>
                 <a:srgbClr val="000000"/>
               </a:solidFill>
@@ -3780,7 +3780,7 @@
               </a:spcBef>
               <a:buNone/>
             </a:pPr>
-            <a:endParaRPr b="0" lang="en-US" sz="3200" spc="-1" strike="noStrike">
+            <a:endParaRPr b="0" lang="en-GB" sz="3200" spc="-1" strike="noStrike">
               <a:solidFill>
                 <a:srgbClr val="000000"/>
               </a:solidFill>
@@ -3842,7 +3842,7 @@
             <a:pPr indent="0" algn="ctr">
               <a:buNone/>
             </a:pPr>
-            <a:endParaRPr b="0" lang="en-US" sz="4400" spc="-1" strike="noStrike">
+            <a:endParaRPr b="0" lang="en-GB" sz="4400" spc="-1" strike="noStrike">
               <a:solidFill>
                 <a:srgbClr val="000000"/>
               </a:solidFill>
@@ -3902,7 +3902,7 @@
           </a:bodyPr>
           <a:p>
             <a:pPr algn="ctr"/>
-            <a:endParaRPr b="0" lang="en-US" sz="3200" spc="-1" strike="noStrike">
+            <a:endParaRPr b="0" lang="en-GB" sz="3200" spc="-1" strike="noStrike">
               <a:solidFill>
                 <a:srgbClr val="000000"/>
               </a:solidFill>
@@ -3964,7 +3964,7 @@
             <a:pPr indent="0" algn="ctr">
               <a:buNone/>
             </a:pPr>
-            <a:endParaRPr b="0" lang="en-US" sz="4400" spc="-1" strike="noStrike">
+            <a:endParaRPr b="0" lang="en-GB" sz="4400" spc="-1" strike="noStrike">
               <a:solidFill>
                 <a:srgbClr val="000000"/>
               </a:solidFill>
@@ -4007,7 +4007,7 @@
               </a:spcBef>
               <a:buNone/>
             </a:pPr>
-            <a:endParaRPr b="0" lang="en-US" sz="3200" spc="-1" strike="noStrike">
+            <a:endParaRPr b="0" lang="en-GB" sz="3200" spc="-1" strike="noStrike">
               <a:solidFill>
                 <a:srgbClr val="000000"/>
               </a:solidFill>
@@ -4050,7 +4050,7 @@
               </a:spcBef>
               <a:buNone/>
             </a:pPr>
-            <a:endParaRPr b="0" lang="en-US" sz="3200" spc="-1" strike="noStrike">
+            <a:endParaRPr b="0" lang="en-GB" sz="3200" spc="-1" strike="noStrike">
               <a:solidFill>
                 <a:srgbClr val="000000"/>
               </a:solidFill>
@@ -4093,7 +4093,7 @@
               </a:spcBef>
               <a:buNone/>
             </a:pPr>
-            <a:endParaRPr b="0" lang="en-US" sz="3200" spc="-1" strike="noStrike">
+            <a:endParaRPr b="0" lang="en-GB" sz="3200" spc="-1" strike="noStrike">
               <a:solidFill>
                 <a:srgbClr val="000000"/>
               </a:solidFill>
@@ -4155,7 +4155,7 @@
             <a:pPr indent="0" algn="ctr">
               <a:buNone/>
             </a:pPr>
-            <a:endParaRPr b="0" lang="en-US" sz="4400" spc="-1" strike="noStrike">
+            <a:endParaRPr b="0" lang="en-GB" sz="4400" spc="-1" strike="noStrike">
               <a:solidFill>
                 <a:srgbClr val="000000"/>
               </a:solidFill>
@@ -4198,7 +4198,7 @@
               </a:spcBef>
               <a:buNone/>
             </a:pPr>
-            <a:endParaRPr b="0" lang="en-US" sz="3200" spc="-1" strike="noStrike">
+            <a:endParaRPr b="0" lang="en-GB" sz="3200" spc="-1" strike="noStrike">
               <a:solidFill>
                 <a:srgbClr val="000000"/>
               </a:solidFill>
@@ -4241,7 +4241,7 @@
               </a:spcBef>
               <a:buNone/>
             </a:pPr>
-            <a:endParaRPr b="0" lang="en-US" sz="3200" spc="-1" strike="noStrike">
+            <a:endParaRPr b="0" lang="en-GB" sz="3200" spc="-1" strike="noStrike">
               <a:solidFill>
                 <a:srgbClr val="000000"/>
               </a:solidFill>
@@ -4284,7 +4284,7 @@
               </a:spcBef>
               <a:buNone/>
             </a:pPr>
-            <a:endParaRPr b="0" lang="en-US" sz="3200" spc="-1" strike="noStrike">
+            <a:endParaRPr b="0" lang="en-GB" sz="3200" spc="-1" strike="noStrike">
               <a:solidFill>
                 <a:srgbClr val="000000"/>
               </a:solidFill>
@@ -4346,7 +4346,7 @@
             <a:pPr indent="0" algn="ctr">
               <a:buNone/>
             </a:pPr>
-            <a:endParaRPr b="0" lang="en-US" sz="4400" spc="-1" strike="noStrike">
+            <a:endParaRPr b="0" lang="en-GB" sz="4400" spc="-1" strike="noStrike">
               <a:solidFill>
                 <a:srgbClr val="000000"/>
               </a:solidFill>
@@ -4389,7 +4389,7 @@
               </a:spcBef>
               <a:buNone/>
             </a:pPr>
-            <a:endParaRPr b="0" lang="en-US" sz="3200" spc="-1" strike="noStrike">
+            <a:endParaRPr b="0" lang="en-GB" sz="3200" spc="-1" strike="noStrike">
               <a:solidFill>
                 <a:srgbClr val="000000"/>
               </a:solidFill>
@@ -4432,7 +4432,7 @@
               </a:spcBef>
               <a:buNone/>
             </a:pPr>
-            <a:endParaRPr b="0" lang="en-US" sz="3200" spc="-1" strike="noStrike">
+            <a:endParaRPr b="0" lang="en-GB" sz="3200" spc="-1" strike="noStrike">
               <a:solidFill>
                 <a:srgbClr val="000000"/>
               </a:solidFill>
@@ -4475,7 +4475,7 @@
               </a:spcBef>
               <a:buNone/>
             </a:pPr>
-            <a:endParaRPr b="0" lang="en-US" sz="3200" spc="-1" strike="noStrike">
+            <a:endParaRPr b="0" lang="en-GB" sz="3200" spc="-1" strike="noStrike">
               <a:solidFill>
                 <a:srgbClr val="000000"/>
               </a:solidFill>
@@ -4522,7 +4522,7 @@
         <p:spPr>
           <a:xfrm>
             <a:off x="11444760" y="0"/>
-            <a:ext cx="744120" cy="6852960"/>
+            <a:ext cx="743760" cy="6852600"/>
           </a:xfrm>
           <a:prstGeom prst="rect">
             <a:avLst/>
@@ -4571,7 +4571,7 @@
         <p:spPr>
           <a:xfrm>
             <a:off x="11438640" y="6453360"/>
-            <a:ext cx="761040" cy="363960"/>
+            <a:ext cx="760680" cy="363960"/>
           </a:xfrm>
           <a:prstGeom prst="rect">
             <a:avLst/>
@@ -4597,7 +4597,7 @@
                 <a:spcPct val="100000"/>
               </a:lnSpc>
             </a:pPr>
-            <a:fld id="{0A8A5EDC-FF26-44E3-8E99-E4604F0480D6}" type="slidenum">
+            <a:fld id="{78A16490-4D89-44D4-9197-4F7B2E57A79D}" type="slidenum">
               <a:rPr b="0" lang="en-US" sz="1800" spc="-1" strike="noStrike">
                 <a:solidFill>
                   <a:srgbClr val="808080"/>
@@ -4607,7 +4607,7 @@
               </a:rPr>
               <a:t>&lt;number&gt;</a:t>
             </a:fld>
-            <a:endParaRPr b="0" lang="en-US" sz="1800" spc="-1" strike="noStrike">
+            <a:endParaRPr b="0" lang="en-GB" sz="1800" spc="-1" strike="noStrike">
               <a:solidFill>
                 <a:srgbClr val="000000"/>
               </a:solidFill>
@@ -4625,7 +4625,7 @@
         <p:spPr>
           <a:xfrm>
             <a:off x="912240" y="1268280"/>
-            <a:ext cx="9210960" cy="364320"/>
+            <a:ext cx="9210600" cy="363960"/>
           </a:xfrm>
           <a:prstGeom prst="rect">
             <a:avLst/>
@@ -4674,7 +4674,7 @@
         <p:spPr>
           <a:xfrm>
             <a:off x="0" y="0"/>
-            <a:ext cx="3054960" cy="564840"/>
+            <a:ext cx="3054600" cy="564480"/>
           </a:xfrm>
           <a:prstGeom prst="rect">
             <a:avLst/>
@@ -4697,7 +4697,7 @@
         <p:spPr>
           <a:xfrm>
             <a:off x="7430400" y="134640"/>
-            <a:ext cx="3700800" cy="516960"/>
+            <a:ext cx="3700440" cy="516600"/>
           </a:xfrm>
           <a:prstGeom prst="rect">
             <a:avLst/>
@@ -4716,7 +4716,7 @@
         <p:spPr>
           <a:xfrm>
             <a:off x="912240" y="1268280"/>
-            <a:ext cx="9210960" cy="364320"/>
+            <a:ext cx="9210600" cy="363960"/>
           </a:xfrm>
           <a:prstGeom prst="rect">
             <a:avLst/>
@@ -4761,7 +4761,7 @@
         <p:spPr>
           <a:xfrm>
             <a:off x="11444760" y="0"/>
-            <a:ext cx="744120" cy="6852960"/>
+            <a:ext cx="743760" cy="6852600"/>
           </a:xfrm>
           <a:prstGeom prst="rect">
             <a:avLst/>
@@ -4810,7 +4810,7 @@
         <p:spPr>
           <a:xfrm>
             <a:off x="0" y="6642720"/>
-            <a:ext cx="12187080" cy="211320"/>
+            <a:ext cx="12186720" cy="211320"/>
           </a:xfrm>
           <a:prstGeom prst="rect">
             <a:avLst/>
@@ -4846,7 +4846,7 @@
               </a:rPr>
               <a:t>Requirements Engineering – TU Clausthal</a:t>
             </a:r>
-            <a:endParaRPr b="0" lang="en-US" sz="800" spc="-1" strike="noStrike">
+            <a:endParaRPr b="0" lang="en-GB" sz="800" spc="-1" strike="noStrike">
               <a:solidFill>
                 <a:srgbClr val="000000"/>
               </a:solidFill>
@@ -4887,7 +4887,7 @@
               <a:buNone/>
             </a:pPr>
             <a:r>
-              <a:rPr b="0" lang="en-US" sz="4400" spc="-1" strike="noStrike">
+              <a:rPr b="0" lang="en-GB" sz="4400" spc="-1" strike="noStrike">
                 <a:solidFill>
                   <a:srgbClr val="000000"/>
                 </a:solidFill>
@@ -4895,7 +4895,7 @@
               </a:rPr>
               <a:t>Click to edit the title text format</a:t>
             </a:r>
-            <a:endParaRPr b="0" lang="en-US" sz="4400" spc="-1" strike="noStrike">
+            <a:endParaRPr b="0" lang="en-GB" sz="4400" spc="-1" strike="noStrike">
               <a:solidFill>
                 <a:srgbClr val="000000"/>
               </a:solidFill>
@@ -4944,7 +4944,7 @@
               <a:buChar char=""/>
             </a:pPr>
             <a:r>
-              <a:rPr b="0" lang="en-US" sz="3200" spc="-1" strike="noStrike">
+              <a:rPr b="0" lang="en-GB" sz="3200" spc="-1" strike="noStrike">
                 <a:solidFill>
                   <a:srgbClr val="000000"/>
                 </a:solidFill>
@@ -4952,7 +4952,7 @@
               </a:rPr>
               <a:t>Click to edit the outline text format</a:t>
             </a:r>
-            <a:endParaRPr b="0" lang="en-US" sz="3200" spc="-1" strike="noStrike">
+            <a:endParaRPr b="0" lang="en-GB" sz="3200" spc="-1" strike="noStrike">
               <a:solidFill>
                 <a:srgbClr val="000000"/>
               </a:solidFill>
@@ -4972,7 +4972,7 @@
               <a:buChar char=""/>
             </a:pPr>
             <a:r>
-              <a:rPr b="0" lang="en-US" sz="2800" spc="-1" strike="noStrike">
+              <a:rPr b="0" lang="en-GB" sz="2800" spc="-1" strike="noStrike">
                 <a:solidFill>
                   <a:srgbClr val="000000"/>
                 </a:solidFill>
@@ -4980,7 +4980,7 @@
               </a:rPr>
               <a:t>Second Outline Level</a:t>
             </a:r>
-            <a:endParaRPr b="0" lang="en-US" sz="2800" spc="-1" strike="noStrike">
+            <a:endParaRPr b="0" lang="en-GB" sz="2800" spc="-1" strike="noStrike">
               <a:solidFill>
                 <a:srgbClr val="000000"/>
               </a:solidFill>
@@ -5000,7 +5000,7 @@
               <a:buChar char=""/>
             </a:pPr>
             <a:r>
-              <a:rPr b="0" lang="en-US" sz="2400" spc="-1" strike="noStrike">
+              <a:rPr b="0" lang="en-GB" sz="2400" spc="-1" strike="noStrike">
                 <a:solidFill>
                   <a:srgbClr val="000000"/>
                 </a:solidFill>
@@ -5008,7 +5008,7 @@
               </a:rPr>
               <a:t>Third Outline Level</a:t>
             </a:r>
-            <a:endParaRPr b="0" lang="en-US" sz="2400" spc="-1" strike="noStrike">
+            <a:endParaRPr b="0" lang="en-GB" sz="2400" spc="-1" strike="noStrike">
               <a:solidFill>
                 <a:srgbClr val="000000"/>
               </a:solidFill>
@@ -5028,7 +5028,7 @@
               <a:buChar char=""/>
             </a:pPr>
             <a:r>
-              <a:rPr b="0" lang="en-US" sz="2000" spc="-1" strike="noStrike">
+              <a:rPr b="0" lang="en-GB" sz="2000" spc="-1" strike="noStrike">
                 <a:solidFill>
                   <a:srgbClr val="000000"/>
                 </a:solidFill>
@@ -5036,7 +5036,7 @@
               </a:rPr>
               <a:t>Fourth Outline Level</a:t>
             </a:r>
-            <a:endParaRPr b="0" lang="en-US" sz="2000" spc="-1" strike="noStrike">
+            <a:endParaRPr b="0" lang="en-GB" sz="2000" spc="-1" strike="noStrike">
               <a:solidFill>
                 <a:srgbClr val="000000"/>
               </a:solidFill>
@@ -5056,7 +5056,7 @@
               <a:buChar char=""/>
             </a:pPr>
             <a:r>
-              <a:rPr b="0" lang="en-US" sz="2000" spc="-1" strike="noStrike">
+              <a:rPr b="0" lang="en-GB" sz="2000" spc="-1" strike="noStrike">
                 <a:solidFill>
                   <a:srgbClr val="000000"/>
                 </a:solidFill>
@@ -5064,7 +5064,7 @@
               </a:rPr>
               <a:t>Fifth Outline Level</a:t>
             </a:r>
-            <a:endParaRPr b="0" lang="en-US" sz="2000" spc="-1" strike="noStrike">
+            <a:endParaRPr b="0" lang="en-GB" sz="2000" spc="-1" strike="noStrike">
               <a:solidFill>
                 <a:srgbClr val="000000"/>
               </a:solidFill>
@@ -5084,7 +5084,7 @@
               <a:buChar char=""/>
             </a:pPr>
             <a:r>
-              <a:rPr b="0" lang="en-US" sz="2000" spc="-1" strike="noStrike">
+              <a:rPr b="0" lang="en-GB" sz="2000" spc="-1" strike="noStrike">
                 <a:solidFill>
                   <a:srgbClr val="000000"/>
                 </a:solidFill>
@@ -5092,7 +5092,7 @@
               </a:rPr>
               <a:t>Sixth Outline Level</a:t>
             </a:r>
-            <a:endParaRPr b="0" lang="en-US" sz="2000" spc="-1" strike="noStrike">
+            <a:endParaRPr b="0" lang="en-GB" sz="2000" spc="-1" strike="noStrike">
               <a:solidFill>
                 <a:srgbClr val="000000"/>
               </a:solidFill>
@@ -5112,7 +5112,7 @@
               <a:buChar char=""/>
             </a:pPr>
             <a:r>
-              <a:rPr b="0" lang="en-US" sz="2000" spc="-1" strike="noStrike">
+              <a:rPr b="0" lang="en-GB" sz="2000" spc="-1" strike="noStrike">
                 <a:solidFill>
                   <a:srgbClr val="000000"/>
                 </a:solidFill>
@@ -5120,7 +5120,7 @@
               </a:rPr>
               <a:t>Seventh Outline Level</a:t>
             </a:r>
-            <a:endParaRPr b="0" lang="en-US" sz="2000" spc="-1" strike="noStrike">
+            <a:endParaRPr b="0" lang="en-GB" sz="2000" spc="-1" strike="noStrike">
               <a:solidFill>
                 <a:srgbClr val="000000"/>
               </a:solidFill>
@@ -5182,7 +5182,7 @@
         <p:spPr>
           <a:xfrm>
             <a:off x="11444760" y="0"/>
-            <a:ext cx="744120" cy="6852960"/>
+            <a:ext cx="743760" cy="6852600"/>
           </a:xfrm>
           <a:prstGeom prst="rect">
             <a:avLst/>
@@ -5231,7 +5231,7 @@
         <p:spPr>
           <a:xfrm>
             <a:off x="11438640" y="6453360"/>
-            <a:ext cx="761040" cy="363960"/>
+            <a:ext cx="760680" cy="363960"/>
           </a:xfrm>
           <a:prstGeom prst="rect">
             <a:avLst/>
@@ -5257,7 +5257,7 @@
                 <a:spcPct val="100000"/>
               </a:lnSpc>
             </a:pPr>
-            <a:fld id="{A503B81D-5FB8-4514-BDF1-F91BC2DE14E2}" type="slidenum">
+            <a:fld id="{A3A522E3-A73B-424B-92E7-DD034F2926CE}" type="slidenum">
               <a:rPr b="0" lang="en-US" sz="1800" spc="-1" strike="noStrike">
                 <a:solidFill>
                   <a:srgbClr val="808080"/>
@@ -5267,7 +5267,7 @@
               </a:rPr>
               <a:t>&lt;number&gt;</a:t>
             </a:fld>
-            <a:endParaRPr b="0" lang="en-US" sz="1800" spc="-1" strike="noStrike">
+            <a:endParaRPr b="0" lang="en-GB" sz="1800" spc="-1" strike="noStrike">
               <a:solidFill>
                 <a:srgbClr val="000000"/>
               </a:solidFill>
@@ -5285,7 +5285,7 @@
         <p:spPr>
           <a:xfrm>
             <a:off x="912240" y="1268280"/>
-            <a:ext cx="9210960" cy="364320"/>
+            <a:ext cx="9210600" cy="363960"/>
           </a:xfrm>
           <a:prstGeom prst="rect">
             <a:avLst/>
@@ -5334,7 +5334,7 @@
         <p:spPr>
           <a:xfrm>
             <a:off x="0" y="0"/>
-            <a:ext cx="3054960" cy="564840"/>
+            <a:ext cx="3054600" cy="564480"/>
           </a:xfrm>
           <a:prstGeom prst="rect">
             <a:avLst/>
@@ -5357,7 +5357,7 @@
         <p:spPr>
           <a:xfrm>
             <a:off x="7430400" y="134640"/>
-            <a:ext cx="3700800" cy="516960"/>
+            <a:ext cx="3700440" cy="516600"/>
           </a:xfrm>
           <a:prstGeom prst="rect">
             <a:avLst/>
@@ -5376,7 +5376,7 @@
         <p:spPr>
           <a:xfrm>
             <a:off x="11444760" y="0"/>
-            <a:ext cx="744120" cy="6852960"/>
+            <a:ext cx="743760" cy="6852600"/>
           </a:xfrm>
           <a:prstGeom prst="rect">
             <a:avLst/>
@@ -5425,7 +5425,7 @@
         <p:spPr>
           <a:xfrm>
             <a:off x="11438640" y="6453360"/>
-            <a:ext cx="761040" cy="363960"/>
+            <a:ext cx="760680" cy="363960"/>
           </a:xfrm>
           <a:prstGeom prst="rect">
             <a:avLst/>
@@ -5451,7 +5451,7 @@
                 <a:spcPct val="100000"/>
               </a:lnSpc>
             </a:pPr>
-            <a:fld id="{0CFCF3C7-3572-4E86-813A-89F51A5FD7CA}" type="slidenum">
+            <a:fld id="{0C636CCB-4772-4521-B718-4828924FC401}" type="slidenum">
               <a:rPr b="0" lang="en-US" sz="1800" spc="-1" strike="noStrike">
                 <a:solidFill>
                   <a:srgbClr val="808080"/>
@@ -5461,7 +5461,7 @@
               </a:rPr>
               <a:t>&lt;number&gt;</a:t>
             </a:fld>
-            <a:endParaRPr b="0" lang="en-US" sz="1800" spc="-1" strike="noStrike">
+            <a:endParaRPr b="0" lang="en-GB" sz="1800" spc="-1" strike="noStrike">
               <a:solidFill>
                 <a:srgbClr val="000000"/>
               </a:solidFill>
@@ -5479,7 +5479,7 @@
         <p:spPr>
           <a:xfrm>
             <a:off x="0" y="6642720"/>
-            <a:ext cx="12187080" cy="211320"/>
+            <a:ext cx="12186720" cy="211320"/>
           </a:xfrm>
           <a:prstGeom prst="rect">
             <a:avLst/>
@@ -5515,7 +5515,7 @@
               </a:rPr>
               <a:t>Requirements Engineering – TU Clausthal</a:t>
             </a:r>
-            <a:endParaRPr b="0" lang="en-US" sz="800" spc="-1" strike="noStrike">
+            <a:endParaRPr b="0" lang="en-GB" sz="800" spc="-1" strike="noStrike">
               <a:solidFill>
                 <a:srgbClr val="000000"/>
               </a:solidFill>
@@ -5556,7 +5556,7 @@
               <a:buNone/>
             </a:pPr>
             <a:r>
-              <a:rPr b="0" lang="en-US" sz="4400" spc="-1" strike="noStrike">
+              <a:rPr b="0" lang="en-GB" sz="4400" spc="-1" strike="noStrike">
                 <a:solidFill>
                   <a:srgbClr val="000000"/>
                 </a:solidFill>
@@ -5564,7 +5564,7 @@
               </a:rPr>
               <a:t>Click to edit the title text format</a:t>
             </a:r>
-            <a:endParaRPr b="0" lang="en-US" sz="4400" spc="-1" strike="noStrike">
+            <a:endParaRPr b="0" lang="en-GB" sz="4400" spc="-1" strike="noStrike">
               <a:solidFill>
                 <a:srgbClr val="000000"/>
               </a:solidFill>
@@ -5613,7 +5613,7 @@
               <a:buChar char=""/>
             </a:pPr>
             <a:r>
-              <a:rPr b="0" lang="en-US" sz="3200" spc="-1" strike="noStrike">
+              <a:rPr b="0" lang="en-GB" sz="3200" spc="-1" strike="noStrike">
                 <a:solidFill>
                   <a:srgbClr val="000000"/>
                 </a:solidFill>
@@ -5621,7 +5621,7 @@
               </a:rPr>
               <a:t>Click to edit the outline text format</a:t>
             </a:r>
-            <a:endParaRPr b="0" lang="en-US" sz="3200" spc="-1" strike="noStrike">
+            <a:endParaRPr b="0" lang="en-GB" sz="3200" spc="-1" strike="noStrike">
               <a:solidFill>
                 <a:srgbClr val="000000"/>
               </a:solidFill>
@@ -5641,7 +5641,7 @@
               <a:buChar char=""/>
             </a:pPr>
             <a:r>
-              <a:rPr b="0" lang="en-US" sz="2800" spc="-1" strike="noStrike">
+              <a:rPr b="0" lang="en-GB" sz="2800" spc="-1" strike="noStrike">
                 <a:solidFill>
                   <a:srgbClr val="000000"/>
                 </a:solidFill>
@@ -5649,7 +5649,7 @@
               </a:rPr>
               <a:t>Second Outline Level</a:t>
             </a:r>
-            <a:endParaRPr b="0" lang="en-US" sz="2800" spc="-1" strike="noStrike">
+            <a:endParaRPr b="0" lang="en-GB" sz="2800" spc="-1" strike="noStrike">
               <a:solidFill>
                 <a:srgbClr val="000000"/>
               </a:solidFill>
@@ -5669,7 +5669,7 @@
               <a:buChar char=""/>
             </a:pPr>
             <a:r>
-              <a:rPr b="0" lang="en-US" sz="2400" spc="-1" strike="noStrike">
+              <a:rPr b="0" lang="en-GB" sz="2400" spc="-1" strike="noStrike">
                 <a:solidFill>
                   <a:srgbClr val="000000"/>
                 </a:solidFill>
@@ -5677,7 +5677,7 @@
               </a:rPr>
               <a:t>Third Outline Level</a:t>
             </a:r>
-            <a:endParaRPr b="0" lang="en-US" sz="2400" spc="-1" strike="noStrike">
+            <a:endParaRPr b="0" lang="en-GB" sz="2400" spc="-1" strike="noStrike">
               <a:solidFill>
                 <a:srgbClr val="000000"/>
               </a:solidFill>
@@ -5697,7 +5697,7 @@
               <a:buChar char=""/>
             </a:pPr>
             <a:r>
-              <a:rPr b="0" lang="en-US" sz="2000" spc="-1" strike="noStrike">
+              <a:rPr b="0" lang="en-GB" sz="2000" spc="-1" strike="noStrike">
                 <a:solidFill>
                   <a:srgbClr val="000000"/>
                 </a:solidFill>
@@ -5705,7 +5705,7 @@
               </a:rPr>
               <a:t>Fourth Outline Level</a:t>
             </a:r>
-            <a:endParaRPr b="0" lang="en-US" sz="2000" spc="-1" strike="noStrike">
+            <a:endParaRPr b="0" lang="en-GB" sz="2000" spc="-1" strike="noStrike">
               <a:solidFill>
                 <a:srgbClr val="000000"/>
               </a:solidFill>
@@ -5725,7 +5725,7 @@
               <a:buChar char=""/>
             </a:pPr>
             <a:r>
-              <a:rPr b="0" lang="en-US" sz="2000" spc="-1" strike="noStrike">
+              <a:rPr b="0" lang="en-GB" sz="2000" spc="-1" strike="noStrike">
                 <a:solidFill>
                   <a:srgbClr val="000000"/>
                 </a:solidFill>
@@ -5733,7 +5733,7 @@
               </a:rPr>
               <a:t>Fifth Outline Level</a:t>
             </a:r>
-            <a:endParaRPr b="0" lang="en-US" sz="2000" spc="-1" strike="noStrike">
+            <a:endParaRPr b="0" lang="en-GB" sz="2000" spc="-1" strike="noStrike">
               <a:solidFill>
                 <a:srgbClr val="000000"/>
               </a:solidFill>
@@ -5753,7 +5753,7 @@
               <a:buChar char=""/>
             </a:pPr>
             <a:r>
-              <a:rPr b="0" lang="en-US" sz="2000" spc="-1" strike="noStrike">
+              <a:rPr b="0" lang="en-GB" sz="2000" spc="-1" strike="noStrike">
                 <a:solidFill>
                   <a:srgbClr val="000000"/>
                 </a:solidFill>
@@ -5761,7 +5761,7 @@
               </a:rPr>
               <a:t>Sixth Outline Level</a:t>
             </a:r>
-            <a:endParaRPr b="0" lang="en-US" sz="2000" spc="-1" strike="noStrike">
+            <a:endParaRPr b="0" lang="en-GB" sz="2000" spc="-1" strike="noStrike">
               <a:solidFill>
                 <a:srgbClr val="000000"/>
               </a:solidFill>
@@ -5781,7 +5781,7 @@
               <a:buChar char=""/>
             </a:pPr>
             <a:r>
-              <a:rPr b="0" lang="en-US" sz="2000" spc="-1" strike="noStrike">
+              <a:rPr b="0" lang="en-GB" sz="2000" spc="-1" strike="noStrike">
                 <a:solidFill>
                   <a:srgbClr val="000000"/>
                 </a:solidFill>
@@ -5789,7 +5789,7 @@
               </a:rPr>
               <a:t>Seventh Outline Level</a:t>
             </a:r>
-            <a:endParaRPr b="0" lang="en-US" sz="2000" spc="-1" strike="noStrike">
+            <a:endParaRPr b="0" lang="en-GB" sz="2000" spc="-1" strike="noStrike">
               <a:solidFill>
                 <a:srgbClr val="000000"/>
               </a:solidFill>
@@ -5844,7 +5844,7 @@
         <p:spPr>
           <a:xfrm>
             <a:off x="527400" y="1412640"/>
-            <a:ext cx="10364040" cy="1150560"/>
+            <a:ext cx="10363680" cy="1150200"/>
           </a:xfrm>
           <a:prstGeom prst="rect">
             <a:avLst/>
@@ -5880,7 +5880,7 @@
               </a:rPr>
               <a:t>Requirement Engineering</a:t>
             </a:r>
-            <a:endParaRPr b="0" lang="en-US" sz="3200" spc="-1" strike="noStrike">
+            <a:endParaRPr b="0" lang="en-GB" sz="3200" spc="-1" strike="noStrike">
               <a:solidFill>
                 <a:srgbClr val="000000"/>
               </a:solidFill>
@@ -5898,7 +5898,7 @@
         <p:spPr>
           <a:xfrm>
             <a:off x="527400" y="2852640"/>
-            <a:ext cx="10364040" cy="2371320"/>
+            <a:ext cx="10363680" cy="2370960"/>
           </a:xfrm>
           <a:prstGeom prst="rect">
             <a:avLst/>
@@ -5940,7 +5940,7 @@
               </a:rPr>
               <a:t>Lecture 0: Organization</a:t>
             </a:r>
-            <a:endParaRPr b="0" lang="en-US" sz="2400" spc="-1" strike="noStrike">
+            <a:endParaRPr b="0" lang="en-GB" sz="2400" spc="-1" strike="noStrike">
               <a:solidFill>
                 <a:srgbClr val="000000"/>
               </a:solidFill>
@@ -5959,7 +5959,7 @@
                 <a:tab algn="l" pos="0"/>
               </a:tabLst>
             </a:pPr>
-            <a:endParaRPr b="0" lang="en-US" sz="2400" spc="-1" strike="noStrike">
+            <a:endParaRPr b="0" lang="en-GB" sz="2400" spc="-1" strike="noStrike">
               <a:solidFill>
                 <a:srgbClr val="000000"/>
               </a:solidFill>
@@ -5978,7 +5978,7 @@
                 <a:tab algn="l" pos="0"/>
               </a:tabLst>
             </a:pPr>
-            <a:endParaRPr b="0" lang="en-US" sz="2400" spc="-1" strike="noStrike">
+            <a:endParaRPr b="0" lang="en-GB" sz="2400" spc="-1" strike="noStrike">
               <a:solidFill>
                 <a:srgbClr val="000000"/>
               </a:solidFill>
@@ -5997,7 +5997,7 @@
                 <a:tab algn="l" pos="0"/>
               </a:tabLst>
             </a:pPr>
-            <a:endParaRPr b="0" lang="en-US" sz="2400" spc="-1" strike="noStrike">
+            <a:endParaRPr b="0" lang="en-GB" sz="2400" spc="-1" strike="noStrike">
               <a:solidFill>
                 <a:srgbClr val="000000"/>
               </a:solidFill>
@@ -6026,7 +6026,7 @@
               </a:rPr>
               <a:t>Prof. Dr. Benjamin Leiding</a:t>
             </a:r>
-            <a:endParaRPr b="0" lang="en-US" sz="1600" spc="-1" strike="noStrike">
+            <a:endParaRPr b="0" lang="en-GB" sz="1600" spc="-1" strike="noStrike">
               <a:solidFill>
                 <a:srgbClr val="000000"/>
               </a:solidFill>
@@ -6055,7 +6055,7 @@
               </a:rPr>
               <a:t>M.Sc. Anant Sujatanagarjuna</a:t>
             </a:r>
-            <a:endParaRPr b="0" lang="en-US" sz="1600" spc="-1" strike="noStrike">
+            <a:endParaRPr b="0" lang="en-GB" sz="1600" spc="-1" strike="noStrike">
               <a:solidFill>
                 <a:srgbClr val="000000"/>
               </a:solidFill>
@@ -6103,7 +6103,7 @@
         <p:spPr>
           <a:xfrm>
             <a:off x="539640" y="764640"/>
-            <a:ext cx="10748160" cy="498960"/>
+            <a:ext cx="10747800" cy="498600"/>
           </a:xfrm>
           <a:prstGeom prst="rect">
             <a:avLst/>
@@ -6139,7 +6139,7 @@
               </a:rPr>
               <a:t>Exercises</a:t>
             </a:r>
-            <a:endParaRPr b="0" lang="en-US" sz="2400" spc="-1" strike="noStrike">
+            <a:endParaRPr b="0" lang="en-GB" sz="2400" spc="-1" strike="noStrike">
               <a:solidFill>
                 <a:srgbClr val="000000"/>
               </a:solidFill>
@@ -6157,7 +6157,7 @@
         <p:spPr>
           <a:xfrm>
             <a:off x="539640" y="1268640"/>
-            <a:ext cx="10748160" cy="5035680"/>
+            <a:ext cx="10747800" cy="5035320"/>
           </a:xfrm>
           <a:prstGeom prst="rect">
             <a:avLst/>
@@ -6202,7 +6202,7 @@
               </a:rPr>
               <a:t>09.11.2022 → Exercise 01 – Knowledge Test (MC)</a:t>
             </a:r>
-            <a:endParaRPr b="0" lang="en-US" sz="1800" spc="-1" strike="noStrike">
+            <a:endParaRPr b="0" lang="en-GB" sz="1800" spc="-1" strike="noStrike">
               <a:solidFill>
                 <a:srgbClr val="000000"/>
               </a:solidFill>
@@ -6234,7 +6234,7 @@
               </a:rPr>
               <a:t>23.11.2022 → Exercise 02 – Elicitation I</a:t>
             </a:r>
-            <a:endParaRPr b="0" lang="en-US" sz="1800" spc="-1" strike="noStrike">
+            <a:endParaRPr b="0" lang="en-GB" sz="1800" spc="-1" strike="noStrike">
               <a:solidFill>
                 <a:srgbClr val="000000"/>
               </a:solidFill>
@@ -6266,7 +6266,7 @@
               </a:rPr>
               <a:t>30.11.2022 → Exercise 03 – Elicitation II</a:t>
             </a:r>
-            <a:endParaRPr b="0" lang="en-US" sz="1800" spc="-1" strike="noStrike">
+            <a:endParaRPr b="0" lang="en-GB" sz="1800" spc="-1" strike="noStrike">
               <a:solidFill>
                 <a:srgbClr val="000000"/>
               </a:solidFill>
@@ -6298,7 +6298,7 @@
               </a:rPr>
               <a:t>14.12.2022 → Exercise 04 – Agent-oriented Modelling</a:t>
             </a:r>
-            <a:endParaRPr b="0" lang="en-US" sz="1800" spc="-1" strike="noStrike">
+            <a:endParaRPr b="0" lang="en-GB" sz="1800" spc="-1" strike="noStrike">
               <a:solidFill>
                 <a:srgbClr val="000000"/>
               </a:solidFill>
@@ -6330,7 +6330,7 @@
               </a:rPr>
               <a:t>21.12.2022 → No Exercise</a:t>
             </a:r>
-            <a:endParaRPr b="0" lang="en-US" sz="1800" spc="-1" strike="noStrike">
+            <a:endParaRPr b="0" lang="en-GB" sz="1800" spc="-1" strike="noStrike">
               <a:solidFill>
                 <a:srgbClr val="000000"/>
               </a:solidFill>
@@ -6360,19 +6360,9 @@
                 <a:latin typeface="DejaVu Sans"/>
                 <a:ea typeface="DejaVu Sans"/>
               </a:rPr>
-              <a:t>11.01.2023 → </a:t>
-            </a:r>
-            <a:r>
-              <a:rPr b="0" lang="en-GB" sz="1800" spc="-1" strike="noStrike">
-                <a:solidFill>
-                  <a:srgbClr val="000000"/>
-                </a:solidFill>
-                <a:latin typeface="DejaVu Sans"/>
-                <a:ea typeface="DejaVu Sans"/>
-              </a:rPr>
-              <a:t>Exercise 05 – Coloured Petri Nets I</a:t>
-            </a:r>
-            <a:endParaRPr b="0" lang="en-US" sz="1800" spc="-1" strike="noStrike">
+              <a:t>11.01.2023 → Exercise 05 – Coloured Petri Nets I</a:t>
+            </a:r>
+            <a:endParaRPr b="0" lang="en-GB" sz="1800" spc="-1" strike="noStrike">
               <a:solidFill>
                 <a:srgbClr val="000000"/>
               </a:solidFill>
@@ -6402,19 +6392,9 @@
                 <a:latin typeface="DejaVu Sans"/>
                 <a:ea typeface="DejaVu Sans"/>
               </a:rPr>
-              <a:t>18.01.2023 → </a:t>
-            </a:r>
-            <a:r>
-              <a:rPr b="0" lang="en-GB" sz="1800" spc="-1" strike="noStrike">
-                <a:solidFill>
-                  <a:srgbClr val="000000"/>
-                </a:solidFill>
-                <a:latin typeface="DejaVu Sans"/>
-                <a:ea typeface="DejaVu Sans"/>
-              </a:rPr>
-              <a:t>Exercise 06 – Coloured Petri Nets II</a:t>
-            </a:r>
-            <a:endParaRPr b="0" lang="en-US" sz="1800" spc="-1" strike="noStrike">
+              <a:t>18.01.2023 → Exercise 06 – Coloured Petri Nets II</a:t>
+            </a:r>
+            <a:endParaRPr b="0" lang="en-GB" sz="1800" spc="-1" strike="noStrike">
               <a:solidFill>
                 <a:srgbClr val="000000"/>
               </a:solidFill>
@@ -6444,19 +6424,9 @@
                 <a:latin typeface="DejaVu Sans"/>
                 <a:ea typeface="DejaVu Sans"/>
               </a:rPr>
-              <a:t>25.01.2023 → </a:t>
-            </a:r>
-            <a:r>
-              <a:rPr b="0" lang="en-GB" sz="1800" spc="-1" strike="noStrike">
-                <a:solidFill>
-                  <a:srgbClr val="000000"/>
-                </a:solidFill>
-                <a:latin typeface="DejaVu Sans"/>
-                <a:ea typeface="DejaVu Sans"/>
-              </a:rPr>
-              <a:t>Bonus Task</a:t>
-            </a:r>
-            <a:endParaRPr b="0" lang="en-US" sz="1800" spc="-1" strike="noStrike">
+              <a:t>25.01.2023 → Bonus Task</a:t>
+            </a:r>
+            <a:endParaRPr b="0" lang="en-GB" sz="1800" spc="-1" strike="noStrike">
               <a:solidFill>
                 <a:srgbClr val="000000"/>
               </a:solidFill>
@@ -6488,7 +6458,7 @@
               </a:rPr>
               <a:t>01.02.2023 → Exercise 07 – Management and Traceability (MC) </a:t>
             </a:r>
-            <a:endParaRPr b="0" lang="en-US" sz="1800" spc="-1" strike="noStrike">
+            <a:endParaRPr b="0" lang="en-GB" sz="1800" spc="-1" strike="noStrike">
               <a:solidFill>
                 <a:srgbClr val="000000"/>
               </a:solidFill>
@@ -6536,7 +6506,7 @@
         <p:spPr>
           <a:xfrm>
             <a:off x="539640" y="764640"/>
-            <a:ext cx="10741320" cy="492120"/>
+            <a:ext cx="10740960" cy="491760"/>
           </a:xfrm>
           <a:prstGeom prst="rect">
             <a:avLst/>
@@ -6572,7 +6542,7 @@
               </a:rPr>
               <a:t>Course Organization</a:t>
             </a:r>
-            <a:endParaRPr b="0" lang="en-US" sz="2400" spc="-1" strike="noStrike">
+            <a:endParaRPr b="0" lang="en-GB" sz="2400" spc="-1" strike="noStrike">
               <a:solidFill>
                 <a:srgbClr val="000000"/>
               </a:solidFill>
@@ -6590,7 +6560,7 @@
         <p:spPr>
           <a:xfrm>
             <a:off x="539640" y="1268280"/>
-            <a:ext cx="10741320" cy="5028840"/>
+            <a:ext cx="10740960" cy="5028480"/>
           </a:xfrm>
           <a:prstGeom prst="rect">
             <a:avLst/>
@@ -6619,7 +6589,7 @@
                 <a:spcPts val="360"/>
               </a:spcBef>
             </a:pPr>
-            <a:endParaRPr b="0" lang="en-US" sz="1800" spc="-1" strike="noStrike">
+            <a:endParaRPr b="0" lang="en-GB" sz="1800" spc="-1" strike="noStrike">
               <a:solidFill>
                 <a:srgbClr val="000000"/>
               </a:solidFill>
@@ -6651,7 +6621,7 @@
               </a:rPr>
               <a:t>Organization of the lecture:</a:t>
             </a:r>
-            <a:endParaRPr b="0" lang="en-US" sz="1800" spc="-1" strike="noStrike">
+            <a:endParaRPr b="0" lang="en-GB" sz="1800" spc="-1" strike="noStrike">
               <a:solidFill>
                 <a:srgbClr val="000000"/>
               </a:solidFill>
@@ -6705,7 +6675,7 @@
               </a:rPr>
               <a:t>)</a:t>
             </a:r>
-            <a:endParaRPr b="0" lang="en-US" sz="1800" spc="-1" strike="noStrike">
+            <a:endParaRPr b="0" lang="en-GB" sz="1800" spc="-1" strike="noStrike">
               <a:solidFill>
                 <a:srgbClr val="000000"/>
               </a:solidFill>
@@ -6737,7 +6707,7 @@
               </a:rPr>
               <a:t>Please report bugs!</a:t>
             </a:r>
-            <a:endParaRPr b="0" lang="en-US" sz="1800" spc="-1" strike="noStrike">
+            <a:endParaRPr b="0" lang="en-GB" sz="1800" spc="-1" strike="noStrike">
               <a:solidFill>
                 <a:srgbClr val="000000"/>
               </a:solidFill>
@@ -6769,7 +6739,7 @@
               </a:rPr>
               <a:t>Lectures and exercises live stream (BBB – next slide) and Goslar</a:t>
             </a:r>
-            <a:endParaRPr b="0" lang="en-US" sz="1800" spc="-1" strike="noStrike">
+            <a:endParaRPr b="0" lang="en-GB" sz="1800" spc="-1" strike="noStrike">
               <a:solidFill>
                 <a:srgbClr val="000000"/>
               </a:solidFill>
@@ -6801,7 +6771,7 @@
               </a:rPr>
               <a:t>No lecture recordings</a:t>
             </a:r>
-            <a:endParaRPr b="0" lang="en-US" sz="1800" spc="-1" strike="noStrike">
+            <a:endParaRPr b="0" lang="en-GB" sz="1800" spc="-1" strike="noStrike">
               <a:solidFill>
                 <a:srgbClr val="000000"/>
               </a:solidFill>
@@ -6853,7 +6823,7 @@
               </a:rPr>
               <a:t>Time for questions and eventual tutorials related to the exercises</a:t>
             </a:r>
-            <a:endParaRPr b="0" lang="en-US" sz="1800" spc="-1" strike="noStrike">
+            <a:endParaRPr b="0" lang="en-GB" sz="1800" spc="-1" strike="noStrike">
               <a:solidFill>
                 <a:srgbClr val="000000"/>
               </a:solidFill>
@@ -6885,7 +6855,7 @@
               </a:rPr>
               <a:t> </a:t>
             </a:r>
-            <a:endParaRPr b="0" lang="en-US" sz="1800" spc="-1" strike="noStrike">
+            <a:endParaRPr b="0" lang="en-GB" sz="1800" spc="-1" strike="noStrike">
               <a:solidFill>
                 <a:srgbClr val="000000"/>
               </a:solidFill>
@@ -6969,7 +6939,7 @@
               </a:rPr>
               <a:t> respond to</a:t>
             </a:r>
-            <a:endParaRPr b="0" lang="en-US" sz="1800" spc="-1" strike="noStrike">
+            <a:endParaRPr b="0" lang="en-GB" sz="1800" spc="-1" strike="noStrike">
               <a:solidFill>
                 <a:srgbClr val="000000"/>
               </a:solidFill>
@@ -7001,7 +6971,7 @@
               </a:rPr>
               <a:t>emails written to this specific email address!</a:t>
             </a:r>
-            <a:endParaRPr b="0" lang="en-US" sz="1800" spc="-1" strike="noStrike">
+            <a:endParaRPr b="0" lang="en-GB" sz="1800" spc="-1" strike="noStrike">
               <a:solidFill>
                 <a:srgbClr val="000000"/>
               </a:solidFill>
@@ -7049,7 +7019,7 @@
         <p:spPr>
           <a:xfrm>
             <a:off x="539640" y="764640"/>
-            <a:ext cx="10739880" cy="490680"/>
+            <a:ext cx="10739520" cy="490320"/>
           </a:xfrm>
           <a:prstGeom prst="rect">
             <a:avLst/>
@@ -7085,7 +7055,7 @@
               </a:rPr>
               <a:t>Dates/Times/Locations</a:t>
             </a:r>
-            <a:endParaRPr b="0" lang="en-US" sz="2400" spc="-1" strike="noStrike">
+            <a:endParaRPr b="0" lang="en-GB" sz="2400" spc="-1" strike="noStrike">
               <a:solidFill>
                 <a:srgbClr val="000000"/>
               </a:solidFill>
@@ -7098,7 +7068,7 @@
                 <a:spcPct val="100000"/>
               </a:lnSpc>
             </a:pPr>
-            <a:endParaRPr b="0" lang="en-US" sz="2400" spc="-1" strike="noStrike">
+            <a:endParaRPr b="0" lang="en-GB" sz="2400" spc="-1" strike="noStrike">
               <a:solidFill>
                 <a:srgbClr val="000000"/>
               </a:solidFill>
@@ -7111,7 +7081,7 @@
                 <a:spcPct val="100000"/>
               </a:lnSpc>
             </a:pPr>
-            <a:endParaRPr b="0" lang="en-US" sz="2400" spc="-1" strike="noStrike">
+            <a:endParaRPr b="0" lang="en-GB" sz="2400" spc="-1" strike="noStrike">
               <a:solidFill>
                 <a:srgbClr val="000000"/>
               </a:solidFill>
@@ -7129,7 +7099,7 @@
         <p:spPr>
           <a:xfrm>
             <a:off x="539640" y="1268640"/>
-            <a:ext cx="10739880" cy="5027400"/>
+            <a:ext cx="10739520" cy="5027040"/>
           </a:xfrm>
           <a:prstGeom prst="rect">
             <a:avLst/>
@@ -7158,7 +7128,7 @@
                 <a:spcPts val="360"/>
               </a:spcBef>
             </a:pPr>
-            <a:endParaRPr b="0" lang="en-US" sz="1800" spc="-1" strike="noStrike">
+            <a:endParaRPr b="0" lang="en-GB" sz="1800" spc="-1" strike="noStrike">
               <a:solidFill>
                 <a:srgbClr val="000000"/>
               </a:solidFill>
@@ -7191,7 +7161,7 @@
               </a:rPr>
               <a:t>Lecture:</a:t>
             </a:r>
-            <a:endParaRPr b="0" lang="en-US" sz="1800" spc="-1" strike="noStrike">
+            <a:endParaRPr b="0" lang="en-GB" sz="1800" spc="-1" strike="noStrike">
               <a:solidFill>
                 <a:srgbClr val="000000"/>
               </a:solidFill>
@@ -7313,7 +7283,7 @@
               </a:rPr>
               <a:t>2023</a:t>
             </a:r>
-            <a:endParaRPr b="0" lang="en-US" sz="1800" spc="-1" strike="noStrike">
+            <a:endParaRPr b="0" lang="en-GB" sz="1800" spc="-1" strike="noStrike">
               <a:solidFill>
                 <a:srgbClr val="000000"/>
               </a:solidFill>
@@ -7367,7 +7337,7 @@
               </a:rPr>
               <a:t>)</a:t>
             </a:r>
-            <a:endParaRPr b="0" lang="en-US" sz="1800" spc="-1" strike="noStrike">
+            <a:endParaRPr b="0" lang="en-GB" sz="1800" spc="-1" strike="noStrike">
               <a:solidFill>
                 <a:srgbClr val="000000"/>
               </a:solidFill>
@@ -7383,7 +7353,7 @@
                 <a:spcPts val="360"/>
               </a:spcBef>
             </a:pPr>
-            <a:endParaRPr b="0" lang="en-US" sz="1800" spc="-1" strike="noStrike">
+            <a:endParaRPr b="0" lang="en-GB" sz="1800" spc="-1" strike="noStrike">
               <a:solidFill>
                 <a:srgbClr val="000000"/>
               </a:solidFill>
@@ -7416,7 +7386,7 @@
               </a:rPr>
               <a:t>Exercise / Q&amp;A:</a:t>
             </a:r>
-            <a:endParaRPr b="0" lang="en-US" sz="1800" spc="-1" strike="noStrike">
+            <a:endParaRPr b="0" lang="en-GB" sz="1800" spc="-1" strike="noStrike">
               <a:solidFill>
                 <a:srgbClr val="000000"/>
               </a:solidFill>
@@ -7538,7 +7508,7 @@
               </a:rPr>
               <a:t>2023</a:t>
             </a:r>
-            <a:endParaRPr b="0" lang="en-US" sz="1800" spc="-1" strike="noStrike">
+            <a:endParaRPr b="0" lang="en-GB" sz="1800" spc="-1" strike="noStrike">
               <a:solidFill>
                 <a:srgbClr val="000000"/>
               </a:solidFill>
@@ -7592,7 +7562,7 @@
               </a:rPr>
               <a:t>)</a:t>
             </a:r>
-            <a:endParaRPr b="0" lang="en-US" sz="1800" spc="-1" strike="noStrike">
+            <a:endParaRPr b="0" lang="en-GB" sz="1800" spc="-1" strike="noStrike">
               <a:solidFill>
                 <a:srgbClr val="000000"/>
               </a:solidFill>
@@ -7640,7 +7610,7 @@
         <p:spPr>
           <a:xfrm>
             <a:off x="539640" y="764640"/>
-            <a:ext cx="10748160" cy="498960"/>
+            <a:ext cx="10747800" cy="498600"/>
           </a:xfrm>
           <a:prstGeom prst="rect">
             <a:avLst/>
@@ -7676,7 +7646,7 @@
               </a:rPr>
               <a:t>Exercises </a:t>
             </a:r>
-            <a:endParaRPr b="0" lang="en-US" sz="2400" spc="-1" strike="noStrike">
+            <a:endParaRPr b="0" lang="en-GB" sz="2400" spc="-1" strike="noStrike">
               <a:solidFill>
                 <a:srgbClr val="000000"/>
               </a:solidFill>
@@ -7694,7 +7664,7 @@
         <p:spPr>
           <a:xfrm>
             <a:off x="539640" y="1268280"/>
-            <a:ext cx="10748160" cy="5035680"/>
+            <a:ext cx="10747800" cy="5035320"/>
           </a:xfrm>
           <a:prstGeom prst="rect">
             <a:avLst/>
@@ -7720,7 +7690,7 @@
                 <a:spcPct val="100000"/>
               </a:lnSpc>
             </a:pPr>
-            <a:endParaRPr b="0" lang="en-US" sz="1800" spc="-1" strike="noStrike">
+            <a:endParaRPr b="0" lang="en-GB" sz="1800" spc="-1" strike="noStrike">
               <a:solidFill>
                 <a:srgbClr val="000000"/>
               </a:solidFill>
@@ -7752,7 +7722,7 @@
               </a:rPr>
               <a:t>Organization of the exercise:</a:t>
             </a:r>
-            <a:endParaRPr b="0" lang="en-US" sz="1800" spc="-1" strike="noStrike">
+            <a:endParaRPr b="0" lang="en-GB" sz="1800" spc="-1" strike="noStrike">
               <a:solidFill>
                 <a:srgbClr val="000000"/>
               </a:solidFill>
@@ -7804,7 +7774,7 @@
               </a:rPr>
               <a:t> group submissions</a:t>
             </a:r>
-            <a:endParaRPr b="0" lang="en-US" sz="1800" spc="-1" strike="noStrike">
+            <a:endParaRPr b="0" lang="en-GB" sz="1800" spc="-1" strike="noStrike">
               <a:solidFill>
                 <a:srgbClr val="000000"/>
               </a:solidFill>
@@ -7836,7 +7806,7 @@
               </a:rPr>
               <a:t>Multiple-Choice or practical tasks</a:t>
             </a:r>
-            <a:endParaRPr b="0" lang="en-US" sz="1800" spc="-1" strike="noStrike">
+            <a:endParaRPr b="0" lang="en-GB" sz="1800" spc="-1" strike="noStrike">
               <a:solidFill>
                 <a:srgbClr val="000000"/>
               </a:solidFill>
@@ -7868,7 +7838,7 @@
               </a:rPr>
               <a:t>7-14 days to submit (depending on the task)</a:t>
             </a:r>
-            <a:endParaRPr b="0" lang="en-US" sz="1800" spc="-1" strike="noStrike">
+            <a:endParaRPr b="0" lang="en-GB" sz="1800" spc="-1" strike="noStrike">
               <a:solidFill>
                 <a:srgbClr val="000000"/>
               </a:solidFill>
@@ -7900,7 +7870,7 @@
               </a:rPr>
               <a:t>Submission deadline is always Wednesday at 1:59pm (right before the next lecture)</a:t>
             </a:r>
-            <a:endParaRPr b="0" lang="en-US" sz="1800" spc="-1" strike="noStrike">
+            <a:endParaRPr b="0" lang="en-GB" sz="1800" spc="-1" strike="noStrike">
               <a:solidFill>
                 <a:srgbClr val="000000"/>
               </a:solidFill>
@@ -7942,7 +7912,7 @@
               </a:rPr>
               <a:t>ow on the next slides (Examination)</a:t>
             </a:r>
-            <a:endParaRPr b="0" lang="en-US" sz="1800" spc="-1" strike="noStrike">
+            <a:endParaRPr b="0" lang="en-GB" sz="1800" spc="-1" strike="noStrike">
               <a:solidFill>
                 <a:srgbClr val="000000"/>
               </a:solidFill>
@@ -7990,7 +7960,7 @@
         <p:spPr>
           <a:xfrm>
             <a:off x="539640" y="764640"/>
-            <a:ext cx="10741320" cy="492120"/>
+            <a:ext cx="10740960" cy="491760"/>
           </a:xfrm>
           <a:prstGeom prst="rect">
             <a:avLst/>
@@ -8026,7 +7996,7 @@
               </a:rPr>
               <a:t>Exercises </a:t>
             </a:r>
-            <a:endParaRPr b="0" lang="en-US" sz="2400" spc="-1" strike="noStrike">
+            <a:endParaRPr b="0" lang="en-GB" sz="2400" spc="-1" strike="noStrike">
               <a:solidFill>
                 <a:srgbClr val="000000"/>
               </a:solidFill>
@@ -8044,7 +8014,7 @@
         <p:spPr>
           <a:xfrm>
             <a:off x="539640" y="1268280"/>
-            <a:ext cx="10741320" cy="5028840"/>
+            <a:ext cx="10740960" cy="5028480"/>
           </a:xfrm>
           <a:prstGeom prst="rect">
             <a:avLst/>
@@ -8086,7 +8056,7 @@
               </a:rPr>
               <a:t>Bonus task:</a:t>
             </a:r>
-            <a:endParaRPr b="0" lang="en-US" sz="1800" spc="-1" strike="noStrike">
+            <a:endParaRPr b="0" lang="en-GB" sz="1800" spc="-1" strike="noStrike">
               <a:solidFill>
                 <a:srgbClr val="000000"/>
               </a:solidFill>
@@ -8118,7 +8088,7 @@
               </a:rPr>
               <a:t>You may miss/fail one of the regular exercises</a:t>
             </a:r>
-            <a:endParaRPr b="0" lang="en-US" sz="1800" spc="-1" strike="noStrike">
+            <a:endParaRPr b="0" lang="en-GB" sz="1800" spc="-1" strike="noStrike">
               <a:solidFill>
                 <a:srgbClr val="000000"/>
               </a:solidFill>
@@ -8170,7 +8140,7 @@
               </a:rPr>
               <a:t> passing the bonus task substitutes the missed/failed exercise</a:t>
             </a:r>
-            <a:endParaRPr b="0" lang="en-US" sz="1800" spc="-1" strike="noStrike">
+            <a:endParaRPr b="0" lang="en-GB" sz="1800" spc="-1" strike="noStrike">
               <a:solidFill>
                 <a:srgbClr val="000000"/>
               </a:solidFill>
@@ -8212,7 +8182,7 @@
               </a:rPr>
               <a:t> → don’t “plan” with the bonus task. Rather submit and pass the regular exercises.</a:t>
             </a:r>
-            <a:endParaRPr b="0" lang="en-US" sz="1800" spc="-1" strike="noStrike">
+            <a:endParaRPr b="0" lang="en-GB" sz="1800" spc="-1" strike="noStrike">
               <a:solidFill>
                 <a:srgbClr val="000000"/>
               </a:solidFill>
@@ -8260,7 +8230,7 @@
         <p:spPr>
           <a:xfrm>
             <a:off x="539640" y="764640"/>
-            <a:ext cx="10741320" cy="492120"/>
+            <a:ext cx="10740960" cy="491760"/>
           </a:xfrm>
           <a:prstGeom prst="rect">
             <a:avLst/>
@@ -8296,7 +8266,7 @@
               </a:rPr>
               <a:t>Multiple-Choice Exercises </a:t>
             </a:r>
-            <a:endParaRPr b="0" lang="en-US" sz="2400" spc="-1" strike="noStrike">
+            <a:endParaRPr b="0" lang="en-GB" sz="2400" spc="-1" strike="noStrike">
               <a:solidFill>
                 <a:srgbClr val="000000"/>
               </a:solidFill>
@@ -8314,7 +8284,7 @@
         <p:spPr>
           <a:xfrm>
             <a:off x="698760" y="1316880"/>
-            <a:ext cx="10360080" cy="475200"/>
+            <a:ext cx="10359720" cy="474840"/>
           </a:xfrm>
           <a:prstGeom prst="rect">
             <a:avLst/>
@@ -8350,7 +8320,7 @@
               </a:rPr>
               <a:t>Step-1: Navigate to Moodle on your studip, select "Zum Kurs in Moodle"</a:t>
             </a:r>
-            <a:endParaRPr b="0" lang="en-US" sz="1800" spc="-1" strike="noStrike">
+            <a:endParaRPr b="0" lang="en-GB" sz="1800" spc="-1" strike="noStrike">
               <a:solidFill>
                 <a:srgbClr val="000000"/>
               </a:solidFill>
@@ -8416,13 +8386,13 @@
         </p:nvPicPr>
         <p:blipFill>
           <a:blip r:embed="rId1"/>
-          <a:srcRect l="0" t="0" r="0" b="7378"/>
+          <a:srcRect l="0" t="0" r="0" b="7376"/>
           <a:stretch/>
         </p:blipFill>
         <p:spPr>
           <a:xfrm>
             <a:off x="2057400" y="2111400"/>
-            <a:ext cx="7313760" cy="4059000"/>
+            <a:ext cx="7313400" cy="4058640"/>
           </a:xfrm>
           <a:prstGeom prst="rect">
             <a:avLst/>
@@ -8471,7 +8441,7 @@
         <p:spPr>
           <a:xfrm>
             <a:off x="539640" y="764640"/>
-            <a:ext cx="10741320" cy="492120"/>
+            <a:ext cx="10740960" cy="491760"/>
           </a:xfrm>
           <a:prstGeom prst="rect">
             <a:avLst/>
@@ -8507,7 +8477,7 @@
               </a:rPr>
               <a:t>Multiple-Choice Exercises </a:t>
             </a:r>
-            <a:endParaRPr b="0" lang="en-US" sz="2400" spc="-1" strike="noStrike">
+            <a:endParaRPr b="0" lang="en-GB" sz="2400" spc="-1" strike="noStrike">
               <a:solidFill>
                 <a:srgbClr val="000000"/>
               </a:solidFill>
@@ -8525,7 +8495,7 @@
         <p:spPr>
           <a:xfrm>
             <a:off x="698760" y="1316880"/>
-            <a:ext cx="5442840" cy="439920"/>
+            <a:ext cx="5442480" cy="439560"/>
           </a:xfrm>
           <a:prstGeom prst="rect">
             <a:avLst/>
@@ -8572,7 +8542,7 @@
               </a:rPr>
               <a:t>"Exercise 1"</a:t>
             </a:r>
-            <a:endParaRPr b="0" lang="en-US" sz="1800" spc="-1" strike="noStrike">
+            <a:endParaRPr b="0" lang="en-GB" sz="1800" spc="-1" strike="noStrike">
               <a:solidFill>
                 <a:srgbClr val="000000"/>
               </a:solidFill>
@@ -8594,7 +8564,7 @@
         <p:spPr>
           <a:xfrm>
             <a:off x="2513520" y="1828800"/>
-            <a:ext cx="6857640" cy="4736520"/>
+            <a:ext cx="6857280" cy="4736160"/>
           </a:xfrm>
           <a:prstGeom prst="rect">
             <a:avLst/>
@@ -8643,7 +8613,7 @@
         <p:spPr>
           <a:xfrm>
             <a:off x="539640" y="764640"/>
-            <a:ext cx="10741320" cy="492120"/>
+            <a:ext cx="10740960" cy="491760"/>
           </a:xfrm>
           <a:prstGeom prst="rect">
             <a:avLst/>
@@ -8679,7 +8649,7 @@
               </a:rPr>
               <a:t>Multiple-Choice Exercises </a:t>
             </a:r>
-            <a:endParaRPr b="0" lang="en-US" sz="2400" spc="-1" strike="noStrike">
+            <a:endParaRPr b="0" lang="en-GB" sz="2400" spc="-1" strike="noStrike">
               <a:solidFill>
                 <a:srgbClr val="000000"/>
               </a:solidFill>
@@ -8697,7 +8667,7 @@
         <p:spPr>
           <a:xfrm>
             <a:off x="698760" y="1316880"/>
-            <a:ext cx="5214240" cy="439920"/>
+            <a:ext cx="5213880" cy="439560"/>
           </a:xfrm>
           <a:prstGeom prst="rect">
             <a:avLst/>
@@ -8733,7 +8703,7 @@
               </a:rPr>
               <a:t>Step-3 : Start your test if you are ready</a:t>
             </a:r>
-            <a:endParaRPr b="0" lang="en-US" sz="1800" spc="-1" strike="noStrike">
+            <a:endParaRPr b="0" lang="en-GB" sz="1800" spc="-1" strike="noStrike">
               <a:solidFill>
                 <a:srgbClr val="000000"/>
               </a:solidFill>
@@ -8755,7 +8725,7 @@
         <p:spPr>
           <a:xfrm>
             <a:off x="1600200" y="2073600"/>
-            <a:ext cx="7698960" cy="3754800"/>
+            <a:ext cx="7698600" cy="3754440"/>
           </a:xfrm>
           <a:prstGeom prst="rect">
             <a:avLst/>
@@ -8803,13 +8773,13 @@
         </p:nvPicPr>
         <p:blipFill>
           <a:blip r:embed="rId1"/>
-          <a:srcRect l="0" t="23833" r="0" b="0"/>
+          <a:srcRect l="0" t="23837" r="0" b="0"/>
           <a:stretch/>
         </p:blipFill>
         <p:spPr>
           <a:xfrm>
             <a:off x="937800" y="3069000"/>
-            <a:ext cx="8868240" cy="2920320"/>
+            <a:ext cx="8867880" cy="2919960"/>
           </a:xfrm>
           <a:prstGeom prst="rect">
             <a:avLst/>
@@ -8828,7 +8798,7 @@
         <p:spPr>
           <a:xfrm>
             <a:off x="539640" y="764640"/>
-            <a:ext cx="10741320" cy="492120"/>
+            <a:ext cx="10740960" cy="491760"/>
           </a:xfrm>
           <a:prstGeom prst="rect">
             <a:avLst/>
@@ -8864,7 +8834,7 @@
               </a:rPr>
               <a:t>Multiple-Choice Exercises </a:t>
             </a:r>
-            <a:endParaRPr b="0" lang="en-US" sz="2400" spc="-1" strike="noStrike">
+            <a:endParaRPr b="0" lang="en-GB" sz="2400" spc="-1" strike="noStrike">
               <a:solidFill>
                 <a:srgbClr val="000000"/>
               </a:solidFill>
@@ -8882,7 +8852,7 @@
         <p:spPr>
           <a:xfrm>
             <a:off x="698760" y="1312200"/>
-            <a:ext cx="1731240" cy="362520"/>
+            <a:ext cx="1730880" cy="362160"/>
           </a:xfrm>
           <a:prstGeom prst="rect">
             <a:avLst/>
@@ -8918,7 +8888,7 @@
               </a:rPr>
               <a:t>Step-4 : </a:t>
             </a:r>
-            <a:endParaRPr b="0" lang="en-US" sz="1800" spc="-1" strike="noStrike">
+            <a:endParaRPr b="0" lang="en-GB" sz="1800" spc="-1" strike="noStrike">
               <a:solidFill>
                 <a:srgbClr val="000000"/>
               </a:solidFill>
@@ -8931,7 +8901,7 @@
                 <a:spcPct val="100000"/>
               </a:lnSpc>
             </a:pPr>
-            <a:endParaRPr b="0" lang="en-US" sz="1800" spc="-1" strike="noStrike">
+            <a:endParaRPr b="0" lang="en-GB" sz="1800" spc="-1" strike="noStrike">
               <a:solidFill>
                 <a:srgbClr val="000000"/>
               </a:solidFill>
@@ -8944,7 +8914,7 @@
                 <a:spcPct val="100000"/>
               </a:lnSpc>
             </a:pPr>
-            <a:endParaRPr b="0" lang="en-US" sz="1800" spc="-1" strike="noStrike">
+            <a:endParaRPr b="0" lang="en-GB" sz="1800" spc="-1" strike="noStrike">
               <a:solidFill>
                 <a:srgbClr val="000000"/>
               </a:solidFill>
@@ -9109,7 +9079,7 @@
         <p:spPr>
           <a:xfrm>
             <a:off x="846720" y="1679400"/>
-            <a:ext cx="8296560" cy="1186920"/>
+            <a:ext cx="8296200" cy="1186920"/>
           </a:xfrm>
           <a:prstGeom prst="rect">
             <a:avLst/>
@@ -9145,7 +9115,7 @@
               </a:rPr>
               <a:t>A. Sequence of questions</a:t>
             </a:r>
-            <a:endParaRPr b="0" lang="en-US" sz="1800" spc="-1" strike="noStrike">
+            <a:endParaRPr b="0" lang="en-GB" sz="1800" spc="-1" strike="noStrike">
               <a:solidFill>
                 <a:srgbClr val="000000"/>
               </a:solidFill>
@@ -9168,7 +9138,7 @@
               </a:rPr>
               <a:t>B. Timer running for the test</a:t>
             </a:r>
-            <a:endParaRPr b="0" lang="en-US" sz="1800" spc="-1" strike="noStrike">
+            <a:endParaRPr b="0" lang="en-GB" sz="1800" spc="-1" strike="noStrike">
               <a:solidFill>
                 <a:srgbClr val="000000"/>
               </a:solidFill>
@@ -9191,7 +9161,7 @@
               </a:rPr>
               <a:t>C. Navigate to next question/Finish attampt</a:t>
             </a:r>
-            <a:endParaRPr b="0" lang="en-US" sz="1800" spc="-1" strike="noStrike">
+            <a:endParaRPr b="0" lang="en-GB" sz="1800" spc="-1" strike="noStrike">
               <a:solidFill>
                 <a:srgbClr val="000000"/>
               </a:solidFill>
@@ -9214,7 +9184,7 @@
               </a:rPr>
               <a:t>D. Navigate to previous question</a:t>
             </a:r>
-            <a:endParaRPr b="0" lang="en-US" sz="1800" spc="-1" strike="noStrike">
+            <a:endParaRPr b="0" lang="en-GB" sz="1800" spc="-1" strike="noStrike">
               <a:solidFill>
                 <a:srgbClr val="000000"/>
               </a:solidFill>
@@ -9232,7 +9202,7 @@
         <p:spPr>
           <a:xfrm>
             <a:off x="7839360" y="1679400"/>
-            <a:ext cx="2613240" cy="425880"/>
+            <a:ext cx="2612880" cy="425520"/>
           </a:xfrm>
           <a:prstGeom prst="rect">
             <a:avLst/>
@@ -9277,7 +9247,7 @@
         <p:spPr>
           <a:xfrm>
             <a:off x="9109440" y="3583440"/>
-            <a:ext cx="277920" cy="363960"/>
+            <a:ext cx="277560" cy="363960"/>
           </a:xfrm>
           <a:prstGeom prst="rect">
             <a:avLst/>
@@ -9313,7 +9283,7 @@
               </a:rPr>
               <a:t>A</a:t>
             </a:r>
-            <a:endParaRPr b="0" lang="en-US" sz="1800" spc="-1" strike="noStrike">
+            <a:endParaRPr b="0" lang="en-GB" sz="1800" spc="-1" strike="noStrike">
               <a:solidFill>
                 <a:srgbClr val="000000"/>
               </a:solidFill>
@@ -9331,7 +9301,7 @@
         <p:spPr>
           <a:xfrm>
             <a:off x="9789840" y="4188960"/>
-            <a:ext cx="277920" cy="363960"/>
+            <a:ext cx="277560" cy="363960"/>
           </a:xfrm>
           <a:prstGeom prst="rect">
             <a:avLst/>
@@ -9367,7 +9337,7 @@
               </a:rPr>
               <a:t>B</a:t>
             </a:r>
-            <a:endParaRPr b="0" lang="en-US" sz="1800" spc="-1" strike="noStrike">
+            <a:endParaRPr b="0" lang="en-GB" sz="1800" spc="-1" strike="noStrike">
               <a:solidFill>
                 <a:srgbClr val="000000"/>
               </a:solidFill>
@@ -9385,7 +9355,7 @@
         <p:spPr>
           <a:xfrm>
             <a:off x="7531920" y="5741280"/>
-            <a:ext cx="278280" cy="363960"/>
+            <a:ext cx="277920" cy="363960"/>
           </a:xfrm>
           <a:prstGeom prst="rect">
             <a:avLst/>
@@ -9421,7 +9391,7 @@
               </a:rPr>
               <a:t>C</a:t>
             </a:r>
-            <a:endParaRPr b="0" lang="en-US" sz="1800" spc="-1" strike="noStrike">
+            <a:endParaRPr b="0" lang="en-GB" sz="1800" spc="-1" strike="noStrike">
               <a:solidFill>
                 <a:srgbClr val="000000"/>
               </a:solidFill>
@@ -9488,7 +9458,7 @@
         <p:spPr>
           <a:xfrm>
             <a:off x="1310760" y="5770800"/>
-            <a:ext cx="278280" cy="363960"/>
+            <a:ext cx="277920" cy="363960"/>
           </a:xfrm>
           <a:prstGeom prst="rect">
             <a:avLst/>
@@ -9524,7 +9494,7 @@
               </a:rPr>
               <a:t>D</a:t>
             </a:r>
-            <a:endParaRPr b="0" lang="en-US" sz="1800" spc="-1" strike="noStrike">
+            <a:endParaRPr b="0" lang="en-GB" sz="1800" spc="-1" strike="noStrike">
               <a:solidFill>
                 <a:srgbClr val="000000"/>
               </a:solidFill>
@@ -9572,7 +9542,7 @@
         <p:spPr>
           <a:xfrm>
             <a:off x="539640" y="764640"/>
-            <a:ext cx="10748160" cy="498960"/>
+            <a:ext cx="10747800" cy="498600"/>
           </a:xfrm>
           <a:prstGeom prst="rect">
             <a:avLst/>
@@ -9608,7 +9578,7 @@
               </a:rPr>
               <a:t>Examination</a:t>
             </a:r>
-            <a:endParaRPr b="0" lang="en-US" sz="2400" spc="-1" strike="noStrike">
+            <a:endParaRPr b="0" lang="en-GB" sz="2400" spc="-1" strike="noStrike">
               <a:solidFill>
                 <a:srgbClr val="000000"/>
               </a:solidFill>
@@ -9626,7 +9596,7 @@
         <p:spPr>
           <a:xfrm>
             <a:off x="539640" y="1268640"/>
-            <a:ext cx="10748160" cy="5035680"/>
+            <a:ext cx="10747800" cy="5035320"/>
           </a:xfrm>
           <a:prstGeom prst="rect">
             <a:avLst/>
@@ -9701,7 +9671,7 @@
               </a:rPr>
               <a:t> criteria have to be fulfilled):</a:t>
             </a:r>
-            <a:endParaRPr b="0" lang="en-US" sz="1800" spc="-1" strike="noStrike">
+            <a:endParaRPr b="0" lang="en-GB" sz="1800" spc="-1" strike="noStrike">
               <a:solidFill>
                 <a:srgbClr val="000000"/>
               </a:solidFill>
@@ -9733,7 +9703,7 @@
               </a:rPr>
               <a:t>Successful completion of the compulsory seven exercises</a:t>
             </a:r>
-            <a:endParaRPr b="0" lang="en-US" sz="1800" spc="-1" strike="noStrike">
+            <a:endParaRPr b="0" lang="en-GB" sz="1800" spc="-1" strike="noStrike">
               <a:solidFill>
                 <a:srgbClr val="000000"/>
               </a:solidFill>
@@ -9765,7 +9735,7 @@
               </a:rPr>
               <a:t>You pass an exercise if you score 50% (or more)</a:t>
             </a:r>
-            <a:endParaRPr b="0" lang="en-US" sz="1800" spc="-1" strike="noStrike">
+            <a:endParaRPr b="0" lang="en-GB" sz="1800" spc="-1" strike="noStrike">
               <a:solidFill>
                 <a:srgbClr val="000000"/>
               </a:solidFill>
@@ -9818,7 +9788,7 @@
               </a:rPr>
               <a:t> exercise</a:t>
             </a:r>
-            <a:endParaRPr b="0" lang="en-US" sz="1800" spc="-1" strike="noStrike">
+            <a:endParaRPr b="0" lang="en-GB" sz="1800" spc="-1" strike="noStrike">
               <a:solidFill>
                 <a:srgbClr val="000000"/>
               </a:solidFill>
@@ -9834,7 +9804,7 @@
                 <a:spcPts val="360"/>
               </a:spcBef>
             </a:pPr>
-            <a:endParaRPr b="0" lang="en-US" sz="1800" spc="-1" strike="noStrike">
+            <a:endParaRPr b="0" lang="en-GB" sz="1800" spc="-1" strike="noStrike">
               <a:solidFill>
                 <a:srgbClr val="000000"/>
               </a:solidFill>
@@ -9866,7 +9836,7 @@
               </a:rPr>
               <a:t>Final exam:</a:t>
             </a:r>
-            <a:endParaRPr b="0" lang="en-US" sz="1800" spc="-1" strike="noStrike">
+            <a:endParaRPr b="0" lang="en-GB" sz="1800" spc="-1" strike="noStrike">
               <a:solidFill>
                 <a:srgbClr val="000000"/>
               </a:solidFill>
@@ -9898,7 +9868,7 @@
               </a:rPr>
               <a:t>22.02.2023 → 14:00 – 16:00 </a:t>
             </a:r>
-            <a:endParaRPr b="0" lang="en-US" sz="1800" spc="-1" strike="noStrike">
+            <a:endParaRPr b="0" lang="en-GB" sz="1800" spc="-1" strike="noStrike">
               <a:solidFill>
                 <a:srgbClr val="000000"/>
               </a:solidFill>
@@ -9930,7 +9900,7 @@
               </a:rPr>
               <a:t>Written exam (120min) </a:t>
             </a:r>
-            <a:endParaRPr b="0" lang="en-US" sz="1800" spc="-1" strike="noStrike">
+            <a:endParaRPr b="0" lang="en-GB" sz="1800" spc="-1" strike="noStrike">
               <a:solidFill>
                 <a:srgbClr val="000000"/>
               </a:solidFill>
@@ -9978,7 +9948,7 @@
         <p:spPr>
           <a:xfrm>
             <a:off x="539640" y="764640"/>
-            <a:ext cx="10748160" cy="498960"/>
+            <a:ext cx="10747800" cy="498600"/>
           </a:xfrm>
           <a:prstGeom prst="rect">
             <a:avLst/>
@@ -10014,7 +9984,7 @@
               </a:rPr>
               <a:t>Team</a:t>
             </a:r>
-            <a:endParaRPr b="0" lang="en-US" sz="2400" spc="-1" strike="noStrike">
+            <a:endParaRPr b="0" lang="en-GB" sz="2400" spc="-1" strike="noStrike">
               <a:solidFill>
                 <a:srgbClr val="000000"/>
               </a:solidFill>
@@ -10036,7 +10006,7 @@
         <p:spPr>
           <a:xfrm>
             <a:off x="2684520" y="1323360"/>
-            <a:ext cx="1470960" cy="2172240"/>
+            <a:ext cx="1470600" cy="2171880"/>
           </a:xfrm>
           <a:prstGeom prst="rect">
             <a:avLst/>
@@ -10059,7 +10029,7 @@
         <p:spPr>
           <a:xfrm>
             <a:off x="7269840" y="1716120"/>
-            <a:ext cx="1784880" cy="1776960"/>
+            <a:ext cx="1784520" cy="1776600"/>
           </a:xfrm>
           <a:prstGeom prst="rect">
             <a:avLst/>
@@ -10078,7 +10048,7 @@
         <p:spPr>
           <a:xfrm>
             <a:off x="1620000" y="3439440"/>
-            <a:ext cx="3635640" cy="677160"/>
+            <a:ext cx="3635280" cy="676800"/>
           </a:xfrm>
           <a:prstGeom prst="rect">
             <a:avLst/>
@@ -10117,7 +10087,7 @@
               </a:rPr>
               <a:t>Prof. Dr. Benjamin Leiding</a:t>
             </a:r>
-            <a:endParaRPr b="0" lang="en-US" sz="1600" spc="-1" strike="noStrike">
+            <a:endParaRPr b="0" lang="en-GB" sz="1600" spc="-1" strike="noStrike">
               <a:solidFill>
                 <a:srgbClr val="000000"/>
               </a:solidFill>
@@ -10135,7 +10105,7 @@
         <p:spPr>
           <a:xfrm>
             <a:off x="6322680" y="3460320"/>
-            <a:ext cx="3635640" cy="677160"/>
+            <a:ext cx="3635280" cy="676800"/>
           </a:xfrm>
           <a:prstGeom prst="rect">
             <a:avLst/>
@@ -10174,7 +10144,7 @@
               </a:rPr>
               <a:t>M.Sc. Anant Sujatanagarjuna</a:t>
             </a:r>
-            <a:endParaRPr b="0" lang="en-US" sz="1600" spc="-1" strike="noStrike">
+            <a:endParaRPr b="0" lang="en-GB" sz="1600" spc="-1" strike="noStrike">
               <a:solidFill>
                 <a:srgbClr val="000000"/>
               </a:solidFill>
@@ -10196,7 +10166,7 @@
         <p:spPr>
           <a:xfrm>
             <a:off x="4845960" y="4206240"/>
-            <a:ext cx="1778040" cy="1770120"/>
+            <a:ext cx="1777680" cy="1769760"/>
           </a:xfrm>
           <a:prstGeom prst="rect">
             <a:avLst/>
@@ -10215,7 +10185,7 @@
         <p:spPr>
           <a:xfrm>
             <a:off x="1311840" y="5920200"/>
-            <a:ext cx="3628800" cy="670320"/>
+            <a:ext cx="3628440" cy="669960"/>
           </a:xfrm>
           <a:prstGeom prst="rect">
             <a:avLst/>
@@ -10260,7 +10230,7 @@
         <p:spPr>
           <a:xfrm>
             <a:off x="3950280" y="5903280"/>
-            <a:ext cx="3628800" cy="670320"/>
+            <a:ext cx="3628440" cy="669960"/>
           </a:xfrm>
           <a:prstGeom prst="rect">
             <a:avLst/>
@@ -10299,7 +10269,7 @@
               </a:rPr>
               <a:t>B.Sc. Sepideh Sayadkouh</a:t>
             </a:r>
-            <a:endParaRPr b="0" lang="en-US" sz="1600" spc="-1" strike="noStrike">
+            <a:endParaRPr b="0" lang="en-GB" sz="1600" spc="-1" strike="noStrike">
               <a:solidFill>
                 <a:srgbClr val="000000"/>
               </a:solidFill>
@@ -10347,7 +10317,7 @@
         <p:spPr>
           <a:xfrm>
             <a:off x="539640" y="764640"/>
-            <a:ext cx="10748160" cy="498960"/>
+            <a:ext cx="10747800" cy="498600"/>
           </a:xfrm>
           <a:prstGeom prst="rect">
             <a:avLst/>
@@ -10383,7 +10353,7 @@
               </a:rPr>
               <a:t>Self-Study Star</a:t>
             </a:r>
-            <a:endParaRPr b="0" lang="en-US" sz="2400" spc="-1" strike="noStrike">
+            <a:endParaRPr b="0" lang="en-GB" sz="2400" spc="-1" strike="noStrike">
               <a:solidFill>
                 <a:srgbClr val="000000"/>
               </a:solidFill>
@@ -10401,7 +10371,7 @@
         <p:spPr>
           <a:xfrm>
             <a:off x="539640" y="1268280"/>
-            <a:ext cx="10748160" cy="5035680"/>
+            <a:ext cx="10747800" cy="5035320"/>
           </a:xfrm>
           <a:prstGeom prst="rect">
             <a:avLst/>
@@ -10430,7 +10400,7 @@
                 <a:spcPts val="360"/>
               </a:spcBef>
             </a:pPr>
-            <a:endParaRPr b="0" lang="en-US" sz="1800" spc="-1" strike="noStrike">
+            <a:endParaRPr b="0" lang="en-GB" sz="1800" spc="-1" strike="noStrike">
               <a:solidFill>
                 <a:srgbClr val="000000"/>
               </a:solidFill>
@@ -10482,7 +10452,7 @@
               </a:rPr>
               <a:t> mandatory but could be helpful for your future career</a:t>
             </a:r>
-            <a:endParaRPr b="0" lang="en-US" sz="1800" spc="-1" strike="noStrike">
+            <a:endParaRPr b="0" lang="en-GB" sz="1800" spc="-1" strike="noStrike">
               <a:solidFill>
                 <a:srgbClr val="000000"/>
               </a:solidFill>
@@ -10498,7 +10468,7 @@
                 <a:spcPts val="360"/>
               </a:spcBef>
             </a:pPr>
-            <a:endParaRPr b="0" lang="en-US" sz="1800" spc="-1" strike="noStrike">
+            <a:endParaRPr b="0" lang="en-GB" sz="1800" spc="-1" strike="noStrike">
               <a:solidFill>
                 <a:srgbClr val="000000"/>
               </a:solidFill>
@@ -10530,7 +10500,7 @@
               </a:rPr>
               <a:t>Of course it won’t hurt to have extra knowledge to impress us during the examination ;)</a:t>
             </a:r>
-            <a:endParaRPr b="0" lang="en-US" sz="1800" spc="-1" strike="noStrike">
+            <a:endParaRPr b="0" lang="en-GB" sz="1800" spc="-1" strike="noStrike">
               <a:solidFill>
                 <a:srgbClr val="000000"/>
               </a:solidFill>
@@ -10548,7 +10518,7 @@
         <p:spPr>
           <a:xfrm>
             <a:off x="6489720" y="2132640"/>
-            <a:ext cx="517680" cy="497520"/>
+            <a:ext cx="517320" cy="497160"/>
           </a:xfrm>
           <a:prstGeom prst="star5">
             <a:avLst>
@@ -10609,7 +10579,7 @@
         <p:spPr>
           <a:xfrm>
             <a:off x="4294080" y="2247480"/>
-            <a:ext cx="2286000" cy="363960"/>
+            <a:ext cx="2285640" cy="363960"/>
           </a:xfrm>
           <a:prstGeom prst="rect">
             <a:avLst/>
@@ -10645,7 +10615,7 @@
               </a:rPr>
               <a:t>Self-Study Star → </a:t>
             </a:r>
-            <a:endParaRPr b="0" lang="en-US" sz="1800" spc="-1" strike="noStrike">
+            <a:endParaRPr b="0" lang="en-GB" sz="1800" spc="-1" strike="noStrike">
               <a:solidFill>
                 <a:srgbClr val="000000"/>
               </a:solidFill>
@@ -10693,7 +10663,7 @@
         <p:spPr>
           <a:xfrm>
             <a:off x="539640" y="764640"/>
-            <a:ext cx="10748160" cy="498960"/>
+            <a:ext cx="10747800" cy="498600"/>
           </a:xfrm>
           <a:prstGeom prst="rect">
             <a:avLst/>
@@ -10729,7 +10699,7 @@
               </a:rPr>
               <a:t>Literature</a:t>
             </a:r>
-            <a:endParaRPr b="0" lang="en-US" sz="2400" spc="-1" strike="noStrike">
+            <a:endParaRPr b="0" lang="en-GB" sz="2400" spc="-1" strike="noStrike">
               <a:solidFill>
                 <a:srgbClr val="000000"/>
               </a:solidFill>
@@ -10747,7 +10717,7 @@
         <p:spPr>
           <a:xfrm>
             <a:off x="539640" y="1268640"/>
-            <a:ext cx="10748160" cy="5035680"/>
+            <a:ext cx="10747800" cy="5035320"/>
           </a:xfrm>
           <a:prstGeom prst="rect">
             <a:avLst/>
@@ -10812,7 +10782,7 @@
               </a:rPr>
               <a:t> need to buy a book to pass the exam.</a:t>
             </a:r>
-            <a:endParaRPr b="0" lang="en-US" sz="1800" spc="-1" strike="noStrike">
+            <a:endParaRPr b="0" lang="en-GB" sz="1800" spc="-1" strike="noStrike">
               <a:solidFill>
                 <a:srgbClr val="000000"/>
               </a:solidFill>
@@ -10828,7 +10798,7 @@
                 <a:spcPts val="360"/>
               </a:spcBef>
             </a:pPr>
-            <a:endParaRPr b="0" lang="en-US" sz="1800" spc="-1" strike="noStrike">
+            <a:endParaRPr b="0" lang="en-GB" sz="1800" spc="-1" strike="noStrike">
               <a:solidFill>
                 <a:srgbClr val="000000"/>
               </a:solidFill>
@@ -10880,7 +10850,7 @@
               </a:rPr>
               <a:t> (2010).</a:t>
             </a:r>
-            <a:endParaRPr b="0" lang="en-US" sz="1800" spc="-1" strike="noStrike">
+            <a:endParaRPr b="0" lang="en-GB" sz="1800" spc="-1" strike="noStrike">
               <a:solidFill>
                 <a:srgbClr val="000000"/>
               </a:solidFill>
@@ -10932,7 +10902,7 @@
               </a:rPr>
               <a:t>(2011).</a:t>
             </a:r>
-            <a:endParaRPr b="0" lang="en-US" sz="1800" spc="-1" strike="noStrike">
+            <a:endParaRPr b="0" lang="en-GB" sz="1800" spc="-1" strike="noStrike">
               <a:solidFill>
                 <a:srgbClr val="000000"/>
               </a:solidFill>
@@ -11004,7 +10974,7 @@
               </a:rPr>
               <a:t>(2017).</a:t>
             </a:r>
-            <a:endParaRPr b="0" lang="en-US" sz="1800" spc="-1" strike="noStrike">
+            <a:endParaRPr b="0" lang="en-GB" sz="1800" spc="-1" strike="noStrike">
               <a:solidFill>
                 <a:srgbClr val="000000"/>
               </a:solidFill>
@@ -11056,7 +11026,7 @@
               </a:rPr>
               <a:t>(2021).</a:t>
             </a:r>
-            <a:endParaRPr b="0" lang="en-US" sz="1800" spc="-1" strike="noStrike">
+            <a:endParaRPr b="0" lang="en-GB" sz="1800" spc="-1" strike="noStrike">
               <a:solidFill>
                 <a:srgbClr val="000000"/>
               </a:solidFill>
@@ -11104,7 +11074,7 @@
         <p:spPr>
           <a:xfrm>
             <a:off x="335520" y="1268640"/>
-            <a:ext cx="10748160" cy="5035680"/>
+            <a:ext cx="10747800" cy="5035320"/>
           </a:xfrm>
           <a:prstGeom prst="rect">
             <a:avLst/>
@@ -11146,7 +11116,7 @@
               </a:rPr>
               <a:t>Questions?</a:t>
             </a:r>
-            <a:endParaRPr b="0" lang="en-US" sz="4000" spc="-1" strike="noStrike">
+            <a:endParaRPr b="0" lang="en-GB" sz="4000" spc="-1" strike="noStrike">
               <a:solidFill>
                 <a:srgbClr val="000000"/>
               </a:solidFill>
@@ -11164,7 +11134,7 @@
         <p:spPr>
           <a:xfrm>
             <a:off x="335520" y="764640"/>
-            <a:ext cx="10748160" cy="498960"/>
+            <a:ext cx="10747800" cy="498600"/>
           </a:xfrm>
           <a:prstGeom prst="rect">
             <a:avLst/>
@@ -11239,7 +11209,7 @@
         <p:spPr>
           <a:xfrm>
             <a:off x="542880" y="721800"/>
-            <a:ext cx="10353960" cy="494640"/>
+            <a:ext cx="10353600" cy="494280"/>
           </a:xfrm>
           <a:prstGeom prst="rect">
             <a:avLst/>
@@ -11275,7 +11245,7 @@
               </a:rPr>
               <a:t>Research Group</a:t>
             </a:r>
-            <a:endParaRPr b="0" lang="en-US" sz="2200" spc="-1" strike="noStrike">
+            <a:endParaRPr b="0" lang="en-GB" sz="2200" spc="-1" strike="noStrike">
               <a:solidFill>
                 <a:srgbClr val="000000"/>
               </a:solidFill>
@@ -11293,7 +11263,7 @@
         <p:spPr>
           <a:xfrm>
             <a:off x="451800" y="1709280"/>
-            <a:ext cx="8221320" cy="4349520"/>
+            <a:ext cx="8220960" cy="4349160"/>
           </a:xfrm>
           <a:prstGeom prst="rect">
             <a:avLst/>
@@ -11338,7 +11308,7 @@
         <p:spPr>
           <a:xfrm>
             <a:off x="609480" y="1769400"/>
-            <a:ext cx="10584360" cy="4852440"/>
+            <a:ext cx="10584000" cy="4852080"/>
           </a:xfrm>
           <a:prstGeom prst="rect">
             <a:avLst/>
@@ -11463,7 +11433,7 @@
               </a:rPr>
               <a:t>ETCE</a:t>
             </a:r>
-            <a:endParaRPr b="0" lang="en-US" sz="2000" spc="-1" strike="noStrike">
+            <a:endParaRPr b="0" lang="en-GB" sz="2000" spc="-1" strike="noStrike">
               <a:solidFill>
                 <a:srgbClr val="000000"/>
               </a:solidFill>
@@ -11495,7 +11465,7 @@
               </a:rPr>
               <a:t>Research focus:</a:t>
             </a:r>
-            <a:endParaRPr b="0" lang="en-US" sz="2000" spc="-1" strike="noStrike">
+            <a:endParaRPr b="0" lang="en-GB" sz="2000" spc="-1" strike="noStrike">
               <a:solidFill>
                 <a:srgbClr val="000000"/>
               </a:solidFill>
@@ -11527,7 +11497,7 @@
               </a:rPr>
               <a:t>Intersection of IT and sustainability</a:t>
             </a:r>
-            <a:endParaRPr b="0" lang="en-US" sz="1800" spc="-1" strike="noStrike">
+            <a:endParaRPr b="0" lang="en-GB" sz="1800" spc="-1" strike="noStrike">
               <a:solidFill>
                 <a:srgbClr val="000000"/>
               </a:solidFill>
@@ -11559,7 +11529,7 @@
               </a:rPr>
               <a:t>Circular Economy and Circular Societies</a:t>
             </a:r>
-            <a:endParaRPr b="0" lang="en-US" sz="1800" spc="-1" strike="noStrike">
+            <a:endParaRPr b="0" lang="en-GB" sz="1800" spc="-1" strike="noStrike">
               <a:solidFill>
                 <a:srgbClr val="000000"/>
               </a:solidFill>
@@ -11591,7 +11561,7 @@
               </a:rPr>
               <a:t>Self-organized, decentralized and distributed systems</a:t>
             </a:r>
-            <a:endParaRPr b="0" lang="en-US" sz="1800" spc="-1" strike="noStrike">
+            <a:endParaRPr b="0" lang="en-GB" sz="1800" spc="-1" strike="noStrike">
               <a:solidFill>
                 <a:srgbClr val="000000"/>
               </a:solidFill>
@@ -11645,7 +11615,7 @@
               </a:rPr>
               <a:t>)</a:t>
             </a:r>
-            <a:endParaRPr b="0" lang="en-US" sz="1800" spc="-1" strike="noStrike">
+            <a:endParaRPr b="0" lang="en-GB" sz="1800" spc="-1" strike="noStrike">
               <a:solidFill>
                 <a:srgbClr val="000000"/>
               </a:solidFill>
@@ -11677,7 +11647,7 @@
               </a:rPr>
               <a:t>Other courses:</a:t>
             </a:r>
-            <a:endParaRPr b="0" lang="en-US" sz="2000" spc="-1" strike="noStrike">
+            <a:endParaRPr b="0" lang="en-GB" sz="2000" spc="-1" strike="noStrike">
               <a:solidFill>
                 <a:srgbClr val="000000"/>
               </a:solidFill>
@@ -11709,7 +11679,7 @@
               </a:rPr>
               <a:t>Emerging Technologies for the Circular Economy (SS – M.Sc.)</a:t>
             </a:r>
-            <a:endParaRPr b="0" lang="en-US" sz="1800" spc="-1" strike="noStrike">
+            <a:endParaRPr b="0" lang="en-GB" sz="1800" spc="-1" strike="noStrike">
               <a:solidFill>
                 <a:srgbClr val="000000"/>
               </a:solidFill>
@@ -11741,7 +11711,7 @@
               </a:rPr>
               <a:t>The Limits to Growth – Sustainability and the Circular Economy (SS – open for everyone)</a:t>
             </a:r>
-            <a:endParaRPr b="0" lang="en-US" sz="1800" spc="-1" strike="noStrike">
+            <a:endParaRPr b="0" lang="en-GB" sz="1800" spc="-1" strike="noStrike">
               <a:solidFill>
                 <a:srgbClr val="000000"/>
               </a:solidFill>
@@ -11789,7 +11759,7 @@
         <p:spPr>
           <a:xfrm>
             <a:off x="542880" y="721800"/>
-            <a:ext cx="10353960" cy="494640"/>
+            <a:ext cx="10353600" cy="494280"/>
           </a:xfrm>
           <a:prstGeom prst="rect">
             <a:avLst/>
@@ -11825,7 +11795,7 @@
               </a:rPr>
               <a:t>Research Group</a:t>
             </a:r>
-            <a:endParaRPr b="0" lang="en-US" sz="2200" spc="-1" strike="noStrike">
+            <a:endParaRPr b="0" lang="en-GB" sz="2200" spc="-1" strike="noStrike">
               <a:solidFill>
                 <a:srgbClr val="000000"/>
               </a:solidFill>
@@ -11843,7 +11813,7 @@
         <p:spPr>
           <a:xfrm>
             <a:off x="451800" y="1709280"/>
-            <a:ext cx="8221320" cy="4349520"/>
+            <a:ext cx="8220960" cy="4349160"/>
           </a:xfrm>
           <a:prstGeom prst="rect">
             <a:avLst/>
@@ -11888,7 +11858,7 @@
         <p:spPr>
           <a:xfrm>
             <a:off x="609480" y="1769400"/>
-            <a:ext cx="10584360" cy="4852440"/>
+            <a:ext cx="10584000" cy="4852080"/>
           </a:xfrm>
           <a:prstGeom prst="rect">
             <a:avLst/>
@@ -11945,7 +11915,7 @@
               </a:rPr>
               <a:t>Link</a:t>
             </a:r>
-            <a:endParaRPr b="0" lang="en-US" sz="2000" spc="-1" strike="noStrike">
+            <a:endParaRPr b="0" lang="en-GB" sz="2000" spc="-1" strike="noStrike">
               <a:solidFill>
                 <a:srgbClr val="000000"/>
               </a:solidFill>
@@ -11977,7 +11947,7 @@
               </a:rPr>
               <a:t>Course material </a:t>
             </a:r>
-            <a:endParaRPr b="0" lang="en-US" sz="1800" spc="-1" strike="noStrike">
+            <a:endParaRPr b="0" lang="en-GB" sz="1800" spc="-1" strike="noStrike">
               <a:solidFill>
                 <a:srgbClr val="000000"/>
               </a:solidFill>
@@ -12009,7 +11979,7 @@
               </a:rPr>
               <a:t>Thesis/project topics</a:t>
             </a:r>
-            <a:endParaRPr b="0" lang="en-US" sz="1800" spc="-1" strike="noStrike">
+            <a:endParaRPr b="0" lang="en-GB" sz="1800" spc="-1" strike="noStrike">
               <a:solidFill>
                 <a:srgbClr val="000000"/>
               </a:solidFill>
@@ -12041,7 +12011,7 @@
               </a:rPr>
               <a:t>Publications</a:t>
             </a:r>
-            <a:endParaRPr b="0" lang="en-US" sz="1800" spc="-1" strike="noStrike">
+            <a:endParaRPr b="0" lang="en-GB" sz="1800" spc="-1" strike="noStrike">
               <a:solidFill>
                 <a:srgbClr val="000000"/>
               </a:solidFill>
@@ -12073,7 +12043,7 @@
               </a:rPr>
               <a:t>Etc.</a:t>
             </a:r>
-            <a:endParaRPr b="0" lang="en-US" sz="1800" spc="-1" strike="noStrike">
+            <a:endParaRPr b="0" lang="en-GB" sz="1800" spc="-1" strike="noStrike">
               <a:solidFill>
                 <a:srgbClr val="000000"/>
               </a:solidFill>
@@ -12092,7 +12062,7 @@
                 <a:tab algn="l" pos="0"/>
               </a:tabLst>
             </a:pPr>
-            <a:endParaRPr b="0" lang="en-US" sz="1800" spc="-1" strike="noStrike">
+            <a:endParaRPr b="0" lang="en-GB" sz="1800" spc="-1" strike="noStrike">
               <a:solidFill>
                 <a:srgbClr val="000000"/>
               </a:solidFill>
@@ -12127,7 +12097,7 @@
               </a:rPr>
               <a:t>Our research in action:</a:t>
             </a:r>
-            <a:endParaRPr b="0" lang="en-US" sz="2000" spc="-1" strike="noStrike">
+            <a:endParaRPr b="0" lang="en-GB" sz="2000" spc="-1" strike="noStrike">
               <a:solidFill>
                 <a:srgbClr val="000000"/>
               </a:solidFill>
@@ -12184,7 +12154,7 @@
               </a:rPr>
               <a:t> </a:t>
             </a:r>
-            <a:endParaRPr b="0" lang="en-US" sz="2000" spc="-1" strike="noStrike">
+            <a:endParaRPr b="0" lang="en-GB" sz="2000" spc="-1" strike="noStrike">
               <a:solidFill>
                 <a:srgbClr val="000000"/>
               </a:solidFill>
@@ -12241,7 +12211,7 @@
               </a:rPr>
               <a:t> </a:t>
             </a:r>
-            <a:endParaRPr b="0" lang="en-US" sz="2000" spc="-1" strike="noStrike">
+            <a:endParaRPr b="0" lang="en-GB" sz="2000" spc="-1" strike="noStrike">
               <a:solidFill>
                 <a:srgbClr val="000000"/>
               </a:solidFill>
@@ -12260,7 +12230,7 @@
                 <a:tab algn="l" pos="0"/>
               </a:tabLst>
             </a:pPr>
-            <a:endParaRPr b="0" lang="en-US" sz="2000" spc="-1" strike="noStrike">
+            <a:endParaRPr b="0" lang="en-GB" sz="2000" spc="-1" strike="noStrike">
               <a:solidFill>
                 <a:srgbClr val="000000"/>
               </a:solidFill>
@@ -12295,7 +12265,7 @@
               </a:rPr>
               <a:t>You want join us? Write us an email! </a:t>
             </a:r>
-            <a:endParaRPr b="0" lang="en-US" sz="2000" spc="-1" strike="noStrike">
+            <a:endParaRPr b="0" lang="en-GB" sz="2000" spc="-1" strike="noStrike">
               <a:solidFill>
                 <a:srgbClr val="000000"/>
               </a:solidFill>
@@ -12340,7 +12310,7 @@
               </a:rPr>
               <a:t>benjamin.leiding@tu-clausthal.de</a:t>
             </a:r>
-            <a:endParaRPr b="0" lang="en-US" sz="1600" spc="-1" strike="noStrike">
+            <a:endParaRPr b="0" lang="en-GB" sz="1600" spc="-1" strike="noStrike">
               <a:solidFill>
                 <a:srgbClr val="000000"/>
               </a:solidFill>
@@ -12388,7 +12358,7 @@
         <p:spPr>
           <a:xfrm>
             <a:off x="542880" y="721800"/>
-            <a:ext cx="10353960" cy="494640"/>
+            <a:ext cx="10353600" cy="494280"/>
           </a:xfrm>
           <a:prstGeom prst="rect">
             <a:avLst/>
@@ -12424,7 +12394,7 @@
               </a:rPr>
               <a:t>Course Content</a:t>
             </a:r>
-            <a:endParaRPr b="0" lang="en-US" sz="2200" spc="-1" strike="noStrike">
+            <a:endParaRPr b="0" lang="en-GB" sz="2200" spc="-1" strike="noStrike">
               <a:solidFill>
                 <a:srgbClr val="000000"/>
               </a:solidFill>
@@ -12442,7 +12412,7 @@
         <p:spPr>
           <a:xfrm>
             <a:off x="451800" y="1709280"/>
-            <a:ext cx="8221320" cy="4349520"/>
+            <a:ext cx="8220960" cy="4349160"/>
           </a:xfrm>
           <a:prstGeom prst="rect">
             <a:avLst/>
@@ -12487,7 +12457,7 @@
         <p:spPr>
           <a:xfrm>
             <a:off x="609480" y="1769400"/>
-            <a:ext cx="10584360" cy="4852440"/>
+            <a:ext cx="10584000" cy="4852080"/>
           </a:xfrm>
           <a:prstGeom prst="rect">
             <a:avLst/>
@@ -12532,7 +12502,7 @@
               </a:rPr>
               <a:t>Core terminology and core tasks of requirements engineering </a:t>
             </a:r>
-            <a:endParaRPr b="0" lang="en-US" sz="2000" spc="-1" strike="noStrike">
+            <a:endParaRPr b="0" lang="en-GB" sz="2000" spc="-1" strike="noStrike">
               <a:solidFill>
                 <a:srgbClr val="000000"/>
               </a:solidFill>
@@ -12564,7 +12534,7 @@
               </a:rPr>
               <a:t>Requirements engineering process</a:t>
             </a:r>
-            <a:endParaRPr b="0" lang="en-US" sz="2000" spc="-1" strike="noStrike">
+            <a:endParaRPr b="0" lang="en-GB" sz="2000" spc="-1" strike="noStrike">
               <a:solidFill>
                 <a:srgbClr val="000000"/>
               </a:solidFill>
@@ -12596,7 +12566,7 @@
               </a:rPr>
               <a:t>Elicitation techniques</a:t>
             </a:r>
-            <a:endParaRPr b="0" lang="en-US" sz="2000" spc="-1" strike="noStrike">
+            <a:endParaRPr b="0" lang="en-GB" sz="2000" spc="-1" strike="noStrike">
               <a:solidFill>
                 <a:srgbClr val="000000"/>
               </a:solidFill>
@@ -12628,7 +12598,7 @@
               </a:rPr>
               <a:t>Documentation methods </a:t>
             </a:r>
-            <a:endParaRPr b="0" lang="en-US" sz="2000" spc="-1" strike="noStrike">
+            <a:endParaRPr b="0" lang="en-GB" sz="2000" spc="-1" strike="noStrike">
               <a:solidFill>
                 <a:srgbClr val="000000"/>
               </a:solidFill>
@@ -12660,7 +12630,7 @@
               </a:rPr>
               <a:t>Textual, model-based and formal requirements specification</a:t>
             </a:r>
-            <a:endParaRPr b="0" lang="en-US" sz="2000" spc="-1" strike="noStrike">
+            <a:endParaRPr b="0" lang="en-GB" sz="2000" spc="-1" strike="noStrike">
               <a:solidFill>
                 <a:srgbClr val="000000"/>
               </a:solidFill>
@@ -12692,7 +12662,7 @@
               </a:rPr>
               <a:t>Requirements negotiation</a:t>
             </a:r>
-            <a:endParaRPr b="0" lang="en-US" sz="2000" spc="-1" strike="noStrike">
+            <a:endParaRPr b="0" lang="en-GB" sz="2000" spc="-1" strike="noStrike">
               <a:solidFill>
                 <a:srgbClr val="000000"/>
               </a:solidFill>
@@ -12724,7 +12694,7 @@
               </a:rPr>
               <a:t>Requirements Management</a:t>
             </a:r>
-            <a:endParaRPr b="0" lang="en-US" sz="2000" spc="-1" strike="noStrike">
+            <a:endParaRPr b="0" lang="en-GB" sz="2000" spc="-1" strike="noStrike">
               <a:solidFill>
                 <a:srgbClr val="000000"/>
               </a:solidFill>
@@ -12756,7 +12726,7 @@
               </a:rPr>
               <a:t>Traceability</a:t>
             </a:r>
-            <a:endParaRPr b="0" lang="en-US" sz="2000" spc="-1" strike="noStrike">
+            <a:endParaRPr b="0" lang="en-GB" sz="2000" spc="-1" strike="noStrike">
               <a:solidFill>
                 <a:srgbClr val="000000"/>
               </a:solidFill>
@@ -12788,7 +12758,7 @@
               </a:rPr>
               <a:t>Requirements validation and quality assurance</a:t>
             </a:r>
-            <a:endParaRPr b="0" lang="en-US" sz="2000" spc="-1" strike="noStrike">
+            <a:endParaRPr b="0" lang="en-GB" sz="2000" spc="-1" strike="noStrike">
               <a:solidFill>
                 <a:srgbClr val="000000"/>
               </a:solidFill>
@@ -12836,7 +12806,7 @@
         <p:spPr>
           <a:xfrm>
             <a:off x="542880" y="721800"/>
-            <a:ext cx="10353960" cy="494640"/>
+            <a:ext cx="10353600" cy="494280"/>
           </a:xfrm>
           <a:prstGeom prst="rect">
             <a:avLst/>
@@ -12872,7 +12842,7 @@
               </a:rPr>
               <a:t>Learning Outcome</a:t>
             </a:r>
-            <a:endParaRPr b="0" lang="en-US" sz="2200" spc="-1" strike="noStrike">
+            <a:endParaRPr b="0" lang="en-GB" sz="2200" spc="-1" strike="noStrike">
               <a:solidFill>
                 <a:srgbClr val="000000"/>
               </a:solidFill>
@@ -12890,7 +12860,7 @@
         <p:spPr>
           <a:xfrm>
             <a:off x="451800" y="1709280"/>
-            <a:ext cx="8221320" cy="4349520"/>
+            <a:ext cx="8220960" cy="4349160"/>
           </a:xfrm>
           <a:prstGeom prst="rect">
             <a:avLst/>
@@ -12935,7 +12905,7 @@
         <p:spPr>
           <a:xfrm>
             <a:off x="609480" y="1769400"/>
-            <a:ext cx="10584360" cy="4852440"/>
+            <a:ext cx="10584000" cy="4852080"/>
           </a:xfrm>
           <a:prstGeom prst="rect">
             <a:avLst/>
@@ -12980,7 +12950,7 @@
               </a:rPr>
               <a:t>Core terminology and core tasks of requirements engineering </a:t>
             </a:r>
-            <a:endParaRPr b="0" lang="en-US" sz="2000" spc="-1" strike="noStrike">
+            <a:endParaRPr b="0" lang="en-GB" sz="2000" spc="-1" strike="noStrike">
               <a:solidFill>
                 <a:srgbClr val="000000"/>
               </a:solidFill>
@@ -13012,7 +12982,7 @@
               </a:rPr>
               <a:t>Understanding of the requirements engineering process</a:t>
             </a:r>
-            <a:endParaRPr b="0" lang="en-US" sz="2000" spc="-1" strike="noStrike">
+            <a:endParaRPr b="0" lang="en-GB" sz="2000" spc="-1" strike="noStrike">
               <a:solidFill>
                 <a:srgbClr val="000000"/>
               </a:solidFill>
@@ -13044,7 +13014,7 @@
               </a:rPr>
               <a:t>Ability to choose, justify and apply appropriate methods and techniques for each step of the requirements engineering process given project constraints and properties</a:t>
             </a:r>
-            <a:endParaRPr b="0" lang="en-US" sz="2000" spc="-1" strike="noStrike">
+            <a:endParaRPr b="0" lang="en-GB" sz="2000" spc="-1" strike="noStrike">
               <a:solidFill>
                 <a:srgbClr val="000000"/>
               </a:solidFill>
@@ -13063,7 +13033,7 @@
                 <a:tab algn="l" pos="0"/>
               </a:tabLst>
             </a:pPr>
-            <a:endParaRPr b="0" lang="en-US" sz="2000" spc="-1" strike="noStrike">
+            <a:endParaRPr b="0" lang="en-GB" sz="2000" spc="-1" strike="noStrike">
               <a:solidFill>
                 <a:srgbClr val="000000"/>
               </a:solidFill>
@@ -13092,7 +13062,7 @@
               </a:rPr>
               <a:t>What is this course about, what is it not about? </a:t>
             </a:r>
-            <a:endParaRPr b="0" lang="en-US" sz="1600" spc="-1" strike="noStrike">
+            <a:endParaRPr b="0" lang="en-GB" sz="1600" spc="-1" strike="noStrike">
               <a:solidFill>
                 <a:srgbClr val="000000"/>
               </a:solidFill>
@@ -13140,7 +13110,7 @@
         <p:spPr>
           <a:xfrm>
             <a:off x="539640" y="764640"/>
-            <a:ext cx="10748160" cy="498960"/>
+            <a:ext cx="10747800" cy="498600"/>
           </a:xfrm>
           <a:prstGeom prst="rect">
             <a:avLst/>
@@ -13176,7 +13146,7 @@
               </a:rPr>
               <a:t>Disclaimer</a:t>
             </a:r>
-            <a:endParaRPr b="0" lang="en-US" sz="2200" spc="-1" strike="noStrike">
+            <a:endParaRPr b="0" lang="en-GB" sz="2200" spc="-1" strike="noStrike">
               <a:solidFill>
                 <a:srgbClr val="000000"/>
               </a:solidFill>
@@ -13194,7 +13164,7 @@
         <p:spPr>
           <a:xfrm>
             <a:off x="539640" y="1268280"/>
-            <a:ext cx="10748160" cy="5035680"/>
+            <a:ext cx="10747800" cy="5035320"/>
           </a:xfrm>
           <a:prstGeom prst="rect">
             <a:avLst/>
@@ -13259,7 +13229,7 @@
               </a:rPr>
               <a:t> (2010)” from Klaus Pohl</a:t>
             </a:r>
-            <a:endParaRPr b="0" lang="en-US" sz="1800" spc="-1" strike="noStrike">
+            <a:endParaRPr b="0" lang="en-GB" sz="1800" spc="-1" strike="noStrike">
               <a:solidFill>
                 <a:srgbClr val="000000"/>
               </a:solidFill>
@@ -13275,7 +13245,7 @@
                 <a:spcPts val="360"/>
               </a:spcBef>
             </a:pPr>
-            <a:endParaRPr b="0" lang="en-US" sz="1800" spc="-1" strike="noStrike">
+            <a:endParaRPr b="0" lang="en-GB" sz="1800" spc="-1" strike="noStrike">
               <a:solidFill>
                 <a:srgbClr val="000000"/>
               </a:solidFill>
@@ -13307,7 +13277,7 @@
               </a:rPr>
               <a:t>Special thanks to Prof. Dr. Steffen Herbold and Dr. Christian Bartelt, who provided valuable input in the form of the teaching materials of their requirements engineering courses. </a:t>
             </a:r>
-            <a:endParaRPr b="0" lang="en-US" sz="1800" spc="-1" strike="noStrike">
+            <a:endParaRPr b="0" lang="en-GB" sz="1800" spc="-1" strike="noStrike">
               <a:solidFill>
                 <a:srgbClr val="000000"/>
               </a:solidFill>
@@ -13355,7 +13325,7 @@
         <p:spPr>
           <a:xfrm>
             <a:off x="542880" y="721800"/>
-            <a:ext cx="10356840" cy="497520"/>
+            <a:ext cx="10356480" cy="497160"/>
           </a:xfrm>
           <a:prstGeom prst="rect">
             <a:avLst/>
@@ -13391,7 +13361,7 @@
               </a:rPr>
               <a:t>Course Content</a:t>
             </a:r>
-            <a:endParaRPr b="0" lang="en-US" sz="2200" spc="-1" strike="noStrike">
+            <a:endParaRPr b="0" lang="en-GB" sz="2200" spc="-1" strike="noStrike">
               <a:solidFill>
                 <a:srgbClr val="000000"/>
               </a:solidFill>
@@ -13413,7 +13383,7 @@
         <p:spPr>
           <a:xfrm>
             <a:off x="542880" y="2387520"/>
-            <a:ext cx="10101960" cy="2079360"/>
+            <a:ext cx="10101600" cy="2079000"/>
           </a:xfrm>
           <a:prstGeom prst="rect">
             <a:avLst/>
@@ -13462,7 +13432,7 @@
         <p:spPr>
           <a:xfrm>
             <a:off x="539640" y="764640"/>
-            <a:ext cx="10741320" cy="492120"/>
+            <a:ext cx="10740960" cy="491760"/>
           </a:xfrm>
           <a:prstGeom prst="rect">
             <a:avLst/>
@@ -13498,7 +13468,7 @@
               </a:rPr>
               <a:t>Lectures</a:t>
             </a:r>
-            <a:endParaRPr b="0" lang="en-US" sz="2400" spc="-1" strike="noStrike">
+            <a:endParaRPr b="0" lang="en-GB" sz="2400" spc="-1" strike="noStrike">
               <a:solidFill>
                 <a:srgbClr val="000000"/>
               </a:solidFill>
@@ -13516,7 +13486,7 @@
         <p:spPr>
           <a:xfrm>
             <a:off x="539640" y="1268640"/>
-            <a:ext cx="10741320" cy="5028840"/>
+            <a:ext cx="10740960" cy="5028480"/>
           </a:xfrm>
           <a:prstGeom prst="rect">
             <a:avLst/>
@@ -13561,7 +13531,7 @@
               </a:rPr>
               <a:t>26.10.2022 → No lecture </a:t>
             </a:r>
-            <a:endParaRPr b="0" lang="en-US" sz="1800" spc="-1" strike="noStrike">
+            <a:endParaRPr b="0" lang="en-GB" sz="1800" spc="-1" strike="noStrike">
               <a:solidFill>
                 <a:srgbClr val="000000"/>
               </a:solidFill>
@@ -13593,7 +13563,7 @@
               </a:rPr>
               <a:t>02.11.2022 → Organization (L00) + Introduction (L01)</a:t>
             </a:r>
-            <a:endParaRPr b="0" lang="en-US" sz="1800" spc="-1" strike="noStrike">
+            <a:endParaRPr b="0" lang="en-GB" sz="1800" spc="-1" strike="noStrike">
               <a:solidFill>
                 <a:srgbClr val="000000"/>
               </a:solidFill>
@@ -13625,7 +13595,7 @@
               </a:rPr>
               <a:t>09.11.2022 → System Context Boundaries and Types of Requirements (L02)</a:t>
             </a:r>
-            <a:endParaRPr b="0" lang="en-US" sz="1800" spc="-1" strike="noStrike">
+            <a:endParaRPr b="0" lang="en-GB" sz="1800" spc="-1" strike="noStrike">
               <a:solidFill>
                 <a:srgbClr val="000000"/>
               </a:solidFill>
@@ -13657,7 +13627,7 @@
               </a:rPr>
               <a:t>16.11.2022 → Elicitation – Part 1 (L03)</a:t>
             </a:r>
-            <a:endParaRPr b="0" lang="en-US" sz="1800" spc="-1" strike="noStrike">
+            <a:endParaRPr b="0" lang="en-GB" sz="1800" spc="-1" strike="noStrike">
               <a:solidFill>
                 <a:srgbClr val="000000"/>
               </a:solidFill>
@@ -13689,7 +13659,7 @@
               </a:rPr>
               <a:t>23.11.2022 → Elicitation – Part 2 (L04) and Negotiations (L05)</a:t>
             </a:r>
-            <a:endParaRPr b="0" lang="en-US" sz="1800" spc="-1" strike="noStrike">
+            <a:endParaRPr b="0" lang="en-GB" sz="1800" spc="-1" strike="noStrike">
               <a:solidFill>
                 <a:srgbClr val="000000"/>
               </a:solidFill>
@@ -13721,7 +13691,7 @@
               </a:rPr>
               <a:t>30.11.2022 → Documentation – Introduction (L06)</a:t>
             </a:r>
-            <a:endParaRPr b="0" lang="en-US" sz="1800" spc="-1" strike="noStrike">
+            <a:endParaRPr b="0" lang="en-GB" sz="1800" spc="-1" strike="noStrike">
               <a:solidFill>
                 <a:srgbClr val="000000"/>
               </a:solidFill>
@@ -13753,7 +13723,7 @@
               </a:rPr>
               <a:t>07.12.2022 → Documentation – Textual Requirements Specification (L07)</a:t>
             </a:r>
-            <a:endParaRPr b="0" lang="en-US" sz="1800" spc="-1" strike="noStrike">
+            <a:endParaRPr b="0" lang="en-GB" sz="1800" spc="-1" strike="noStrike">
               <a:solidFill>
                 <a:srgbClr val="000000"/>
               </a:solidFill>
@@ -13785,7 +13755,7 @@
               </a:rPr>
               <a:t>14.12.2022 → Documentation – Model-based Requirements Documentation (L08)</a:t>
             </a:r>
-            <a:endParaRPr b="0" lang="en-US" sz="1800" spc="-1" strike="noStrike">
+            <a:endParaRPr b="0" lang="en-GB" sz="1800" spc="-1" strike="noStrike">
               <a:solidFill>
                 <a:srgbClr val="000000"/>
               </a:solidFill>
@@ -13817,7 +13787,7 @@
               </a:rPr>
               <a:t>21.12.2022 → No Lecture</a:t>
             </a:r>
-            <a:endParaRPr b="0" lang="en-US" sz="1800" spc="-1" strike="noStrike">
+            <a:endParaRPr b="0" lang="en-GB" sz="1800" spc="-1" strike="noStrike">
               <a:solidFill>
                 <a:srgbClr val="000000"/>
               </a:solidFill>
@@ -13847,19 +13817,9 @@
                 <a:latin typeface="DejaVu Sans"/>
                 <a:ea typeface="DejaVu Sans"/>
               </a:rPr>
-              <a:t>11.01.2023 → </a:t>
-            </a:r>
-            <a:r>
-              <a:rPr b="0" lang="en-GB" sz="1800" spc="-1" strike="noStrike">
-                <a:solidFill>
-                  <a:srgbClr val="000000"/>
-                </a:solidFill>
-                <a:latin typeface="DejaVu Sans"/>
-                <a:ea typeface="DejaVu Sans"/>
-              </a:rPr>
-              <a:t>Documentation – Formal Requirements Specification (L09)</a:t>
-            </a:r>
-            <a:endParaRPr b="0" lang="en-US" sz="1800" spc="-1" strike="noStrike">
+              <a:t>11.01.2023 → Documentation – Formal Requirements Specification (L09)</a:t>
+            </a:r>
+            <a:endParaRPr b="0" lang="en-GB" sz="1800" spc="-1" strike="noStrike">
               <a:solidFill>
                 <a:srgbClr val="000000"/>
               </a:solidFill>
@@ -13889,19 +13849,9 @@
                 <a:latin typeface="DejaVu Sans"/>
                 <a:ea typeface="DejaVu Sans"/>
               </a:rPr>
-              <a:t>18.01.2023 → </a:t>
-            </a:r>
-            <a:r>
-              <a:rPr b="0" lang="en-GB" sz="1800" spc="-1" strike="noStrike">
-                <a:solidFill>
-                  <a:srgbClr val="000000"/>
-                </a:solidFill>
-                <a:latin typeface="DejaVu Sans"/>
-                <a:ea typeface="DejaVu Sans"/>
-              </a:rPr>
-              <a:t>Validation (L10)</a:t>
-            </a:r>
-            <a:endParaRPr b="0" lang="en-US" sz="1800" spc="-1" strike="noStrike">
+              <a:t>18.01.2023 → Validation (L10)</a:t>
+            </a:r>
+            <a:endParaRPr b="0" lang="en-GB" sz="1800" spc="-1" strike="noStrike">
               <a:solidFill>
                 <a:srgbClr val="000000"/>
               </a:solidFill>
@@ -13931,7 +13881,7 @@
                 <a:latin typeface="DejaVu Sans"/>
                 <a:ea typeface="DejaVu Sans"/>
               </a:rPr>
-              <a:t>25.01.2023 → </a:t>
+              <a:t>25.01.2023 → Traceability (L11), </a:t>
             </a:r>
             <a:r>
               <a:rPr b="0" lang="en-GB" sz="1800" spc="-1" strike="noStrike">
@@ -13941,9 +13891,9 @@
                 <a:latin typeface="DejaVu Sans"/>
                 <a:ea typeface="DejaVu Sans"/>
               </a:rPr>
-              <a:t>Traceability (L11)</a:t>
-            </a:r>
-            <a:endParaRPr b="0" lang="en-US" sz="1800" spc="-1" strike="noStrike">
+              <a:t>Requirements Management (L12) and Tool Support (L13)</a:t>
+            </a:r>
+            <a:endParaRPr b="0" lang="en-GB" sz="1800" spc="-1" strike="noStrike">
               <a:solidFill>
                 <a:srgbClr val="000000"/>
               </a:solidFill>
@@ -13973,19 +13923,9 @@
                 <a:latin typeface="DejaVu Sans"/>
                 <a:ea typeface="DejaVu Sans"/>
               </a:rPr>
-              <a:t>01.02.2023 → </a:t>
-            </a:r>
-            <a:r>
-              <a:rPr b="0" lang="en-GB" sz="1800" spc="-1" strike="noStrike">
-                <a:solidFill>
-                  <a:srgbClr val="000000"/>
-                </a:solidFill>
-                <a:latin typeface="DejaVu Sans"/>
-                <a:ea typeface="DejaVu Sans"/>
-              </a:rPr>
-              <a:t>Requirements Management (L12) and Tool Support (L13)</a:t>
-            </a:r>
-            <a:endParaRPr b="0" lang="en-US" sz="1800" spc="-1" strike="noStrike">
+              <a:t>01.02.2023 → No Lecture</a:t>
+            </a:r>
+            <a:endParaRPr b="0" lang="en-GB" sz="1800" spc="-1" strike="noStrike">
               <a:solidFill>
                 <a:srgbClr val="000000"/>
               </a:solidFill>
@@ -14017,7 +13957,7 @@
               </a:rPr>
               <a:t>08.02.2023 → Exam Q&amp;A</a:t>
             </a:r>
-            <a:endParaRPr b="0" lang="en-US" sz="1800" spc="-1" strike="noStrike">
+            <a:endParaRPr b="0" lang="en-GB" sz="1800" spc="-1" strike="noStrike">
               <a:solidFill>
                 <a:srgbClr val="000000"/>
               </a:solidFill>

</xml_diff>

<commit_message>
squash! squash! Add New Lecture Plan
</commit_message>
<xml_diff>
--- a/Requirements-Engineering/RE-L00-Organization.pptx
+++ b/Requirements-Engineering/RE-L00-Organization.pptx
@@ -86,7 +86,25 @@
                 </a:solidFill>
                 <a:latin typeface="Arial"/>
               </a:rPr>
-              <a:t>Click to move the slide</a:t>
+              <a:t>Click to </a:t>
+            </a:r>
+            <a:r>
+              <a:rPr b="0" lang="en-US" sz="4400" spc="-1" strike="noStrike">
+                <a:solidFill>
+                  <a:srgbClr val="000000"/>
+                </a:solidFill>
+                <a:latin typeface="Arial"/>
+              </a:rPr>
+              <a:t>move </a:t>
+            </a:r>
+            <a:r>
+              <a:rPr b="0" lang="en-US" sz="4400" spc="-1" strike="noStrike">
+                <a:solidFill>
+                  <a:srgbClr val="000000"/>
+                </a:solidFill>
+                <a:latin typeface="Arial"/>
+              </a:rPr>
+              <a:t>the slide</a:t>
             </a:r>
             <a:endParaRPr b="0" lang="en-US" sz="4400" spc="-1" strike="noStrike">
               <a:solidFill>
@@ -135,7 +153,7 @@
                 </a:solidFill>
                 <a:latin typeface="Arial"/>
               </a:rPr>
-              <a:t>Click to </a:t>
+              <a:t>Click to edit the </a:t>
             </a:r>
             <a:r>
               <a:rPr b="0" lang="en-US" sz="2000" spc="-1" strike="noStrike">
@@ -144,25 +162,7 @@
                 </a:solidFill>
                 <a:latin typeface="Arial"/>
               </a:rPr>
-              <a:t>edit the </a:t>
-            </a:r>
-            <a:r>
-              <a:rPr b="0" lang="en-US" sz="2000" spc="-1" strike="noStrike">
-                <a:solidFill>
-                  <a:srgbClr val="000000"/>
-                </a:solidFill>
-                <a:latin typeface="Arial"/>
-              </a:rPr>
-              <a:t>notes </a:t>
-            </a:r>
-            <a:r>
-              <a:rPr b="0" lang="en-US" sz="2000" spc="-1" strike="noStrike">
-                <a:solidFill>
-                  <a:srgbClr val="000000"/>
-                </a:solidFill>
-                <a:latin typeface="Arial"/>
-              </a:rPr>
-              <a:t>format</a:t>
+              <a:t>notes format</a:t>
             </a:r>
             <a:endParaRPr b="0" lang="en-US" sz="2000" spc="-1" strike="noStrike">
               <a:solidFill>
@@ -384,7 +384,7 @@
             <a:pPr indent="0" algn="r">
               <a:buNone/>
             </a:pPr>
-            <a:fld id="{950D683D-8E71-4650-9F0F-70D10802E6A8}" type="slidenum">
+            <a:fld id="{A90EE719-E259-48F3-8B19-45382F1FCA3A}" type="slidenum">
               <a:rPr b="0" lang="en-US" sz="1400" spc="-1" strike="noStrike">
                 <a:solidFill>
                   <a:srgbClr val="000000"/>
@@ -523,7 +523,7 @@
                 <a:spcPct val="100000"/>
               </a:lnSpc>
             </a:pPr>
-            <a:fld id="{C1EA1556-1C40-4752-98D5-E1DDF0E99B15}" type="slidenum">
+            <a:fld id="{09F80757-9944-4B2B-AA8E-9B3C16B79C7F}" type="slidenum">
               <a:rPr b="0" lang="en-GB" sz="1800" spc="-1" strike="noStrike">
                 <a:solidFill>
                   <a:srgbClr val="000000"/>
@@ -531,7 +531,7 @@
                 <a:latin typeface="+mn-lt"/>
                 <a:ea typeface="+mn-ea"/>
               </a:rPr>
-              <a:t>6</a:t>
+              <a:t>&lt;number&gt;</a:t>
             </a:fld>
             <a:endParaRPr b="0" lang="en-US" sz="1800" spc="-1" strike="noStrike">
               <a:solidFill>
@@ -662,7 +662,7 @@
                 <a:spcPct val="100000"/>
               </a:lnSpc>
             </a:pPr>
-            <a:fld id="{8ACD05F0-42D1-4C68-A0B4-7B96301260EF}" type="slidenum">
+            <a:fld id="{4F165A65-11B0-439A-8F94-176C00D43AB3}" type="slidenum">
               <a:rPr b="0" lang="en-GB" sz="1800" spc="-1" strike="noStrike">
                 <a:solidFill>
                   <a:srgbClr val="000000"/>
@@ -670,7 +670,7 @@
                 <a:latin typeface="+mn-lt"/>
                 <a:ea typeface="+mn-ea"/>
               </a:rPr>
-              <a:t>6</a:t>
+              <a:t>&lt;number&gt;</a:t>
             </a:fld>
             <a:endParaRPr b="0" lang="en-US" sz="1800" spc="-1" strike="noStrike">
               <a:solidFill>
@@ -801,7 +801,7 @@
                 <a:spcPct val="100000"/>
               </a:lnSpc>
             </a:pPr>
-            <a:fld id="{30382E08-B925-40C0-BE2A-3E2A7681D049}" type="slidenum">
+            <a:fld id="{61CA2DD0-A172-402C-AB5B-FA52D930E3A2}" type="slidenum">
               <a:rPr b="0" lang="en-GB" sz="1800" spc="-1" strike="noStrike">
                 <a:solidFill>
                   <a:srgbClr val="000000"/>
@@ -809,7 +809,7 @@
                 <a:latin typeface="+mn-lt"/>
                 <a:ea typeface="+mn-ea"/>
               </a:rPr>
-              <a:t>6</a:t>
+              <a:t>&lt;number&gt;</a:t>
             </a:fld>
             <a:endParaRPr b="0" lang="en-US" sz="1800" spc="-1" strike="noStrike">
               <a:solidFill>
@@ -940,7 +940,7 @@
                 <a:spcPct val="100000"/>
               </a:lnSpc>
             </a:pPr>
-            <a:fld id="{3B4E1B17-0FD3-4312-AA8F-74245F552DA2}" type="slidenum">
+            <a:fld id="{B87D4EFD-E1B5-462F-8156-E61C0170C98A}" type="slidenum">
               <a:rPr b="0" lang="en-GB" sz="1800" spc="-1" strike="noStrike">
                 <a:solidFill>
                   <a:srgbClr val="000000"/>
@@ -948,7 +948,7 @@
                 <a:latin typeface="+mn-lt"/>
                 <a:ea typeface="+mn-ea"/>
               </a:rPr>
-              <a:t>6</a:t>
+              <a:t>&lt;number&gt;</a:t>
             </a:fld>
             <a:endParaRPr b="0" lang="en-US" sz="1800" spc="-1" strike="noStrike">
               <a:solidFill>
@@ -4620,7 +4620,7 @@
                 <a:spcPct val="100000"/>
               </a:lnSpc>
             </a:pPr>
-            <a:fld id="{582C1749-CD0D-4386-AD8A-ADB661C53929}" type="slidenum">
+            <a:fld id="{60B2B569-678F-4E00-893A-57C25C73BE83}" type="slidenum">
               <a:rPr b="0" lang="en-US" sz="1800" spc="-1" strike="noStrike">
                 <a:solidFill>
                   <a:srgbClr val="808080"/>
@@ -4916,7 +4916,7 @@
                 </a:solidFill>
                 <a:latin typeface="Arial"/>
               </a:rPr>
-              <a:t>Clic</a:t>
+              <a:t>Click to </a:t>
             </a:r>
             <a:r>
               <a:rPr b="0" lang="en-US" sz="4400" spc="-1" strike="noStrike">
@@ -4925,7 +4925,7 @@
                 </a:solidFill>
                 <a:latin typeface="Arial"/>
               </a:rPr>
-              <a:t>k to </a:t>
+              <a:t>edit the </a:t>
             </a:r>
             <a:r>
               <a:rPr b="0" lang="en-US" sz="4400" spc="-1" strike="noStrike">
@@ -4934,7 +4934,7 @@
                 </a:solidFill>
                 <a:latin typeface="Arial"/>
               </a:rPr>
-              <a:t>edit </a:t>
+              <a:t>title text </a:t>
             </a:r>
             <a:r>
               <a:rPr b="0" lang="en-US" sz="4400" spc="-1" strike="noStrike">
@@ -4943,43 +4943,7 @@
                 </a:solidFill>
                 <a:latin typeface="Arial"/>
               </a:rPr>
-              <a:t>the </a:t>
-            </a:r>
-            <a:r>
-              <a:rPr b="0" lang="en-US" sz="4400" spc="-1" strike="noStrike">
-                <a:solidFill>
-                  <a:srgbClr val="000000"/>
-                </a:solidFill>
-                <a:latin typeface="Arial"/>
-              </a:rPr>
-              <a:t>title </a:t>
-            </a:r>
-            <a:r>
-              <a:rPr b="0" lang="en-US" sz="4400" spc="-1" strike="noStrike">
-                <a:solidFill>
-                  <a:srgbClr val="000000"/>
-                </a:solidFill>
-                <a:latin typeface="Arial"/>
-              </a:rPr>
-              <a:t>text </a:t>
-            </a:r>
-            <a:r>
-              <a:rPr b="0" lang="en-US" sz="4400" spc="-1" strike="noStrike">
-                <a:solidFill>
-                  <a:srgbClr val="000000"/>
-                </a:solidFill>
-                <a:latin typeface="Arial"/>
-              </a:rPr>
-              <a:t>form</a:t>
-            </a:r>
-            <a:r>
-              <a:rPr b="0" lang="en-US" sz="4400" spc="-1" strike="noStrike">
-                <a:solidFill>
-                  <a:srgbClr val="000000"/>
-                </a:solidFill>
-                <a:latin typeface="Arial"/>
-              </a:rPr>
-              <a:t>at</a:t>
+              <a:t>format</a:t>
             </a:r>
             <a:endParaRPr b="0" lang="en-US" sz="4400" spc="-1" strike="noStrike">
               <a:solidFill>
@@ -5343,7 +5307,7 @@
                 <a:spcPct val="100000"/>
               </a:lnSpc>
             </a:pPr>
-            <a:fld id="{ACA11B94-CF98-43AD-9F96-0EABE8E15395}" type="slidenum">
+            <a:fld id="{620523A7-CD93-49ED-87CE-03DA3A6F5008}" type="slidenum">
               <a:rPr b="0" lang="en-US" sz="1800" spc="-1" strike="noStrike">
                 <a:solidFill>
                   <a:srgbClr val="808080"/>
@@ -5537,7 +5501,7 @@
                 <a:spcPct val="100000"/>
               </a:lnSpc>
             </a:pPr>
-            <a:fld id="{FCD84237-D9C4-44A8-8954-CB71286789B1}" type="slidenum">
+            <a:fld id="{541358CA-2D7B-4130-A71F-66D4C8DF3EFD}" type="slidenum">
               <a:rPr b="0" lang="en-US" sz="1800" spc="-1" strike="noStrike">
                 <a:solidFill>
                   <a:srgbClr val="808080"/>
@@ -5648,7 +5612,7 @@
                 </a:solidFill>
                 <a:latin typeface="Arial"/>
               </a:rPr>
-              <a:t>Click </a:t>
+              <a:t>Click to </a:t>
             </a:r>
             <a:r>
               <a:rPr b="0" lang="en-US" sz="4400" spc="-1" strike="noStrike">
@@ -5657,7 +5621,7 @@
                 </a:solidFill>
                 <a:latin typeface="Arial"/>
               </a:rPr>
-              <a:t>to edit </a:t>
+              <a:t>edit the </a:t>
             </a:r>
             <a:r>
               <a:rPr b="0" lang="en-US" sz="4400" spc="-1" strike="noStrike">
@@ -5666,7 +5630,7 @@
                 </a:solidFill>
                 <a:latin typeface="Arial"/>
               </a:rPr>
-              <a:t>the </a:t>
+              <a:t>title text </a:t>
             </a:r>
             <a:r>
               <a:rPr b="0" lang="en-US" sz="4400" spc="-1" strike="noStrike">
@@ -5675,34 +5639,7 @@
                 </a:solidFill>
                 <a:latin typeface="Arial"/>
               </a:rPr>
-              <a:t>title </a:t>
-            </a:r>
-            <a:r>
-              <a:rPr b="0" lang="en-US" sz="4400" spc="-1" strike="noStrike">
-                <a:solidFill>
-                  <a:srgbClr val="000000"/>
-                </a:solidFill>
-                <a:latin typeface="Arial"/>
-              </a:rPr>
-              <a:t>text </a:t>
-            </a:r>
-            <a:r>
-              <a:rPr b="0" lang="en-US" sz="4400" spc="-1" strike="noStrike">
-                <a:solidFill>
-                  <a:srgbClr val="000000"/>
-                </a:solidFill>
-                <a:latin typeface="Arial"/>
-              </a:rPr>
-              <a:t>forma</a:t>
-            </a:r>
-            <a:r>
-              <a:rPr b="0" lang="en-US" sz="4400" spc="-1" strike="noStrike">
-                <a:solidFill>
-                  <a:srgbClr val="000000"/>
-                </a:solidFill>
-                <a:latin typeface="Arial"/>
-              </a:rPr>
-              <a:t>t</a:t>
+              <a:t>format</a:t>
             </a:r>
             <a:endParaRPr b="0" lang="en-US" sz="4400" spc="-1" strike="noStrike">
               <a:solidFill>
@@ -6797,7 +6734,7 @@
                           <a:latin typeface="DejaVu Sans"/>
                           <a:ea typeface="WenQuanYi Zen Hei"/>
                         </a:rPr>
-                        <a:t>E02 – Elicitation I, E02 – Elicitation II</a:t>
+                        <a:t>E02 – Elicitation I, E03 – Elicitation II</a:t>
                       </a:r>
                       <a:endParaRPr b="0" lang="en-US" sz="1500" spc="-1" strike="noStrike">
                         <a:solidFill>

</xml_diff>

<commit_message>
* updated RE L00
</commit_message>
<xml_diff>
--- a/Requirements-Engineering/RE-L00-Organization.pptx
+++ b/Requirements-Engineering/RE-L00-Organization.pptx
@@ -62,8 +62,8 @@
         </p:nvSpPr>
         <p:spPr>
           <a:xfrm>
-            <a:off x="533520" y="764280"/>
-            <a:ext cx="6704640" cy="3771360"/>
+            <a:off x="216000" y="812520"/>
+            <a:ext cx="7127280" cy="4008960"/>
           </a:xfrm>
           <a:prstGeom prst="rect">
             <a:avLst/>
@@ -80,15 +80,51 @@
           <a:p>
             <a:pPr algn="ctr"/>
             <a:r>
-              <a:rPr b="0" lang="en-US" sz="4400" spc="-1" strike="noStrike">
+              <a:rPr b="0" lang="de-DE" sz="4400" spc="-1" strike="noStrike">
                 <a:solidFill>
                   <a:srgbClr val="000000"/>
                 </a:solidFill>
                 <a:latin typeface="Arial"/>
               </a:rPr>
-              <a:t>Click to move the slide</a:t>
-            </a:r>
-            <a:endParaRPr b="0" lang="en-US" sz="4400" spc="-1" strike="noStrike">
+              <a:t>Click </a:t>
+            </a:r>
+            <a:r>
+              <a:rPr b="0" lang="de-DE" sz="4400" spc="-1" strike="noStrike">
+                <a:solidFill>
+                  <a:srgbClr val="000000"/>
+                </a:solidFill>
+                <a:latin typeface="Arial"/>
+              </a:rPr>
+              <a:t>to </a:t>
+            </a:r>
+            <a:r>
+              <a:rPr b="0" lang="de-DE" sz="4400" spc="-1" strike="noStrike">
+                <a:solidFill>
+                  <a:srgbClr val="000000"/>
+                </a:solidFill>
+                <a:latin typeface="Arial"/>
+              </a:rPr>
+              <a:t>move </a:t>
+            </a:r>
+            <a:r>
+              <a:rPr b="0" lang="de-DE" sz="4400" spc="-1" strike="noStrike">
+                <a:solidFill>
+                  <a:srgbClr val="000000"/>
+                </a:solidFill>
+                <a:latin typeface="Arial"/>
+              </a:rPr>
+              <a:t>the </a:t>
+            </a:r>
+            <a:r>
+              <a:rPr b="0" lang="de-DE" sz="4400" spc="-1" strike="noStrike">
+                <a:solidFill>
+                  <a:srgbClr val="000000"/>
+                </a:solidFill>
+                <a:latin typeface="Arial"/>
+              </a:rPr>
+              <a:t>slide</a:t>
+            </a:r>
+            <a:endParaRPr b="0" lang="de-DE" sz="4400" spc="-1" strike="noStrike">
               <a:solidFill>
                 <a:srgbClr val="000000"/>
               </a:solidFill>
@@ -109,8 +145,8 @@
         </p:nvSpPr>
         <p:spPr>
           <a:xfrm>
-            <a:off x="777240" y="4777560"/>
-            <a:ext cx="6217560" cy="4525920"/>
+            <a:off x="756000" y="5078520"/>
+            <a:ext cx="6047640" cy="4811040"/>
           </a:xfrm>
           <a:prstGeom prst="rect">
             <a:avLst/>
@@ -129,87 +165,33 @@
               <a:buNone/>
             </a:pPr>
             <a:r>
-              <a:rPr b="0" lang="en-US" sz="2000" spc="-1" strike="noStrike">
+              <a:rPr b="0" lang="de-DE" sz="2000" spc="-1" strike="noStrike">
                 <a:solidFill>
                   <a:srgbClr val="000000"/>
                 </a:solidFill>
                 <a:latin typeface="Arial"/>
               </a:rPr>
-              <a:t>Click </a:t>
-            </a:r>
-            <a:r>
-              <a:rPr b="0" lang="en-US" sz="2000" spc="-1" strike="noStrike">
+              <a:t>Click to edit </a:t>
+            </a:r>
+            <a:r>
+              <a:rPr b="0" lang="de-DE" sz="2000" spc="-1" strike="noStrike">
                 <a:solidFill>
                   <a:srgbClr val="000000"/>
                 </a:solidFill>
                 <a:latin typeface="Arial"/>
               </a:rPr>
-              <a:t>to </a:t>
-            </a:r>
-            <a:r>
-              <a:rPr b="0" lang="en-US" sz="2000" spc="-1" strike="noStrike">
+              <a:t>the notes' </a:t>
+            </a:r>
+            <a:r>
+              <a:rPr b="0" lang="de-DE" sz="2000" spc="-1" strike="noStrike">
                 <a:solidFill>
                   <a:srgbClr val="000000"/>
                 </a:solidFill>
                 <a:latin typeface="Arial"/>
               </a:rPr>
-              <a:t>edit </a:t>
-            </a:r>
-            <a:r>
-              <a:rPr b="0" lang="en-US" sz="2000" spc="-1" strike="noStrike">
-                <a:solidFill>
-                  <a:srgbClr val="000000"/>
-                </a:solidFill>
-                <a:latin typeface="Arial"/>
-              </a:rPr>
-              <a:t>the </a:t>
-            </a:r>
-            <a:r>
-              <a:rPr b="0" lang="en-US" sz="2000" spc="-1" strike="noStrike">
-                <a:solidFill>
-                  <a:srgbClr val="000000"/>
-                </a:solidFill>
-                <a:latin typeface="Arial"/>
-              </a:rPr>
-              <a:t>not</a:t>
-            </a:r>
-            <a:r>
-              <a:rPr b="0" lang="en-US" sz="2000" spc="-1" strike="noStrike">
-                <a:solidFill>
-                  <a:srgbClr val="000000"/>
-                </a:solidFill>
-                <a:latin typeface="Arial"/>
-              </a:rPr>
-              <a:t>es </a:t>
-            </a:r>
-            <a:r>
-              <a:rPr b="0" lang="en-US" sz="2000" spc="-1" strike="noStrike">
-                <a:solidFill>
-                  <a:srgbClr val="000000"/>
-                </a:solidFill>
-                <a:latin typeface="Arial"/>
-              </a:rPr>
-              <a:t>for</a:t>
-            </a:r>
-            <a:r>
-              <a:rPr b="0" lang="en-US" sz="2000" spc="-1" strike="noStrike">
-                <a:solidFill>
-                  <a:srgbClr val="000000"/>
-                </a:solidFill>
-                <a:latin typeface="Arial"/>
-              </a:rPr>
-              <a:t>ma</a:t>
-            </a:r>
-            <a:r>
-              <a:rPr b="0" lang="en-US" sz="2000" spc="-1" strike="noStrike">
-                <a:solidFill>
-                  <a:srgbClr val="000000"/>
-                </a:solidFill>
-                <a:latin typeface="Arial"/>
-              </a:rPr>
-              <a:t>t</a:t>
-            </a:r>
-            <a:endParaRPr b="0" lang="en-US" sz="2000" spc="-1" strike="noStrike">
+              <a:t>format</a:t>
+            </a:r>
+            <a:endParaRPr b="0" lang="de-DE" sz="2000" spc="-1" strike="noStrike">
               <a:solidFill>
                 <a:srgbClr val="000000"/>
               </a:solidFill>
@@ -231,7 +213,7 @@
         <p:spPr>
           <a:xfrm>
             <a:off x="0" y="0"/>
-            <a:ext cx="3372840" cy="502560"/>
+            <a:ext cx="3280680" cy="534240"/>
           </a:xfrm>
           <a:prstGeom prst="rect">
             <a:avLst/>
@@ -250,7 +232,7 @@
               <a:buNone/>
             </a:pPr>
             <a:r>
-              <a:rPr b="0" lang="en-US" sz="1400" spc="-1" strike="noStrike">
+              <a:rPr b="0" lang="de-DE" sz="1400" spc="-1" strike="noStrike">
                 <a:solidFill>
                   <a:srgbClr val="000000"/>
                 </a:solidFill>
@@ -258,7 +240,7 @@
               </a:rPr>
               <a:t>&lt;header&gt;</a:t>
             </a:r>
-            <a:endParaRPr b="0" lang="en-US" sz="1400" spc="-1" strike="noStrike">
+            <a:endParaRPr b="0" lang="de-DE" sz="1400" spc="-1" strike="noStrike">
               <a:solidFill>
                 <a:srgbClr val="000000"/>
               </a:solidFill>
@@ -279,8 +261,8 @@
         </p:nvSpPr>
         <p:spPr>
           <a:xfrm>
-            <a:off x="4399200" y="0"/>
-            <a:ext cx="3372840" cy="502560"/>
+            <a:off x="4278960" y="0"/>
+            <a:ext cx="3280680" cy="534240"/>
           </a:xfrm>
           <a:prstGeom prst="rect">
             <a:avLst/>
@@ -297,7 +279,7 @@
           <a:lstStyle>
             <a:lvl1pPr indent="0" algn="r">
               <a:buNone/>
-              <a:defRPr b="0" lang="en-US" sz="1400" spc="-1" strike="noStrike">
+              <a:defRPr b="0" lang="de-DE" sz="1400" spc="-1" strike="noStrike">
                 <a:solidFill>
                   <a:srgbClr val="000000"/>
                 </a:solidFill>
@@ -310,7 +292,7 @@
               <a:buNone/>
             </a:pPr>
             <a:r>
-              <a:rPr b="0" lang="en-US" sz="1400" spc="-1" strike="noStrike">
+              <a:rPr b="0" lang="de-DE" sz="1400" spc="-1" strike="noStrike">
                 <a:solidFill>
                   <a:srgbClr val="000000"/>
                 </a:solidFill>
@@ -318,7 +300,7 @@
               </a:rPr>
               <a:t>&lt;date/time&gt;</a:t>
             </a:r>
-            <a:endParaRPr b="0" lang="en-US" sz="1400" spc="-1" strike="noStrike">
+            <a:endParaRPr b="0" lang="de-DE" sz="1400" spc="-1" strike="noStrike">
               <a:solidFill>
                 <a:srgbClr val="000000"/>
               </a:solidFill>
@@ -339,8 +321,8 @@
         </p:nvSpPr>
         <p:spPr>
           <a:xfrm>
-            <a:off x="0" y="9555480"/>
-            <a:ext cx="3372840" cy="502560"/>
+            <a:off x="0" y="10157400"/>
+            <a:ext cx="3280680" cy="534240"/>
           </a:xfrm>
           <a:prstGeom prst="rect">
             <a:avLst/>
@@ -357,7 +339,7 @@
           <a:lstStyle>
             <a:lvl1pPr indent="0">
               <a:buNone/>
-              <a:defRPr b="0" lang="en-US" sz="1400" spc="-1" strike="noStrike">
+              <a:defRPr b="0" lang="de-DE" sz="1400" spc="-1" strike="noStrike">
                 <a:solidFill>
                   <a:srgbClr val="000000"/>
                 </a:solidFill>
@@ -370,7 +352,7 @@
               <a:buNone/>
             </a:pPr>
             <a:r>
-              <a:rPr b="0" lang="en-US" sz="1400" spc="-1" strike="noStrike">
+              <a:rPr b="0" lang="de-DE" sz="1400" spc="-1" strike="noStrike">
                 <a:solidFill>
                   <a:srgbClr val="000000"/>
                 </a:solidFill>
@@ -378,7 +360,7 @@
               </a:rPr>
               <a:t>&lt;footer&gt;</a:t>
             </a:r>
-            <a:endParaRPr b="0" lang="en-US" sz="1400" spc="-1" strike="noStrike">
+            <a:endParaRPr b="0" lang="de-DE" sz="1400" spc="-1" strike="noStrike">
               <a:solidFill>
                 <a:srgbClr val="000000"/>
               </a:solidFill>
@@ -399,8 +381,8 @@
         </p:nvSpPr>
         <p:spPr>
           <a:xfrm>
-            <a:off x="4399200" y="9555480"/>
-            <a:ext cx="3372840" cy="502560"/>
+            <a:off x="4278960" y="10157400"/>
+            <a:ext cx="3280680" cy="534240"/>
           </a:xfrm>
           <a:prstGeom prst="rect">
             <a:avLst/>
@@ -417,7 +399,7 @@
           <a:lstStyle>
             <a:lvl1pPr indent="0" algn="r">
               <a:buNone/>
-              <a:defRPr b="0" lang="en-US" sz="1400" spc="-1" strike="noStrike">
+              <a:defRPr b="0" lang="de-DE" sz="1400" spc="-1" strike="noStrike">
                 <a:solidFill>
                   <a:srgbClr val="000000"/>
                 </a:solidFill>
@@ -429,8 +411,8 @@
             <a:pPr indent="0" algn="r">
               <a:buNone/>
             </a:pPr>
-            <a:fld id="{C4D49352-98D4-4007-9496-8CCC92C9D342}" type="slidenum">
-              <a:rPr b="0" lang="en-US" sz="1400" spc="-1" strike="noStrike">
+            <a:fld id="{43D4EB28-AF16-49D3-959F-B9995F61F3EF}" type="slidenum">
+              <a:rPr b="0" lang="de-DE" sz="1400" spc="-1" strike="noStrike">
                 <a:solidFill>
                   <a:srgbClr val="000000"/>
                 </a:solidFill>
@@ -438,7 +420,7 @@
               </a:rPr>
               <a:t>&lt;number&gt;</a:t>
             </a:fld>
-            <a:endParaRPr b="0" lang="en-US" sz="1400" spc="-1" strike="noStrike">
+            <a:endParaRPr b="0" lang="de-DE" sz="1400" spc="-1" strike="noStrike">
               <a:solidFill>
                 <a:srgbClr val="000000"/>
               </a:solidFill>
@@ -483,7 +465,7 @@
         <p:spPr>
           <a:xfrm>
             <a:off x="533520" y="763560"/>
-            <a:ext cx="6694920" cy="3763080"/>
+            <a:ext cx="6694560" cy="3762720"/>
           </a:xfrm>
           <a:prstGeom prst="rect">
             <a:avLst/>
@@ -506,7 +488,7 @@
         <p:spPr>
           <a:xfrm>
             <a:off x="777240" y="4777560"/>
-            <a:ext cx="6208560" cy="4516920"/>
+            <a:ext cx="6208200" cy="4516560"/>
           </a:xfrm>
           <a:prstGeom prst="rect">
             <a:avLst/>
@@ -524,7 +506,7 @@
             <a:pPr marL="216000" indent="0">
               <a:buNone/>
             </a:pPr>
-            <a:endParaRPr b="0" lang="en-US" sz="1800" spc="-1" strike="noStrike">
+            <a:endParaRPr b="0" lang="de-DE" sz="1800" spc="-1" strike="noStrike">
               <a:solidFill>
                 <a:srgbClr val="000000"/>
               </a:solidFill>
@@ -542,7 +524,7 @@
         <p:spPr>
           <a:xfrm>
             <a:off x="4399200" y="9555480"/>
-            <a:ext cx="3363840" cy="493560"/>
+            <a:ext cx="3363480" cy="493200"/>
           </a:xfrm>
           <a:prstGeom prst="rect">
             <a:avLst/>
@@ -568,7 +550,7 @@
                 <a:spcPct val="100000"/>
               </a:lnSpc>
             </a:pPr>
-            <a:fld id="{C5F8911A-5C08-46A1-A365-A1A4EAC054F4}" type="slidenum">
+            <a:fld id="{D00E51A7-3039-484D-A9A6-86BEF04238B8}" type="slidenum">
               <a:rPr b="0" lang="en-GB" sz="1800" spc="-1" strike="noStrike">
                 <a:solidFill>
                   <a:srgbClr val="000000"/>
@@ -576,9 +558,9 @@
                 <a:latin typeface="+mn-lt"/>
                 <a:ea typeface="+mn-ea"/>
               </a:rPr>
-              <a:t>&lt;number&gt;</a:t>
+              <a:t>6</a:t>
             </a:fld>
-            <a:endParaRPr b="0" lang="en-US" sz="1800" spc="-1" strike="noStrike">
+            <a:endParaRPr b="0" lang="de-DE" sz="1800" spc="-1" strike="noStrike">
               <a:solidFill>
                 <a:srgbClr val="000000"/>
               </a:solidFill>
@@ -622,7 +604,7 @@
         <p:spPr>
           <a:xfrm>
             <a:off x="533520" y="763560"/>
-            <a:ext cx="6694920" cy="3763080"/>
+            <a:ext cx="6694560" cy="3762720"/>
           </a:xfrm>
           <a:prstGeom prst="rect">
             <a:avLst/>
@@ -645,7 +627,7 @@
         <p:spPr>
           <a:xfrm>
             <a:off x="777240" y="4777560"/>
-            <a:ext cx="6208560" cy="4516920"/>
+            <a:ext cx="6208200" cy="4516560"/>
           </a:xfrm>
           <a:prstGeom prst="rect">
             <a:avLst/>
@@ -663,7 +645,7 @@
             <a:pPr marL="216000" indent="0">
               <a:buNone/>
             </a:pPr>
-            <a:endParaRPr b="0" lang="en-US" sz="1800" spc="-1" strike="noStrike">
+            <a:endParaRPr b="0" lang="de-DE" sz="1800" spc="-1" strike="noStrike">
               <a:solidFill>
                 <a:srgbClr val="000000"/>
               </a:solidFill>
@@ -681,7 +663,7 @@
         <p:spPr>
           <a:xfrm>
             <a:off x="4399200" y="9555480"/>
-            <a:ext cx="3363840" cy="493560"/>
+            <a:ext cx="3363480" cy="493200"/>
           </a:xfrm>
           <a:prstGeom prst="rect">
             <a:avLst/>
@@ -707,7 +689,7 @@
                 <a:spcPct val="100000"/>
               </a:lnSpc>
             </a:pPr>
-            <a:fld id="{FDBBC06B-4D98-45A5-A738-4B11776CBC5C}" type="slidenum">
+            <a:fld id="{E5AF1E5B-BA8C-4CA9-B612-BAC7D67BBDC8}" type="slidenum">
               <a:rPr b="0" lang="en-GB" sz="1800" spc="-1" strike="noStrike">
                 <a:solidFill>
                   <a:srgbClr val="000000"/>
@@ -715,9 +697,9 @@
                 <a:latin typeface="+mn-lt"/>
                 <a:ea typeface="+mn-ea"/>
               </a:rPr>
-              <a:t>&lt;number&gt;</a:t>
+              <a:t>6</a:t>
             </a:fld>
-            <a:endParaRPr b="0" lang="en-US" sz="1800" spc="-1" strike="noStrike">
+            <a:endParaRPr b="0" lang="de-DE" sz="1800" spc="-1" strike="noStrike">
               <a:solidFill>
                 <a:srgbClr val="000000"/>
               </a:solidFill>
@@ -761,7 +743,7 @@
         <p:spPr>
           <a:xfrm>
             <a:off x="533520" y="763560"/>
-            <a:ext cx="6694920" cy="3763080"/>
+            <a:ext cx="6694560" cy="3762720"/>
           </a:xfrm>
           <a:prstGeom prst="rect">
             <a:avLst/>
@@ -784,7 +766,7 @@
         <p:spPr>
           <a:xfrm>
             <a:off x="777240" y="4777560"/>
-            <a:ext cx="6208560" cy="4516920"/>
+            <a:ext cx="6208200" cy="4516560"/>
           </a:xfrm>
           <a:prstGeom prst="rect">
             <a:avLst/>
@@ -802,7 +784,7 @@
             <a:pPr marL="216000" indent="0">
               <a:buNone/>
             </a:pPr>
-            <a:endParaRPr b="0" lang="en-US" sz="1800" spc="-1" strike="noStrike">
+            <a:endParaRPr b="0" lang="de-DE" sz="1800" spc="-1" strike="noStrike">
               <a:solidFill>
                 <a:srgbClr val="000000"/>
               </a:solidFill>
@@ -820,7 +802,7 @@
         <p:spPr>
           <a:xfrm>
             <a:off x="4399200" y="9555480"/>
-            <a:ext cx="3363840" cy="493560"/>
+            <a:ext cx="3363480" cy="493200"/>
           </a:xfrm>
           <a:prstGeom prst="rect">
             <a:avLst/>
@@ -846,7 +828,7 @@
                 <a:spcPct val="100000"/>
               </a:lnSpc>
             </a:pPr>
-            <a:fld id="{49582A8A-A0CC-4086-8142-EB415D9E90DF}" type="slidenum">
+            <a:fld id="{A1E3D2A5-654F-4258-8D2A-59691B7F97F5}" type="slidenum">
               <a:rPr b="0" lang="en-GB" sz="1800" spc="-1" strike="noStrike">
                 <a:solidFill>
                   <a:srgbClr val="000000"/>
@@ -854,9 +836,9 @@
                 <a:latin typeface="+mn-lt"/>
                 <a:ea typeface="+mn-ea"/>
               </a:rPr>
-              <a:t>&lt;number&gt;</a:t>
+              <a:t>6</a:t>
             </a:fld>
-            <a:endParaRPr b="0" lang="en-US" sz="1800" spc="-1" strike="noStrike">
+            <a:endParaRPr b="0" lang="de-DE" sz="1800" spc="-1" strike="noStrike">
               <a:solidFill>
                 <a:srgbClr val="000000"/>
               </a:solidFill>
@@ -900,7 +882,7 @@
         <p:spPr>
           <a:xfrm>
             <a:off x="533520" y="763560"/>
-            <a:ext cx="6694920" cy="3763080"/>
+            <a:ext cx="6694560" cy="3762720"/>
           </a:xfrm>
           <a:prstGeom prst="rect">
             <a:avLst/>
@@ -923,7 +905,7 @@
         <p:spPr>
           <a:xfrm>
             <a:off x="777240" y="4777560"/>
-            <a:ext cx="6208560" cy="4516920"/>
+            <a:ext cx="6208200" cy="4516560"/>
           </a:xfrm>
           <a:prstGeom prst="rect">
             <a:avLst/>
@@ -941,7 +923,7 @@
             <a:pPr marL="216000" indent="0">
               <a:buNone/>
             </a:pPr>
-            <a:endParaRPr b="0" lang="en-US" sz="1800" spc="-1" strike="noStrike">
+            <a:endParaRPr b="0" lang="de-DE" sz="1800" spc="-1" strike="noStrike">
               <a:solidFill>
                 <a:srgbClr val="000000"/>
               </a:solidFill>
@@ -959,7 +941,7 @@
         <p:spPr>
           <a:xfrm>
             <a:off x="4399200" y="9555480"/>
-            <a:ext cx="3363840" cy="493560"/>
+            <a:ext cx="3363480" cy="493200"/>
           </a:xfrm>
           <a:prstGeom prst="rect">
             <a:avLst/>
@@ -985,7 +967,7 @@
                 <a:spcPct val="100000"/>
               </a:lnSpc>
             </a:pPr>
-            <a:fld id="{AF98E903-AE26-4B04-AD93-ADAD388CACF9}" type="slidenum">
+            <a:fld id="{DBEC9D9D-865F-4CEF-AD98-EA12B8068A9F}" type="slidenum">
               <a:rPr b="0" lang="en-GB" sz="1800" spc="-1" strike="noStrike">
                 <a:solidFill>
                   <a:srgbClr val="000000"/>
@@ -993,9 +975,9 @@
                 <a:latin typeface="+mn-lt"/>
                 <a:ea typeface="+mn-ea"/>
               </a:rPr>
-              <a:t>&lt;number&gt;</a:t>
+              <a:t>6</a:t>
             </a:fld>
-            <a:endParaRPr b="0" lang="en-US" sz="1800" spc="-1" strike="noStrike">
+            <a:endParaRPr b="0" lang="de-DE" sz="1800" spc="-1" strike="noStrike">
               <a:solidFill>
                 <a:srgbClr val="000000"/>
               </a:solidFill>
@@ -1079,7 +1061,7 @@
             <a:pPr indent="0" algn="ctr">
               <a:buNone/>
             </a:pPr>
-            <a:endParaRPr b="0" lang="en-US" sz="4400" spc="-1" strike="noStrike">
+            <a:endParaRPr b="0" lang="de-DE" sz="4400" spc="-1" strike="noStrike">
               <a:solidFill>
                 <a:srgbClr val="000000"/>
               </a:solidFill>
@@ -1122,7 +1104,7 @@
               </a:spcBef>
               <a:buNone/>
             </a:pPr>
-            <a:endParaRPr b="0" lang="en-US" sz="3200" spc="-1" strike="noStrike">
+            <a:endParaRPr b="0" lang="de-DE" sz="3200" spc="-1" strike="noStrike">
               <a:solidFill>
                 <a:srgbClr val="000000"/>
               </a:solidFill>
@@ -1165,7 +1147,7 @@
               </a:spcBef>
               <a:buNone/>
             </a:pPr>
-            <a:endParaRPr b="0" lang="en-US" sz="3200" spc="-1" strike="noStrike">
+            <a:endParaRPr b="0" lang="de-DE" sz="3200" spc="-1" strike="noStrike">
               <a:solidFill>
                 <a:srgbClr val="000000"/>
               </a:solidFill>
@@ -1227,7 +1209,7 @@
             <a:pPr indent="0" algn="ctr">
               <a:buNone/>
             </a:pPr>
-            <a:endParaRPr b="0" lang="en-US" sz="4400" spc="-1" strike="noStrike">
+            <a:endParaRPr b="0" lang="de-DE" sz="4400" spc="-1" strike="noStrike">
               <a:solidFill>
                 <a:srgbClr val="000000"/>
               </a:solidFill>
@@ -1270,7 +1252,7 @@
               </a:spcBef>
               <a:buNone/>
             </a:pPr>
-            <a:endParaRPr b="0" lang="en-US" sz="3200" spc="-1" strike="noStrike">
+            <a:endParaRPr b="0" lang="de-DE" sz="3200" spc="-1" strike="noStrike">
               <a:solidFill>
                 <a:srgbClr val="000000"/>
               </a:solidFill>
@@ -1313,7 +1295,7 @@
               </a:spcBef>
               <a:buNone/>
             </a:pPr>
-            <a:endParaRPr b="0" lang="en-US" sz="3200" spc="-1" strike="noStrike">
+            <a:endParaRPr b="0" lang="de-DE" sz="3200" spc="-1" strike="noStrike">
               <a:solidFill>
                 <a:srgbClr val="000000"/>
               </a:solidFill>
@@ -1356,7 +1338,7 @@
               </a:spcBef>
               <a:buNone/>
             </a:pPr>
-            <a:endParaRPr b="0" lang="en-US" sz="3200" spc="-1" strike="noStrike">
+            <a:endParaRPr b="0" lang="de-DE" sz="3200" spc="-1" strike="noStrike">
               <a:solidFill>
                 <a:srgbClr val="000000"/>
               </a:solidFill>
@@ -1399,7 +1381,7 @@
               </a:spcBef>
               <a:buNone/>
             </a:pPr>
-            <a:endParaRPr b="0" lang="en-US" sz="3200" spc="-1" strike="noStrike">
+            <a:endParaRPr b="0" lang="de-DE" sz="3200" spc="-1" strike="noStrike">
               <a:solidFill>
                 <a:srgbClr val="000000"/>
               </a:solidFill>
@@ -1461,7 +1443,7 @@
             <a:pPr indent="0" algn="ctr">
               <a:buNone/>
             </a:pPr>
-            <a:endParaRPr b="0" lang="en-US" sz="4400" spc="-1" strike="noStrike">
+            <a:endParaRPr b="0" lang="de-DE" sz="4400" spc="-1" strike="noStrike">
               <a:solidFill>
                 <a:srgbClr val="000000"/>
               </a:solidFill>
@@ -1504,7 +1486,7 @@
               </a:spcBef>
               <a:buNone/>
             </a:pPr>
-            <a:endParaRPr b="0" lang="en-US" sz="3200" spc="-1" strike="noStrike">
+            <a:endParaRPr b="0" lang="de-DE" sz="3200" spc="-1" strike="noStrike">
               <a:solidFill>
                 <a:srgbClr val="000000"/>
               </a:solidFill>
@@ -1547,7 +1529,7 @@
               </a:spcBef>
               <a:buNone/>
             </a:pPr>
-            <a:endParaRPr b="0" lang="en-US" sz="3200" spc="-1" strike="noStrike">
+            <a:endParaRPr b="0" lang="de-DE" sz="3200" spc="-1" strike="noStrike">
               <a:solidFill>
                 <a:srgbClr val="000000"/>
               </a:solidFill>
@@ -1590,7 +1572,7 @@
               </a:spcBef>
               <a:buNone/>
             </a:pPr>
-            <a:endParaRPr b="0" lang="en-US" sz="3200" spc="-1" strike="noStrike">
+            <a:endParaRPr b="0" lang="de-DE" sz="3200" spc="-1" strike="noStrike">
               <a:solidFill>
                 <a:srgbClr val="000000"/>
               </a:solidFill>
@@ -1633,7 +1615,7 @@
               </a:spcBef>
               <a:buNone/>
             </a:pPr>
-            <a:endParaRPr b="0" lang="en-US" sz="3200" spc="-1" strike="noStrike">
+            <a:endParaRPr b="0" lang="de-DE" sz="3200" spc="-1" strike="noStrike">
               <a:solidFill>
                 <a:srgbClr val="000000"/>
               </a:solidFill>
@@ -1676,7 +1658,7 @@
               </a:spcBef>
               <a:buNone/>
             </a:pPr>
-            <a:endParaRPr b="0" lang="en-US" sz="3200" spc="-1" strike="noStrike">
+            <a:endParaRPr b="0" lang="de-DE" sz="3200" spc="-1" strike="noStrike">
               <a:solidFill>
                 <a:srgbClr val="000000"/>
               </a:solidFill>
@@ -1719,7 +1701,7 @@
               </a:spcBef>
               <a:buNone/>
             </a:pPr>
-            <a:endParaRPr b="0" lang="en-US" sz="3200" spc="-1" strike="noStrike">
+            <a:endParaRPr b="0" lang="de-DE" sz="3200" spc="-1" strike="noStrike">
               <a:solidFill>
                 <a:srgbClr val="000000"/>
               </a:solidFill>
@@ -1803,7 +1785,7 @@
             <a:pPr indent="0" algn="ctr">
               <a:buNone/>
             </a:pPr>
-            <a:endParaRPr b="0" lang="en-US" sz="4400" spc="-1" strike="noStrike">
+            <a:endParaRPr b="0" lang="de-DE" sz="4400" spc="-1" strike="noStrike">
               <a:solidFill>
                 <a:srgbClr val="000000"/>
               </a:solidFill>
@@ -1843,7 +1825,7 @@
             <a:pPr indent="0" algn="ctr">
               <a:buNone/>
             </a:pPr>
-            <a:endParaRPr b="0" lang="en-US" sz="3200" spc="-1" strike="noStrike">
+            <a:endParaRPr b="0" lang="de-DE" sz="3200" spc="-1" strike="noStrike">
               <a:solidFill>
                 <a:srgbClr val="000000"/>
               </a:solidFill>
@@ -1905,7 +1887,7 @@
             <a:pPr indent="0" algn="ctr">
               <a:buNone/>
             </a:pPr>
-            <a:endParaRPr b="0" lang="en-US" sz="4400" spc="-1" strike="noStrike">
+            <a:endParaRPr b="0" lang="de-DE" sz="4400" spc="-1" strike="noStrike">
               <a:solidFill>
                 <a:srgbClr val="000000"/>
               </a:solidFill>
@@ -1948,7 +1930,7 @@
               </a:spcBef>
               <a:buNone/>
             </a:pPr>
-            <a:endParaRPr b="0" lang="en-US" sz="3200" spc="-1" strike="noStrike">
+            <a:endParaRPr b="0" lang="de-DE" sz="3200" spc="-1" strike="noStrike">
               <a:solidFill>
                 <a:srgbClr val="000000"/>
               </a:solidFill>
@@ -2010,7 +1992,7 @@
             <a:pPr indent="0" algn="ctr">
               <a:buNone/>
             </a:pPr>
-            <a:endParaRPr b="0" lang="en-US" sz="4400" spc="-1" strike="noStrike">
+            <a:endParaRPr b="0" lang="de-DE" sz="4400" spc="-1" strike="noStrike">
               <a:solidFill>
                 <a:srgbClr val="000000"/>
               </a:solidFill>
@@ -2053,7 +2035,7 @@
               </a:spcBef>
               <a:buNone/>
             </a:pPr>
-            <a:endParaRPr b="0" lang="en-US" sz="3200" spc="-1" strike="noStrike">
+            <a:endParaRPr b="0" lang="de-DE" sz="3200" spc="-1" strike="noStrike">
               <a:solidFill>
                 <a:srgbClr val="000000"/>
               </a:solidFill>
@@ -2096,7 +2078,7 @@
               </a:spcBef>
               <a:buNone/>
             </a:pPr>
-            <a:endParaRPr b="0" lang="en-US" sz="3200" spc="-1" strike="noStrike">
+            <a:endParaRPr b="0" lang="de-DE" sz="3200" spc="-1" strike="noStrike">
               <a:solidFill>
                 <a:srgbClr val="000000"/>
               </a:solidFill>
@@ -2158,7 +2140,7 @@
             <a:pPr indent="0" algn="ctr">
               <a:buNone/>
             </a:pPr>
-            <a:endParaRPr b="0" lang="en-US" sz="4400" spc="-1" strike="noStrike">
+            <a:endParaRPr b="0" lang="de-DE" sz="4400" spc="-1" strike="noStrike">
               <a:solidFill>
                 <a:srgbClr val="000000"/>
               </a:solidFill>
@@ -2218,7 +2200,7 @@
           </a:bodyPr>
           <a:p>
             <a:pPr algn="ctr"/>
-            <a:endParaRPr b="0" lang="en-US" sz="3200" spc="-1" strike="noStrike">
+            <a:endParaRPr b="0" lang="de-DE" sz="3200" spc="-1" strike="noStrike">
               <a:solidFill>
                 <a:srgbClr val="000000"/>
               </a:solidFill>
@@ -2280,7 +2262,7 @@
             <a:pPr indent="0" algn="ctr">
               <a:buNone/>
             </a:pPr>
-            <a:endParaRPr b="0" lang="en-US" sz="4400" spc="-1" strike="noStrike">
+            <a:endParaRPr b="0" lang="de-DE" sz="4400" spc="-1" strike="noStrike">
               <a:solidFill>
                 <a:srgbClr val="000000"/>
               </a:solidFill>
@@ -2323,7 +2305,7 @@
               </a:spcBef>
               <a:buNone/>
             </a:pPr>
-            <a:endParaRPr b="0" lang="en-US" sz="3200" spc="-1" strike="noStrike">
+            <a:endParaRPr b="0" lang="de-DE" sz="3200" spc="-1" strike="noStrike">
               <a:solidFill>
                 <a:srgbClr val="000000"/>
               </a:solidFill>
@@ -2366,7 +2348,7 @@
               </a:spcBef>
               <a:buNone/>
             </a:pPr>
-            <a:endParaRPr b="0" lang="en-US" sz="3200" spc="-1" strike="noStrike">
+            <a:endParaRPr b="0" lang="de-DE" sz="3200" spc="-1" strike="noStrike">
               <a:solidFill>
                 <a:srgbClr val="000000"/>
               </a:solidFill>
@@ -2409,7 +2391,7 @@
               </a:spcBef>
               <a:buNone/>
             </a:pPr>
-            <a:endParaRPr b="0" lang="en-US" sz="3200" spc="-1" strike="noStrike">
+            <a:endParaRPr b="0" lang="de-DE" sz="3200" spc="-1" strike="noStrike">
               <a:solidFill>
                 <a:srgbClr val="000000"/>
               </a:solidFill>
@@ -2471,7 +2453,7 @@
             <a:pPr indent="0" algn="ctr">
               <a:buNone/>
             </a:pPr>
-            <a:endParaRPr b="0" lang="en-US" sz="4400" spc="-1" strike="noStrike">
+            <a:endParaRPr b="0" lang="de-DE" sz="4400" spc="-1" strike="noStrike">
               <a:solidFill>
                 <a:srgbClr val="000000"/>
               </a:solidFill>
@@ -2511,7 +2493,7 @@
             <a:pPr indent="0" algn="ctr">
               <a:buNone/>
             </a:pPr>
-            <a:endParaRPr b="0" lang="en-US" sz="3200" spc="-1" strike="noStrike">
+            <a:endParaRPr b="0" lang="de-DE" sz="3200" spc="-1" strike="noStrike">
               <a:solidFill>
                 <a:srgbClr val="000000"/>
               </a:solidFill>
@@ -2573,7 +2555,7 @@
             <a:pPr indent="0" algn="ctr">
               <a:buNone/>
             </a:pPr>
-            <a:endParaRPr b="0" lang="en-US" sz="4400" spc="-1" strike="noStrike">
+            <a:endParaRPr b="0" lang="de-DE" sz="4400" spc="-1" strike="noStrike">
               <a:solidFill>
                 <a:srgbClr val="000000"/>
               </a:solidFill>
@@ -2616,7 +2598,7 @@
               </a:spcBef>
               <a:buNone/>
             </a:pPr>
-            <a:endParaRPr b="0" lang="en-US" sz="3200" spc="-1" strike="noStrike">
+            <a:endParaRPr b="0" lang="de-DE" sz="3200" spc="-1" strike="noStrike">
               <a:solidFill>
                 <a:srgbClr val="000000"/>
               </a:solidFill>
@@ -2659,7 +2641,7 @@
               </a:spcBef>
               <a:buNone/>
             </a:pPr>
-            <a:endParaRPr b="0" lang="en-US" sz="3200" spc="-1" strike="noStrike">
+            <a:endParaRPr b="0" lang="de-DE" sz="3200" spc="-1" strike="noStrike">
               <a:solidFill>
                 <a:srgbClr val="000000"/>
               </a:solidFill>
@@ -2702,7 +2684,7 @@
               </a:spcBef>
               <a:buNone/>
             </a:pPr>
-            <a:endParaRPr b="0" lang="en-US" sz="3200" spc="-1" strike="noStrike">
+            <a:endParaRPr b="0" lang="de-DE" sz="3200" spc="-1" strike="noStrike">
               <a:solidFill>
                 <a:srgbClr val="000000"/>
               </a:solidFill>
@@ -2764,7 +2746,7 @@
             <a:pPr indent="0" algn="ctr">
               <a:buNone/>
             </a:pPr>
-            <a:endParaRPr b="0" lang="en-US" sz="4400" spc="-1" strike="noStrike">
+            <a:endParaRPr b="0" lang="de-DE" sz="4400" spc="-1" strike="noStrike">
               <a:solidFill>
                 <a:srgbClr val="000000"/>
               </a:solidFill>
@@ -2807,7 +2789,7 @@
               </a:spcBef>
               <a:buNone/>
             </a:pPr>
-            <a:endParaRPr b="0" lang="en-US" sz="3200" spc="-1" strike="noStrike">
+            <a:endParaRPr b="0" lang="de-DE" sz="3200" spc="-1" strike="noStrike">
               <a:solidFill>
                 <a:srgbClr val="000000"/>
               </a:solidFill>
@@ -2850,7 +2832,7 @@
               </a:spcBef>
               <a:buNone/>
             </a:pPr>
-            <a:endParaRPr b="0" lang="en-US" sz="3200" spc="-1" strike="noStrike">
+            <a:endParaRPr b="0" lang="de-DE" sz="3200" spc="-1" strike="noStrike">
               <a:solidFill>
                 <a:srgbClr val="000000"/>
               </a:solidFill>
@@ -2893,7 +2875,7 @@
               </a:spcBef>
               <a:buNone/>
             </a:pPr>
-            <a:endParaRPr b="0" lang="en-US" sz="3200" spc="-1" strike="noStrike">
+            <a:endParaRPr b="0" lang="de-DE" sz="3200" spc="-1" strike="noStrike">
               <a:solidFill>
                 <a:srgbClr val="000000"/>
               </a:solidFill>
@@ -2955,7 +2937,7 @@
             <a:pPr indent="0" algn="ctr">
               <a:buNone/>
             </a:pPr>
-            <a:endParaRPr b="0" lang="en-US" sz="4400" spc="-1" strike="noStrike">
+            <a:endParaRPr b="0" lang="de-DE" sz="4400" spc="-1" strike="noStrike">
               <a:solidFill>
                 <a:srgbClr val="000000"/>
               </a:solidFill>
@@ -2998,7 +2980,7 @@
               </a:spcBef>
               <a:buNone/>
             </a:pPr>
-            <a:endParaRPr b="0" lang="en-US" sz="3200" spc="-1" strike="noStrike">
+            <a:endParaRPr b="0" lang="de-DE" sz="3200" spc="-1" strike="noStrike">
               <a:solidFill>
                 <a:srgbClr val="000000"/>
               </a:solidFill>
@@ -3041,7 +3023,7 @@
               </a:spcBef>
               <a:buNone/>
             </a:pPr>
-            <a:endParaRPr b="0" lang="en-US" sz="3200" spc="-1" strike="noStrike">
+            <a:endParaRPr b="0" lang="de-DE" sz="3200" spc="-1" strike="noStrike">
               <a:solidFill>
                 <a:srgbClr val="000000"/>
               </a:solidFill>
@@ -3103,7 +3085,7 @@
             <a:pPr indent="0" algn="ctr">
               <a:buNone/>
             </a:pPr>
-            <a:endParaRPr b="0" lang="en-US" sz="4400" spc="-1" strike="noStrike">
+            <a:endParaRPr b="0" lang="de-DE" sz="4400" spc="-1" strike="noStrike">
               <a:solidFill>
                 <a:srgbClr val="000000"/>
               </a:solidFill>
@@ -3146,7 +3128,7 @@
               </a:spcBef>
               <a:buNone/>
             </a:pPr>
-            <a:endParaRPr b="0" lang="en-US" sz="3200" spc="-1" strike="noStrike">
+            <a:endParaRPr b="0" lang="de-DE" sz="3200" spc="-1" strike="noStrike">
               <a:solidFill>
                 <a:srgbClr val="000000"/>
               </a:solidFill>
@@ -3189,7 +3171,7 @@
               </a:spcBef>
               <a:buNone/>
             </a:pPr>
-            <a:endParaRPr b="0" lang="en-US" sz="3200" spc="-1" strike="noStrike">
+            <a:endParaRPr b="0" lang="de-DE" sz="3200" spc="-1" strike="noStrike">
               <a:solidFill>
                 <a:srgbClr val="000000"/>
               </a:solidFill>
@@ -3232,7 +3214,7 @@
               </a:spcBef>
               <a:buNone/>
             </a:pPr>
-            <a:endParaRPr b="0" lang="en-US" sz="3200" spc="-1" strike="noStrike">
+            <a:endParaRPr b="0" lang="de-DE" sz="3200" spc="-1" strike="noStrike">
               <a:solidFill>
                 <a:srgbClr val="000000"/>
               </a:solidFill>
@@ -3275,7 +3257,7 @@
               </a:spcBef>
               <a:buNone/>
             </a:pPr>
-            <a:endParaRPr b="0" lang="en-US" sz="3200" spc="-1" strike="noStrike">
+            <a:endParaRPr b="0" lang="de-DE" sz="3200" spc="-1" strike="noStrike">
               <a:solidFill>
                 <a:srgbClr val="000000"/>
               </a:solidFill>
@@ -3337,7 +3319,7 @@
             <a:pPr indent="0" algn="ctr">
               <a:buNone/>
             </a:pPr>
-            <a:endParaRPr b="0" lang="en-US" sz="4400" spc="-1" strike="noStrike">
+            <a:endParaRPr b="0" lang="de-DE" sz="4400" spc="-1" strike="noStrike">
               <a:solidFill>
                 <a:srgbClr val="000000"/>
               </a:solidFill>
@@ -3380,7 +3362,7 @@
               </a:spcBef>
               <a:buNone/>
             </a:pPr>
-            <a:endParaRPr b="0" lang="en-US" sz="3200" spc="-1" strike="noStrike">
+            <a:endParaRPr b="0" lang="de-DE" sz="3200" spc="-1" strike="noStrike">
               <a:solidFill>
                 <a:srgbClr val="000000"/>
               </a:solidFill>
@@ -3423,7 +3405,7 @@
               </a:spcBef>
               <a:buNone/>
             </a:pPr>
-            <a:endParaRPr b="0" lang="en-US" sz="3200" spc="-1" strike="noStrike">
+            <a:endParaRPr b="0" lang="de-DE" sz="3200" spc="-1" strike="noStrike">
               <a:solidFill>
                 <a:srgbClr val="000000"/>
               </a:solidFill>
@@ -3466,7 +3448,7 @@
               </a:spcBef>
               <a:buNone/>
             </a:pPr>
-            <a:endParaRPr b="0" lang="en-US" sz="3200" spc="-1" strike="noStrike">
+            <a:endParaRPr b="0" lang="de-DE" sz="3200" spc="-1" strike="noStrike">
               <a:solidFill>
                 <a:srgbClr val="000000"/>
               </a:solidFill>
@@ -3509,7 +3491,7 @@
               </a:spcBef>
               <a:buNone/>
             </a:pPr>
-            <a:endParaRPr b="0" lang="en-US" sz="3200" spc="-1" strike="noStrike">
+            <a:endParaRPr b="0" lang="de-DE" sz="3200" spc="-1" strike="noStrike">
               <a:solidFill>
                 <a:srgbClr val="000000"/>
               </a:solidFill>
@@ -3552,7 +3534,7 @@
               </a:spcBef>
               <a:buNone/>
             </a:pPr>
-            <a:endParaRPr b="0" lang="en-US" sz="3200" spc="-1" strike="noStrike">
+            <a:endParaRPr b="0" lang="de-DE" sz="3200" spc="-1" strike="noStrike">
               <a:solidFill>
                 <a:srgbClr val="000000"/>
               </a:solidFill>
@@ -3595,7 +3577,7 @@
               </a:spcBef>
               <a:buNone/>
             </a:pPr>
-            <a:endParaRPr b="0" lang="en-US" sz="3200" spc="-1" strike="noStrike">
+            <a:endParaRPr b="0" lang="de-DE" sz="3200" spc="-1" strike="noStrike">
               <a:solidFill>
                 <a:srgbClr val="000000"/>
               </a:solidFill>
@@ -3657,7 +3639,7 @@
             <a:pPr indent="0" algn="ctr">
               <a:buNone/>
             </a:pPr>
-            <a:endParaRPr b="0" lang="en-US" sz="4400" spc="-1" strike="noStrike">
+            <a:endParaRPr b="0" lang="de-DE" sz="4400" spc="-1" strike="noStrike">
               <a:solidFill>
                 <a:srgbClr val="000000"/>
               </a:solidFill>
@@ -3700,7 +3682,7 @@
               </a:spcBef>
               <a:buNone/>
             </a:pPr>
-            <a:endParaRPr b="0" lang="en-US" sz="3200" spc="-1" strike="noStrike">
+            <a:endParaRPr b="0" lang="de-DE" sz="3200" spc="-1" strike="noStrike">
               <a:solidFill>
                 <a:srgbClr val="000000"/>
               </a:solidFill>
@@ -3762,7 +3744,7 @@
             <a:pPr indent="0" algn="ctr">
               <a:buNone/>
             </a:pPr>
-            <a:endParaRPr b="0" lang="en-US" sz="4400" spc="-1" strike="noStrike">
+            <a:endParaRPr b="0" lang="de-DE" sz="4400" spc="-1" strike="noStrike">
               <a:solidFill>
                 <a:srgbClr val="000000"/>
               </a:solidFill>
@@ -3805,7 +3787,7 @@
               </a:spcBef>
               <a:buNone/>
             </a:pPr>
-            <a:endParaRPr b="0" lang="en-US" sz="3200" spc="-1" strike="noStrike">
+            <a:endParaRPr b="0" lang="de-DE" sz="3200" spc="-1" strike="noStrike">
               <a:solidFill>
                 <a:srgbClr val="000000"/>
               </a:solidFill>
@@ -3848,7 +3830,7 @@
               </a:spcBef>
               <a:buNone/>
             </a:pPr>
-            <a:endParaRPr b="0" lang="en-US" sz="3200" spc="-1" strike="noStrike">
+            <a:endParaRPr b="0" lang="de-DE" sz="3200" spc="-1" strike="noStrike">
               <a:solidFill>
                 <a:srgbClr val="000000"/>
               </a:solidFill>
@@ -3910,7 +3892,7 @@
             <a:pPr indent="0" algn="ctr">
               <a:buNone/>
             </a:pPr>
-            <a:endParaRPr b="0" lang="en-US" sz="4400" spc="-1" strike="noStrike">
+            <a:endParaRPr b="0" lang="de-DE" sz="4400" spc="-1" strike="noStrike">
               <a:solidFill>
                 <a:srgbClr val="000000"/>
               </a:solidFill>
@@ -3970,7 +3952,7 @@
           </a:bodyPr>
           <a:p>
             <a:pPr algn="ctr"/>
-            <a:endParaRPr b="0" lang="en-US" sz="3200" spc="-1" strike="noStrike">
+            <a:endParaRPr b="0" lang="de-DE" sz="3200" spc="-1" strike="noStrike">
               <a:solidFill>
                 <a:srgbClr val="000000"/>
               </a:solidFill>
@@ -4032,7 +4014,7 @@
             <a:pPr indent="0" algn="ctr">
               <a:buNone/>
             </a:pPr>
-            <a:endParaRPr b="0" lang="en-US" sz="4400" spc="-1" strike="noStrike">
+            <a:endParaRPr b="0" lang="de-DE" sz="4400" spc="-1" strike="noStrike">
               <a:solidFill>
                 <a:srgbClr val="000000"/>
               </a:solidFill>
@@ -4075,7 +4057,7 @@
               </a:spcBef>
               <a:buNone/>
             </a:pPr>
-            <a:endParaRPr b="0" lang="en-US" sz="3200" spc="-1" strike="noStrike">
+            <a:endParaRPr b="0" lang="de-DE" sz="3200" spc="-1" strike="noStrike">
               <a:solidFill>
                 <a:srgbClr val="000000"/>
               </a:solidFill>
@@ -4118,7 +4100,7 @@
               </a:spcBef>
               <a:buNone/>
             </a:pPr>
-            <a:endParaRPr b="0" lang="en-US" sz="3200" spc="-1" strike="noStrike">
+            <a:endParaRPr b="0" lang="de-DE" sz="3200" spc="-1" strike="noStrike">
               <a:solidFill>
                 <a:srgbClr val="000000"/>
               </a:solidFill>
@@ -4161,7 +4143,7 @@
               </a:spcBef>
               <a:buNone/>
             </a:pPr>
-            <a:endParaRPr b="0" lang="en-US" sz="3200" spc="-1" strike="noStrike">
+            <a:endParaRPr b="0" lang="de-DE" sz="3200" spc="-1" strike="noStrike">
               <a:solidFill>
                 <a:srgbClr val="000000"/>
               </a:solidFill>
@@ -4223,7 +4205,7 @@
             <a:pPr indent="0" algn="ctr">
               <a:buNone/>
             </a:pPr>
-            <a:endParaRPr b="0" lang="en-US" sz="4400" spc="-1" strike="noStrike">
+            <a:endParaRPr b="0" lang="de-DE" sz="4400" spc="-1" strike="noStrike">
               <a:solidFill>
                 <a:srgbClr val="000000"/>
               </a:solidFill>
@@ -4266,7 +4248,7 @@
               </a:spcBef>
               <a:buNone/>
             </a:pPr>
-            <a:endParaRPr b="0" lang="en-US" sz="3200" spc="-1" strike="noStrike">
+            <a:endParaRPr b="0" lang="de-DE" sz="3200" spc="-1" strike="noStrike">
               <a:solidFill>
                 <a:srgbClr val="000000"/>
               </a:solidFill>
@@ -4309,7 +4291,7 @@
               </a:spcBef>
               <a:buNone/>
             </a:pPr>
-            <a:endParaRPr b="0" lang="en-US" sz="3200" spc="-1" strike="noStrike">
+            <a:endParaRPr b="0" lang="de-DE" sz="3200" spc="-1" strike="noStrike">
               <a:solidFill>
                 <a:srgbClr val="000000"/>
               </a:solidFill>
@@ -4352,7 +4334,7 @@
               </a:spcBef>
               <a:buNone/>
             </a:pPr>
-            <a:endParaRPr b="0" lang="en-US" sz="3200" spc="-1" strike="noStrike">
+            <a:endParaRPr b="0" lang="de-DE" sz="3200" spc="-1" strike="noStrike">
               <a:solidFill>
                 <a:srgbClr val="000000"/>
               </a:solidFill>
@@ -4414,7 +4396,7 @@
             <a:pPr indent="0" algn="ctr">
               <a:buNone/>
             </a:pPr>
-            <a:endParaRPr b="0" lang="en-US" sz="4400" spc="-1" strike="noStrike">
+            <a:endParaRPr b="0" lang="de-DE" sz="4400" spc="-1" strike="noStrike">
               <a:solidFill>
                 <a:srgbClr val="000000"/>
               </a:solidFill>
@@ -4457,7 +4439,7 @@
               </a:spcBef>
               <a:buNone/>
             </a:pPr>
-            <a:endParaRPr b="0" lang="en-US" sz="3200" spc="-1" strike="noStrike">
+            <a:endParaRPr b="0" lang="de-DE" sz="3200" spc="-1" strike="noStrike">
               <a:solidFill>
                 <a:srgbClr val="000000"/>
               </a:solidFill>
@@ -4500,7 +4482,7 @@
               </a:spcBef>
               <a:buNone/>
             </a:pPr>
-            <a:endParaRPr b="0" lang="en-US" sz="3200" spc="-1" strike="noStrike">
+            <a:endParaRPr b="0" lang="de-DE" sz="3200" spc="-1" strike="noStrike">
               <a:solidFill>
                 <a:srgbClr val="000000"/>
               </a:solidFill>
@@ -4543,7 +4525,7 @@
               </a:spcBef>
               <a:buNone/>
             </a:pPr>
-            <a:endParaRPr b="0" lang="en-US" sz="3200" spc="-1" strike="noStrike">
+            <a:endParaRPr b="0" lang="de-DE" sz="3200" spc="-1" strike="noStrike">
               <a:solidFill>
                 <a:srgbClr val="000000"/>
               </a:solidFill>
@@ -4590,7 +4572,7 @@
         <p:spPr>
           <a:xfrm>
             <a:off x="11444760" y="0"/>
-            <a:ext cx="741960" cy="6850800"/>
+            <a:ext cx="741600" cy="6850440"/>
           </a:xfrm>
           <a:prstGeom prst="rect">
             <a:avLst/>
@@ -4639,7 +4621,7 @@
         <p:spPr>
           <a:xfrm>
             <a:off x="11438640" y="6453360"/>
-            <a:ext cx="758880" cy="363960"/>
+            <a:ext cx="758520" cy="363960"/>
           </a:xfrm>
           <a:prstGeom prst="rect">
             <a:avLst/>
@@ -4665,7 +4647,7 @@
                 <a:spcPct val="100000"/>
               </a:lnSpc>
             </a:pPr>
-            <a:fld id="{827BEE76-0EF0-4C25-8642-8BB7D1F908A8}" type="slidenum">
+            <a:fld id="{D691880E-B8B0-4B56-BC5B-AF60B95BCDDB}" type="slidenum">
               <a:rPr b="0" lang="en-US" sz="1800" spc="-1" strike="noStrike">
                 <a:solidFill>
                   <a:srgbClr val="808080"/>
@@ -4675,7 +4657,7 @@
               </a:rPr>
               <a:t>&lt;number&gt;</a:t>
             </a:fld>
-            <a:endParaRPr b="0" lang="en-US" sz="1800" spc="-1" strike="noStrike">
+            <a:endParaRPr b="0" lang="de-DE" sz="1800" spc="-1" strike="noStrike">
               <a:solidFill>
                 <a:srgbClr val="000000"/>
               </a:solidFill>
@@ -4693,7 +4675,7 @@
         <p:spPr>
           <a:xfrm>
             <a:off x="912240" y="1268280"/>
-            <a:ext cx="9208800" cy="362160"/>
+            <a:ext cx="9208440" cy="361800"/>
           </a:xfrm>
           <a:prstGeom prst="rect">
             <a:avLst/>
@@ -4742,7 +4724,7 @@
         <p:spPr>
           <a:xfrm>
             <a:off x="0" y="0"/>
-            <a:ext cx="3052800" cy="562680"/>
+            <a:ext cx="3052440" cy="562320"/>
           </a:xfrm>
           <a:prstGeom prst="rect">
             <a:avLst/>
@@ -4765,7 +4747,7 @@
         <p:spPr>
           <a:xfrm>
             <a:off x="7430400" y="134640"/>
-            <a:ext cx="3698640" cy="514800"/>
+            <a:ext cx="3698280" cy="514440"/>
           </a:xfrm>
           <a:prstGeom prst="rect">
             <a:avLst/>
@@ -4784,7 +4766,7 @@
         <p:spPr>
           <a:xfrm>
             <a:off x="912240" y="1268280"/>
-            <a:ext cx="9208800" cy="362160"/>
+            <a:ext cx="9208440" cy="361800"/>
           </a:xfrm>
           <a:prstGeom prst="rect">
             <a:avLst/>
@@ -4829,7 +4811,7 @@
         <p:spPr>
           <a:xfrm>
             <a:off x="11444760" y="0"/>
-            <a:ext cx="741960" cy="6850800"/>
+            <a:ext cx="741600" cy="6850440"/>
           </a:xfrm>
           <a:prstGeom prst="rect">
             <a:avLst/>
@@ -4878,7 +4860,7 @@
         <p:spPr>
           <a:xfrm>
             <a:off x="0" y="6642720"/>
-            <a:ext cx="12184920" cy="211320"/>
+            <a:ext cx="12184560" cy="211320"/>
           </a:xfrm>
           <a:prstGeom prst="rect">
             <a:avLst/>
@@ -4914,7 +4896,7 @@
               </a:rPr>
               <a:t>Requirements Engineering – TU Clausthal</a:t>
             </a:r>
-            <a:endParaRPr b="0" lang="en-US" sz="800" spc="-1" strike="noStrike">
+            <a:endParaRPr b="0" lang="de-DE" sz="800" spc="-1" strike="noStrike">
               <a:solidFill>
                 <a:srgbClr val="000000"/>
               </a:solidFill>
@@ -4955,150 +4937,69 @@
               <a:buNone/>
             </a:pPr>
             <a:r>
-              <a:rPr b="0" lang="en-US" sz="4400" spc="-1" strike="noStrike">
+              <a:rPr b="0" lang="de-DE" sz="4400" spc="-1" strike="noStrike">
                 <a:solidFill>
                   <a:srgbClr val="000000"/>
                 </a:solidFill>
                 <a:latin typeface="Arial"/>
               </a:rPr>
-              <a:t>Cl</a:t>
-            </a:r>
-            <a:r>
-              <a:rPr b="0" lang="en-US" sz="4400" spc="-1" strike="noStrike">
+              <a:t>Click </a:t>
+            </a:r>
+            <a:r>
+              <a:rPr b="0" lang="de-DE" sz="4400" spc="-1" strike="noStrike">
                 <a:solidFill>
                   <a:srgbClr val="000000"/>
                 </a:solidFill>
                 <a:latin typeface="Arial"/>
               </a:rPr>
-              <a:t>ic</a:t>
-            </a:r>
-            <a:r>
-              <a:rPr b="0" lang="en-US" sz="4400" spc="-1" strike="noStrike">
+              <a:t>to edit </a:t>
+            </a:r>
+            <a:r>
+              <a:rPr b="0" lang="de-DE" sz="4400" spc="-1" strike="noStrike">
                 <a:solidFill>
                   <a:srgbClr val="000000"/>
                 </a:solidFill>
                 <a:latin typeface="Arial"/>
               </a:rPr>
-              <a:t>k </a:t>
-            </a:r>
-            <a:r>
-              <a:rPr b="0" lang="en-US" sz="4400" spc="-1" strike="noStrike">
+              <a:t>the </a:t>
+            </a:r>
+            <a:r>
+              <a:rPr b="0" lang="de-DE" sz="4400" spc="-1" strike="noStrike">
                 <a:solidFill>
                   <a:srgbClr val="000000"/>
                 </a:solidFill>
                 <a:latin typeface="Arial"/>
               </a:rPr>
-              <a:t>to </a:t>
-            </a:r>
-            <a:r>
-              <a:rPr b="0" lang="en-US" sz="4400" spc="-1" strike="noStrike">
+              <a:t>title </a:t>
+            </a:r>
+            <a:r>
+              <a:rPr b="0" lang="de-DE" sz="4400" spc="-1" strike="noStrike">
                 <a:solidFill>
                   <a:srgbClr val="000000"/>
                 </a:solidFill>
                 <a:latin typeface="Arial"/>
               </a:rPr>
-              <a:t>ed</a:t>
-            </a:r>
-            <a:r>
-              <a:rPr b="0" lang="en-US" sz="4400" spc="-1" strike="noStrike">
+              <a:t>text </a:t>
+            </a:r>
+            <a:r>
+              <a:rPr b="0" lang="de-DE" sz="4400" spc="-1" strike="noStrike">
                 <a:solidFill>
                   <a:srgbClr val="000000"/>
                 </a:solidFill>
                 <a:latin typeface="Arial"/>
               </a:rPr>
-              <a:t>it </a:t>
-            </a:r>
-            <a:r>
-              <a:rPr b="0" lang="en-US" sz="4400" spc="-1" strike="noStrike">
+              <a:t>forma</a:t>
+            </a:r>
+            <a:r>
+              <a:rPr b="0" lang="de-DE" sz="4400" spc="-1" strike="noStrike">
                 <a:solidFill>
                   <a:srgbClr val="000000"/>
                 </a:solidFill>
                 <a:latin typeface="Arial"/>
               </a:rPr>
-              <a:t>th</a:t>
-            </a:r>
-            <a:r>
-              <a:rPr b="0" lang="en-US" sz="4400" spc="-1" strike="noStrike">
-                <a:solidFill>
-                  <a:srgbClr val="000000"/>
-                </a:solidFill>
-                <a:latin typeface="Arial"/>
-              </a:rPr>
-              <a:t>e </a:t>
-            </a:r>
-            <a:r>
-              <a:rPr b="0" lang="en-US" sz="4400" spc="-1" strike="noStrike">
-                <a:solidFill>
-                  <a:srgbClr val="000000"/>
-                </a:solidFill>
-                <a:latin typeface="Arial"/>
-              </a:rPr>
-              <a:t>titl</a:t>
-            </a:r>
-            <a:r>
-              <a:rPr b="0" lang="en-US" sz="4400" spc="-1" strike="noStrike">
-                <a:solidFill>
-                  <a:srgbClr val="000000"/>
-                </a:solidFill>
-                <a:latin typeface="Arial"/>
-              </a:rPr>
-              <a:t>e </a:t>
-            </a:r>
-            <a:r>
-              <a:rPr b="0" lang="en-US" sz="4400" spc="-1" strike="noStrike">
-                <a:solidFill>
-                  <a:srgbClr val="000000"/>
-                </a:solidFill>
-                <a:latin typeface="Arial"/>
-              </a:rPr>
-              <a:t>te</a:t>
-            </a:r>
-            <a:r>
-              <a:rPr b="0" lang="en-US" sz="4400" spc="-1" strike="noStrike">
-                <a:solidFill>
-                  <a:srgbClr val="000000"/>
-                </a:solidFill>
-                <a:latin typeface="Arial"/>
-              </a:rPr>
-              <a:t>xt </a:t>
-            </a:r>
-            <a:r>
-              <a:rPr b="0" lang="en-US" sz="4400" spc="-1" strike="noStrike">
-                <a:solidFill>
-                  <a:srgbClr val="000000"/>
-                </a:solidFill>
-                <a:latin typeface="Arial"/>
-              </a:rPr>
-              <a:t>fo</a:t>
-            </a:r>
-            <a:r>
-              <a:rPr b="0" lang="en-US" sz="4400" spc="-1" strike="noStrike">
-                <a:solidFill>
-                  <a:srgbClr val="000000"/>
-                </a:solidFill>
-                <a:latin typeface="Arial"/>
-              </a:rPr>
-              <a:t>r</a:t>
-            </a:r>
-            <a:r>
-              <a:rPr b="0" lang="en-US" sz="4400" spc="-1" strike="noStrike">
-                <a:solidFill>
-                  <a:srgbClr val="000000"/>
-                </a:solidFill>
-                <a:latin typeface="Arial"/>
-              </a:rPr>
-              <a:t>m</a:t>
-            </a:r>
-            <a:r>
-              <a:rPr b="0" lang="en-US" sz="4400" spc="-1" strike="noStrike">
-                <a:solidFill>
-                  <a:srgbClr val="000000"/>
-                </a:solidFill>
-                <a:latin typeface="Arial"/>
-              </a:rPr>
-              <a:t>at</a:t>
-            </a:r>
-            <a:endParaRPr b="0" lang="en-US" sz="4400" spc="-1" strike="noStrike">
+              <a:t>t</a:t>
+            </a:r>
+            <a:endParaRPr b="0" lang="de-DE" sz="4400" spc="-1" strike="noStrike">
               <a:solidFill>
                 <a:srgbClr val="000000"/>
               </a:solidFill>
@@ -5147,7 +5048,7 @@
               <a:buChar char=""/>
             </a:pPr>
             <a:r>
-              <a:rPr b="0" lang="en-US" sz="3200" spc="-1" strike="noStrike">
+              <a:rPr b="0" lang="de-DE" sz="3200" spc="-1" strike="noStrike">
                 <a:solidFill>
                   <a:srgbClr val="000000"/>
                 </a:solidFill>
@@ -5155,7 +5056,7 @@
               </a:rPr>
               <a:t>Click to edit the outline text format</a:t>
             </a:r>
-            <a:endParaRPr b="0" lang="en-US" sz="3200" spc="-1" strike="noStrike">
+            <a:endParaRPr b="0" lang="de-DE" sz="3200" spc="-1" strike="noStrike">
               <a:solidFill>
                 <a:srgbClr val="000000"/>
               </a:solidFill>
@@ -5175,7 +5076,7 @@
               <a:buChar char=""/>
             </a:pPr>
             <a:r>
-              <a:rPr b="0" lang="en-US" sz="2800" spc="-1" strike="noStrike">
+              <a:rPr b="0" lang="de-DE" sz="2800" spc="-1" strike="noStrike">
                 <a:solidFill>
                   <a:srgbClr val="000000"/>
                 </a:solidFill>
@@ -5183,7 +5084,7 @@
               </a:rPr>
               <a:t>Second Outline Level</a:t>
             </a:r>
-            <a:endParaRPr b="0" lang="en-US" sz="2800" spc="-1" strike="noStrike">
+            <a:endParaRPr b="0" lang="de-DE" sz="2800" spc="-1" strike="noStrike">
               <a:solidFill>
                 <a:srgbClr val="000000"/>
               </a:solidFill>
@@ -5203,7 +5104,7 @@
               <a:buChar char=""/>
             </a:pPr>
             <a:r>
-              <a:rPr b="0" lang="en-US" sz="2400" spc="-1" strike="noStrike">
+              <a:rPr b="0" lang="de-DE" sz="2400" spc="-1" strike="noStrike">
                 <a:solidFill>
                   <a:srgbClr val="000000"/>
                 </a:solidFill>
@@ -5211,7 +5112,7 @@
               </a:rPr>
               <a:t>Third Outline Level</a:t>
             </a:r>
-            <a:endParaRPr b="0" lang="en-US" sz="2400" spc="-1" strike="noStrike">
+            <a:endParaRPr b="0" lang="de-DE" sz="2400" spc="-1" strike="noStrike">
               <a:solidFill>
                 <a:srgbClr val="000000"/>
               </a:solidFill>
@@ -5231,7 +5132,7 @@
               <a:buChar char=""/>
             </a:pPr>
             <a:r>
-              <a:rPr b="0" lang="en-US" sz="2000" spc="-1" strike="noStrike">
+              <a:rPr b="0" lang="de-DE" sz="2000" spc="-1" strike="noStrike">
                 <a:solidFill>
                   <a:srgbClr val="000000"/>
                 </a:solidFill>
@@ -5239,7 +5140,7 @@
               </a:rPr>
               <a:t>Fourth Outline Level</a:t>
             </a:r>
-            <a:endParaRPr b="0" lang="en-US" sz="2000" spc="-1" strike="noStrike">
+            <a:endParaRPr b="0" lang="de-DE" sz="2000" spc="-1" strike="noStrike">
               <a:solidFill>
                 <a:srgbClr val="000000"/>
               </a:solidFill>
@@ -5259,7 +5160,7 @@
               <a:buChar char=""/>
             </a:pPr>
             <a:r>
-              <a:rPr b="0" lang="en-US" sz="2000" spc="-1" strike="noStrike">
+              <a:rPr b="0" lang="de-DE" sz="2000" spc="-1" strike="noStrike">
                 <a:solidFill>
                   <a:srgbClr val="000000"/>
                 </a:solidFill>
@@ -5267,7 +5168,7 @@
               </a:rPr>
               <a:t>Fifth Outline Level</a:t>
             </a:r>
-            <a:endParaRPr b="0" lang="en-US" sz="2000" spc="-1" strike="noStrike">
+            <a:endParaRPr b="0" lang="de-DE" sz="2000" spc="-1" strike="noStrike">
               <a:solidFill>
                 <a:srgbClr val="000000"/>
               </a:solidFill>
@@ -5287,7 +5188,7 @@
               <a:buChar char=""/>
             </a:pPr>
             <a:r>
-              <a:rPr b="0" lang="en-US" sz="2000" spc="-1" strike="noStrike">
+              <a:rPr b="0" lang="de-DE" sz="2000" spc="-1" strike="noStrike">
                 <a:solidFill>
                   <a:srgbClr val="000000"/>
                 </a:solidFill>
@@ -5295,7 +5196,7 @@
               </a:rPr>
               <a:t>Sixth Outline Level</a:t>
             </a:r>
-            <a:endParaRPr b="0" lang="en-US" sz="2000" spc="-1" strike="noStrike">
+            <a:endParaRPr b="0" lang="de-DE" sz="2000" spc="-1" strike="noStrike">
               <a:solidFill>
                 <a:srgbClr val="000000"/>
               </a:solidFill>
@@ -5315,7 +5216,7 @@
               <a:buChar char=""/>
             </a:pPr>
             <a:r>
-              <a:rPr b="0" lang="en-US" sz="2000" spc="-1" strike="noStrike">
+              <a:rPr b="0" lang="de-DE" sz="2000" spc="-1" strike="noStrike">
                 <a:solidFill>
                   <a:srgbClr val="000000"/>
                 </a:solidFill>
@@ -5323,7 +5224,7 @@
               </a:rPr>
               <a:t>Seventh Outline Level</a:t>
             </a:r>
-            <a:endParaRPr b="0" lang="en-US" sz="2000" spc="-1" strike="noStrike">
+            <a:endParaRPr b="0" lang="de-DE" sz="2000" spc="-1" strike="noStrike">
               <a:solidFill>
                 <a:srgbClr val="000000"/>
               </a:solidFill>
@@ -5385,7 +5286,7 @@
         <p:spPr>
           <a:xfrm>
             <a:off x="11444760" y="0"/>
-            <a:ext cx="741960" cy="6850800"/>
+            <a:ext cx="741600" cy="6850440"/>
           </a:xfrm>
           <a:prstGeom prst="rect">
             <a:avLst/>
@@ -5434,7 +5335,7 @@
         <p:spPr>
           <a:xfrm>
             <a:off x="11438640" y="6453360"/>
-            <a:ext cx="758880" cy="363960"/>
+            <a:ext cx="758520" cy="363960"/>
           </a:xfrm>
           <a:prstGeom prst="rect">
             <a:avLst/>
@@ -5460,7 +5361,7 @@
                 <a:spcPct val="100000"/>
               </a:lnSpc>
             </a:pPr>
-            <a:fld id="{17A7646B-1AD2-4E8B-9B7F-8343B04FAA55}" type="slidenum">
+            <a:fld id="{712EAAFC-0D71-4A1F-976E-8ECCBBC4BA24}" type="slidenum">
               <a:rPr b="0" lang="en-US" sz="1800" spc="-1" strike="noStrike">
                 <a:solidFill>
                   <a:srgbClr val="808080"/>
@@ -5470,7 +5371,7 @@
               </a:rPr>
               <a:t>&lt;number&gt;</a:t>
             </a:fld>
-            <a:endParaRPr b="0" lang="en-US" sz="1800" spc="-1" strike="noStrike">
+            <a:endParaRPr b="0" lang="de-DE" sz="1800" spc="-1" strike="noStrike">
               <a:solidFill>
                 <a:srgbClr val="000000"/>
               </a:solidFill>
@@ -5488,7 +5389,7 @@
         <p:spPr>
           <a:xfrm>
             <a:off x="912240" y="1268280"/>
-            <a:ext cx="9208800" cy="362160"/>
+            <a:ext cx="9208440" cy="361800"/>
           </a:xfrm>
           <a:prstGeom prst="rect">
             <a:avLst/>
@@ -5537,7 +5438,7 @@
         <p:spPr>
           <a:xfrm>
             <a:off x="0" y="0"/>
-            <a:ext cx="3052800" cy="562680"/>
+            <a:ext cx="3052440" cy="562320"/>
           </a:xfrm>
           <a:prstGeom prst="rect">
             <a:avLst/>
@@ -5560,7 +5461,7 @@
         <p:spPr>
           <a:xfrm>
             <a:off x="7430400" y="134640"/>
-            <a:ext cx="3698640" cy="514800"/>
+            <a:ext cx="3698280" cy="514440"/>
           </a:xfrm>
           <a:prstGeom prst="rect">
             <a:avLst/>
@@ -5579,7 +5480,7 @@
         <p:spPr>
           <a:xfrm>
             <a:off x="11444760" y="0"/>
-            <a:ext cx="741960" cy="6850800"/>
+            <a:ext cx="741600" cy="6850440"/>
           </a:xfrm>
           <a:prstGeom prst="rect">
             <a:avLst/>
@@ -5628,7 +5529,7 @@
         <p:spPr>
           <a:xfrm>
             <a:off x="11438640" y="6453360"/>
-            <a:ext cx="758880" cy="363960"/>
+            <a:ext cx="758520" cy="363960"/>
           </a:xfrm>
           <a:prstGeom prst="rect">
             <a:avLst/>
@@ -5654,7 +5555,7 @@
                 <a:spcPct val="100000"/>
               </a:lnSpc>
             </a:pPr>
-            <a:fld id="{0E53E27F-509A-43FD-9930-027BBEBA8FB3}" type="slidenum">
+            <a:fld id="{36EDBD58-F24F-45BB-8934-A822D99AB252}" type="slidenum">
               <a:rPr b="0" lang="en-US" sz="1800" spc="-1" strike="noStrike">
                 <a:solidFill>
                   <a:srgbClr val="808080"/>
@@ -5664,7 +5565,7 @@
               </a:rPr>
               <a:t>&lt;number&gt;</a:t>
             </a:fld>
-            <a:endParaRPr b="0" lang="en-US" sz="1800" spc="-1" strike="noStrike">
+            <a:endParaRPr b="0" lang="de-DE" sz="1800" spc="-1" strike="noStrike">
               <a:solidFill>
                 <a:srgbClr val="000000"/>
               </a:solidFill>
@@ -5682,7 +5583,7 @@
         <p:spPr>
           <a:xfrm>
             <a:off x="0" y="6642720"/>
-            <a:ext cx="12184920" cy="211320"/>
+            <a:ext cx="12184560" cy="211320"/>
           </a:xfrm>
           <a:prstGeom prst="rect">
             <a:avLst/>
@@ -5718,7 +5619,7 @@
               </a:rPr>
               <a:t>Requirements Engineering – TU Clausthal</a:t>
             </a:r>
-            <a:endParaRPr b="0" lang="en-US" sz="800" spc="-1" strike="noStrike">
+            <a:endParaRPr b="0" lang="de-DE" sz="800" spc="-1" strike="noStrike">
               <a:solidFill>
                 <a:srgbClr val="000000"/>
               </a:solidFill>
@@ -5759,150 +5660,69 @@
               <a:buNone/>
             </a:pPr>
             <a:r>
-              <a:rPr b="0" lang="en-US" sz="4400" spc="-1" strike="noStrike">
+              <a:rPr b="0" lang="de-DE" sz="4400" spc="-1" strike="noStrike">
                 <a:solidFill>
                   <a:srgbClr val="000000"/>
                 </a:solidFill>
                 <a:latin typeface="Arial"/>
               </a:rPr>
-              <a:t>Cl</a:t>
-            </a:r>
-            <a:r>
-              <a:rPr b="0" lang="en-US" sz="4400" spc="-1" strike="noStrike">
+              <a:t>Click </a:t>
+            </a:r>
+            <a:r>
+              <a:rPr b="0" lang="de-DE" sz="4400" spc="-1" strike="noStrike">
                 <a:solidFill>
                   <a:srgbClr val="000000"/>
                 </a:solidFill>
                 <a:latin typeface="Arial"/>
               </a:rPr>
-              <a:t>ic</a:t>
-            </a:r>
-            <a:r>
-              <a:rPr b="0" lang="en-US" sz="4400" spc="-1" strike="noStrike">
+              <a:t>to edit </a:t>
+            </a:r>
+            <a:r>
+              <a:rPr b="0" lang="de-DE" sz="4400" spc="-1" strike="noStrike">
                 <a:solidFill>
                   <a:srgbClr val="000000"/>
                 </a:solidFill>
                 <a:latin typeface="Arial"/>
               </a:rPr>
-              <a:t>k </a:t>
-            </a:r>
-            <a:r>
-              <a:rPr b="0" lang="en-US" sz="4400" spc="-1" strike="noStrike">
+              <a:t>the </a:t>
+            </a:r>
+            <a:r>
+              <a:rPr b="0" lang="de-DE" sz="4400" spc="-1" strike="noStrike">
                 <a:solidFill>
                   <a:srgbClr val="000000"/>
                 </a:solidFill>
                 <a:latin typeface="Arial"/>
               </a:rPr>
-              <a:t>to </a:t>
-            </a:r>
-            <a:r>
-              <a:rPr b="0" lang="en-US" sz="4400" spc="-1" strike="noStrike">
+              <a:t>title </a:t>
+            </a:r>
+            <a:r>
+              <a:rPr b="0" lang="de-DE" sz="4400" spc="-1" strike="noStrike">
                 <a:solidFill>
                   <a:srgbClr val="000000"/>
                 </a:solidFill>
                 <a:latin typeface="Arial"/>
               </a:rPr>
-              <a:t>ed</a:t>
-            </a:r>
-            <a:r>
-              <a:rPr b="0" lang="en-US" sz="4400" spc="-1" strike="noStrike">
+              <a:t>text </a:t>
+            </a:r>
+            <a:r>
+              <a:rPr b="0" lang="de-DE" sz="4400" spc="-1" strike="noStrike">
                 <a:solidFill>
                   <a:srgbClr val="000000"/>
                 </a:solidFill>
                 <a:latin typeface="Arial"/>
               </a:rPr>
-              <a:t>it </a:t>
-            </a:r>
-            <a:r>
-              <a:rPr b="0" lang="en-US" sz="4400" spc="-1" strike="noStrike">
+              <a:t>forma</a:t>
+            </a:r>
+            <a:r>
+              <a:rPr b="0" lang="de-DE" sz="4400" spc="-1" strike="noStrike">
                 <a:solidFill>
                   <a:srgbClr val="000000"/>
                 </a:solidFill>
                 <a:latin typeface="Arial"/>
               </a:rPr>
-              <a:t>th</a:t>
-            </a:r>
-            <a:r>
-              <a:rPr b="0" lang="en-US" sz="4400" spc="-1" strike="noStrike">
-                <a:solidFill>
-                  <a:srgbClr val="000000"/>
-                </a:solidFill>
-                <a:latin typeface="Arial"/>
-              </a:rPr>
-              <a:t>e </a:t>
-            </a:r>
-            <a:r>
-              <a:rPr b="0" lang="en-US" sz="4400" spc="-1" strike="noStrike">
-                <a:solidFill>
-                  <a:srgbClr val="000000"/>
-                </a:solidFill>
-                <a:latin typeface="Arial"/>
-              </a:rPr>
-              <a:t>titl</a:t>
-            </a:r>
-            <a:r>
-              <a:rPr b="0" lang="en-US" sz="4400" spc="-1" strike="noStrike">
-                <a:solidFill>
-                  <a:srgbClr val="000000"/>
-                </a:solidFill>
-                <a:latin typeface="Arial"/>
-              </a:rPr>
-              <a:t>e </a:t>
-            </a:r>
-            <a:r>
-              <a:rPr b="0" lang="en-US" sz="4400" spc="-1" strike="noStrike">
-                <a:solidFill>
-                  <a:srgbClr val="000000"/>
-                </a:solidFill>
-                <a:latin typeface="Arial"/>
-              </a:rPr>
-              <a:t>te</a:t>
-            </a:r>
-            <a:r>
-              <a:rPr b="0" lang="en-US" sz="4400" spc="-1" strike="noStrike">
-                <a:solidFill>
-                  <a:srgbClr val="000000"/>
-                </a:solidFill>
-                <a:latin typeface="Arial"/>
-              </a:rPr>
-              <a:t>xt </a:t>
-            </a:r>
-            <a:r>
-              <a:rPr b="0" lang="en-US" sz="4400" spc="-1" strike="noStrike">
-                <a:solidFill>
-                  <a:srgbClr val="000000"/>
-                </a:solidFill>
-                <a:latin typeface="Arial"/>
-              </a:rPr>
-              <a:t>fo</a:t>
-            </a:r>
-            <a:r>
-              <a:rPr b="0" lang="en-US" sz="4400" spc="-1" strike="noStrike">
-                <a:solidFill>
-                  <a:srgbClr val="000000"/>
-                </a:solidFill>
-                <a:latin typeface="Arial"/>
-              </a:rPr>
-              <a:t>r</a:t>
-            </a:r>
-            <a:r>
-              <a:rPr b="0" lang="en-US" sz="4400" spc="-1" strike="noStrike">
-                <a:solidFill>
-                  <a:srgbClr val="000000"/>
-                </a:solidFill>
-                <a:latin typeface="Arial"/>
-              </a:rPr>
-              <a:t>m</a:t>
-            </a:r>
-            <a:r>
-              <a:rPr b="0" lang="en-US" sz="4400" spc="-1" strike="noStrike">
-                <a:solidFill>
-                  <a:srgbClr val="000000"/>
-                </a:solidFill>
-                <a:latin typeface="Arial"/>
-              </a:rPr>
-              <a:t>at</a:t>
-            </a:r>
-            <a:endParaRPr b="0" lang="en-US" sz="4400" spc="-1" strike="noStrike">
+              <a:t>t</a:t>
+            </a:r>
+            <a:endParaRPr b="0" lang="de-DE" sz="4400" spc="-1" strike="noStrike">
               <a:solidFill>
                 <a:srgbClr val="000000"/>
               </a:solidFill>
@@ -5951,7 +5771,7 @@
               <a:buChar char=""/>
             </a:pPr>
             <a:r>
-              <a:rPr b="0" lang="en-US" sz="3200" spc="-1" strike="noStrike">
+              <a:rPr b="0" lang="de-DE" sz="3200" spc="-1" strike="noStrike">
                 <a:solidFill>
                   <a:srgbClr val="000000"/>
                 </a:solidFill>
@@ -5959,7 +5779,7 @@
               </a:rPr>
               <a:t>Click to edit the outline text format</a:t>
             </a:r>
-            <a:endParaRPr b="0" lang="en-US" sz="3200" spc="-1" strike="noStrike">
+            <a:endParaRPr b="0" lang="de-DE" sz="3200" spc="-1" strike="noStrike">
               <a:solidFill>
                 <a:srgbClr val="000000"/>
               </a:solidFill>
@@ -5979,7 +5799,7 @@
               <a:buChar char=""/>
             </a:pPr>
             <a:r>
-              <a:rPr b="0" lang="en-US" sz="2800" spc="-1" strike="noStrike">
+              <a:rPr b="0" lang="de-DE" sz="2800" spc="-1" strike="noStrike">
                 <a:solidFill>
                   <a:srgbClr val="000000"/>
                 </a:solidFill>
@@ -5987,7 +5807,7 @@
               </a:rPr>
               <a:t>Second Outline Level</a:t>
             </a:r>
-            <a:endParaRPr b="0" lang="en-US" sz="2800" spc="-1" strike="noStrike">
+            <a:endParaRPr b="0" lang="de-DE" sz="2800" spc="-1" strike="noStrike">
               <a:solidFill>
                 <a:srgbClr val="000000"/>
               </a:solidFill>
@@ -6007,7 +5827,7 @@
               <a:buChar char=""/>
             </a:pPr>
             <a:r>
-              <a:rPr b="0" lang="en-US" sz="2400" spc="-1" strike="noStrike">
+              <a:rPr b="0" lang="de-DE" sz="2400" spc="-1" strike="noStrike">
                 <a:solidFill>
                   <a:srgbClr val="000000"/>
                 </a:solidFill>
@@ -6015,7 +5835,7 @@
               </a:rPr>
               <a:t>Third Outline Level</a:t>
             </a:r>
-            <a:endParaRPr b="0" lang="en-US" sz="2400" spc="-1" strike="noStrike">
+            <a:endParaRPr b="0" lang="de-DE" sz="2400" spc="-1" strike="noStrike">
               <a:solidFill>
                 <a:srgbClr val="000000"/>
               </a:solidFill>
@@ -6035,7 +5855,7 @@
               <a:buChar char=""/>
             </a:pPr>
             <a:r>
-              <a:rPr b="0" lang="en-US" sz="2000" spc="-1" strike="noStrike">
+              <a:rPr b="0" lang="de-DE" sz="2000" spc="-1" strike="noStrike">
                 <a:solidFill>
                   <a:srgbClr val="000000"/>
                 </a:solidFill>
@@ -6043,7 +5863,7 @@
               </a:rPr>
               <a:t>Fourth Outline Level</a:t>
             </a:r>
-            <a:endParaRPr b="0" lang="en-US" sz="2000" spc="-1" strike="noStrike">
+            <a:endParaRPr b="0" lang="de-DE" sz="2000" spc="-1" strike="noStrike">
               <a:solidFill>
                 <a:srgbClr val="000000"/>
               </a:solidFill>
@@ -6063,7 +5883,7 @@
               <a:buChar char=""/>
             </a:pPr>
             <a:r>
-              <a:rPr b="0" lang="en-US" sz="2000" spc="-1" strike="noStrike">
+              <a:rPr b="0" lang="de-DE" sz="2000" spc="-1" strike="noStrike">
                 <a:solidFill>
                   <a:srgbClr val="000000"/>
                 </a:solidFill>
@@ -6071,7 +5891,7 @@
               </a:rPr>
               <a:t>Fifth Outline Level</a:t>
             </a:r>
-            <a:endParaRPr b="0" lang="en-US" sz="2000" spc="-1" strike="noStrike">
+            <a:endParaRPr b="0" lang="de-DE" sz="2000" spc="-1" strike="noStrike">
               <a:solidFill>
                 <a:srgbClr val="000000"/>
               </a:solidFill>
@@ -6091,7 +5911,7 @@
               <a:buChar char=""/>
             </a:pPr>
             <a:r>
-              <a:rPr b="0" lang="en-US" sz="2000" spc="-1" strike="noStrike">
+              <a:rPr b="0" lang="de-DE" sz="2000" spc="-1" strike="noStrike">
                 <a:solidFill>
                   <a:srgbClr val="000000"/>
                 </a:solidFill>
@@ -6099,7 +5919,7 @@
               </a:rPr>
               <a:t>Sixth Outline Level</a:t>
             </a:r>
-            <a:endParaRPr b="0" lang="en-US" sz="2000" spc="-1" strike="noStrike">
+            <a:endParaRPr b="0" lang="de-DE" sz="2000" spc="-1" strike="noStrike">
               <a:solidFill>
                 <a:srgbClr val="000000"/>
               </a:solidFill>
@@ -6119,7 +5939,7 @@
               <a:buChar char=""/>
             </a:pPr>
             <a:r>
-              <a:rPr b="0" lang="en-US" sz="2000" spc="-1" strike="noStrike">
+              <a:rPr b="0" lang="de-DE" sz="2000" spc="-1" strike="noStrike">
                 <a:solidFill>
                   <a:srgbClr val="000000"/>
                 </a:solidFill>
@@ -6127,7 +5947,7 @@
               </a:rPr>
               <a:t>Seventh Outline Level</a:t>
             </a:r>
-            <a:endParaRPr b="0" lang="en-US" sz="2000" spc="-1" strike="noStrike">
+            <a:endParaRPr b="0" lang="de-DE" sz="2000" spc="-1" strike="noStrike">
               <a:solidFill>
                 <a:srgbClr val="000000"/>
               </a:solidFill>
@@ -6182,7 +6002,7 @@
         <p:spPr>
           <a:xfrm>
             <a:off x="527400" y="1412640"/>
-            <a:ext cx="10361880" cy="1148400"/>
+            <a:ext cx="10361520" cy="1148040"/>
           </a:xfrm>
           <a:prstGeom prst="rect">
             <a:avLst/>
@@ -6218,7 +6038,7 @@
               </a:rPr>
               <a:t>Requirement Engineering</a:t>
             </a:r>
-            <a:endParaRPr b="0" lang="en-US" sz="3200" spc="-1" strike="noStrike">
+            <a:endParaRPr b="0" lang="de-DE" sz="3200" spc="-1" strike="noStrike">
               <a:solidFill>
                 <a:srgbClr val="000000"/>
               </a:solidFill>
@@ -6236,7 +6056,7 @@
         <p:spPr>
           <a:xfrm>
             <a:off x="527400" y="2852640"/>
-            <a:ext cx="10361880" cy="2369160"/>
+            <a:ext cx="10361520" cy="2368800"/>
           </a:xfrm>
           <a:prstGeom prst="rect">
             <a:avLst/>
@@ -6278,7 +6098,7 @@
               </a:rPr>
               <a:t>Lecture 0: Organization</a:t>
             </a:r>
-            <a:endParaRPr b="0" lang="en-US" sz="2400" spc="-1" strike="noStrike">
+            <a:endParaRPr b="0" lang="de-DE" sz="2400" spc="-1" strike="noStrike">
               <a:solidFill>
                 <a:srgbClr val="000000"/>
               </a:solidFill>
@@ -6297,7 +6117,7 @@
                 <a:tab algn="l" pos="0"/>
               </a:tabLst>
             </a:pPr>
-            <a:endParaRPr b="0" lang="en-US" sz="2400" spc="-1" strike="noStrike">
+            <a:endParaRPr b="0" lang="de-DE" sz="2400" spc="-1" strike="noStrike">
               <a:solidFill>
                 <a:srgbClr val="000000"/>
               </a:solidFill>
@@ -6316,7 +6136,7 @@
                 <a:tab algn="l" pos="0"/>
               </a:tabLst>
             </a:pPr>
-            <a:endParaRPr b="0" lang="en-US" sz="2400" spc="-1" strike="noStrike">
+            <a:endParaRPr b="0" lang="de-DE" sz="2400" spc="-1" strike="noStrike">
               <a:solidFill>
                 <a:srgbClr val="000000"/>
               </a:solidFill>
@@ -6335,7 +6155,7 @@
                 <a:tab algn="l" pos="0"/>
               </a:tabLst>
             </a:pPr>
-            <a:endParaRPr b="0" lang="en-US" sz="2400" spc="-1" strike="noStrike">
+            <a:endParaRPr b="0" lang="de-DE" sz="2400" spc="-1" strike="noStrike">
               <a:solidFill>
                 <a:srgbClr val="000000"/>
               </a:solidFill>
@@ -6364,7 +6184,7 @@
               </a:rPr>
               <a:t>Prof. Dr. Benjamin Leiding</a:t>
             </a:r>
-            <a:endParaRPr b="0" lang="en-US" sz="1600" spc="-1" strike="noStrike">
+            <a:endParaRPr b="0" lang="de-DE" sz="1600" spc="-1" strike="noStrike">
               <a:solidFill>
                 <a:srgbClr val="000000"/>
               </a:solidFill>
@@ -6393,7 +6213,7 @@
               </a:rPr>
               <a:t>M.Sc. Anant Sujatanagarjuna</a:t>
             </a:r>
-            <a:endParaRPr b="0" lang="en-US" sz="1600" spc="-1" strike="noStrike">
+            <a:endParaRPr b="0" lang="de-DE" sz="1600" spc="-1" strike="noStrike">
               <a:solidFill>
                 <a:srgbClr val="000000"/>
               </a:solidFill>
@@ -6441,7 +6261,7 @@
         <p:spPr>
           <a:xfrm>
             <a:off x="539640" y="764640"/>
-            <a:ext cx="10746000" cy="496800"/>
+            <a:ext cx="10745640" cy="496440"/>
           </a:xfrm>
           <a:prstGeom prst="rect">
             <a:avLst/>
@@ -6477,7 +6297,7 @@
               </a:rPr>
               <a:t>Exercises</a:t>
             </a:r>
-            <a:endParaRPr b="0" lang="en-US" sz="2400" spc="-1" strike="noStrike">
+            <a:endParaRPr b="0" lang="de-DE" sz="2400" spc="-1" strike="noStrike">
               <a:solidFill>
                 <a:srgbClr val="000000"/>
               </a:solidFill>
@@ -6526,7 +6346,7 @@
                         </a:rPr>
                         <a:t>Publication Date</a:t>
                       </a:r>
-                      <a:endParaRPr b="0" lang="en-US" sz="1500" spc="-1" strike="noStrike">
+                      <a:endParaRPr b="0" lang="de-DE" sz="1500" spc="-1" strike="noStrike">
                         <a:solidFill>
                           <a:srgbClr val="000000"/>
                         </a:solidFill>
@@ -6584,7 +6404,7 @@
                         </a:rPr>
                         <a:t>Submission Deadline</a:t>
                       </a:r>
-                      <a:endParaRPr b="0" lang="en-US" sz="1500" spc="-1" strike="noStrike">
+                      <a:endParaRPr b="0" lang="de-DE" sz="1500" spc="-1" strike="noStrike">
                         <a:solidFill>
                           <a:srgbClr val="000000"/>
                         </a:solidFill>
@@ -6643,7 +6463,7 @@
                         </a:rPr>
                         <a:t>Exercise</a:t>
                       </a:r>
-                      <a:endParaRPr b="0" lang="en-US" sz="1500" spc="-1" strike="noStrike">
+                      <a:endParaRPr b="0" lang="de-DE" sz="1500" spc="-1" strike="noStrike">
                         <a:solidFill>
                           <a:srgbClr val="000000"/>
                         </a:solidFill>
@@ -6703,7 +6523,7 @@
                         </a:rPr>
                         <a:t>13.11.2023</a:t>
                       </a:r>
-                      <a:endParaRPr b="0" lang="en-US" sz="1500" spc="-1" strike="noStrike">
+                      <a:endParaRPr b="0" lang="de-DE" sz="1500" spc="-1" strike="noStrike">
                         <a:solidFill>
                           <a:srgbClr val="000000"/>
                         </a:solidFill>
@@ -6761,7 +6581,7 @@
                         </a:rPr>
                         <a:t>20.11.2023</a:t>
                       </a:r>
-                      <a:endParaRPr b="0" lang="en-US" sz="1500" spc="-1" strike="noStrike">
+                      <a:endParaRPr b="0" lang="de-DE" sz="1500" spc="-1" strike="noStrike">
                         <a:solidFill>
                           <a:srgbClr val="000000"/>
                         </a:solidFill>
@@ -6820,7 +6640,7 @@
                         </a:rPr>
                         <a:t>E01 – Knowledge Test (MC)</a:t>
                       </a:r>
-                      <a:endParaRPr b="0" lang="en-US" sz="1500" spc="-1" strike="noStrike">
+                      <a:endParaRPr b="0" lang="de-DE" sz="1500" spc="-1" strike="noStrike">
                         <a:solidFill>
                           <a:srgbClr val="000000"/>
                         </a:solidFill>
@@ -6880,7 +6700,7 @@
                         </a:rPr>
                         <a:t>27.11.2023</a:t>
                       </a:r>
-                      <a:endParaRPr b="0" lang="en-US" sz="1500" spc="-1" strike="noStrike">
+                      <a:endParaRPr b="0" lang="de-DE" sz="1500" spc="-1" strike="noStrike">
                         <a:solidFill>
                           <a:srgbClr val="000000"/>
                         </a:solidFill>
@@ -6938,7 +6758,7 @@
                         </a:rPr>
                         <a:t>04.12.2023</a:t>
                       </a:r>
-                      <a:endParaRPr b="0" lang="en-US" sz="1500" spc="-1" strike="noStrike">
+                      <a:endParaRPr b="0" lang="de-DE" sz="1500" spc="-1" strike="noStrike">
                         <a:solidFill>
                           <a:srgbClr val="000000"/>
                         </a:solidFill>
@@ -6997,7 +6817,7 @@
                         </a:rPr>
                         <a:t>E02 – Elicitation I, E03 – Elicitation II</a:t>
                       </a:r>
-                      <a:endParaRPr b="0" lang="en-US" sz="1500" spc="-1" strike="noStrike">
+                      <a:endParaRPr b="0" lang="de-DE" sz="1500" spc="-1" strike="noStrike">
                         <a:solidFill>
                           <a:srgbClr val="000000"/>
                         </a:solidFill>
@@ -7057,7 +6877,7 @@
                         </a:rPr>
                         <a:t>18.12.2023</a:t>
                       </a:r>
-                      <a:endParaRPr b="0" lang="en-US" sz="1500" spc="-1" strike="noStrike">
+                      <a:endParaRPr b="0" lang="de-DE" sz="1500" spc="-1" strike="noStrike">
                         <a:solidFill>
                           <a:srgbClr val="000000"/>
                         </a:solidFill>
@@ -7115,7 +6935,7 @@
                         </a:rPr>
                         <a:t>08.01.2024</a:t>
                       </a:r>
-                      <a:endParaRPr b="0" lang="en-US" sz="1500" spc="-1" strike="noStrike">
+                      <a:endParaRPr b="0" lang="de-DE" sz="1500" spc="-1" strike="noStrike">
                         <a:solidFill>
                           <a:srgbClr val="000000"/>
                         </a:solidFill>
@@ -7174,7 +6994,7 @@
                         </a:rPr>
                         <a:t>E04 – Agent-Oriented Modeling</a:t>
                       </a:r>
-                      <a:endParaRPr b="0" lang="en-US" sz="1500" spc="-1" strike="noStrike">
+                      <a:endParaRPr b="0" lang="de-DE" sz="1500" spc="-1" strike="noStrike">
                         <a:solidFill>
                           <a:srgbClr val="000000"/>
                         </a:solidFill>
@@ -7234,7 +7054,7 @@
                         </a:rPr>
                         <a:t>08.01.2024</a:t>
                       </a:r>
-                      <a:endParaRPr b="0" lang="en-US" sz="1500" spc="-1" strike="noStrike">
+                      <a:endParaRPr b="0" lang="de-DE" sz="1500" spc="-1" strike="noStrike">
                         <a:solidFill>
                           <a:srgbClr val="000000"/>
                         </a:solidFill>
@@ -7292,7 +7112,7 @@
                         </a:rPr>
                         <a:t>22.01.2024</a:t>
                       </a:r>
-                      <a:endParaRPr b="0" lang="en-US" sz="1500" spc="-1" strike="noStrike">
+                      <a:endParaRPr b="0" lang="de-DE" sz="1500" spc="-1" strike="noStrike">
                         <a:solidFill>
                           <a:srgbClr val="000000"/>
                         </a:solidFill>
@@ -7351,7 +7171,7 @@
                         </a:rPr>
                         <a:t>E05 – CPN I, E06 – CPN II</a:t>
                       </a:r>
-                      <a:endParaRPr b="0" lang="en-US" sz="1500" spc="-1" strike="noStrike">
+                      <a:endParaRPr b="0" lang="de-DE" sz="1500" spc="-1" strike="noStrike">
                         <a:solidFill>
                           <a:srgbClr val="000000"/>
                         </a:solidFill>
@@ -7411,7 +7231,7 @@
                         </a:rPr>
                         <a:t>22.01.2024</a:t>
                       </a:r>
-                      <a:endParaRPr b="0" lang="en-US" sz="1500" spc="-1" strike="noStrike">
+                      <a:endParaRPr b="0" lang="de-DE" sz="1500" spc="-1" strike="noStrike">
                         <a:solidFill>
                           <a:srgbClr val="000000"/>
                         </a:solidFill>
@@ -7469,7 +7289,7 @@
                         </a:rPr>
                         <a:t>29.01.2024</a:t>
                       </a:r>
-                      <a:endParaRPr b="0" lang="en-US" sz="1500" spc="-1" strike="noStrike">
+                      <a:endParaRPr b="0" lang="de-DE" sz="1500" spc="-1" strike="noStrike">
                         <a:solidFill>
                           <a:srgbClr val="000000"/>
                         </a:solidFill>
@@ -7528,7 +7348,7 @@
                         </a:rPr>
                         <a:t>E07 – Management</a:t>
                       </a:r>
-                      <a:endParaRPr b="0" lang="en-US" sz="1500" spc="-1" strike="noStrike">
+                      <a:endParaRPr b="0" lang="de-DE" sz="1500" spc="-1" strike="noStrike">
                         <a:solidFill>
                           <a:srgbClr val="000000"/>
                         </a:solidFill>
@@ -7588,7 +7408,7 @@
                         </a:rPr>
                         <a:t>29.01.2024</a:t>
                       </a:r>
-                      <a:endParaRPr b="0" lang="en-US" sz="1500" spc="-1" strike="noStrike">
+                      <a:endParaRPr b="0" lang="de-DE" sz="1500" spc="-1" strike="noStrike">
                         <a:solidFill>
                           <a:srgbClr val="000000"/>
                         </a:solidFill>
@@ -7644,7 +7464,7 @@
                         </a:rPr>
                         <a:t>05.02.2024</a:t>
                       </a:r>
-                      <a:endParaRPr b="0" lang="en-US" sz="1500" spc="-1" strike="noStrike">
+                      <a:endParaRPr b="0" lang="de-DE" sz="1500" spc="-1" strike="noStrike">
                         <a:solidFill>
                           <a:srgbClr val="000000"/>
                         </a:solidFill>
@@ -7701,7 +7521,7 @@
                         </a:rPr>
                         <a:t>E08 – Traceability</a:t>
                       </a:r>
-                      <a:endParaRPr b="0" lang="en-US" sz="1500" spc="-1" strike="noStrike">
+                      <a:endParaRPr b="0" lang="de-DE" sz="1500" spc="-1" strike="noStrike">
                         <a:solidFill>
                           <a:srgbClr val="000000"/>
                         </a:solidFill>
@@ -7759,7 +7579,7 @@
                         </a:rPr>
                         <a:t>04.12.2023</a:t>
                       </a:r>
-                      <a:endParaRPr b="0" lang="en-US" sz="1500" spc="-1" strike="noStrike">
+                      <a:endParaRPr b="0" lang="de-DE" sz="1500" spc="-1" strike="noStrike">
                         <a:solidFill>
                           <a:srgbClr val="000000"/>
                         </a:solidFill>
@@ -7817,7 +7637,7 @@
                         </a:rPr>
                         <a:t>15.01.2024</a:t>
                       </a:r>
-                      <a:endParaRPr b="0" lang="en-US" sz="1500" spc="-1" strike="noStrike">
+                      <a:endParaRPr b="0" lang="de-DE" sz="1500" spc="-1" strike="noStrike">
                         <a:solidFill>
                           <a:srgbClr val="000000"/>
                         </a:solidFill>
@@ -7876,7 +7696,7 @@
                         </a:rPr>
                         <a:t>EXX – Bonus Task (Not-Mandatory)</a:t>
                       </a:r>
-                      <a:endParaRPr b="0" lang="en-US" sz="1500" spc="-1" strike="noStrike">
+                      <a:endParaRPr b="0" lang="de-DE" sz="1500" spc="-1" strike="noStrike">
                         <a:solidFill>
                           <a:srgbClr val="000000"/>
                         </a:solidFill>
@@ -7958,7 +7778,7 @@
         <p:spPr>
           <a:xfrm>
             <a:off x="539640" y="764640"/>
-            <a:ext cx="10739160" cy="489960"/>
+            <a:ext cx="10738800" cy="489600"/>
           </a:xfrm>
           <a:prstGeom prst="rect">
             <a:avLst/>
@@ -7994,7 +7814,7 @@
               </a:rPr>
               <a:t>Course Organization</a:t>
             </a:r>
-            <a:endParaRPr b="0" lang="en-US" sz="2400" spc="-1" strike="noStrike">
+            <a:endParaRPr b="0" lang="de-DE" sz="2400" spc="-1" strike="noStrike">
               <a:solidFill>
                 <a:srgbClr val="000000"/>
               </a:solidFill>
@@ -8012,7 +7832,7 @@
         <p:spPr>
           <a:xfrm>
             <a:off x="539640" y="1268280"/>
-            <a:ext cx="10739160" cy="5026680"/>
+            <a:ext cx="10738800" cy="5026320"/>
           </a:xfrm>
           <a:prstGeom prst="rect">
             <a:avLst/>
@@ -8041,7 +7861,7 @@
                 <a:spcPts val="360"/>
               </a:spcBef>
             </a:pPr>
-            <a:endParaRPr b="0" lang="en-US" sz="1800" spc="-1" strike="noStrike">
+            <a:endParaRPr b="0" lang="de-DE" sz="1800" spc="-1" strike="noStrike">
               <a:solidFill>
                 <a:srgbClr val="000000"/>
               </a:solidFill>
@@ -8073,7 +7893,7 @@
               </a:rPr>
               <a:t>Organization of the lecture:</a:t>
             </a:r>
-            <a:endParaRPr b="0" lang="en-US" sz="1800" spc="-1" strike="noStrike">
+            <a:endParaRPr b="0" lang="de-DE" sz="1800" spc="-1" strike="noStrike">
               <a:solidFill>
                 <a:srgbClr val="000000"/>
               </a:solidFill>
@@ -8117,7 +7937,7 @@
               </a:rPr>
               <a:t>re.etce-lab.de</a:t>
             </a:r>
-            <a:endParaRPr b="0" lang="en-US" sz="1800" spc="-1" strike="noStrike">
+            <a:endParaRPr b="0" lang="de-DE" sz="1800" spc="-1" strike="noStrike">
               <a:solidFill>
                 <a:srgbClr val="000000"/>
               </a:solidFill>
@@ -8149,7 +7969,7 @@
               </a:rPr>
               <a:t>Course content is mainly delivered as pre-produced learning material.</a:t>
             </a:r>
-            <a:endParaRPr b="0" lang="en-US" sz="1800" spc="-1" strike="noStrike">
+            <a:endParaRPr b="0" lang="de-DE" sz="1800" spc="-1" strike="noStrike">
               <a:solidFill>
                 <a:srgbClr val="000000"/>
               </a:solidFill>
@@ -8203,7 +8023,7 @@
               </a:rPr>
               <a:t>) </a:t>
             </a:r>
-            <a:endParaRPr b="0" lang="en-US" sz="1800" spc="-1" strike="noStrike">
+            <a:endParaRPr b="0" lang="de-DE" sz="1800" spc="-1" strike="noStrike">
               <a:solidFill>
                 <a:srgbClr val="000000"/>
               </a:solidFill>
@@ -8235,7 +8055,7 @@
               </a:rPr>
               <a:t>Exercise / Q&amp;A Session live streams (BBB – next slide) and Goslar</a:t>
             </a:r>
-            <a:endParaRPr b="0" lang="en-US" sz="1800" spc="-1" strike="noStrike">
+            <a:endParaRPr b="0" lang="de-DE" sz="1800" spc="-1" strike="noStrike">
               <a:solidFill>
                 <a:srgbClr val="000000"/>
               </a:solidFill>
@@ -8287,7 +8107,33 @@
               </a:rPr>
               <a:t>Time for questions and eventual tutorials related to the exercises</a:t>
             </a:r>
-            <a:endParaRPr b="0" lang="en-US" sz="1800" spc="-1" strike="noStrike">
+            <a:endParaRPr b="0" lang="de-DE" sz="1800" spc="-1" strike="noStrike">
+              <a:solidFill>
+                <a:srgbClr val="000000"/>
+              </a:solidFill>
+              <a:latin typeface="Arial"/>
+            </a:endParaRPr>
+          </a:p>
+          <a:p>
+            <a:pPr algn="ctr">
+              <a:lnSpc>
+                <a:spcPct val="100000"/>
+              </a:lnSpc>
+              <a:spcBef>
+                <a:spcPts val="360"/>
+              </a:spcBef>
+            </a:pPr>
+            <a:r>
+              <a:rPr b="0" lang="en-US" sz="1800" spc="-1" strike="noStrike">
+                <a:solidFill>
+                  <a:srgbClr val="000000"/>
+                </a:solidFill>
+                <a:latin typeface="Arial"/>
+                <a:ea typeface="DejaVu Sans"/>
+              </a:rPr>
+              <a:t> </a:t>
+            </a:r>
+            <a:endParaRPr b="0" lang="de-DE" sz="1800" spc="-1" strike="noStrike">
               <a:solidFill>
                 <a:srgbClr val="000000"/>
               </a:solidFill>
@@ -8310,132 +8156,94 @@
               <a:buChar char="◾"/>
             </a:pPr>
             <a:r>
-              <a:rPr b="0" lang="en-US" sz="1800" spc="-1" strike="noStrike">
-                <a:solidFill>
-                  <a:srgbClr val="000000"/>
-                </a:solidFill>
-                <a:latin typeface="Arial"/>
-                <a:ea typeface="DejaVu Sans"/>
-              </a:rPr>
-              <a:t> </a:t>
-            </a:r>
-            <a:endParaRPr b="0" lang="en-US" sz="1800" spc="-1" strike="noStrike">
-              <a:solidFill>
-                <a:srgbClr val="000000"/>
-              </a:solidFill>
-              <a:latin typeface="Arial"/>
-            </a:endParaRPr>
-          </a:p>
-          <a:p>
-            <a:pPr marL="216000" indent="-216000" algn="ctr">
+              <a:rPr b="0" lang="en-GB" sz="1800" spc="-1" strike="noStrike">
+                <a:solidFill>
+                  <a:srgbClr val="000000"/>
+                </a:solidFill>
+                <a:latin typeface="DejaVu Sans"/>
+                <a:ea typeface="DejaVu Sans"/>
+              </a:rPr>
+              <a:t>Questions? Write us an email: </a:t>
+            </a:r>
+            <a:r>
+              <a:rPr b="0" lang="en-GB" sz="1800" spc="-1" strike="noStrike" u="sng">
+                <a:solidFill>
+                  <a:srgbClr val="000000"/>
+                </a:solidFill>
+                <a:uFillTx/>
+                <a:latin typeface="DejaVu Sans"/>
+                <a:ea typeface="DejaVu Sans"/>
+              </a:rPr>
+              <a:t>etce-re@tu-clausthal.de</a:t>
+            </a:r>
+            <a:r>
+              <a:rPr b="0" lang="en-GB" sz="1800" spc="-1" strike="noStrike">
+                <a:solidFill>
+                  <a:srgbClr val="000000"/>
+                </a:solidFill>
+                <a:latin typeface="DejaVu Sans"/>
+                <a:ea typeface="DejaVu Sans"/>
+              </a:rPr>
+              <a:t> ← </a:t>
+            </a:r>
+            <a:r>
+              <a:rPr b="1" lang="en-GB" sz="1800" spc="-1" strike="noStrike">
+                <a:solidFill>
+                  <a:srgbClr val="000000"/>
+                </a:solidFill>
+                <a:latin typeface="DejaVu Sans"/>
+                <a:ea typeface="DejaVu Sans"/>
+              </a:rPr>
+              <a:t>We will </a:t>
+            </a:r>
+            <a:r>
+              <a:rPr b="1" lang="en-GB" sz="1800" spc="-1" strike="noStrike" u="sng">
+                <a:solidFill>
+                  <a:srgbClr val="c9211e"/>
+                </a:solidFill>
+                <a:uFillTx/>
+                <a:latin typeface="DejaVu Sans"/>
+                <a:ea typeface="DejaVu Sans"/>
+              </a:rPr>
+              <a:t>only</a:t>
+            </a:r>
+            <a:r>
+              <a:rPr b="1" lang="en-GB" sz="1800" spc="-1" strike="noStrike">
+                <a:solidFill>
+                  <a:srgbClr val="000000"/>
+                </a:solidFill>
+                <a:latin typeface="DejaVu Sans"/>
+                <a:ea typeface="DejaVu Sans"/>
+              </a:rPr>
+              <a:t> respond to</a:t>
+            </a:r>
+            <a:endParaRPr b="0" lang="de-DE" sz="1800" spc="-1" strike="noStrike">
+              <a:solidFill>
+                <a:srgbClr val="000000"/>
+              </a:solidFill>
+              <a:latin typeface="Arial"/>
+            </a:endParaRPr>
+          </a:p>
+          <a:p>
+            <a:pPr algn="ctr">
               <a:lnSpc>
                 <a:spcPct val="100000"/>
               </a:lnSpc>
               <a:spcBef>
                 <a:spcPts val="360"/>
               </a:spcBef>
-              <a:buClr>
-                <a:srgbClr val="008c4f"/>
-              </a:buClr>
-              <a:buSzPct val="45000"/>
-              <a:buFont typeface="DejaVu Sans"/>
-              <a:buChar char="◾"/>
-            </a:pPr>
-            <a:r>
-              <a:rPr b="0" lang="en-GB" sz="1800" spc="-1" strike="noStrike">
+            </a:pPr>
+            <a:r>
+              <a:rPr b="1" lang="en-GB" sz="1800" spc="-1" strike="noStrike">
                 <a:solidFill>
                   <a:srgbClr val="000000"/>
                 </a:solidFill>
                 <a:latin typeface="DejaVu Sans"/>
                 <a:ea typeface="DejaVu Sans"/>
               </a:rPr>
-              <a:t>Questions? Write us an email: </a:t>
-            </a:r>
-            <a:r>
-              <a:rPr b="0" lang="en-GB" sz="1800" spc="-1" strike="noStrike" u="sng">
-                <a:solidFill>
-                  <a:srgbClr val="000000"/>
-                </a:solidFill>
-                <a:uFillTx/>
-                <a:latin typeface="DejaVu Sans"/>
-                <a:ea typeface="DejaVu Sans"/>
-              </a:rPr>
-              <a:t>etce-re@tu-clausthal.de</a:t>
-            </a:r>
-            <a:r>
-              <a:rPr b="0" lang="en-GB" sz="1800" spc="-1" strike="noStrike">
-                <a:solidFill>
-                  <a:srgbClr val="000000"/>
-                </a:solidFill>
-                <a:latin typeface="DejaVu Sans"/>
-                <a:ea typeface="DejaVu Sans"/>
-              </a:rPr>
-              <a:t> ← </a:t>
-            </a:r>
-            <a:r>
-              <a:rPr b="1" lang="en-GB" sz="1800" spc="-1" strike="noStrike">
-                <a:solidFill>
-                  <a:srgbClr val="000000"/>
-                </a:solidFill>
-                <a:latin typeface="DejaVu Sans"/>
-                <a:ea typeface="DejaVu Sans"/>
-              </a:rPr>
-              <a:t>We will </a:t>
-            </a:r>
-            <a:r>
-              <a:rPr b="1" lang="en-GB" sz="1800" spc="-1" strike="noStrike" u="sng">
-                <a:solidFill>
-                  <a:srgbClr val="c9211e"/>
-                </a:solidFill>
-                <a:uFillTx/>
-                <a:latin typeface="DejaVu Sans"/>
-                <a:ea typeface="DejaVu Sans"/>
-              </a:rPr>
-              <a:t>only</a:t>
-            </a:r>
-            <a:r>
-              <a:rPr b="1" lang="en-GB" sz="1800" spc="-1" strike="noStrike">
-                <a:solidFill>
-                  <a:srgbClr val="000000"/>
-                </a:solidFill>
-                <a:latin typeface="DejaVu Sans"/>
-                <a:ea typeface="DejaVu Sans"/>
-              </a:rPr>
-              <a:t> respond to</a:t>
-            </a:r>
-            <a:endParaRPr b="0" lang="en-US" sz="1800" spc="-1" strike="noStrike">
-              <a:solidFill>
-                <a:srgbClr val="000000"/>
-              </a:solidFill>
-              <a:latin typeface="Arial"/>
-            </a:endParaRPr>
-          </a:p>
-          <a:p>
-            <a:pPr marL="216000" indent="-216000" algn="ctr">
-              <a:lnSpc>
-                <a:spcPct val="100000"/>
-              </a:lnSpc>
-              <a:spcBef>
-                <a:spcPts val="360"/>
-              </a:spcBef>
-              <a:buClr>
-                <a:srgbClr val="008c4f"/>
-              </a:buClr>
-              <a:buSzPct val="45000"/>
-              <a:buFont typeface="DejaVu Sans"/>
-              <a:buChar char="◾"/>
-            </a:pPr>
-            <a:r>
-              <a:rPr b="1" lang="en-GB" sz="1800" spc="-1" strike="noStrike">
-                <a:solidFill>
-                  <a:srgbClr val="000000"/>
-                </a:solidFill>
-                <a:latin typeface="DejaVu Sans"/>
-                <a:ea typeface="DejaVu Sans"/>
-              </a:rPr>
               <a:t>emails written to this specific email address!</a:t>
             </a:r>
-            <a:endParaRPr b="0" lang="en-US" sz="1800" spc="-1" strike="noStrike">
+            <a:endParaRPr b="0" lang="de-DE" sz="1800" spc="-1" strike="noStrike">
               <a:solidFill>
                 <a:srgbClr val="000000"/>
               </a:solidFill>
@@ -8483,7 +8291,7 @@
         <p:spPr>
           <a:xfrm>
             <a:off x="539640" y="764640"/>
-            <a:ext cx="10737720" cy="488520"/>
+            <a:ext cx="10737360" cy="488160"/>
           </a:xfrm>
           <a:prstGeom prst="rect">
             <a:avLst/>
@@ -8519,7 +8327,7 @@
               </a:rPr>
               <a:t>Dates/Times/Locations</a:t>
             </a:r>
-            <a:endParaRPr b="0" lang="en-US" sz="2400" spc="-1" strike="noStrike">
+            <a:endParaRPr b="0" lang="de-DE" sz="2400" spc="-1" strike="noStrike">
               <a:solidFill>
                 <a:srgbClr val="000000"/>
               </a:solidFill>
@@ -8532,7 +8340,7 @@
                 <a:spcPct val="100000"/>
               </a:lnSpc>
             </a:pPr>
-            <a:endParaRPr b="0" lang="en-US" sz="2400" spc="-1" strike="noStrike">
+            <a:endParaRPr b="0" lang="de-DE" sz="2400" spc="-1" strike="noStrike">
               <a:solidFill>
                 <a:srgbClr val="000000"/>
               </a:solidFill>
@@ -8545,7 +8353,7 @@
                 <a:spcPct val="100000"/>
               </a:lnSpc>
             </a:pPr>
-            <a:endParaRPr b="0" lang="en-US" sz="2400" spc="-1" strike="noStrike">
+            <a:endParaRPr b="0" lang="de-DE" sz="2400" spc="-1" strike="noStrike">
               <a:solidFill>
                 <a:srgbClr val="000000"/>
               </a:solidFill>
@@ -8563,7 +8371,7 @@
         <p:spPr>
           <a:xfrm>
             <a:off x="539640" y="1268640"/>
-            <a:ext cx="10737720" cy="5025240"/>
+            <a:ext cx="10737360" cy="5024880"/>
           </a:xfrm>
           <a:prstGeom prst="rect">
             <a:avLst/>
@@ -8592,7 +8400,7 @@
                 <a:spcPts val="360"/>
               </a:spcBef>
             </a:pPr>
-            <a:endParaRPr b="0" lang="en-US" sz="1800" spc="-1" strike="noStrike">
+            <a:endParaRPr b="0" lang="de-DE" sz="1800" spc="-1" strike="noStrike">
               <a:solidFill>
                 <a:srgbClr val="000000"/>
               </a:solidFill>
@@ -8625,7 +8433,7 @@
               </a:rPr>
               <a:t>Lecture:</a:t>
             </a:r>
-            <a:endParaRPr b="0" lang="en-US" sz="1800" spc="-1" strike="noStrike">
+            <a:endParaRPr b="0" lang="de-DE" sz="1800" spc="-1" strike="noStrike">
               <a:solidFill>
                 <a:srgbClr val="000000"/>
               </a:solidFill>
@@ -8747,7 +8555,7 @@
               </a:rPr>
               <a:t>2024</a:t>
             </a:r>
-            <a:endParaRPr b="0" lang="en-US" sz="1800" spc="-1" strike="noStrike">
+            <a:endParaRPr b="0" lang="de-DE" sz="1800" spc="-1" strike="noStrike">
               <a:solidFill>
                 <a:srgbClr val="000000"/>
               </a:solidFill>
@@ -8801,7 +8609,7 @@
               </a:rPr>
               <a:t>)</a:t>
             </a:r>
-            <a:endParaRPr b="0" lang="en-US" sz="1800" spc="-1" strike="noStrike">
+            <a:endParaRPr b="0" lang="de-DE" sz="1800" spc="-1" strike="noStrike">
               <a:solidFill>
                 <a:srgbClr val="000000"/>
               </a:solidFill>
@@ -8817,7 +8625,7 @@
                 <a:spcPts val="360"/>
               </a:spcBef>
             </a:pPr>
-            <a:endParaRPr b="0" lang="en-US" sz="1800" spc="-1" strike="noStrike">
+            <a:endParaRPr b="0" lang="de-DE" sz="1800" spc="-1" strike="noStrike">
               <a:solidFill>
                 <a:srgbClr val="000000"/>
               </a:solidFill>
@@ -8850,7 +8658,7 @@
               </a:rPr>
               <a:t>Exercise / Q&amp;A:</a:t>
             </a:r>
-            <a:endParaRPr b="0" lang="en-US" sz="1800" spc="-1" strike="noStrike">
+            <a:endParaRPr b="0" lang="de-DE" sz="1800" spc="-1" strike="noStrike">
               <a:solidFill>
                 <a:srgbClr val="000000"/>
               </a:solidFill>
@@ -8910,7 +8718,7 @@
                 <a:latin typeface="DejaVu Sans"/>
                 <a:ea typeface="DejaVu Sans"/>
               </a:rPr>
-              <a:t>30.10</a:t>
+              <a:t>06.11</a:t>
             </a:r>
             <a:r>
               <a:rPr b="0" lang="en-GB" sz="1800" spc="-1" strike="noStrike">
@@ -8972,7 +8780,7 @@
               </a:rPr>
               <a:t>2024</a:t>
             </a:r>
-            <a:endParaRPr b="0" lang="en-US" sz="1800" spc="-1" strike="noStrike">
+            <a:endParaRPr b="0" lang="de-DE" sz="1800" spc="-1" strike="noStrike">
               <a:solidFill>
                 <a:srgbClr val="000000"/>
               </a:solidFill>
@@ -9026,7 +8834,7 @@
               </a:rPr>
               <a:t>)</a:t>
             </a:r>
-            <a:endParaRPr b="0" lang="en-US" sz="1800" spc="-1" strike="noStrike">
+            <a:endParaRPr b="0" lang="de-DE" sz="1800" spc="-1" strike="noStrike">
               <a:solidFill>
                 <a:srgbClr val="000000"/>
               </a:solidFill>
@@ -9074,7 +8882,7 @@
         <p:spPr>
           <a:xfrm>
             <a:off x="539640" y="764640"/>
-            <a:ext cx="10746000" cy="496800"/>
+            <a:ext cx="10745640" cy="496440"/>
           </a:xfrm>
           <a:prstGeom prst="rect">
             <a:avLst/>
@@ -9110,7 +8918,7 @@
               </a:rPr>
               <a:t>Exercises </a:t>
             </a:r>
-            <a:endParaRPr b="0" lang="en-US" sz="2400" spc="-1" strike="noStrike">
+            <a:endParaRPr b="0" lang="de-DE" sz="2400" spc="-1" strike="noStrike">
               <a:solidFill>
                 <a:srgbClr val="000000"/>
               </a:solidFill>
@@ -9128,7 +8936,7 @@
         <p:spPr>
           <a:xfrm>
             <a:off x="539640" y="1268280"/>
-            <a:ext cx="10746000" cy="5033520"/>
+            <a:ext cx="10745640" cy="5033160"/>
           </a:xfrm>
           <a:prstGeom prst="rect">
             <a:avLst/>
@@ -9154,7 +8962,7 @@
                 <a:spcPct val="100000"/>
               </a:lnSpc>
             </a:pPr>
-            <a:endParaRPr b="0" lang="en-US" sz="1800" spc="-1" strike="noStrike">
+            <a:endParaRPr b="0" lang="de-DE" sz="1800" spc="-1" strike="noStrike">
               <a:solidFill>
                 <a:srgbClr val="000000"/>
               </a:solidFill>
@@ -9186,7 +8994,7 @@
               </a:rPr>
               <a:t>Organization of the exercise:</a:t>
             </a:r>
-            <a:endParaRPr b="0" lang="en-US" sz="1800" spc="-1" strike="noStrike">
+            <a:endParaRPr b="0" lang="de-DE" sz="1800" spc="-1" strike="noStrike">
               <a:solidFill>
                 <a:srgbClr val="000000"/>
               </a:solidFill>
@@ -9238,7 +9046,7 @@
               </a:rPr>
               <a:t> group submissions</a:t>
             </a:r>
-            <a:endParaRPr b="0" lang="en-US" sz="1800" spc="-1" strike="noStrike">
+            <a:endParaRPr b="0" lang="de-DE" sz="1800" spc="-1" strike="noStrike">
               <a:solidFill>
                 <a:srgbClr val="000000"/>
               </a:solidFill>
@@ -9270,7 +9078,7 @@
               </a:rPr>
               <a:t>Multiple-Choice or practical tasks</a:t>
             </a:r>
-            <a:endParaRPr b="0" lang="en-US" sz="1800" spc="-1" strike="noStrike">
+            <a:endParaRPr b="0" lang="de-DE" sz="1800" spc="-1" strike="noStrike">
               <a:solidFill>
                 <a:srgbClr val="000000"/>
               </a:solidFill>
@@ -9302,7 +9110,7 @@
               </a:rPr>
               <a:t>7-14 days to submit (depending on the task)</a:t>
             </a:r>
-            <a:endParaRPr b="0" lang="en-US" sz="1800" spc="-1" strike="noStrike">
+            <a:endParaRPr b="0" lang="de-DE" sz="1800" spc="-1" strike="noStrike">
               <a:solidFill>
                 <a:srgbClr val="000000"/>
               </a:solidFill>
@@ -9334,7 +9142,7 @@
               </a:rPr>
               <a:t>Submission deadline is always Monday at 1:59pm (right before the next lecture period)</a:t>
             </a:r>
-            <a:endParaRPr b="0" lang="en-US" sz="1800" spc="-1" strike="noStrike">
+            <a:endParaRPr b="0" lang="de-DE" sz="1800" spc="-1" strike="noStrike">
               <a:solidFill>
                 <a:srgbClr val="000000"/>
               </a:solidFill>
@@ -9376,7 +9184,7 @@
               </a:rPr>
               <a:t>ow on the next slides (Examination)</a:t>
             </a:r>
-            <a:endParaRPr b="0" lang="en-US" sz="1800" spc="-1" strike="noStrike">
+            <a:endParaRPr b="0" lang="de-DE" sz="1800" spc="-1" strike="noStrike">
               <a:solidFill>
                 <a:srgbClr val="000000"/>
               </a:solidFill>
@@ -9424,7 +9232,7 @@
         <p:spPr>
           <a:xfrm>
             <a:off x="539640" y="764640"/>
-            <a:ext cx="10739160" cy="489960"/>
+            <a:ext cx="10738800" cy="489600"/>
           </a:xfrm>
           <a:prstGeom prst="rect">
             <a:avLst/>
@@ -9460,7 +9268,7 @@
               </a:rPr>
               <a:t>Exercises </a:t>
             </a:r>
-            <a:endParaRPr b="0" lang="en-US" sz="2400" spc="-1" strike="noStrike">
+            <a:endParaRPr b="0" lang="de-DE" sz="2400" spc="-1" strike="noStrike">
               <a:solidFill>
                 <a:srgbClr val="000000"/>
               </a:solidFill>
@@ -9478,7 +9286,7 @@
         <p:spPr>
           <a:xfrm>
             <a:off x="539640" y="1268280"/>
-            <a:ext cx="10739160" cy="5026680"/>
+            <a:ext cx="10738800" cy="5026320"/>
           </a:xfrm>
           <a:prstGeom prst="rect">
             <a:avLst/>
@@ -9520,7 +9328,7 @@
               </a:rPr>
               <a:t>Multiple-choice exercises: Self-evaluated, available directly on the MOOC website.</a:t>
             </a:r>
-            <a:endParaRPr b="0" lang="en-US" sz="1800" spc="-1" strike="noStrike">
+            <a:endParaRPr b="0" lang="de-DE" sz="1800" spc="-1" strike="noStrike">
               <a:solidFill>
                 <a:srgbClr val="000000"/>
               </a:solidFill>
@@ -9549,7 +9357,7 @@
               </a:rPr>
               <a:t>Practical Tasks: Submitted via Moodle.</a:t>
             </a:r>
-            <a:endParaRPr b="0" lang="en-US" sz="1800" spc="-1" strike="noStrike">
+            <a:endParaRPr b="0" lang="de-DE" sz="1800" spc="-1" strike="noStrike">
               <a:solidFill>
                 <a:srgbClr val="000000"/>
               </a:solidFill>
@@ -9578,7 +9386,7 @@
               </a:rPr>
               <a:t>Bonus task:</a:t>
             </a:r>
-            <a:endParaRPr b="0" lang="en-US" sz="1800" spc="-1" strike="noStrike">
+            <a:endParaRPr b="0" lang="de-DE" sz="1800" spc="-1" strike="noStrike">
               <a:solidFill>
                 <a:srgbClr val="000000"/>
               </a:solidFill>
@@ -9610,7 +9418,7 @@
               </a:rPr>
               <a:t>You may miss/fail one of the regular practical exercises</a:t>
             </a:r>
-            <a:endParaRPr b="0" lang="en-US" sz="1800" spc="-1" strike="noStrike">
+            <a:endParaRPr b="0" lang="de-DE" sz="1800" spc="-1" strike="noStrike">
               <a:solidFill>
                 <a:srgbClr val="000000"/>
               </a:solidFill>
@@ -9662,7 +9470,7 @@
               </a:rPr>
               <a:t> passing the bonus task substitutes the missed/failed exercise</a:t>
             </a:r>
-            <a:endParaRPr b="0" lang="en-US" sz="1800" spc="-1" strike="noStrike">
+            <a:endParaRPr b="0" lang="de-DE" sz="1800" spc="-1" strike="noStrike">
               <a:solidFill>
                 <a:srgbClr val="000000"/>
               </a:solidFill>
@@ -9704,7 +9512,7 @@
               </a:rPr>
               <a:t> → don’t “plan” with the bonus task. Rather submit and pass the regular exercises.</a:t>
             </a:r>
-            <a:endParaRPr b="0" lang="en-US" sz="1800" spc="-1" strike="noStrike">
+            <a:endParaRPr b="0" lang="de-DE" sz="1800" spc="-1" strike="noStrike">
               <a:solidFill>
                 <a:srgbClr val="000000"/>
               </a:solidFill>
@@ -9752,7 +9560,7 @@
         <p:spPr>
           <a:xfrm>
             <a:off x="539640" y="764640"/>
-            <a:ext cx="10746000" cy="496800"/>
+            <a:ext cx="10745640" cy="496440"/>
           </a:xfrm>
           <a:prstGeom prst="rect">
             <a:avLst/>
@@ -9788,7 +9596,7 @@
               </a:rPr>
               <a:t>Examination</a:t>
             </a:r>
-            <a:endParaRPr b="0" lang="en-US" sz="2400" spc="-1" strike="noStrike">
+            <a:endParaRPr b="0" lang="de-DE" sz="2400" spc="-1" strike="noStrike">
               <a:solidFill>
                 <a:srgbClr val="000000"/>
               </a:solidFill>
@@ -9806,7 +9614,7 @@
         <p:spPr>
           <a:xfrm>
             <a:off x="539640" y="1268640"/>
-            <a:ext cx="10746000" cy="5033520"/>
+            <a:ext cx="10745640" cy="5033160"/>
           </a:xfrm>
           <a:prstGeom prst="rect">
             <a:avLst/>
@@ -9881,7 +9689,7 @@
               </a:rPr>
               <a:t> criteria have to be fulfilled):</a:t>
             </a:r>
-            <a:endParaRPr b="0" lang="en-US" sz="1800" spc="-1" strike="noStrike">
+            <a:endParaRPr b="0" lang="de-DE" sz="1800" spc="-1" strike="noStrike">
               <a:solidFill>
                 <a:srgbClr val="000000"/>
               </a:solidFill>
@@ -9913,7 +9721,7 @@
               </a:rPr>
               <a:t>Successful completion of the compulsory seven exercises</a:t>
             </a:r>
-            <a:endParaRPr b="0" lang="en-US" sz="1800" spc="-1" strike="noStrike">
+            <a:endParaRPr b="0" lang="de-DE" sz="1800" spc="-1" strike="noStrike">
               <a:solidFill>
                 <a:srgbClr val="000000"/>
               </a:solidFill>
@@ -9945,7 +9753,7 @@
               </a:rPr>
               <a:t>You pass an exercise if you score 50% (or more)</a:t>
             </a:r>
-            <a:endParaRPr b="0" lang="en-US" sz="1800" spc="-1" strike="noStrike">
+            <a:endParaRPr b="0" lang="de-DE" sz="1800" spc="-1" strike="noStrike">
               <a:solidFill>
                 <a:srgbClr val="000000"/>
               </a:solidFill>
@@ -9998,7 +9806,7 @@
               </a:rPr>
               <a:t> exercise</a:t>
             </a:r>
-            <a:endParaRPr b="0" lang="en-US" sz="1800" spc="-1" strike="noStrike">
+            <a:endParaRPr b="0" lang="de-DE" sz="1800" spc="-1" strike="noStrike">
               <a:solidFill>
                 <a:srgbClr val="000000"/>
               </a:solidFill>
@@ -10014,7 +9822,7 @@
                 <a:spcPts val="360"/>
               </a:spcBef>
             </a:pPr>
-            <a:endParaRPr b="0" lang="en-US" sz="1800" spc="-1" strike="noStrike">
+            <a:endParaRPr b="0" lang="de-DE" sz="1800" spc="-1" strike="noStrike">
               <a:solidFill>
                 <a:srgbClr val="000000"/>
               </a:solidFill>
@@ -10046,7 +9854,7 @@
               </a:rPr>
               <a:t>Final exam:</a:t>
             </a:r>
-            <a:endParaRPr b="0" lang="en-US" sz="1800" spc="-1" strike="noStrike">
+            <a:endParaRPr b="0" lang="de-DE" sz="1800" spc="-1" strike="noStrike">
               <a:solidFill>
                 <a:srgbClr val="000000"/>
               </a:solidFill>
@@ -10078,7 +9886,7 @@
               </a:rPr>
               <a:t>04.03.2024 → 14:00 – 16:00 </a:t>
             </a:r>
-            <a:endParaRPr b="0" lang="en-US" sz="1800" spc="-1" strike="noStrike">
+            <a:endParaRPr b="0" lang="de-DE" sz="1800" spc="-1" strike="noStrike">
               <a:solidFill>
                 <a:srgbClr val="000000"/>
               </a:solidFill>
@@ -10110,7 +9918,7 @@
               </a:rPr>
               <a:t>Written exam (120min) </a:t>
             </a:r>
-            <a:endParaRPr b="0" lang="en-US" sz="1800" spc="-1" strike="noStrike">
+            <a:endParaRPr b="0" lang="de-DE" sz="1800" spc="-1" strike="noStrike">
               <a:solidFill>
                 <a:srgbClr val="000000"/>
               </a:solidFill>
@@ -10158,7 +9966,7 @@
         <p:spPr>
           <a:xfrm>
             <a:off x="539640" y="764640"/>
-            <a:ext cx="10746000" cy="496800"/>
+            <a:ext cx="10745640" cy="496440"/>
           </a:xfrm>
           <a:prstGeom prst="rect">
             <a:avLst/>
@@ -10194,7 +10002,7 @@
               </a:rPr>
               <a:t>Self-Study Star</a:t>
             </a:r>
-            <a:endParaRPr b="0" lang="en-US" sz="2400" spc="-1" strike="noStrike">
+            <a:endParaRPr b="0" lang="de-DE" sz="2400" spc="-1" strike="noStrike">
               <a:solidFill>
                 <a:srgbClr val="000000"/>
               </a:solidFill>
@@ -10212,7 +10020,7 @@
         <p:spPr>
           <a:xfrm>
             <a:off x="539640" y="1268280"/>
-            <a:ext cx="10746000" cy="5033520"/>
+            <a:ext cx="10745640" cy="5033160"/>
           </a:xfrm>
           <a:prstGeom prst="rect">
             <a:avLst/>
@@ -10241,7 +10049,7 @@
                 <a:spcPts val="360"/>
               </a:spcBef>
             </a:pPr>
-            <a:endParaRPr b="0" lang="en-US" sz="1800" spc="-1" strike="noStrike">
+            <a:endParaRPr b="0" lang="de-DE" sz="1800" spc="-1" strike="noStrike">
               <a:solidFill>
                 <a:srgbClr val="000000"/>
               </a:solidFill>
@@ -10293,7 +10101,7 @@
               </a:rPr>
               <a:t> mandatory but could be helpful for your future career</a:t>
             </a:r>
-            <a:endParaRPr b="0" lang="en-US" sz="1800" spc="-1" strike="noStrike">
+            <a:endParaRPr b="0" lang="de-DE" sz="1800" spc="-1" strike="noStrike">
               <a:solidFill>
                 <a:srgbClr val="000000"/>
               </a:solidFill>
@@ -10309,7 +10117,7 @@
                 <a:spcPts val="360"/>
               </a:spcBef>
             </a:pPr>
-            <a:endParaRPr b="0" lang="en-US" sz="1800" spc="-1" strike="noStrike">
+            <a:endParaRPr b="0" lang="de-DE" sz="1800" spc="-1" strike="noStrike">
               <a:solidFill>
                 <a:srgbClr val="000000"/>
               </a:solidFill>
@@ -10341,7 +10149,7 @@
               </a:rPr>
               <a:t>Of course it won’t hurt to have extra knowledge to impress us during the examination ;)</a:t>
             </a:r>
-            <a:endParaRPr b="0" lang="en-US" sz="1800" spc="-1" strike="noStrike">
+            <a:endParaRPr b="0" lang="de-DE" sz="1800" spc="-1" strike="noStrike">
               <a:solidFill>
                 <a:srgbClr val="000000"/>
               </a:solidFill>
@@ -10359,7 +10167,7 @@
         <p:spPr>
           <a:xfrm>
             <a:off x="6489720" y="2132640"/>
-            <a:ext cx="515520" cy="495360"/>
+            <a:ext cx="515160" cy="495000"/>
           </a:xfrm>
           <a:prstGeom prst="star5">
             <a:avLst>
@@ -10420,7 +10228,7 @@
         <p:spPr>
           <a:xfrm>
             <a:off x="4294080" y="2247480"/>
-            <a:ext cx="2283840" cy="363960"/>
+            <a:ext cx="2283480" cy="363960"/>
           </a:xfrm>
           <a:prstGeom prst="rect">
             <a:avLst/>
@@ -10456,7 +10264,7 @@
               </a:rPr>
               <a:t>Self-Study Star → </a:t>
             </a:r>
-            <a:endParaRPr b="0" lang="en-US" sz="1800" spc="-1" strike="noStrike">
+            <a:endParaRPr b="0" lang="de-DE" sz="1800" spc="-1" strike="noStrike">
               <a:solidFill>
                 <a:srgbClr val="000000"/>
               </a:solidFill>
@@ -10504,7 +10312,7 @@
         <p:spPr>
           <a:xfrm>
             <a:off x="539640" y="764640"/>
-            <a:ext cx="10746000" cy="496800"/>
+            <a:ext cx="10745640" cy="496440"/>
           </a:xfrm>
           <a:prstGeom prst="rect">
             <a:avLst/>
@@ -10540,7 +10348,7 @@
               </a:rPr>
               <a:t>Literature</a:t>
             </a:r>
-            <a:endParaRPr b="0" lang="en-US" sz="2400" spc="-1" strike="noStrike">
+            <a:endParaRPr b="0" lang="de-DE" sz="2400" spc="-1" strike="noStrike">
               <a:solidFill>
                 <a:srgbClr val="000000"/>
               </a:solidFill>
@@ -10558,7 +10366,7 @@
         <p:spPr>
           <a:xfrm>
             <a:off x="539640" y="1268640"/>
-            <a:ext cx="10746000" cy="5033520"/>
+            <a:ext cx="10745640" cy="5033160"/>
           </a:xfrm>
           <a:prstGeom prst="rect">
             <a:avLst/>
@@ -10623,7 +10431,7 @@
               </a:rPr>
               <a:t> need to buy a book to pass the exam.</a:t>
             </a:r>
-            <a:endParaRPr b="0" lang="en-US" sz="1800" spc="-1" strike="noStrike">
+            <a:endParaRPr b="0" lang="de-DE" sz="1800" spc="-1" strike="noStrike">
               <a:solidFill>
                 <a:srgbClr val="000000"/>
               </a:solidFill>
@@ -10639,7 +10447,7 @@
                 <a:spcPts val="360"/>
               </a:spcBef>
             </a:pPr>
-            <a:endParaRPr b="0" lang="en-US" sz="1800" spc="-1" strike="noStrike">
+            <a:endParaRPr b="0" lang="de-DE" sz="1800" spc="-1" strike="noStrike">
               <a:solidFill>
                 <a:srgbClr val="000000"/>
               </a:solidFill>
@@ -10691,7 +10499,7 @@
               </a:rPr>
               <a:t> (2010).</a:t>
             </a:r>
-            <a:endParaRPr b="0" lang="en-US" sz="1800" spc="-1" strike="noStrike">
+            <a:endParaRPr b="0" lang="de-DE" sz="1800" spc="-1" strike="noStrike">
               <a:solidFill>
                 <a:srgbClr val="000000"/>
               </a:solidFill>
@@ -10743,7 +10551,7 @@
               </a:rPr>
               <a:t>(2011).</a:t>
             </a:r>
-            <a:endParaRPr b="0" lang="en-US" sz="1800" spc="-1" strike="noStrike">
+            <a:endParaRPr b="0" lang="de-DE" sz="1800" spc="-1" strike="noStrike">
               <a:solidFill>
                 <a:srgbClr val="000000"/>
               </a:solidFill>
@@ -10815,7 +10623,7 @@
               </a:rPr>
               <a:t>(2017).</a:t>
             </a:r>
-            <a:endParaRPr b="0" lang="en-US" sz="1800" spc="-1" strike="noStrike">
+            <a:endParaRPr b="0" lang="de-DE" sz="1800" spc="-1" strike="noStrike">
               <a:solidFill>
                 <a:srgbClr val="000000"/>
               </a:solidFill>
@@ -10867,7 +10675,7 @@
               </a:rPr>
               <a:t>(2021).</a:t>
             </a:r>
-            <a:endParaRPr b="0" lang="en-US" sz="1800" spc="-1" strike="noStrike">
+            <a:endParaRPr b="0" lang="de-DE" sz="1800" spc="-1" strike="noStrike">
               <a:solidFill>
                 <a:srgbClr val="000000"/>
               </a:solidFill>
@@ -10915,7 +10723,7 @@
         <p:spPr>
           <a:xfrm>
             <a:off x="335520" y="1268640"/>
-            <a:ext cx="10746000" cy="5033520"/>
+            <a:ext cx="10745640" cy="5033160"/>
           </a:xfrm>
           <a:prstGeom prst="rect">
             <a:avLst/>
@@ -10957,7 +10765,7 @@
               </a:rPr>
               <a:t>Questions?</a:t>
             </a:r>
-            <a:endParaRPr b="0" lang="en-US" sz="4000" spc="-1" strike="noStrike">
+            <a:endParaRPr b="0" lang="de-DE" sz="4000" spc="-1" strike="noStrike">
               <a:solidFill>
                 <a:srgbClr val="000000"/>
               </a:solidFill>
@@ -10975,7 +10783,7 @@
         <p:spPr>
           <a:xfrm>
             <a:off x="335520" y="764640"/>
-            <a:ext cx="10746000" cy="496800"/>
+            <a:ext cx="10745640" cy="496440"/>
           </a:xfrm>
           <a:prstGeom prst="rect">
             <a:avLst/>
@@ -11050,7 +10858,7 @@
         <p:spPr>
           <a:xfrm>
             <a:off x="539640" y="764640"/>
-            <a:ext cx="10746000" cy="496800"/>
+            <a:ext cx="10745640" cy="496440"/>
           </a:xfrm>
           <a:prstGeom prst="rect">
             <a:avLst/>
@@ -11086,7 +10894,7 @@
               </a:rPr>
               <a:t>Team</a:t>
             </a:r>
-            <a:endParaRPr b="0" lang="en-US" sz="2400" spc="-1" strike="noStrike">
+            <a:endParaRPr b="0" lang="de-DE" sz="2400" spc="-1" strike="noStrike">
               <a:solidFill>
                 <a:srgbClr val="000000"/>
               </a:solidFill>
@@ -11108,7 +10916,7 @@
         <p:spPr>
           <a:xfrm>
             <a:off x="2684520" y="1323360"/>
-            <a:ext cx="1468800" cy="2170080"/>
+            <a:ext cx="1468440" cy="2169720"/>
           </a:xfrm>
           <a:prstGeom prst="rect">
             <a:avLst/>
@@ -11131,7 +10939,7 @@
         <p:spPr>
           <a:xfrm>
             <a:off x="7269840" y="1716120"/>
-            <a:ext cx="1782720" cy="1774800"/>
+            <a:ext cx="1782360" cy="1774440"/>
           </a:xfrm>
           <a:prstGeom prst="rect">
             <a:avLst/>
@@ -11150,7 +10958,7 @@
         <p:spPr>
           <a:xfrm>
             <a:off x="1620000" y="3439440"/>
-            <a:ext cx="3633480" cy="675000"/>
+            <a:ext cx="3633120" cy="674640"/>
           </a:xfrm>
           <a:prstGeom prst="rect">
             <a:avLst/>
@@ -11189,7 +10997,7 @@
               </a:rPr>
               <a:t>Prof. Dr. Benjamin Leiding</a:t>
             </a:r>
-            <a:endParaRPr b="0" lang="en-US" sz="1600" spc="-1" strike="noStrike">
+            <a:endParaRPr b="0" lang="de-DE" sz="1600" spc="-1" strike="noStrike">
               <a:solidFill>
                 <a:srgbClr val="000000"/>
               </a:solidFill>
@@ -11207,7 +11015,7 @@
         <p:spPr>
           <a:xfrm>
             <a:off x="6322680" y="3460320"/>
-            <a:ext cx="3633480" cy="675000"/>
+            <a:ext cx="3633120" cy="674640"/>
           </a:xfrm>
           <a:prstGeom prst="rect">
             <a:avLst/>
@@ -11246,7 +11054,7 @@
               </a:rPr>
               <a:t>M.Sc. Anant Sujatanagarjuna</a:t>
             </a:r>
-            <a:endParaRPr b="0" lang="en-US" sz="1600" spc="-1" strike="noStrike">
+            <a:endParaRPr b="0" lang="de-DE" sz="1600" spc="-1" strike="noStrike">
               <a:solidFill>
                 <a:srgbClr val="000000"/>
               </a:solidFill>
@@ -11264,7 +11072,7 @@
         <p:spPr>
           <a:xfrm>
             <a:off x="1311840" y="5920200"/>
-            <a:ext cx="3626640" cy="668160"/>
+            <a:ext cx="3626280" cy="667800"/>
           </a:xfrm>
           <a:prstGeom prst="rect">
             <a:avLst/>
@@ -11309,7 +11117,7 @@
         <p:spPr>
           <a:xfrm>
             <a:off x="3950280" y="5903280"/>
-            <a:ext cx="3626640" cy="668160"/>
+            <a:ext cx="3626280" cy="667800"/>
           </a:xfrm>
           <a:prstGeom prst="rect">
             <a:avLst/>
@@ -11348,7 +11156,7 @@
               </a:rPr>
               <a:t>B.Sc. Nisha Muthuraju</a:t>
             </a:r>
-            <a:endParaRPr b="0" lang="en-US" sz="1600" spc="-1" strike="noStrike">
+            <a:endParaRPr b="0" lang="de-DE" sz="1600" spc="-1" strike="noStrike">
               <a:solidFill>
                 <a:srgbClr val="000000"/>
               </a:solidFill>
@@ -11365,13 +11173,13 @@
         </p:nvPicPr>
         <p:blipFill>
           <a:blip r:embed="rId3"/>
-          <a:srcRect l="0" t="0" r="9021" b="11387"/>
+          <a:srcRect l="0" t="0" r="9021" b="11388"/>
           <a:stretch/>
         </p:blipFill>
         <p:spPr>
           <a:xfrm>
             <a:off x="4644360" y="4042080"/>
-            <a:ext cx="2056320" cy="2002680"/>
+            <a:ext cx="2055960" cy="2002320"/>
           </a:xfrm>
           <a:prstGeom prst="rect">
             <a:avLst/>
@@ -11420,7 +11228,7 @@
         <p:spPr>
           <a:xfrm>
             <a:off x="542880" y="721800"/>
-            <a:ext cx="10351800" cy="492480"/>
+            <a:ext cx="10351440" cy="492120"/>
           </a:xfrm>
           <a:prstGeom prst="rect">
             <a:avLst/>
@@ -11456,7 +11264,7 @@
               </a:rPr>
               <a:t>Research Group</a:t>
             </a:r>
-            <a:endParaRPr b="0" lang="en-US" sz="2200" spc="-1" strike="noStrike">
+            <a:endParaRPr b="0" lang="de-DE" sz="2200" spc="-1" strike="noStrike">
               <a:solidFill>
                 <a:srgbClr val="000000"/>
               </a:solidFill>
@@ -11474,7 +11282,7 @@
         <p:spPr>
           <a:xfrm>
             <a:off x="451800" y="1709280"/>
-            <a:ext cx="8219160" cy="4347360"/>
+            <a:ext cx="8218800" cy="4347000"/>
           </a:xfrm>
           <a:prstGeom prst="rect">
             <a:avLst/>
@@ -11519,7 +11327,7 @@
         <p:spPr>
           <a:xfrm>
             <a:off x="609480" y="1769400"/>
-            <a:ext cx="10582200" cy="4850280"/>
+            <a:ext cx="10581840" cy="4849920"/>
           </a:xfrm>
           <a:prstGeom prst="rect">
             <a:avLst/>
@@ -11644,7 +11452,7 @@
               </a:rPr>
               <a:t>ETCE</a:t>
             </a:r>
-            <a:endParaRPr b="0" lang="en-US" sz="2000" spc="-1" strike="noStrike">
+            <a:endParaRPr b="0" lang="de-DE" sz="2000" spc="-1" strike="noStrike">
               <a:solidFill>
                 <a:srgbClr val="000000"/>
               </a:solidFill>
@@ -11676,7 +11484,7 @@
               </a:rPr>
               <a:t>Research focus:</a:t>
             </a:r>
-            <a:endParaRPr b="0" lang="en-US" sz="2000" spc="-1" strike="noStrike">
+            <a:endParaRPr b="0" lang="de-DE" sz="2000" spc="-1" strike="noStrike">
               <a:solidFill>
                 <a:srgbClr val="000000"/>
               </a:solidFill>
@@ -11708,7 +11516,7 @@
               </a:rPr>
               <a:t>Intersection of IT and sustainability</a:t>
             </a:r>
-            <a:endParaRPr b="0" lang="en-US" sz="1800" spc="-1" strike="noStrike">
+            <a:endParaRPr b="0" lang="de-DE" sz="1800" spc="-1" strike="noStrike">
               <a:solidFill>
                 <a:srgbClr val="000000"/>
               </a:solidFill>
@@ -11740,7 +11548,7 @@
               </a:rPr>
               <a:t>Circular Economy and Circular Societies</a:t>
             </a:r>
-            <a:endParaRPr b="0" lang="en-US" sz="1800" spc="-1" strike="noStrike">
+            <a:endParaRPr b="0" lang="de-DE" sz="1800" spc="-1" strike="noStrike">
               <a:solidFill>
                 <a:srgbClr val="000000"/>
               </a:solidFill>
@@ -11772,7 +11580,7 @@
               </a:rPr>
               <a:t>Self-organized, decentralized and distributed systems</a:t>
             </a:r>
-            <a:endParaRPr b="0" lang="en-US" sz="1800" spc="-1" strike="noStrike">
+            <a:endParaRPr b="0" lang="de-DE" sz="1800" spc="-1" strike="noStrike">
               <a:solidFill>
                 <a:srgbClr val="000000"/>
               </a:solidFill>
@@ -11804,7 +11612,7 @@
               </a:rPr>
               <a:t>Localized and resilient food production</a:t>
             </a:r>
-            <a:endParaRPr b="0" lang="en-US" sz="1800" spc="-1" strike="noStrike">
+            <a:endParaRPr b="0" lang="de-DE" sz="1800" spc="-1" strike="noStrike">
               <a:solidFill>
                 <a:srgbClr val="000000"/>
               </a:solidFill>
@@ -11836,7 +11644,7 @@
               </a:rPr>
               <a:t>Other courses:</a:t>
             </a:r>
-            <a:endParaRPr b="0" lang="en-US" sz="2000" spc="-1" strike="noStrike">
+            <a:endParaRPr b="0" lang="de-DE" sz="2000" spc="-1" strike="noStrike">
               <a:solidFill>
                 <a:srgbClr val="000000"/>
               </a:solidFill>
@@ -11868,7 +11676,7 @@
               </a:rPr>
               <a:t>Emerging Technologies for the Circular Economy (SS – M.Sc.)</a:t>
             </a:r>
-            <a:endParaRPr b="0" lang="en-US" sz="1800" spc="-1" strike="noStrike">
+            <a:endParaRPr b="0" lang="de-DE" sz="1800" spc="-1" strike="noStrike">
               <a:solidFill>
                 <a:srgbClr val="000000"/>
               </a:solidFill>
@@ -11900,7 +11708,7 @@
               </a:rPr>
               <a:t>The Limits to Growth – Sustainability and the Circular Economy (WS – open for everyone)</a:t>
             </a:r>
-            <a:endParaRPr b="0" lang="en-US" sz="1800" spc="-1" strike="noStrike">
+            <a:endParaRPr b="0" lang="de-DE" sz="1800" spc="-1" strike="noStrike">
               <a:solidFill>
                 <a:srgbClr val="000000"/>
               </a:solidFill>
@@ -11948,7 +11756,7 @@
         <p:spPr>
           <a:xfrm>
             <a:off x="542880" y="721800"/>
-            <a:ext cx="10351800" cy="492480"/>
+            <a:ext cx="10351440" cy="492120"/>
           </a:xfrm>
           <a:prstGeom prst="rect">
             <a:avLst/>
@@ -11984,7 +11792,7 @@
               </a:rPr>
               <a:t>Research Group</a:t>
             </a:r>
-            <a:endParaRPr b="0" lang="en-US" sz="2200" spc="-1" strike="noStrike">
+            <a:endParaRPr b="0" lang="de-DE" sz="2200" spc="-1" strike="noStrike">
               <a:solidFill>
                 <a:srgbClr val="000000"/>
               </a:solidFill>
@@ -12002,7 +11810,7 @@
         <p:spPr>
           <a:xfrm>
             <a:off x="451800" y="1709280"/>
-            <a:ext cx="8219160" cy="4347360"/>
+            <a:ext cx="8218800" cy="4347000"/>
           </a:xfrm>
           <a:prstGeom prst="rect">
             <a:avLst/>
@@ -12047,7 +11855,7 @@
         <p:spPr>
           <a:xfrm>
             <a:off x="609480" y="1769400"/>
-            <a:ext cx="10582200" cy="4850280"/>
+            <a:ext cx="10581840" cy="4849920"/>
           </a:xfrm>
           <a:prstGeom prst="rect">
             <a:avLst/>
@@ -12104,7 +11912,7 @@
               </a:rPr>
               <a:t>Link</a:t>
             </a:r>
-            <a:endParaRPr b="0" lang="en-US" sz="2000" spc="-1" strike="noStrike">
+            <a:endParaRPr b="0" lang="de-DE" sz="2000" spc="-1" strike="noStrike">
               <a:solidFill>
                 <a:srgbClr val="000000"/>
               </a:solidFill>
@@ -12136,7 +11944,7 @@
               </a:rPr>
               <a:t>Course material </a:t>
             </a:r>
-            <a:endParaRPr b="0" lang="en-US" sz="1800" spc="-1" strike="noStrike">
+            <a:endParaRPr b="0" lang="de-DE" sz="1800" spc="-1" strike="noStrike">
               <a:solidFill>
                 <a:srgbClr val="000000"/>
               </a:solidFill>
@@ -12168,7 +11976,7 @@
               </a:rPr>
               <a:t>Thesis/project topics</a:t>
             </a:r>
-            <a:endParaRPr b="0" lang="en-US" sz="1800" spc="-1" strike="noStrike">
+            <a:endParaRPr b="0" lang="de-DE" sz="1800" spc="-1" strike="noStrike">
               <a:solidFill>
                 <a:srgbClr val="000000"/>
               </a:solidFill>
@@ -12200,7 +12008,7 @@
               </a:rPr>
               <a:t>Publications</a:t>
             </a:r>
-            <a:endParaRPr b="0" lang="en-US" sz="1800" spc="-1" strike="noStrike">
+            <a:endParaRPr b="0" lang="de-DE" sz="1800" spc="-1" strike="noStrike">
               <a:solidFill>
                 <a:srgbClr val="000000"/>
               </a:solidFill>
@@ -12232,7 +12040,7 @@
               </a:rPr>
               <a:t>Etc.</a:t>
             </a:r>
-            <a:endParaRPr b="0" lang="en-US" sz="1800" spc="-1" strike="noStrike">
+            <a:endParaRPr b="0" lang="de-DE" sz="1800" spc="-1" strike="noStrike">
               <a:solidFill>
                 <a:srgbClr val="000000"/>
               </a:solidFill>
@@ -12251,7 +12059,7 @@
                 <a:tab algn="l" pos="0"/>
               </a:tabLst>
             </a:pPr>
-            <a:endParaRPr b="0" lang="en-US" sz="1800" spc="-1" strike="noStrike">
+            <a:endParaRPr b="0" lang="de-DE" sz="1800" spc="-1" strike="noStrike">
               <a:solidFill>
                 <a:srgbClr val="000000"/>
               </a:solidFill>
@@ -12286,7 +12094,7 @@
               </a:rPr>
               <a:t>Our research in action:</a:t>
             </a:r>
-            <a:endParaRPr b="0" lang="en-US" sz="2000" spc="-1" strike="noStrike">
+            <a:endParaRPr b="0" lang="de-DE" sz="2000" spc="-1" strike="noStrike">
               <a:solidFill>
                 <a:srgbClr val="000000"/>
               </a:solidFill>
@@ -12343,7 +12151,7 @@
               </a:rPr>
               <a:t> </a:t>
             </a:r>
-            <a:endParaRPr b="0" lang="en-US" sz="2000" spc="-1" strike="noStrike">
+            <a:endParaRPr b="0" lang="de-DE" sz="2000" spc="-1" strike="noStrike">
               <a:solidFill>
                 <a:srgbClr val="000000"/>
               </a:solidFill>
@@ -12400,7 +12208,7 @@
               </a:rPr>
               <a:t> </a:t>
             </a:r>
-            <a:endParaRPr b="0" lang="en-US" sz="2000" spc="-1" strike="noStrike">
+            <a:endParaRPr b="0" lang="de-DE" sz="2000" spc="-1" strike="noStrike">
               <a:solidFill>
                 <a:srgbClr val="000000"/>
               </a:solidFill>
@@ -12419,7 +12227,7 @@
                 <a:tab algn="l" pos="0"/>
               </a:tabLst>
             </a:pPr>
-            <a:endParaRPr b="0" lang="en-US" sz="2000" spc="-1" strike="noStrike">
+            <a:endParaRPr b="0" lang="de-DE" sz="2000" spc="-1" strike="noStrike">
               <a:solidFill>
                 <a:srgbClr val="000000"/>
               </a:solidFill>
@@ -12454,7 +12262,7 @@
               </a:rPr>
               <a:t>You want join us? Write us an email! </a:t>
             </a:r>
-            <a:endParaRPr b="0" lang="en-US" sz="2000" spc="-1" strike="noStrike">
+            <a:endParaRPr b="0" lang="de-DE" sz="2000" spc="-1" strike="noStrike">
               <a:solidFill>
                 <a:srgbClr val="000000"/>
               </a:solidFill>
@@ -12499,7 +12307,7 @@
               </a:rPr>
               <a:t>benjamin.leiding@tu-clausthal.de</a:t>
             </a:r>
-            <a:endParaRPr b="0" lang="en-US" sz="1600" spc="-1" strike="noStrike">
+            <a:endParaRPr b="0" lang="de-DE" sz="1600" spc="-1" strike="noStrike">
               <a:solidFill>
                 <a:srgbClr val="000000"/>
               </a:solidFill>
@@ -12547,7 +12355,7 @@
         <p:spPr>
           <a:xfrm>
             <a:off x="542880" y="721800"/>
-            <a:ext cx="10351800" cy="492480"/>
+            <a:ext cx="10351440" cy="492120"/>
           </a:xfrm>
           <a:prstGeom prst="rect">
             <a:avLst/>
@@ -12583,7 +12391,7 @@
               </a:rPr>
               <a:t>Course Content</a:t>
             </a:r>
-            <a:endParaRPr b="0" lang="en-US" sz="2200" spc="-1" strike="noStrike">
+            <a:endParaRPr b="0" lang="de-DE" sz="2200" spc="-1" strike="noStrike">
               <a:solidFill>
                 <a:srgbClr val="000000"/>
               </a:solidFill>
@@ -12601,7 +12409,7 @@
         <p:spPr>
           <a:xfrm>
             <a:off x="451800" y="1709280"/>
-            <a:ext cx="8219160" cy="4347360"/>
+            <a:ext cx="8218800" cy="4347000"/>
           </a:xfrm>
           <a:prstGeom prst="rect">
             <a:avLst/>
@@ -12646,7 +12454,7 @@
         <p:spPr>
           <a:xfrm>
             <a:off x="609480" y="1769400"/>
-            <a:ext cx="10582200" cy="4850280"/>
+            <a:ext cx="10581840" cy="4849920"/>
           </a:xfrm>
           <a:prstGeom prst="rect">
             <a:avLst/>
@@ -12691,7 +12499,7 @@
               </a:rPr>
               <a:t>Core terminology and core tasks of requirements engineering </a:t>
             </a:r>
-            <a:endParaRPr b="0" lang="en-US" sz="2000" spc="-1" strike="noStrike">
+            <a:endParaRPr b="0" lang="de-DE" sz="2000" spc="-1" strike="noStrike">
               <a:solidFill>
                 <a:srgbClr val="000000"/>
               </a:solidFill>
@@ -12723,7 +12531,7 @@
               </a:rPr>
               <a:t>Requirements engineering process</a:t>
             </a:r>
-            <a:endParaRPr b="0" lang="en-US" sz="2000" spc="-1" strike="noStrike">
+            <a:endParaRPr b="0" lang="de-DE" sz="2000" spc="-1" strike="noStrike">
               <a:solidFill>
                 <a:srgbClr val="000000"/>
               </a:solidFill>
@@ -12755,7 +12563,7 @@
               </a:rPr>
               <a:t>Elicitation techniques</a:t>
             </a:r>
-            <a:endParaRPr b="0" lang="en-US" sz="2000" spc="-1" strike="noStrike">
+            <a:endParaRPr b="0" lang="de-DE" sz="2000" spc="-1" strike="noStrike">
               <a:solidFill>
                 <a:srgbClr val="000000"/>
               </a:solidFill>
@@ -12787,7 +12595,7 @@
               </a:rPr>
               <a:t>Documentation methods </a:t>
             </a:r>
-            <a:endParaRPr b="0" lang="en-US" sz="2000" spc="-1" strike="noStrike">
+            <a:endParaRPr b="0" lang="de-DE" sz="2000" spc="-1" strike="noStrike">
               <a:solidFill>
                 <a:srgbClr val="000000"/>
               </a:solidFill>
@@ -12819,7 +12627,7 @@
               </a:rPr>
               <a:t>Textual, model-based and formal requirements specification</a:t>
             </a:r>
-            <a:endParaRPr b="0" lang="en-US" sz="2000" spc="-1" strike="noStrike">
+            <a:endParaRPr b="0" lang="de-DE" sz="2000" spc="-1" strike="noStrike">
               <a:solidFill>
                 <a:srgbClr val="000000"/>
               </a:solidFill>
@@ -12851,7 +12659,7 @@
               </a:rPr>
               <a:t>Requirements negotiation</a:t>
             </a:r>
-            <a:endParaRPr b="0" lang="en-US" sz="2000" spc="-1" strike="noStrike">
+            <a:endParaRPr b="0" lang="de-DE" sz="2000" spc="-1" strike="noStrike">
               <a:solidFill>
                 <a:srgbClr val="000000"/>
               </a:solidFill>
@@ -12883,7 +12691,7 @@
               </a:rPr>
               <a:t>Requirements Management</a:t>
             </a:r>
-            <a:endParaRPr b="0" lang="en-US" sz="2000" spc="-1" strike="noStrike">
+            <a:endParaRPr b="0" lang="de-DE" sz="2000" spc="-1" strike="noStrike">
               <a:solidFill>
                 <a:srgbClr val="000000"/>
               </a:solidFill>
@@ -12915,7 +12723,7 @@
               </a:rPr>
               <a:t>Traceability</a:t>
             </a:r>
-            <a:endParaRPr b="0" lang="en-US" sz="2000" spc="-1" strike="noStrike">
+            <a:endParaRPr b="0" lang="de-DE" sz="2000" spc="-1" strike="noStrike">
               <a:solidFill>
                 <a:srgbClr val="000000"/>
               </a:solidFill>
@@ -12947,7 +12755,7 @@
               </a:rPr>
               <a:t>Requirements validation and quality assurance</a:t>
             </a:r>
-            <a:endParaRPr b="0" lang="en-US" sz="2000" spc="-1" strike="noStrike">
+            <a:endParaRPr b="0" lang="de-DE" sz="2000" spc="-1" strike="noStrike">
               <a:solidFill>
                 <a:srgbClr val="000000"/>
               </a:solidFill>
@@ -12995,7 +12803,7 @@
         <p:spPr>
           <a:xfrm>
             <a:off x="542880" y="721800"/>
-            <a:ext cx="10351800" cy="492480"/>
+            <a:ext cx="10351440" cy="492120"/>
           </a:xfrm>
           <a:prstGeom prst="rect">
             <a:avLst/>
@@ -13031,7 +12839,7 @@
               </a:rPr>
               <a:t>Learning Outcome</a:t>
             </a:r>
-            <a:endParaRPr b="0" lang="en-US" sz="2200" spc="-1" strike="noStrike">
+            <a:endParaRPr b="0" lang="de-DE" sz="2200" spc="-1" strike="noStrike">
               <a:solidFill>
                 <a:srgbClr val="000000"/>
               </a:solidFill>
@@ -13049,7 +12857,7 @@
         <p:spPr>
           <a:xfrm>
             <a:off x="451800" y="1709280"/>
-            <a:ext cx="8219160" cy="4347360"/>
+            <a:ext cx="8218800" cy="4347000"/>
           </a:xfrm>
           <a:prstGeom prst="rect">
             <a:avLst/>
@@ -13094,7 +12902,7 @@
         <p:spPr>
           <a:xfrm>
             <a:off x="609480" y="1769400"/>
-            <a:ext cx="10582200" cy="4850280"/>
+            <a:ext cx="10581840" cy="4849920"/>
           </a:xfrm>
           <a:prstGeom prst="rect">
             <a:avLst/>
@@ -13139,7 +12947,7 @@
               </a:rPr>
               <a:t>Core terminology and core tasks of requirements engineering </a:t>
             </a:r>
-            <a:endParaRPr b="0" lang="en-US" sz="2000" spc="-1" strike="noStrike">
+            <a:endParaRPr b="0" lang="de-DE" sz="2000" spc="-1" strike="noStrike">
               <a:solidFill>
                 <a:srgbClr val="000000"/>
               </a:solidFill>
@@ -13171,7 +12979,7 @@
               </a:rPr>
               <a:t>Understanding of the requirements engineering process</a:t>
             </a:r>
-            <a:endParaRPr b="0" lang="en-US" sz="2000" spc="-1" strike="noStrike">
+            <a:endParaRPr b="0" lang="de-DE" sz="2000" spc="-1" strike="noStrike">
               <a:solidFill>
                 <a:srgbClr val="000000"/>
               </a:solidFill>
@@ -13203,7 +13011,7 @@
               </a:rPr>
               <a:t>Ability to choose, justify and apply appropriate methods and techniques for each step of the requirements engineering process given project constraints and properties</a:t>
             </a:r>
-            <a:endParaRPr b="0" lang="en-US" sz="2000" spc="-1" strike="noStrike">
+            <a:endParaRPr b="0" lang="de-DE" sz="2000" spc="-1" strike="noStrike">
               <a:solidFill>
                 <a:srgbClr val="000000"/>
               </a:solidFill>
@@ -13222,7 +13030,7 @@
                 <a:tab algn="l" pos="0"/>
               </a:tabLst>
             </a:pPr>
-            <a:endParaRPr b="0" lang="en-US" sz="2000" spc="-1" strike="noStrike">
+            <a:endParaRPr b="0" lang="de-DE" sz="2000" spc="-1" strike="noStrike">
               <a:solidFill>
                 <a:srgbClr val="000000"/>
               </a:solidFill>
@@ -13251,7 +13059,7 @@
               </a:rPr>
               <a:t>What is this course about, what is it not about? </a:t>
             </a:r>
-            <a:endParaRPr b="0" lang="en-US" sz="1600" spc="-1" strike="noStrike">
+            <a:endParaRPr b="0" lang="de-DE" sz="1600" spc="-1" strike="noStrike">
               <a:solidFill>
                 <a:srgbClr val="000000"/>
               </a:solidFill>
@@ -13299,7 +13107,7 @@
         <p:spPr>
           <a:xfrm>
             <a:off x="539640" y="764640"/>
-            <a:ext cx="10746000" cy="496800"/>
+            <a:ext cx="10745640" cy="496440"/>
           </a:xfrm>
           <a:prstGeom prst="rect">
             <a:avLst/>
@@ -13335,7 +13143,7 @@
               </a:rPr>
               <a:t>Disclaimer</a:t>
             </a:r>
-            <a:endParaRPr b="0" lang="en-US" sz="2200" spc="-1" strike="noStrike">
+            <a:endParaRPr b="0" lang="de-DE" sz="2200" spc="-1" strike="noStrike">
               <a:solidFill>
                 <a:srgbClr val="000000"/>
               </a:solidFill>
@@ -13353,7 +13161,7 @@
         <p:spPr>
           <a:xfrm>
             <a:off x="539640" y="1268280"/>
-            <a:ext cx="10746000" cy="5033520"/>
+            <a:ext cx="10745640" cy="5033160"/>
           </a:xfrm>
           <a:prstGeom prst="rect">
             <a:avLst/>
@@ -13418,7 +13226,7 @@
               </a:rPr>
               <a:t> (2010)” from Klaus Pohl</a:t>
             </a:r>
-            <a:endParaRPr b="0" lang="en-US" sz="1800" spc="-1" strike="noStrike">
+            <a:endParaRPr b="0" lang="de-DE" sz="1800" spc="-1" strike="noStrike">
               <a:solidFill>
                 <a:srgbClr val="000000"/>
               </a:solidFill>
@@ -13434,7 +13242,7 @@
                 <a:spcPts val="360"/>
               </a:spcBef>
             </a:pPr>
-            <a:endParaRPr b="0" lang="en-US" sz="1800" spc="-1" strike="noStrike">
+            <a:endParaRPr b="0" lang="de-DE" sz="1800" spc="-1" strike="noStrike">
               <a:solidFill>
                 <a:srgbClr val="000000"/>
               </a:solidFill>
@@ -13466,7 +13274,7 @@
               </a:rPr>
               <a:t>Special thanks to Prof. Dr. Steffen Herbold and Dr. Christian Bartelt, who provided valuable input in the form of the teaching materials of their requirements engineering courses. </a:t>
             </a:r>
-            <a:endParaRPr b="0" lang="en-US" sz="1800" spc="-1" strike="noStrike">
+            <a:endParaRPr b="0" lang="de-DE" sz="1800" spc="-1" strike="noStrike">
               <a:solidFill>
                 <a:srgbClr val="000000"/>
               </a:solidFill>
@@ -13514,7 +13322,7 @@
         <p:spPr>
           <a:xfrm>
             <a:off x="542880" y="721800"/>
-            <a:ext cx="10354680" cy="495360"/>
+            <a:ext cx="10354320" cy="495000"/>
           </a:xfrm>
           <a:prstGeom prst="rect">
             <a:avLst/>
@@ -13550,7 +13358,7 @@
               </a:rPr>
               <a:t>Course Content</a:t>
             </a:r>
-            <a:endParaRPr b="0" lang="en-US" sz="2200" spc="-1" strike="noStrike">
+            <a:endParaRPr b="0" lang="de-DE" sz="2200" spc="-1" strike="noStrike">
               <a:solidFill>
                 <a:srgbClr val="000000"/>
               </a:solidFill>
@@ -13572,7 +13380,7 @@
         <p:spPr>
           <a:xfrm>
             <a:off x="542880" y="2387520"/>
-            <a:ext cx="10099800" cy="2077200"/>
+            <a:ext cx="10099440" cy="2076840"/>
           </a:xfrm>
           <a:prstGeom prst="rect">
             <a:avLst/>
@@ -13621,7 +13429,7 @@
         <p:spPr>
           <a:xfrm>
             <a:off x="539640" y="764640"/>
-            <a:ext cx="10739160" cy="489960"/>
+            <a:ext cx="10738800" cy="489600"/>
           </a:xfrm>
           <a:prstGeom prst="rect">
             <a:avLst/>
@@ -13657,7 +13465,7 @@
               </a:rPr>
               <a:t>Lectures</a:t>
             </a:r>
-            <a:endParaRPr b="0" lang="en-US" sz="2400" spc="-1" strike="noStrike">
+            <a:endParaRPr b="0" lang="de-DE" sz="2400" spc="-1" strike="noStrike">
               <a:solidFill>
                 <a:srgbClr val="000000"/>
               </a:solidFill>
@@ -13707,7 +13515,7 @@
                         </a:rPr>
                         <a:t>Week</a:t>
                       </a:r>
-                      <a:endParaRPr b="0" lang="en-US" sz="1200" spc="-1" strike="noStrike">
+                      <a:endParaRPr b="0" lang="de-DE" sz="1200" spc="-1" strike="noStrike">
                         <a:solidFill>
                           <a:srgbClr val="000000"/>
                         </a:solidFill>
@@ -13765,7 +13573,7 @@
                         </a:rPr>
                         <a:t>Date</a:t>
                       </a:r>
-                      <a:endParaRPr b="0" lang="en-US" sz="1200" spc="-1" strike="noStrike">
+                      <a:endParaRPr b="0" lang="de-DE" sz="1200" spc="-1" strike="noStrike">
                         <a:solidFill>
                           <a:srgbClr val="000000"/>
                         </a:solidFill>
@@ -13824,7 +13632,7 @@
                         </a:rPr>
                         <a:t>Lecture</a:t>
                       </a:r>
-                      <a:endParaRPr b="0" lang="en-US" sz="1200" spc="-1" strike="noStrike">
+                      <a:endParaRPr b="0" lang="de-DE" sz="1200" spc="-1" strike="noStrike">
                         <a:solidFill>
                           <a:srgbClr val="000000"/>
                         </a:solidFill>
@@ -13882,7 +13690,7 @@
                         </a:rPr>
                         <a:t>Location</a:t>
                       </a:r>
-                      <a:endParaRPr b="0" lang="en-US" sz="1200" spc="-1" strike="noStrike">
+                      <a:endParaRPr b="0" lang="de-DE" sz="1200" spc="-1" strike="noStrike">
                         <a:solidFill>
                           <a:srgbClr val="000000"/>
                         </a:solidFill>
@@ -13942,7 +13750,7 @@
                         </a:rPr>
                         <a:t>1</a:t>
                       </a:r>
-                      <a:endParaRPr b="0" lang="en-US" sz="1200" spc="-1" strike="noStrike">
+                      <a:endParaRPr b="0" lang="de-DE" sz="1200" spc="-1" strike="noStrike">
                         <a:solidFill>
                           <a:srgbClr val="000000"/>
                         </a:solidFill>
@@ -14000,7 +13808,7 @@
                         </a:rPr>
                         <a:t>30.10.2023</a:t>
                       </a:r>
-                      <a:endParaRPr b="0" lang="en-US" sz="1200" spc="-1" strike="noStrike">
+                      <a:endParaRPr b="0" lang="de-DE" sz="1200" spc="-1" strike="noStrike">
                         <a:solidFill>
                           <a:srgbClr val="000000"/>
                         </a:solidFill>
@@ -14058,7 +13866,7 @@
                         </a:rPr>
                         <a:t>Organization (L00)</a:t>
                       </a:r>
-                      <a:endParaRPr b="0" lang="en-US" sz="1200" spc="-1" strike="noStrike">
+                      <a:endParaRPr b="0" lang="de-DE" sz="1200" spc="-1" strike="noStrike">
                         <a:solidFill>
                           <a:srgbClr val="000000"/>
                         </a:solidFill>
@@ -14116,7 +13924,7 @@
                         </a:rPr>
                         <a:t>BBB (Online+LIVE in Gotec)</a:t>
                       </a:r>
-                      <a:endParaRPr b="0" lang="en-US" sz="1200" spc="-1" strike="noStrike">
+                      <a:endParaRPr b="0" lang="de-DE" sz="1200" spc="-1" strike="noStrike">
                         <a:solidFill>
                           <a:srgbClr val="000000"/>
                         </a:solidFill>
@@ -14176,7 +13984,7 @@
                         </a:rPr>
                         <a:t>2</a:t>
                       </a:r>
-                      <a:endParaRPr b="0" lang="en-US" sz="1200" spc="-1" strike="noStrike">
+                      <a:endParaRPr b="0" lang="de-DE" sz="1200" spc="-1" strike="noStrike">
                         <a:solidFill>
                           <a:srgbClr val="000000"/>
                         </a:solidFill>
@@ -14234,7 +14042,7 @@
                         </a:rPr>
                         <a:t>06.11.2023</a:t>
                       </a:r>
-                      <a:endParaRPr b="0" lang="en-US" sz="1200" spc="-1" strike="noStrike">
+                      <a:endParaRPr b="0" lang="de-DE" sz="1200" spc="-1" strike="noStrike">
                         <a:solidFill>
                           <a:srgbClr val="000000"/>
                         </a:solidFill>
@@ -14292,7 +14100,7 @@
                         </a:rPr>
                         <a:t>Introduction (L01)</a:t>
                       </a:r>
-                      <a:endParaRPr b="0" lang="en-US" sz="1200" spc="-1" strike="noStrike">
+                      <a:endParaRPr b="0" lang="de-DE" sz="1200" spc="-1" strike="noStrike">
                         <a:solidFill>
                           <a:srgbClr val="000000"/>
                         </a:solidFill>
@@ -14350,7 +14158,7 @@
                         </a:rPr>
                         <a:t>MOOC</a:t>
                       </a:r>
-                      <a:endParaRPr b="0" lang="en-US" sz="1200" spc="-1" strike="noStrike">
+                      <a:endParaRPr b="0" lang="de-DE" sz="1200" spc="-1" strike="noStrike">
                         <a:solidFill>
                           <a:srgbClr val="000000"/>
                         </a:solidFill>
@@ -14410,7 +14218,7 @@
                         </a:rPr>
                         <a:t>3</a:t>
                       </a:r>
-                      <a:endParaRPr b="0" lang="en-US" sz="1200" spc="-1" strike="noStrike">
+                      <a:endParaRPr b="0" lang="de-DE" sz="1200" spc="-1" strike="noStrike">
                         <a:solidFill>
                           <a:srgbClr val="000000"/>
                         </a:solidFill>
@@ -14468,7 +14276,7 @@
                         </a:rPr>
                         <a:t>13.11.2023</a:t>
                       </a:r>
-                      <a:endParaRPr b="0" lang="en-US" sz="1200" spc="-1" strike="noStrike">
+                      <a:endParaRPr b="0" lang="de-DE" sz="1200" spc="-1" strike="noStrike">
                         <a:solidFill>
                           <a:srgbClr val="000000"/>
                         </a:solidFill>
@@ -14526,7 +14334,7 @@
                         </a:rPr>
                         <a:t>System Context/Boundaries and Types of Requirements (L02)</a:t>
                       </a:r>
-                      <a:endParaRPr b="0" lang="en-US" sz="1200" spc="-1" strike="noStrike">
+                      <a:endParaRPr b="0" lang="de-DE" sz="1200" spc="-1" strike="noStrike">
                         <a:solidFill>
                           <a:srgbClr val="000000"/>
                         </a:solidFill>
@@ -14584,7 +14392,7 @@
                         </a:rPr>
                         <a:t>MOOC</a:t>
                       </a:r>
-                      <a:endParaRPr b="0" lang="en-US" sz="1200" spc="-1" strike="noStrike">
+                      <a:endParaRPr b="0" lang="de-DE" sz="1200" spc="-1" strike="noStrike">
                         <a:solidFill>
                           <a:srgbClr val="000000"/>
                         </a:solidFill>
@@ -14644,7 +14452,7 @@
                         </a:rPr>
                         <a:t>4</a:t>
                       </a:r>
-                      <a:endParaRPr b="0" lang="en-US" sz="1200" spc="-1" strike="noStrike">
+                      <a:endParaRPr b="0" lang="de-DE" sz="1200" spc="-1" strike="noStrike">
                         <a:solidFill>
                           <a:srgbClr val="000000"/>
                         </a:solidFill>
@@ -14702,7 +14510,7 @@
                         </a:rPr>
                         <a:t>20.11.2023</a:t>
                       </a:r>
-                      <a:endParaRPr b="0" lang="en-US" sz="1200" spc="-1" strike="noStrike">
+                      <a:endParaRPr b="0" lang="de-DE" sz="1200" spc="-1" strike="noStrike">
                         <a:solidFill>
                           <a:srgbClr val="000000"/>
                         </a:solidFill>
@@ -14760,7 +14568,7 @@
                         </a:rPr>
                         <a:t>Elicitation (L03 + L04),</a:t>
                       </a:r>
-                      <a:endParaRPr b="0" lang="en-US" sz="1200" spc="-1" strike="noStrike">
+                      <a:endParaRPr b="0" lang="de-DE" sz="1200" spc="-1" strike="noStrike">
                         <a:solidFill>
                           <a:srgbClr val="000000"/>
                         </a:solidFill>
@@ -14782,7 +14590,7 @@
                         </a:rPr>
                         <a:t>Negotiation (L05)</a:t>
                       </a:r>
-                      <a:endParaRPr b="0" lang="en-US" sz="1200" spc="-1" strike="noStrike">
+                      <a:endParaRPr b="0" lang="de-DE" sz="1200" spc="-1" strike="noStrike">
                         <a:solidFill>
                           <a:srgbClr val="000000"/>
                         </a:solidFill>
@@ -14840,7 +14648,7 @@
                         </a:rPr>
                         <a:t>MOOC</a:t>
                       </a:r>
-                      <a:endParaRPr b="0" lang="en-US" sz="1200" spc="-1" strike="noStrike">
+                      <a:endParaRPr b="0" lang="de-DE" sz="1200" spc="-1" strike="noStrike">
                         <a:solidFill>
                           <a:srgbClr val="000000"/>
                         </a:solidFill>
@@ -14900,7 +14708,7 @@
                         </a:rPr>
                         <a:t>5</a:t>
                       </a:r>
-                      <a:endParaRPr b="0" lang="en-US" sz="1200" spc="-1" strike="noStrike">
+                      <a:endParaRPr b="0" lang="de-DE" sz="1200" spc="-1" strike="noStrike">
                         <a:solidFill>
                           <a:srgbClr val="000000"/>
                         </a:solidFill>
@@ -14958,7 +14766,7 @@
                         </a:rPr>
                         <a:t>27.11.2023</a:t>
                       </a:r>
-                      <a:endParaRPr b="0" lang="en-US" sz="1200" spc="-1" strike="noStrike">
+                      <a:endParaRPr b="0" lang="de-DE" sz="1200" spc="-1" strike="noStrike">
                         <a:solidFill>
                           <a:srgbClr val="000000"/>
                         </a:solidFill>
@@ -15002,7 +14810,7 @@
                       <a:noAutofit/>
                     </a:bodyPr>
                     <a:p>
-                      <a:endParaRPr b="0" lang="en-US" sz="1800" spc="-1" strike="noStrike">
+                      <a:endParaRPr b="0" lang="de-DE" sz="1800" spc="-1" strike="noStrike">
                         <a:solidFill>
                           <a:srgbClr val="000000"/>
                         </a:solidFill>
@@ -15034,7 +14842,7 @@
                       <a:noAutofit/>
                     </a:bodyPr>
                     <a:p>
-                      <a:endParaRPr b="0" lang="en-US" sz="1800" spc="-1" strike="noStrike">
+                      <a:endParaRPr b="0" lang="de-DE" sz="1800" spc="-1" strike="noStrike">
                         <a:solidFill>
                           <a:srgbClr val="000000"/>
                         </a:solidFill>
@@ -15082,7 +14890,7 @@
                         </a:rPr>
                         <a:t>6</a:t>
                       </a:r>
-                      <a:endParaRPr b="0" lang="en-US" sz="1200" spc="-1" strike="noStrike">
+                      <a:endParaRPr b="0" lang="de-DE" sz="1200" spc="-1" strike="noStrike">
                         <a:solidFill>
                           <a:srgbClr val="000000"/>
                         </a:solidFill>
@@ -15140,7 +14948,7 @@
                         </a:rPr>
                         <a:t>04.12.2023</a:t>
                       </a:r>
-                      <a:endParaRPr b="0" lang="en-US" sz="1200" spc="-1" strike="noStrike">
+                      <a:endParaRPr b="0" lang="de-DE" sz="1200" spc="-1" strike="noStrike">
                         <a:solidFill>
                           <a:srgbClr val="000000"/>
                         </a:solidFill>
@@ -15196,7 +15004,7 @@
                         </a:rPr>
                         <a:t>Documentation – Introduction (L06),</a:t>
                       </a:r>
-                      <a:endParaRPr b="0" lang="en-US" sz="1200" spc="-1" strike="noStrike">
+                      <a:endParaRPr b="0" lang="de-DE" sz="1200" spc="-1" strike="noStrike">
                         <a:solidFill>
                           <a:srgbClr val="000000"/>
                         </a:solidFill>
@@ -15218,7 +15026,7 @@
                         </a:rPr>
                         <a:t>Documentation – Textual Requirements Specification (L07)</a:t>
                       </a:r>
-                      <a:endParaRPr b="0" lang="en-US" sz="1200" spc="-1" strike="noStrike">
+                      <a:endParaRPr b="0" lang="de-DE" sz="1200" spc="-1" strike="noStrike">
                         <a:solidFill>
                           <a:srgbClr val="000000"/>
                         </a:solidFill>
@@ -15276,7 +15084,7 @@
                         </a:rPr>
                         <a:t>MOOC</a:t>
                       </a:r>
-                      <a:endParaRPr b="0" lang="en-US" sz="1200" spc="-1" strike="noStrike">
+                      <a:endParaRPr b="0" lang="de-DE" sz="1200" spc="-1" strike="noStrike">
                         <a:solidFill>
                           <a:srgbClr val="000000"/>
                         </a:solidFill>
@@ -15334,7 +15142,7 @@
                         </a:rPr>
                         <a:t>7</a:t>
                       </a:r>
-                      <a:endParaRPr b="0" lang="en-US" sz="1200" spc="-1" strike="noStrike">
+                      <a:endParaRPr b="0" lang="de-DE" sz="1200" spc="-1" strike="noStrike">
                         <a:solidFill>
                           <a:srgbClr val="000000"/>
                         </a:solidFill>
@@ -15392,7 +15200,7 @@
                         </a:rPr>
                         <a:t>11.12.2023</a:t>
                       </a:r>
-                      <a:endParaRPr b="0" lang="en-US" sz="1200" spc="-1" strike="noStrike">
+                      <a:endParaRPr b="0" lang="de-DE" sz="1200" spc="-1" strike="noStrike">
                         <a:solidFill>
                           <a:srgbClr val="000000"/>
                         </a:solidFill>
@@ -15434,7 +15242,7 @@
                       <a:noAutofit/>
                     </a:bodyPr>
                     <a:p>
-                      <a:endParaRPr b="0" lang="en-US" sz="1800" spc="-1" strike="noStrike">
+                      <a:endParaRPr b="0" lang="de-DE" sz="1800" spc="-1" strike="noStrike">
                         <a:solidFill>
                           <a:srgbClr val="000000"/>
                         </a:solidFill>
@@ -15466,7 +15274,7 @@
                       <a:noAutofit/>
                     </a:bodyPr>
                     <a:p>
-                      <a:endParaRPr b="0" lang="en-US" sz="1800" spc="-1" strike="noStrike">
+                      <a:endParaRPr b="0" lang="de-DE" sz="1800" spc="-1" strike="noStrike">
                         <a:solidFill>
                           <a:srgbClr val="000000"/>
                         </a:solidFill>
@@ -15514,7 +15322,7 @@
                         </a:rPr>
                         <a:t>8</a:t>
                       </a:r>
-                      <a:endParaRPr b="0" lang="en-US" sz="1200" spc="-1" strike="noStrike">
+                      <a:endParaRPr b="0" lang="de-DE" sz="1200" spc="-1" strike="noStrike">
                         <a:solidFill>
                           <a:srgbClr val="000000"/>
                         </a:solidFill>
@@ -15572,7 +15380,7 @@
                         </a:rPr>
                         <a:t>18.12.2023</a:t>
                       </a:r>
-                      <a:endParaRPr b="0" lang="en-US" sz="1200" spc="-1" strike="noStrike">
+                      <a:endParaRPr b="0" lang="de-DE" sz="1200" spc="-1" strike="noStrike">
                         <a:solidFill>
                           <a:srgbClr val="000000"/>
                         </a:solidFill>
@@ -15630,7 +15438,7 @@
                         </a:rPr>
                         <a:t>Documentation – Model-based Requirements Documentation (L08),</a:t>
                       </a:r>
-                      <a:endParaRPr b="0" lang="en-US" sz="1200" spc="-1" strike="noStrike">
+                      <a:endParaRPr b="0" lang="de-DE" sz="1200" spc="-1" strike="noStrike">
                         <a:solidFill>
                           <a:srgbClr val="000000"/>
                         </a:solidFill>
@@ -15652,7 +15460,7 @@
                         </a:rPr>
                         <a:t>Documentation – Formal Requirements Specification (L09)</a:t>
                       </a:r>
-                      <a:endParaRPr b="0" lang="en-US" sz="1200" spc="-1" strike="noStrike">
+                      <a:endParaRPr b="0" lang="de-DE" sz="1200" spc="-1" strike="noStrike">
                         <a:solidFill>
                           <a:srgbClr val="000000"/>
                         </a:solidFill>
@@ -15708,7 +15516,7 @@
                         </a:rPr>
                         <a:t>MOOC</a:t>
                       </a:r>
-                      <a:endParaRPr b="0" lang="en-US" sz="1200" spc="-1" strike="noStrike">
+                      <a:endParaRPr b="0" lang="de-DE" sz="1200" spc="-1" strike="noStrike">
                         <a:solidFill>
                           <a:srgbClr val="000000"/>
                         </a:solidFill>
@@ -15766,7 +15574,7 @@
                         </a:rPr>
                         <a:t>9</a:t>
                       </a:r>
-                      <a:endParaRPr b="0" lang="en-US" sz="1200" spc="-1" strike="noStrike">
+                      <a:endParaRPr b="0" lang="de-DE" sz="1200" spc="-1" strike="noStrike">
                         <a:solidFill>
                           <a:srgbClr val="000000"/>
                         </a:solidFill>
@@ -15824,7 +15632,7 @@
                         </a:rPr>
                         <a:t>08.01.2024</a:t>
                       </a:r>
-                      <a:endParaRPr b="0" lang="en-US" sz="1200" spc="-1" strike="noStrike">
+                      <a:endParaRPr b="0" lang="de-DE" sz="1200" spc="-1" strike="noStrike">
                         <a:solidFill>
                           <a:srgbClr val="000000"/>
                         </a:solidFill>
@@ -15868,7 +15676,7 @@
                       <a:noAutofit/>
                     </a:bodyPr>
                     <a:p>
-                      <a:endParaRPr b="0" lang="en-US" sz="1800" spc="-1" strike="noStrike">
+                      <a:endParaRPr b="0" lang="de-DE" sz="1800" spc="-1" strike="noStrike">
                         <a:solidFill>
                           <a:srgbClr val="000000"/>
                         </a:solidFill>
@@ -15900,7 +15708,7 @@
                       <a:noAutofit/>
                     </a:bodyPr>
                     <a:p>
-                      <a:endParaRPr b="0" lang="en-US" sz="1800" spc="-1" strike="noStrike">
+                      <a:endParaRPr b="0" lang="de-DE" sz="1800" spc="-1" strike="noStrike">
                         <a:solidFill>
                           <a:srgbClr val="000000"/>
                         </a:solidFill>
@@ -15948,7 +15756,7 @@
                         </a:rPr>
                         <a:t>10</a:t>
                       </a:r>
-                      <a:endParaRPr b="0" lang="en-US" sz="1200" spc="-1" strike="noStrike">
+                      <a:endParaRPr b="0" lang="de-DE" sz="1200" spc="-1" strike="noStrike">
                         <a:solidFill>
                           <a:srgbClr val="000000"/>
                         </a:solidFill>
@@ -16006,7 +15814,7 @@
                         </a:rPr>
                         <a:t>15.01.2024</a:t>
                       </a:r>
-                      <a:endParaRPr b="0" lang="en-US" sz="1200" spc="-1" strike="noStrike">
+                      <a:endParaRPr b="0" lang="de-DE" sz="1200" spc="-1" strike="noStrike">
                         <a:solidFill>
                           <a:srgbClr val="000000"/>
                         </a:solidFill>
@@ -16064,7 +15872,7 @@
                         </a:rPr>
                         <a:t>Requirements Validation (L10)</a:t>
                       </a:r>
-                      <a:endParaRPr b="0" lang="en-US" sz="1200" spc="-1" strike="noStrike">
+                      <a:endParaRPr b="0" lang="de-DE" sz="1200" spc="-1" strike="noStrike">
                         <a:solidFill>
                           <a:srgbClr val="000000"/>
                         </a:solidFill>
@@ -16122,7 +15930,7 @@
                         </a:rPr>
                         <a:t>MOOC</a:t>
                       </a:r>
-                      <a:endParaRPr b="0" lang="en-US" sz="1200" spc="-1" strike="noStrike">
+                      <a:endParaRPr b="0" lang="de-DE" sz="1200" spc="-1" strike="noStrike">
                         <a:solidFill>
                           <a:srgbClr val="000000"/>
                         </a:solidFill>
@@ -16182,7 +15990,7 @@
                         </a:rPr>
                         <a:t>11</a:t>
                       </a:r>
-                      <a:endParaRPr b="0" lang="en-US" sz="1200" spc="-1" strike="noStrike">
+                      <a:endParaRPr b="0" lang="de-DE" sz="1200" spc="-1" strike="noStrike">
                         <a:solidFill>
                           <a:srgbClr val="000000"/>
                         </a:solidFill>
@@ -16240,7 +16048,7 @@
                         </a:rPr>
                         <a:t>22.01.2024</a:t>
                       </a:r>
-                      <a:endParaRPr b="0" lang="en-US" sz="1200" spc="-1" strike="noStrike">
+                      <a:endParaRPr b="0" lang="de-DE" sz="1200" spc="-1" strike="noStrike">
                         <a:solidFill>
                           <a:srgbClr val="000000"/>
                         </a:solidFill>
@@ -16298,7 +16106,7 @@
                         </a:rPr>
                         <a:t>Requirements Management (L11)</a:t>
                       </a:r>
-                      <a:endParaRPr b="0" lang="en-US" sz="1200" spc="-1" strike="noStrike">
+                      <a:endParaRPr b="0" lang="de-DE" sz="1200" spc="-1" strike="noStrike">
                         <a:solidFill>
                           <a:srgbClr val="000000"/>
                         </a:solidFill>
@@ -16356,7 +16164,7 @@
                         </a:rPr>
                         <a:t>MOOC</a:t>
                       </a:r>
-                      <a:endParaRPr b="0" lang="en-US" sz="1200" spc="-1" strike="noStrike">
+                      <a:endParaRPr b="0" lang="de-DE" sz="1200" spc="-1" strike="noStrike">
                         <a:solidFill>
                           <a:srgbClr val="000000"/>
                         </a:solidFill>
@@ -16416,7 +16224,7 @@
                         </a:rPr>
                         <a:t>12</a:t>
                       </a:r>
-                      <a:endParaRPr b="0" lang="en-US" sz="1200" spc="-1" strike="noStrike">
+                      <a:endParaRPr b="0" lang="de-DE" sz="1200" spc="-1" strike="noStrike">
                         <a:solidFill>
                           <a:srgbClr val="000000"/>
                         </a:solidFill>
@@ -16474,7 +16282,7 @@
                         </a:rPr>
                         <a:t>29.01.2024</a:t>
                       </a:r>
-                      <a:endParaRPr b="0" lang="en-US" sz="1200" spc="-1" strike="noStrike">
+                      <a:endParaRPr b="0" lang="de-DE" sz="1200" spc="-1" strike="noStrike">
                         <a:solidFill>
                           <a:srgbClr val="000000"/>
                         </a:solidFill>
@@ -16532,7 +16340,7 @@
                         </a:rPr>
                         <a:t>Requirements Traceability (L12)</a:t>
                       </a:r>
-                      <a:endParaRPr b="0" lang="en-US" sz="1200" spc="-1" strike="noStrike">
+                      <a:endParaRPr b="0" lang="de-DE" sz="1200" spc="-1" strike="noStrike">
                         <a:solidFill>
                           <a:srgbClr val="000000"/>
                         </a:solidFill>
@@ -16590,7 +16398,7 @@
                         </a:rPr>
                         <a:t>MOOC</a:t>
                       </a:r>
-                      <a:endParaRPr b="0" lang="en-US" sz="1200" spc="-1" strike="noStrike">
+                      <a:endParaRPr b="0" lang="de-DE" sz="1200" spc="-1" strike="noStrike">
                         <a:solidFill>
                           <a:srgbClr val="000000"/>
                         </a:solidFill>
@@ -16650,7 +16458,7 @@
                         </a:rPr>
                         <a:t>13</a:t>
                       </a:r>
-                      <a:endParaRPr b="0" lang="en-US" sz="1200" spc="-1" strike="noStrike">
+                      <a:endParaRPr b="0" lang="de-DE" sz="1200" spc="-1" strike="noStrike">
                         <a:solidFill>
                           <a:srgbClr val="000000"/>
                         </a:solidFill>
@@ -16708,7 +16516,7 @@
                         </a:rPr>
                         <a:t>05.02.2024</a:t>
                       </a:r>
-                      <a:endParaRPr b="0" lang="en-US" sz="1200" spc="-1" strike="noStrike">
+                      <a:endParaRPr b="0" lang="de-DE" sz="1200" spc="-1" strike="noStrike">
                         <a:solidFill>
                           <a:srgbClr val="000000"/>
                         </a:solidFill>
@@ -16766,7 +16574,7 @@
                         </a:rPr>
                         <a:t>Tool Support (L13)</a:t>
                       </a:r>
-                      <a:endParaRPr b="0" lang="en-US" sz="1200" spc="-1" strike="noStrike">
+                      <a:endParaRPr b="0" lang="de-DE" sz="1200" spc="-1" strike="noStrike">
                         <a:solidFill>
                           <a:srgbClr val="000000"/>
                         </a:solidFill>
@@ -16824,7 +16632,7 @@
                         </a:rPr>
                         <a:t>MOOC</a:t>
                       </a:r>
-                      <a:endParaRPr b="0" lang="en-US" sz="1200" spc="-1" strike="noStrike">
+                      <a:endParaRPr b="0" lang="de-DE" sz="1200" spc="-1" strike="noStrike">
                         <a:solidFill>
                           <a:srgbClr val="000000"/>
                         </a:solidFill>
@@ -16884,7 +16692,7 @@
                         </a:rPr>
                         <a:t>14</a:t>
                       </a:r>
-                      <a:endParaRPr b="0" lang="en-US" sz="1200" spc="-1" strike="noStrike">
+                      <a:endParaRPr b="0" lang="de-DE" sz="1200" spc="-1" strike="noStrike">
                         <a:solidFill>
                           <a:srgbClr val="000000"/>
                         </a:solidFill>
@@ -16942,7 +16750,7 @@
                         </a:rPr>
                         <a:t>12.02.2024</a:t>
                       </a:r>
-                      <a:endParaRPr b="0" lang="en-US" sz="1200" spc="-1" strike="noStrike">
+                      <a:endParaRPr b="0" lang="de-DE" sz="1200" spc="-1" strike="noStrike">
                         <a:solidFill>
                           <a:srgbClr val="000000"/>
                         </a:solidFill>
@@ -17000,7 +16808,7 @@
                         </a:rPr>
                         <a:t>-- No Lecture --</a:t>
                       </a:r>
-                      <a:endParaRPr b="0" lang="en-US" sz="1200" spc="-1" strike="noStrike">
+                      <a:endParaRPr b="0" lang="de-DE" sz="1200" spc="-1" strike="noStrike">
                         <a:solidFill>
                           <a:srgbClr val="000000"/>
                         </a:solidFill>
@@ -17104,7 +16912,7 @@
                         </a:rPr>
                         <a:t>15</a:t>
                       </a:r>
-                      <a:endParaRPr b="0" lang="en-US" sz="1200" spc="-1" strike="noStrike">
+                      <a:endParaRPr b="0" lang="de-DE" sz="1200" spc="-1" strike="noStrike">
                         <a:solidFill>
                           <a:srgbClr val="000000"/>
                         </a:solidFill>
@@ -17162,7 +16970,7 @@
                         </a:rPr>
                         <a:t>26.02.2024</a:t>
                       </a:r>
-                      <a:endParaRPr b="0" lang="en-US" sz="1200" spc="-1" strike="noStrike">
+                      <a:endParaRPr b="0" lang="de-DE" sz="1200" spc="-1" strike="noStrike">
                         <a:solidFill>
                           <a:srgbClr val="000000"/>
                         </a:solidFill>
@@ -17220,7 +17028,7 @@
                         </a:rPr>
                         <a:t>Exam Q&amp;A</a:t>
                       </a:r>
-                      <a:endParaRPr b="0" lang="en-US" sz="1200" spc="-1" strike="noStrike">
+                      <a:endParaRPr b="0" lang="de-DE" sz="1200" spc="-1" strike="noStrike">
                         <a:solidFill>
                           <a:srgbClr val="000000"/>
                         </a:solidFill>
@@ -17278,7 +17086,7 @@
                         </a:rPr>
                         <a:t>BBB (Online+LIVE in Gotec)</a:t>
                       </a:r>
-                      <a:endParaRPr b="0" lang="en-US" sz="1200" spc="-1" strike="noStrike">
+                      <a:endParaRPr b="0" lang="de-DE" sz="1200" spc="-1" strike="noStrike">
                         <a:solidFill>
                           <a:srgbClr val="000000"/>
                         </a:solidFill>

</xml_diff>

<commit_message>
* re L00 fixes
</commit_message>
<xml_diff>
--- a/Requirements-Engineering/RE-L00-Organization.pptx
+++ b/Requirements-Engineering/RE-L00-Organization.pptx
@@ -379,7 +379,7 @@
             <a:pPr indent="0" algn="r">
               <a:buNone/>
             </a:pPr>
-            <a:fld id="{AA58D7B0-66D9-4A47-8CF4-9F32E046887F}" type="slidenum">
+            <a:fld id="{4DCE4F18-8F3E-4880-99CD-0438454A67F5}" type="slidenum">
               <a:rPr b="0" lang="en-GB" sz="1400" spc="-1" strike="noStrike">
                 <a:solidFill>
                   <a:srgbClr val="000000"/>
@@ -433,7 +433,7 @@
         <p:spPr>
           <a:xfrm>
             <a:off x="533520" y="763560"/>
-            <a:ext cx="6693480" cy="3761640"/>
+            <a:ext cx="6693120" cy="3761280"/>
           </a:xfrm>
           <a:prstGeom prst="rect">
             <a:avLst/>
@@ -456,7 +456,7 @@
         <p:spPr>
           <a:xfrm>
             <a:off x="777240" y="4777560"/>
-            <a:ext cx="6207120" cy="4515480"/>
+            <a:ext cx="6206760" cy="4515120"/>
           </a:xfrm>
           <a:prstGeom prst="rect">
             <a:avLst/>
@@ -492,7 +492,7 @@
         <p:spPr>
           <a:xfrm>
             <a:off x="4399200" y="9555480"/>
-            <a:ext cx="3362400" cy="492120"/>
+            <a:ext cx="3362040" cy="491760"/>
           </a:xfrm>
           <a:prstGeom prst="rect">
             <a:avLst/>
@@ -518,7 +518,7 @@
                 <a:spcPct val="100000"/>
               </a:lnSpc>
             </a:pPr>
-            <a:fld id="{94834666-A718-4F00-BCC6-7C3A389F0412}" type="slidenum">
+            <a:fld id="{74BBBE41-9BFE-4FC8-BB0F-493AFF0581EE}" type="slidenum">
               <a:rPr b="0" lang="en-GB" sz="1800" spc="-1" strike="noStrike">
                 <a:solidFill>
                   <a:srgbClr val="000000"/>
@@ -572,7 +572,7 @@
         <p:spPr>
           <a:xfrm>
             <a:off x="533520" y="763560"/>
-            <a:ext cx="6693480" cy="3761640"/>
+            <a:ext cx="6693120" cy="3761280"/>
           </a:xfrm>
           <a:prstGeom prst="rect">
             <a:avLst/>
@@ -595,7 +595,7 @@
         <p:spPr>
           <a:xfrm>
             <a:off x="777240" y="4777560"/>
-            <a:ext cx="6207120" cy="4515480"/>
+            <a:ext cx="6206760" cy="4515120"/>
           </a:xfrm>
           <a:prstGeom prst="rect">
             <a:avLst/>
@@ -631,7 +631,7 @@
         <p:spPr>
           <a:xfrm>
             <a:off x="4399200" y="9555480"/>
-            <a:ext cx="3362400" cy="492120"/>
+            <a:ext cx="3362040" cy="491760"/>
           </a:xfrm>
           <a:prstGeom prst="rect">
             <a:avLst/>
@@ -657,7 +657,7 @@
                 <a:spcPct val="100000"/>
               </a:lnSpc>
             </a:pPr>
-            <a:fld id="{03387847-61FB-474E-809C-88C83350CD93}" type="slidenum">
+            <a:fld id="{418E6DAF-CBF3-43FB-9839-971AB70E979E}" type="slidenum">
               <a:rPr b="0" lang="en-GB" sz="1800" spc="-1" strike="noStrike">
                 <a:solidFill>
                   <a:srgbClr val="000000"/>
@@ -711,7 +711,7 @@
         <p:spPr>
           <a:xfrm>
             <a:off x="533520" y="763560"/>
-            <a:ext cx="6693480" cy="3761640"/>
+            <a:ext cx="6693120" cy="3761280"/>
           </a:xfrm>
           <a:prstGeom prst="rect">
             <a:avLst/>
@@ -734,7 +734,7 @@
         <p:spPr>
           <a:xfrm>
             <a:off x="777240" y="4777560"/>
-            <a:ext cx="6207120" cy="4515480"/>
+            <a:ext cx="6206760" cy="4515120"/>
           </a:xfrm>
           <a:prstGeom prst="rect">
             <a:avLst/>
@@ -770,7 +770,7 @@
         <p:spPr>
           <a:xfrm>
             <a:off x="4399200" y="9555480"/>
-            <a:ext cx="3362400" cy="492120"/>
+            <a:ext cx="3362040" cy="491760"/>
           </a:xfrm>
           <a:prstGeom prst="rect">
             <a:avLst/>
@@ -796,7 +796,7 @@
                 <a:spcPct val="100000"/>
               </a:lnSpc>
             </a:pPr>
-            <a:fld id="{A7B11DAB-EC87-49DE-BCB1-BFF5452AD769}" type="slidenum">
+            <a:fld id="{4684F891-B13C-4CC5-A196-C2F1C2AA5625}" type="slidenum">
               <a:rPr b="0" lang="en-GB" sz="1800" spc="-1" strike="noStrike">
                 <a:solidFill>
                   <a:srgbClr val="000000"/>
@@ -850,7 +850,7 @@
         <p:spPr>
           <a:xfrm>
             <a:off x="533520" y="763560"/>
-            <a:ext cx="6693480" cy="3761640"/>
+            <a:ext cx="6693120" cy="3761280"/>
           </a:xfrm>
           <a:prstGeom prst="rect">
             <a:avLst/>
@@ -873,7 +873,7 @@
         <p:spPr>
           <a:xfrm>
             <a:off x="777240" y="4777560"/>
-            <a:ext cx="6207120" cy="4515480"/>
+            <a:ext cx="6206760" cy="4515120"/>
           </a:xfrm>
           <a:prstGeom prst="rect">
             <a:avLst/>
@@ -909,7 +909,7 @@
         <p:spPr>
           <a:xfrm>
             <a:off x="4399200" y="9555480"/>
-            <a:ext cx="3362400" cy="492120"/>
+            <a:ext cx="3362040" cy="491760"/>
           </a:xfrm>
           <a:prstGeom prst="rect">
             <a:avLst/>
@@ -935,7 +935,7 @@
                 <a:spcPct val="100000"/>
               </a:lnSpc>
             </a:pPr>
-            <a:fld id="{12879795-A8FA-47DB-8F2E-9F145E1A5FEF}" type="slidenum">
+            <a:fld id="{9395E4D1-22F1-4388-8E68-19070A738E3D}" type="slidenum">
               <a:rPr b="0" lang="en-GB" sz="1800" spc="-1" strike="noStrike">
                 <a:solidFill>
                   <a:srgbClr val="000000"/>
@@ -3874,7 +3874,7 @@
         <p:spPr>
           <a:xfrm>
             <a:off x="11444760" y="0"/>
-            <a:ext cx="740520" cy="6849360"/>
+            <a:ext cx="740160" cy="6849000"/>
           </a:xfrm>
           <a:prstGeom prst="rect">
             <a:avLst/>
@@ -3923,7 +3923,7 @@
         <p:spPr>
           <a:xfrm>
             <a:off x="11438640" y="6453360"/>
-            <a:ext cx="757440" cy="363960"/>
+            <a:ext cx="757080" cy="363960"/>
           </a:xfrm>
           <a:prstGeom prst="rect">
             <a:avLst/>
@@ -3949,7 +3949,7 @@
                 <a:spcPct val="100000"/>
               </a:lnSpc>
             </a:pPr>
-            <a:fld id="{312ED567-7753-4797-8239-3BAFE503307D}" type="slidenum">
+            <a:fld id="{DB899096-2E2F-40DD-8F0B-88BEBF71C919}" type="slidenum">
               <a:rPr b="0" lang="en-US" sz="1800" spc="-1" strike="noStrike">
                 <a:solidFill>
                   <a:srgbClr val="808080"/>
@@ -3977,7 +3977,7 @@
         <p:spPr>
           <a:xfrm>
             <a:off x="912240" y="1268280"/>
-            <a:ext cx="9207360" cy="360720"/>
+            <a:ext cx="9207000" cy="360360"/>
           </a:xfrm>
           <a:prstGeom prst="rect">
             <a:avLst/>
@@ -4026,7 +4026,7 @@
         <p:spPr>
           <a:xfrm>
             <a:off x="0" y="0"/>
-            <a:ext cx="3051360" cy="561240"/>
+            <a:ext cx="3051000" cy="560880"/>
           </a:xfrm>
           <a:prstGeom prst="rect">
             <a:avLst/>
@@ -4049,7 +4049,7 @@
         <p:spPr>
           <a:xfrm>
             <a:off x="7430400" y="134640"/>
-            <a:ext cx="3697200" cy="513360"/>
+            <a:ext cx="3696840" cy="513000"/>
           </a:xfrm>
           <a:prstGeom prst="rect">
             <a:avLst/>
@@ -4068,7 +4068,7 @@
         <p:spPr>
           <a:xfrm>
             <a:off x="912240" y="1268280"/>
-            <a:ext cx="9207360" cy="360720"/>
+            <a:ext cx="9207000" cy="360360"/>
           </a:xfrm>
           <a:prstGeom prst="rect">
             <a:avLst/>
@@ -4113,7 +4113,7 @@
         <p:spPr>
           <a:xfrm>
             <a:off x="11444760" y="0"/>
-            <a:ext cx="740520" cy="6849360"/>
+            <a:ext cx="740160" cy="6849000"/>
           </a:xfrm>
           <a:prstGeom prst="rect">
             <a:avLst/>
@@ -4162,7 +4162,7 @@
         <p:spPr>
           <a:xfrm>
             <a:off x="0" y="6642720"/>
-            <a:ext cx="12183480" cy="211320"/>
+            <a:ext cx="12183120" cy="211320"/>
           </a:xfrm>
           <a:prstGeom prst="rect">
             <a:avLst/>
@@ -4973,7 +4973,7 @@
         <p:spPr>
           <a:xfrm>
             <a:off x="11444760" y="0"/>
-            <a:ext cx="740520" cy="6849360"/>
+            <a:ext cx="740160" cy="6849000"/>
           </a:xfrm>
           <a:prstGeom prst="rect">
             <a:avLst/>
@@ -5022,7 +5022,7 @@
         <p:spPr>
           <a:xfrm>
             <a:off x="11438640" y="6453360"/>
-            <a:ext cx="757440" cy="363960"/>
+            <a:ext cx="757080" cy="363960"/>
           </a:xfrm>
           <a:prstGeom prst="rect">
             <a:avLst/>
@@ -5048,7 +5048,7 @@
                 <a:spcPct val="100000"/>
               </a:lnSpc>
             </a:pPr>
-            <a:fld id="{0D927425-45E8-49E5-9ED7-83E100BC4648}" type="slidenum">
+            <a:fld id="{BB7A49E9-9F60-4370-9388-3690F5082411}" type="slidenum">
               <a:rPr b="0" lang="en-US" sz="1800" spc="-1" strike="noStrike">
                 <a:solidFill>
                   <a:srgbClr val="808080"/>
@@ -5076,7 +5076,7 @@
         <p:spPr>
           <a:xfrm>
             <a:off x="912240" y="1268280"/>
-            <a:ext cx="9207360" cy="360720"/>
+            <a:ext cx="9207000" cy="360360"/>
           </a:xfrm>
           <a:prstGeom prst="rect">
             <a:avLst/>
@@ -5125,7 +5125,7 @@
         <p:spPr>
           <a:xfrm>
             <a:off x="0" y="0"/>
-            <a:ext cx="3051360" cy="561240"/>
+            <a:ext cx="3051000" cy="560880"/>
           </a:xfrm>
           <a:prstGeom prst="rect">
             <a:avLst/>
@@ -5148,7 +5148,7 @@
         <p:spPr>
           <a:xfrm>
             <a:off x="7430400" y="134640"/>
-            <a:ext cx="3697200" cy="513360"/>
+            <a:ext cx="3696840" cy="513000"/>
           </a:xfrm>
           <a:prstGeom prst="rect">
             <a:avLst/>
@@ -5167,7 +5167,7 @@
         <p:spPr>
           <a:xfrm>
             <a:off x="912240" y="1268280"/>
-            <a:ext cx="9207360" cy="360720"/>
+            <a:ext cx="9207000" cy="360360"/>
           </a:xfrm>
           <a:prstGeom prst="rect">
             <a:avLst/>
@@ -5212,7 +5212,7 @@
         <p:spPr>
           <a:xfrm>
             <a:off x="11444760" y="0"/>
-            <a:ext cx="740520" cy="6849360"/>
+            <a:ext cx="740160" cy="6849000"/>
           </a:xfrm>
           <a:prstGeom prst="rect">
             <a:avLst/>
@@ -5261,7 +5261,7 @@
         <p:spPr>
           <a:xfrm>
             <a:off x="0" y="6642720"/>
-            <a:ext cx="12183480" cy="211320"/>
+            <a:ext cx="12183120" cy="211320"/>
           </a:xfrm>
           <a:prstGeom prst="rect">
             <a:avLst/>
@@ -5847,7 +5847,7 @@
         <p:spPr>
           <a:xfrm>
             <a:off x="11444760" y="0"/>
-            <a:ext cx="740520" cy="6849360"/>
+            <a:ext cx="740160" cy="6849000"/>
           </a:xfrm>
           <a:prstGeom prst="rect">
             <a:avLst/>
@@ -5896,7 +5896,7 @@
         <p:spPr>
           <a:xfrm>
             <a:off x="11438640" y="6453360"/>
-            <a:ext cx="757440" cy="363960"/>
+            <a:ext cx="757080" cy="363960"/>
           </a:xfrm>
           <a:prstGeom prst="rect">
             <a:avLst/>
@@ -5922,7 +5922,7 @@
                 <a:spcPct val="100000"/>
               </a:lnSpc>
             </a:pPr>
-            <a:fld id="{D2F3900C-5F3D-4FFD-B383-70FAC90F9F68}" type="slidenum">
+            <a:fld id="{F0624E19-45AD-4ABF-BDF0-0AAF80FF4EAD}" type="slidenum">
               <a:rPr b="0" lang="en-US" sz="1800" spc="-1" strike="noStrike">
                 <a:solidFill>
                   <a:srgbClr val="808080"/>
@@ -5950,7 +5950,7 @@
         <p:spPr>
           <a:xfrm>
             <a:off x="912240" y="1268280"/>
-            <a:ext cx="9207360" cy="360720"/>
+            <a:ext cx="9207000" cy="360360"/>
           </a:xfrm>
           <a:prstGeom prst="rect">
             <a:avLst/>
@@ -5999,7 +5999,7 @@
         <p:spPr>
           <a:xfrm>
             <a:off x="0" y="0"/>
-            <a:ext cx="3051360" cy="561240"/>
+            <a:ext cx="3051000" cy="560880"/>
           </a:xfrm>
           <a:prstGeom prst="rect">
             <a:avLst/>
@@ -6022,7 +6022,7 @@
         <p:spPr>
           <a:xfrm>
             <a:off x="7430400" y="134640"/>
-            <a:ext cx="3697200" cy="513360"/>
+            <a:ext cx="3696840" cy="513000"/>
           </a:xfrm>
           <a:prstGeom prst="rect">
             <a:avLst/>
@@ -6041,7 +6041,7 @@
         <p:spPr>
           <a:xfrm>
             <a:off x="912240" y="1268280"/>
-            <a:ext cx="9207360" cy="360720"/>
+            <a:ext cx="9207000" cy="360360"/>
           </a:xfrm>
           <a:prstGeom prst="rect">
             <a:avLst/>
@@ -6086,7 +6086,7 @@
         <p:spPr>
           <a:xfrm>
             <a:off x="11444760" y="0"/>
-            <a:ext cx="740520" cy="6849360"/>
+            <a:ext cx="740160" cy="6849000"/>
           </a:xfrm>
           <a:prstGeom prst="rect">
             <a:avLst/>
@@ -6135,7 +6135,7 @@
         <p:spPr>
           <a:xfrm>
             <a:off x="0" y="6642720"/>
-            <a:ext cx="12183480" cy="211320"/>
+            <a:ext cx="12183120" cy="211320"/>
           </a:xfrm>
           <a:prstGeom prst="rect">
             <a:avLst/>
@@ -6271,7 +6271,7 @@
         <p:spPr>
           <a:xfrm>
             <a:off x="11444760" y="0"/>
-            <a:ext cx="740520" cy="6849360"/>
+            <a:ext cx="740160" cy="6849000"/>
           </a:xfrm>
           <a:prstGeom prst="rect">
             <a:avLst/>
@@ -6320,7 +6320,7 @@
         <p:spPr>
           <a:xfrm>
             <a:off x="11438640" y="6453360"/>
-            <a:ext cx="757440" cy="363960"/>
+            <a:ext cx="757080" cy="363960"/>
           </a:xfrm>
           <a:prstGeom prst="rect">
             <a:avLst/>
@@ -6346,7 +6346,7 @@
                 <a:spcPct val="100000"/>
               </a:lnSpc>
             </a:pPr>
-            <a:fld id="{D054E0C9-46AE-474D-A858-6EFEC589D050}" type="slidenum">
+            <a:fld id="{76A47A93-6CB9-4F6F-AA93-0645DB080FDD}" type="slidenum">
               <a:rPr b="0" lang="en-US" sz="1800" spc="-1" strike="noStrike">
                 <a:solidFill>
                   <a:srgbClr val="808080"/>
@@ -6374,7 +6374,7 @@
         <p:spPr>
           <a:xfrm>
             <a:off x="912240" y="1268280"/>
-            <a:ext cx="9207360" cy="360720"/>
+            <a:ext cx="9207000" cy="360360"/>
           </a:xfrm>
           <a:prstGeom prst="rect">
             <a:avLst/>
@@ -6423,7 +6423,7 @@
         <p:spPr>
           <a:xfrm>
             <a:off x="0" y="0"/>
-            <a:ext cx="3051360" cy="561240"/>
+            <a:ext cx="3051000" cy="560880"/>
           </a:xfrm>
           <a:prstGeom prst="rect">
             <a:avLst/>
@@ -6446,7 +6446,7 @@
         <p:spPr>
           <a:xfrm>
             <a:off x="7430400" y="134640"/>
-            <a:ext cx="3697200" cy="513360"/>
+            <a:ext cx="3696840" cy="513000"/>
           </a:xfrm>
           <a:prstGeom prst="rect">
             <a:avLst/>
@@ -6465,7 +6465,7 @@
         <p:spPr>
           <a:xfrm>
             <a:off x="912240" y="1268280"/>
-            <a:ext cx="9207360" cy="360720"/>
+            <a:ext cx="9207000" cy="360360"/>
           </a:xfrm>
           <a:prstGeom prst="rect">
             <a:avLst/>
@@ -6510,7 +6510,7 @@
         <p:spPr>
           <a:xfrm>
             <a:off x="11444760" y="0"/>
-            <a:ext cx="740520" cy="6849360"/>
+            <a:ext cx="740160" cy="6849000"/>
           </a:xfrm>
           <a:prstGeom prst="rect">
             <a:avLst/>
@@ -6559,7 +6559,7 @@
         <p:spPr>
           <a:xfrm>
             <a:off x="0" y="6642720"/>
-            <a:ext cx="12183480" cy="211320"/>
+            <a:ext cx="12183120" cy="211320"/>
           </a:xfrm>
           <a:prstGeom prst="rect">
             <a:avLst/>
@@ -6646,7 +6646,7 @@
         <p:spPr>
           <a:xfrm>
             <a:off x="11444760" y="0"/>
-            <a:ext cx="740520" cy="6849360"/>
+            <a:ext cx="740160" cy="6849000"/>
           </a:xfrm>
           <a:prstGeom prst="rect">
             <a:avLst/>
@@ -6695,7 +6695,7 @@
         <p:spPr>
           <a:xfrm>
             <a:off x="11438640" y="6453360"/>
-            <a:ext cx="757440" cy="363960"/>
+            <a:ext cx="757080" cy="363960"/>
           </a:xfrm>
           <a:prstGeom prst="rect">
             <a:avLst/>
@@ -6721,7 +6721,7 @@
                 <a:spcPct val="100000"/>
               </a:lnSpc>
             </a:pPr>
-            <a:fld id="{DE184D8D-157B-4A06-A914-ADB30A2857A0}" type="slidenum">
+            <a:fld id="{475377CE-CDBC-4852-9DFF-D5E143B69BA7}" type="slidenum">
               <a:rPr b="0" lang="en-US" sz="1800" spc="-1" strike="noStrike">
                 <a:solidFill>
                   <a:srgbClr val="808080"/>
@@ -6749,7 +6749,7 @@
         <p:spPr>
           <a:xfrm>
             <a:off x="912240" y="1268280"/>
-            <a:ext cx="9207360" cy="360720"/>
+            <a:ext cx="9207000" cy="360360"/>
           </a:xfrm>
           <a:prstGeom prst="rect">
             <a:avLst/>
@@ -6798,7 +6798,7 @@
         <p:spPr>
           <a:xfrm>
             <a:off x="0" y="0"/>
-            <a:ext cx="3051360" cy="561240"/>
+            <a:ext cx="3051000" cy="560880"/>
           </a:xfrm>
           <a:prstGeom prst="rect">
             <a:avLst/>
@@ -6821,7 +6821,7 @@
         <p:spPr>
           <a:xfrm>
             <a:off x="7430400" y="134640"/>
-            <a:ext cx="3697200" cy="513360"/>
+            <a:ext cx="3696840" cy="513000"/>
           </a:xfrm>
           <a:prstGeom prst="rect">
             <a:avLst/>
@@ -6840,7 +6840,7 @@
         <p:spPr>
           <a:xfrm>
             <a:off x="11444760" y="0"/>
-            <a:ext cx="740520" cy="6849360"/>
+            <a:ext cx="740160" cy="6849000"/>
           </a:xfrm>
           <a:prstGeom prst="rect">
             <a:avLst/>
@@ -6889,7 +6889,7 @@
         <p:spPr>
           <a:xfrm>
             <a:off x="11438640" y="6453360"/>
-            <a:ext cx="757440" cy="363960"/>
+            <a:ext cx="757080" cy="363960"/>
           </a:xfrm>
           <a:prstGeom prst="rect">
             <a:avLst/>
@@ -6915,7 +6915,7 @@
                 <a:spcPct val="100000"/>
               </a:lnSpc>
             </a:pPr>
-            <a:fld id="{A1751C19-3E7F-4534-AD16-479A64484137}" type="slidenum">
+            <a:fld id="{29B1CFF3-14CD-479C-8524-5E78A99C8A56}" type="slidenum">
               <a:rPr b="0" lang="en-US" sz="1800" spc="-1" strike="noStrike">
                 <a:solidFill>
                   <a:srgbClr val="808080"/>
@@ -6943,7 +6943,7 @@
         <p:spPr>
           <a:xfrm>
             <a:off x="0" y="6642720"/>
-            <a:ext cx="12183480" cy="211320"/>
+            <a:ext cx="12183120" cy="211320"/>
           </a:xfrm>
           <a:prstGeom prst="rect">
             <a:avLst/>
@@ -7754,7 +7754,7 @@
         <p:spPr>
           <a:xfrm>
             <a:off x="11444760" y="0"/>
-            <a:ext cx="740520" cy="6849360"/>
+            <a:ext cx="740160" cy="6849000"/>
           </a:xfrm>
           <a:prstGeom prst="rect">
             <a:avLst/>
@@ -7803,7 +7803,7 @@
         <p:spPr>
           <a:xfrm>
             <a:off x="11438640" y="6453360"/>
-            <a:ext cx="757440" cy="363960"/>
+            <a:ext cx="757080" cy="363960"/>
           </a:xfrm>
           <a:prstGeom prst="rect">
             <a:avLst/>
@@ -7829,7 +7829,7 @@
                 <a:spcPct val="100000"/>
               </a:lnSpc>
             </a:pPr>
-            <a:fld id="{C1F83EB9-2CDE-4778-B355-DF69449C83D4}" type="slidenum">
+            <a:fld id="{EEE2FA0A-E105-4A53-B995-677D2BB46247}" type="slidenum">
               <a:rPr b="0" lang="en-US" sz="1800" spc="-1" strike="noStrike">
                 <a:solidFill>
                   <a:srgbClr val="808080"/>
@@ -7857,7 +7857,7 @@
         <p:spPr>
           <a:xfrm>
             <a:off x="912240" y="1268280"/>
-            <a:ext cx="9207360" cy="360720"/>
+            <a:ext cx="9207000" cy="360360"/>
           </a:xfrm>
           <a:prstGeom prst="rect">
             <a:avLst/>
@@ -7906,7 +7906,7 @@
         <p:spPr>
           <a:xfrm>
             <a:off x="0" y="0"/>
-            <a:ext cx="3051360" cy="561240"/>
+            <a:ext cx="3051000" cy="560880"/>
           </a:xfrm>
           <a:prstGeom prst="rect">
             <a:avLst/>
@@ -7929,7 +7929,7 @@
         <p:spPr>
           <a:xfrm>
             <a:off x="7430400" y="134640"/>
-            <a:ext cx="3697200" cy="513360"/>
+            <a:ext cx="3696840" cy="513000"/>
           </a:xfrm>
           <a:prstGeom prst="rect">
             <a:avLst/>
@@ -7948,7 +7948,7 @@
         <p:spPr>
           <a:xfrm>
             <a:off x="11444760" y="0"/>
-            <a:ext cx="740520" cy="6849360"/>
+            <a:ext cx="740160" cy="6849000"/>
           </a:xfrm>
           <a:prstGeom prst="rect">
             <a:avLst/>
@@ -7997,7 +7997,7 @@
         <p:spPr>
           <a:xfrm>
             <a:off x="11438640" y="6453360"/>
-            <a:ext cx="757440" cy="363960"/>
+            <a:ext cx="757080" cy="363960"/>
           </a:xfrm>
           <a:prstGeom prst="rect">
             <a:avLst/>
@@ -8023,7 +8023,7 @@
                 <a:spcPct val="100000"/>
               </a:lnSpc>
             </a:pPr>
-            <a:fld id="{C5A5A88B-9FBA-4AD9-AFEC-A42BDB807EB6}" type="slidenum">
+            <a:fld id="{BF7ED0CB-1FF5-46B3-B56A-12AC75151BEC}" type="slidenum">
               <a:rPr b="0" lang="en-US" sz="1800" spc="-1" strike="noStrike">
                 <a:solidFill>
                   <a:srgbClr val="808080"/>
@@ -8051,7 +8051,7 @@
         <p:spPr>
           <a:xfrm>
             <a:off x="0" y="6642720"/>
-            <a:ext cx="12183480" cy="211320"/>
+            <a:ext cx="12183120" cy="211320"/>
           </a:xfrm>
           <a:prstGeom prst="rect">
             <a:avLst/>
@@ -8862,7 +8862,7 @@
         <p:spPr>
           <a:xfrm>
             <a:off x="11444760" y="0"/>
-            <a:ext cx="740520" cy="6849360"/>
+            <a:ext cx="740160" cy="6849000"/>
           </a:xfrm>
           <a:prstGeom prst="rect">
             <a:avLst/>
@@ -8911,7 +8911,7 @@
         <p:spPr>
           <a:xfrm>
             <a:off x="11438640" y="6453360"/>
-            <a:ext cx="757440" cy="363960"/>
+            <a:ext cx="757080" cy="363960"/>
           </a:xfrm>
           <a:prstGeom prst="rect">
             <a:avLst/>
@@ -8937,7 +8937,7 @@
                 <a:spcPct val="100000"/>
               </a:lnSpc>
             </a:pPr>
-            <a:fld id="{D475C089-E071-49D2-A46C-CF111E33511E}" type="slidenum">
+            <a:fld id="{CE1EB0CB-D141-4AB8-A126-6CD3C164AA5B}" type="slidenum">
               <a:rPr b="0" lang="en-US" sz="1800" spc="-1" strike="noStrike">
                 <a:solidFill>
                   <a:srgbClr val="808080"/>
@@ -8965,7 +8965,7 @@
         <p:spPr>
           <a:xfrm>
             <a:off x="912240" y="1268280"/>
-            <a:ext cx="9207360" cy="360720"/>
+            <a:ext cx="9207000" cy="360360"/>
           </a:xfrm>
           <a:prstGeom prst="rect">
             <a:avLst/>
@@ -9014,7 +9014,7 @@
         <p:spPr>
           <a:xfrm>
             <a:off x="0" y="0"/>
-            <a:ext cx="3051360" cy="561240"/>
+            <a:ext cx="3051000" cy="560880"/>
           </a:xfrm>
           <a:prstGeom prst="rect">
             <a:avLst/>
@@ -9037,7 +9037,7 @@
         <p:spPr>
           <a:xfrm>
             <a:off x="7430400" y="134640"/>
-            <a:ext cx="3697200" cy="513360"/>
+            <a:ext cx="3696840" cy="513000"/>
           </a:xfrm>
           <a:prstGeom prst="rect">
             <a:avLst/>
@@ -9056,7 +9056,7 @@
         <p:spPr>
           <a:xfrm>
             <a:off x="11444760" y="0"/>
-            <a:ext cx="740520" cy="6849360"/>
+            <a:ext cx="740160" cy="6849000"/>
           </a:xfrm>
           <a:prstGeom prst="rect">
             <a:avLst/>
@@ -9105,7 +9105,7 @@
         <p:spPr>
           <a:xfrm>
             <a:off x="11438640" y="6453360"/>
-            <a:ext cx="757440" cy="363960"/>
+            <a:ext cx="757080" cy="363960"/>
           </a:xfrm>
           <a:prstGeom prst="rect">
             <a:avLst/>
@@ -9131,7 +9131,7 @@
                 <a:spcPct val="100000"/>
               </a:lnSpc>
             </a:pPr>
-            <a:fld id="{76136D2C-0E84-4C49-A08D-00778E04AD2E}" type="slidenum">
+            <a:fld id="{67DD49ED-4068-4727-A439-75B4749378DE}" type="slidenum">
               <a:rPr b="0" lang="en-US" sz="1800" spc="-1" strike="noStrike">
                 <a:solidFill>
                   <a:srgbClr val="808080"/>
@@ -9159,7 +9159,7 @@
         <p:spPr>
           <a:xfrm>
             <a:off x="0" y="6642720"/>
-            <a:ext cx="12183480" cy="211320"/>
+            <a:ext cx="12183120" cy="211320"/>
           </a:xfrm>
           <a:prstGeom prst="rect">
             <a:avLst/>
@@ -9970,7 +9970,7 @@
         <p:spPr>
           <a:xfrm>
             <a:off x="11444760" y="0"/>
-            <a:ext cx="740520" cy="6849360"/>
+            <a:ext cx="740160" cy="6849000"/>
           </a:xfrm>
           <a:prstGeom prst="rect">
             <a:avLst/>
@@ -10019,7 +10019,7 @@
         <p:spPr>
           <a:xfrm>
             <a:off x="11438640" y="6453360"/>
-            <a:ext cx="757440" cy="363960"/>
+            <a:ext cx="757080" cy="363960"/>
           </a:xfrm>
           <a:prstGeom prst="rect">
             <a:avLst/>
@@ -10045,7 +10045,7 @@
                 <a:spcPct val="100000"/>
               </a:lnSpc>
             </a:pPr>
-            <a:fld id="{87586F8D-4EA8-40FD-9E2D-C54F4B4D270C}" type="slidenum">
+            <a:fld id="{800C2AEC-1158-467E-91E3-BAD08D6E6B4E}" type="slidenum">
               <a:rPr b="0" lang="en-US" sz="1800" spc="-1" strike="noStrike">
                 <a:solidFill>
                   <a:srgbClr val="808080"/>
@@ -10073,7 +10073,7 @@
         <p:spPr>
           <a:xfrm>
             <a:off x="912240" y="1268280"/>
-            <a:ext cx="9207360" cy="360720"/>
+            <a:ext cx="9207000" cy="360360"/>
           </a:xfrm>
           <a:prstGeom prst="rect">
             <a:avLst/>
@@ -10122,7 +10122,7 @@
         <p:spPr>
           <a:xfrm>
             <a:off x="0" y="0"/>
-            <a:ext cx="3051360" cy="561240"/>
+            <a:ext cx="3051000" cy="560880"/>
           </a:xfrm>
           <a:prstGeom prst="rect">
             <a:avLst/>
@@ -10145,7 +10145,7 @@
         <p:spPr>
           <a:xfrm>
             <a:off x="7430400" y="134640"/>
-            <a:ext cx="3697200" cy="513360"/>
+            <a:ext cx="3696840" cy="513000"/>
           </a:xfrm>
           <a:prstGeom prst="rect">
             <a:avLst/>
@@ -10164,7 +10164,7 @@
         <p:spPr>
           <a:xfrm>
             <a:off x="11444760" y="0"/>
-            <a:ext cx="740520" cy="6849360"/>
+            <a:ext cx="740160" cy="6849000"/>
           </a:xfrm>
           <a:prstGeom prst="rect">
             <a:avLst/>
@@ -10213,7 +10213,7 @@
         <p:spPr>
           <a:xfrm>
             <a:off x="11438640" y="6453360"/>
-            <a:ext cx="757440" cy="363960"/>
+            <a:ext cx="757080" cy="363960"/>
           </a:xfrm>
           <a:prstGeom prst="rect">
             <a:avLst/>
@@ -10239,7 +10239,7 @@
                 <a:spcPct val="100000"/>
               </a:lnSpc>
             </a:pPr>
-            <a:fld id="{59C28CF8-D922-4584-B567-7A3B2CA48AB6}" type="slidenum">
+            <a:fld id="{4FFEB479-ECF5-4379-B58D-39F003B55B26}" type="slidenum">
               <a:rPr b="0" lang="en-US" sz="1800" spc="-1" strike="noStrike">
                 <a:solidFill>
                   <a:srgbClr val="808080"/>
@@ -10267,7 +10267,7 @@
         <p:spPr>
           <a:xfrm>
             <a:off x="0" y="6642720"/>
-            <a:ext cx="12183480" cy="211320"/>
+            <a:ext cx="12183120" cy="211320"/>
           </a:xfrm>
           <a:prstGeom prst="rect">
             <a:avLst/>
@@ -10853,7 +10853,7 @@
         <p:spPr>
           <a:xfrm>
             <a:off x="11444760" y="0"/>
-            <a:ext cx="740520" cy="6849360"/>
+            <a:ext cx="740160" cy="6849000"/>
           </a:xfrm>
           <a:prstGeom prst="rect">
             <a:avLst/>
@@ -10902,7 +10902,7 @@
         <p:spPr>
           <a:xfrm>
             <a:off x="11438640" y="6453360"/>
-            <a:ext cx="757440" cy="363960"/>
+            <a:ext cx="757080" cy="363960"/>
           </a:xfrm>
           <a:prstGeom prst="rect">
             <a:avLst/>
@@ -10928,7 +10928,7 @@
                 <a:spcPct val="100000"/>
               </a:lnSpc>
             </a:pPr>
-            <a:fld id="{CF61CD8D-6CF7-415A-B005-43CA9CDA0640}" type="slidenum">
+            <a:fld id="{50BAAE3A-4072-445D-A13C-49F289F6EC4C}" type="slidenum">
               <a:rPr b="0" lang="en-US" sz="1800" spc="-1" strike="noStrike">
                 <a:solidFill>
                   <a:srgbClr val="808080"/>
@@ -10956,7 +10956,7 @@
         <p:spPr>
           <a:xfrm>
             <a:off x="912240" y="1268280"/>
-            <a:ext cx="9207360" cy="360720"/>
+            <a:ext cx="9207000" cy="360360"/>
           </a:xfrm>
           <a:prstGeom prst="rect">
             <a:avLst/>
@@ -11005,7 +11005,7 @@
         <p:spPr>
           <a:xfrm>
             <a:off x="0" y="0"/>
-            <a:ext cx="3051360" cy="561240"/>
+            <a:ext cx="3051000" cy="560880"/>
           </a:xfrm>
           <a:prstGeom prst="rect">
             <a:avLst/>
@@ -11028,7 +11028,7 @@
         <p:spPr>
           <a:xfrm>
             <a:off x="7430400" y="134640"/>
-            <a:ext cx="3697200" cy="513360"/>
+            <a:ext cx="3696840" cy="513000"/>
           </a:xfrm>
           <a:prstGeom prst="rect">
             <a:avLst/>
@@ -11047,7 +11047,7 @@
         <p:spPr>
           <a:xfrm>
             <a:off x="11444760" y="0"/>
-            <a:ext cx="740520" cy="6849360"/>
+            <a:ext cx="740160" cy="6849000"/>
           </a:xfrm>
           <a:prstGeom prst="rect">
             <a:avLst/>
@@ -11096,7 +11096,7 @@
         <p:spPr>
           <a:xfrm>
             <a:off x="11438640" y="6453360"/>
-            <a:ext cx="757440" cy="363960"/>
+            <a:ext cx="757080" cy="363960"/>
           </a:xfrm>
           <a:prstGeom prst="rect">
             <a:avLst/>
@@ -11122,7 +11122,7 @@
                 <a:spcPct val="100000"/>
               </a:lnSpc>
             </a:pPr>
-            <a:fld id="{05884315-0469-4FE6-A35C-890F9F9A5B6C}" type="slidenum">
+            <a:fld id="{47B7FD5D-BD29-4345-8A94-68A83D7BC18C}" type="slidenum">
               <a:rPr b="0" lang="en-US" sz="1800" spc="-1" strike="noStrike">
                 <a:solidFill>
                   <a:srgbClr val="808080"/>
@@ -11150,7 +11150,7 @@
         <p:spPr>
           <a:xfrm>
             <a:off x="0" y="6642720"/>
-            <a:ext cx="12183480" cy="211320"/>
+            <a:ext cx="12183120" cy="211320"/>
           </a:xfrm>
           <a:prstGeom prst="rect">
             <a:avLst/>
@@ -12186,7 +12186,7 @@
         <p:spPr>
           <a:xfrm>
             <a:off x="11444760" y="0"/>
-            <a:ext cx="740520" cy="6849360"/>
+            <a:ext cx="740160" cy="6849000"/>
           </a:xfrm>
           <a:prstGeom prst="rect">
             <a:avLst/>
@@ -12235,7 +12235,7 @@
         <p:spPr>
           <a:xfrm>
             <a:off x="11438640" y="6453360"/>
-            <a:ext cx="757440" cy="363960"/>
+            <a:ext cx="757080" cy="363960"/>
           </a:xfrm>
           <a:prstGeom prst="rect">
             <a:avLst/>
@@ -12261,7 +12261,7 @@
                 <a:spcPct val="100000"/>
               </a:lnSpc>
             </a:pPr>
-            <a:fld id="{AC9BD33B-3B3A-40BC-90CF-5E4B984F3D0E}" type="slidenum">
+            <a:fld id="{25503E71-3897-43AF-BABA-AC83A23EC174}" type="slidenum">
               <a:rPr b="0" lang="en-US" sz="1800" spc="-1" strike="noStrike">
                 <a:solidFill>
                   <a:srgbClr val="808080"/>
@@ -12289,7 +12289,7 @@
         <p:spPr>
           <a:xfrm>
             <a:off x="912240" y="1268280"/>
-            <a:ext cx="9207360" cy="360720"/>
+            <a:ext cx="9207000" cy="360360"/>
           </a:xfrm>
           <a:prstGeom prst="rect">
             <a:avLst/>
@@ -12338,7 +12338,7 @@
         <p:spPr>
           <a:xfrm>
             <a:off x="0" y="0"/>
-            <a:ext cx="3051360" cy="561240"/>
+            <a:ext cx="3051000" cy="560880"/>
           </a:xfrm>
           <a:prstGeom prst="rect">
             <a:avLst/>
@@ -12361,7 +12361,7 @@
         <p:spPr>
           <a:xfrm>
             <a:off x="7430400" y="134640"/>
-            <a:ext cx="3697200" cy="513360"/>
+            <a:ext cx="3696840" cy="513000"/>
           </a:xfrm>
           <a:prstGeom prst="rect">
             <a:avLst/>
@@ -12380,7 +12380,7 @@
         <p:spPr>
           <a:xfrm>
             <a:off x="11444760" y="0"/>
-            <a:ext cx="740520" cy="6849360"/>
+            <a:ext cx="740160" cy="6849000"/>
           </a:xfrm>
           <a:prstGeom prst="rect">
             <a:avLst/>
@@ -12429,7 +12429,7 @@
         <p:spPr>
           <a:xfrm>
             <a:off x="11438640" y="6453360"/>
-            <a:ext cx="757440" cy="363960"/>
+            <a:ext cx="757080" cy="363960"/>
           </a:xfrm>
           <a:prstGeom prst="rect">
             <a:avLst/>
@@ -12455,7 +12455,7 @@
                 <a:spcPct val="100000"/>
               </a:lnSpc>
             </a:pPr>
-            <a:fld id="{0CC62347-8F3C-4FDB-8C3E-078CCEB90434}" type="slidenum">
+            <a:fld id="{AF537DA4-F329-4281-8DF4-3D403F4C772B}" type="slidenum">
               <a:rPr b="0" lang="en-US" sz="1800" spc="-1" strike="noStrike">
                 <a:solidFill>
                   <a:srgbClr val="808080"/>
@@ -12483,7 +12483,7 @@
         <p:spPr>
           <a:xfrm>
             <a:off x="0" y="6642720"/>
-            <a:ext cx="12183480" cy="211320"/>
+            <a:ext cx="12183120" cy="211320"/>
           </a:xfrm>
           <a:prstGeom prst="rect">
             <a:avLst/>
@@ -12570,7 +12570,7 @@
         <p:spPr>
           <a:xfrm>
             <a:off x="11444760" y="0"/>
-            <a:ext cx="740520" cy="6849360"/>
+            <a:ext cx="740160" cy="6849000"/>
           </a:xfrm>
           <a:prstGeom prst="rect">
             <a:avLst/>
@@ -12619,7 +12619,7 @@
         <p:spPr>
           <a:xfrm>
             <a:off x="11438640" y="6453360"/>
-            <a:ext cx="757440" cy="363960"/>
+            <a:ext cx="757080" cy="363960"/>
           </a:xfrm>
           <a:prstGeom prst="rect">
             <a:avLst/>
@@ -12645,7 +12645,7 @@
                 <a:spcPct val="100000"/>
               </a:lnSpc>
             </a:pPr>
-            <a:fld id="{BE85E53E-C603-4141-BBE2-6DD08E9993F4}" type="slidenum">
+            <a:fld id="{83DA0AA3-FC5E-451E-9DCE-EF8E4DB41472}" type="slidenum">
               <a:rPr b="0" lang="en-US" sz="1800" spc="-1" strike="noStrike">
                 <a:solidFill>
                   <a:srgbClr val="808080"/>
@@ -12673,7 +12673,7 @@
         <p:spPr>
           <a:xfrm>
             <a:off x="912240" y="1268280"/>
-            <a:ext cx="9207360" cy="360720"/>
+            <a:ext cx="9207000" cy="360360"/>
           </a:xfrm>
           <a:prstGeom prst="rect">
             <a:avLst/>
@@ -12722,7 +12722,7 @@
         <p:spPr>
           <a:xfrm>
             <a:off x="0" y="0"/>
-            <a:ext cx="3051360" cy="561240"/>
+            <a:ext cx="3051000" cy="560880"/>
           </a:xfrm>
           <a:prstGeom prst="rect">
             <a:avLst/>
@@ -12745,7 +12745,7 @@
         <p:spPr>
           <a:xfrm>
             <a:off x="7430400" y="134640"/>
-            <a:ext cx="3697200" cy="513360"/>
+            <a:ext cx="3696840" cy="513000"/>
           </a:xfrm>
           <a:prstGeom prst="rect">
             <a:avLst/>
@@ -12764,7 +12764,7 @@
         <p:spPr>
           <a:xfrm>
             <a:off x="11444760" y="0"/>
-            <a:ext cx="740520" cy="6849360"/>
+            <a:ext cx="740160" cy="6849000"/>
           </a:xfrm>
           <a:prstGeom prst="rect">
             <a:avLst/>
@@ -12813,7 +12813,7 @@
         <p:spPr>
           <a:xfrm>
             <a:off x="11438640" y="6453360"/>
-            <a:ext cx="757440" cy="363960"/>
+            <a:ext cx="757080" cy="363960"/>
           </a:xfrm>
           <a:prstGeom prst="rect">
             <a:avLst/>
@@ -12839,7 +12839,7 @@
                 <a:spcPct val="100000"/>
               </a:lnSpc>
             </a:pPr>
-            <a:fld id="{CC432DD7-0499-4E12-AE6D-431FEFF2CD61}" type="slidenum">
+            <a:fld id="{D256F652-9CC3-46E0-8247-A923A9462F98}" type="slidenum">
               <a:rPr b="0" lang="en-US" sz="1800" spc="-1" strike="noStrike">
                 <a:solidFill>
                   <a:srgbClr val="808080"/>
@@ -12867,7 +12867,7 @@
         <p:spPr>
           <a:xfrm>
             <a:off x="0" y="6642720"/>
-            <a:ext cx="12183480" cy="211320"/>
+            <a:ext cx="12183120" cy="211320"/>
           </a:xfrm>
           <a:prstGeom prst="rect">
             <a:avLst/>
@@ -13228,7 +13228,7 @@
         <p:spPr>
           <a:xfrm>
             <a:off x="11444760" y="0"/>
-            <a:ext cx="740520" cy="6849360"/>
+            <a:ext cx="740160" cy="6849000"/>
           </a:xfrm>
           <a:prstGeom prst="rect">
             <a:avLst/>
@@ -13277,7 +13277,7 @@
         <p:spPr>
           <a:xfrm>
             <a:off x="11438640" y="6453360"/>
-            <a:ext cx="757440" cy="363960"/>
+            <a:ext cx="757080" cy="363960"/>
           </a:xfrm>
           <a:prstGeom prst="rect">
             <a:avLst/>
@@ -13303,7 +13303,7 @@
                 <a:spcPct val="100000"/>
               </a:lnSpc>
             </a:pPr>
-            <a:fld id="{C045B807-00D9-4B7D-967B-B878B6530B04}" type="slidenum">
+            <a:fld id="{A05507AA-1AF5-4AF6-B350-80EB3F2C4E2E}" type="slidenum">
               <a:rPr b="0" lang="en-US" sz="1800" spc="-1" strike="noStrike">
                 <a:solidFill>
                   <a:srgbClr val="808080"/>
@@ -13331,7 +13331,7 @@
         <p:spPr>
           <a:xfrm>
             <a:off x="912240" y="1268280"/>
-            <a:ext cx="9207360" cy="360720"/>
+            <a:ext cx="9207000" cy="360360"/>
           </a:xfrm>
           <a:prstGeom prst="rect">
             <a:avLst/>
@@ -13380,7 +13380,7 @@
         <p:spPr>
           <a:xfrm>
             <a:off x="0" y="0"/>
-            <a:ext cx="3051360" cy="561240"/>
+            <a:ext cx="3051000" cy="560880"/>
           </a:xfrm>
           <a:prstGeom prst="rect">
             <a:avLst/>
@@ -13403,7 +13403,7 @@
         <p:spPr>
           <a:xfrm>
             <a:off x="7430400" y="134640"/>
-            <a:ext cx="3697200" cy="513360"/>
+            <a:ext cx="3696840" cy="513000"/>
           </a:xfrm>
           <a:prstGeom prst="rect">
             <a:avLst/>
@@ -13422,7 +13422,7 @@
         <p:spPr>
           <a:xfrm>
             <a:off x="912240" y="1268280"/>
-            <a:ext cx="9207360" cy="360720"/>
+            <a:ext cx="9207000" cy="360360"/>
           </a:xfrm>
           <a:prstGeom prst="rect">
             <a:avLst/>
@@ -13467,7 +13467,7 @@
         <p:spPr>
           <a:xfrm>
             <a:off x="11444760" y="0"/>
-            <a:ext cx="740520" cy="6849360"/>
+            <a:ext cx="740160" cy="6849000"/>
           </a:xfrm>
           <a:prstGeom prst="rect">
             <a:avLst/>
@@ -13516,7 +13516,7 @@
         <p:spPr>
           <a:xfrm>
             <a:off x="0" y="6642720"/>
-            <a:ext cx="12183480" cy="211320"/>
+            <a:ext cx="12183120" cy="211320"/>
           </a:xfrm>
           <a:prstGeom prst="rect">
             <a:avLst/>
@@ -14327,7 +14327,7 @@
         <p:spPr>
           <a:xfrm>
             <a:off x="11444760" y="0"/>
-            <a:ext cx="740520" cy="6849360"/>
+            <a:ext cx="740160" cy="6849000"/>
           </a:xfrm>
           <a:prstGeom prst="rect">
             <a:avLst/>
@@ -14376,7 +14376,7 @@
         <p:spPr>
           <a:xfrm>
             <a:off x="11438640" y="6453360"/>
-            <a:ext cx="757440" cy="363960"/>
+            <a:ext cx="757080" cy="363960"/>
           </a:xfrm>
           <a:prstGeom prst="rect">
             <a:avLst/>
@@ -14402,7 +14402,7 @@
                 <a:spcPct val="100000"/>
               </a:lnSpc>
             </a:pPr>
-            <a:fld id="{29758CAB-5953-4A99-8E31-A70A6B0F0ACE}" type="slidenum">
+            <a:fld id="{9DB88585-B364-415E-BCE4-E71F30B91E01}" type="slidenum">
               <a:rPr b="0" lang="en-US" sz="1800" spc="-1" strike="noStrike">
                 <a:solidFill>
                   <a:srgbClr val="808080"/>
@@ -14430,7 +14430,7 @@
         <p:spPr>
           <a:xfrm>
             <a:off x="912240" y="1268280"/>
-            <a:ext cx="9207360" cy="360720"/>
+            <a:ext cx="9207000" cy="360360"/>
           </a:xfrm>
           <a:prstGeom prst="rect">
             <a:avLst/>
@@ -14479,7 +14479,7 @@
         <p:spPr>
           <a:xfrm>
             <a:off x="0" y="0"/>
-            <a:ext cx="3051360" cy="561240"/>
+            <a:ext cx="3051000" cy="560880"/>
           </a:xfrm>
           <a:prstGeom prst="rect">
             <a:avLst/>
@@ -14502,7 +14502,7 @@
         <p:spPr>
           <a:xfrm>
             <a:off x="7430400" y="134640"/>
-            <a:ext cx="3697200" cy="513360"/>
+            <a:ext cx="3696840" cy="513000"/>
           </a:xfrm>
           <a:prstGeom prst="rect">
             <a:avLst/>
@@ -14521,7 +14521,7 @@
         <p:spPr>
           <a:xfrm>
             <a:off x="11444760" y="0"/>
-            <a:ext cx="740520" cy="6849360"/>
+            <a:ext cx="740160" cy="6849000"/>
           </a:xfrm>
           <a:prstGeom prst="rect">
             <a:avLst/>
@@ -14570,7 +14570,7 @@
         <p:spPr>
           <a:xfrm>
             <a:off x="11438640" y="6453360"/>
-            <a:ext cx="757440" cy="363960"/>
+            <a:ext cx="757080" cy="363960"/>
           </a:xfrm>
           <a:prstGeom prst="rect">
             <a:avLst/>
@@ -14596,7 +14596,7 @@
                 <a:spcPct val="100000"/>
               </a:lnSpc>
             </a:pPr>
-            <a:fld id="{27AA9005-2906-4A1F-877A-B4FD607BF1B7}" type="slidenum">
+            <a:fld id="{75519D72-849A-4C4A-B3A1-41916BA01402}" type="slidenum">
               <a:rPr b="0" lang="en-US" sz="1800" spc="-1" strike="noStrike">
                 <a:solidFill>
                   <a:srgbClr val="808080"/>
@@ -14624,7 +14624,7 @@
         <p:spPr>
           <a:xfrm>
             <a:off x="0" y="6642720"/>
-            <a:ext cx="12183480" cy="211320"/>
+            <a:ext cx="12183120" cy="211320"/>
           </a:xfrm>
           <a:prstGeom prst="rect">
             <a:avLst/>
@@ -14985,7 +14985,7 @@
         <p:spPr>
           <a:xfrm>
             <a:off x="11444760" y="0"/>
-            <a:ext cx="740520" cy="6849360"/>
+            <a:ext cx="740160" cy="6849000"/>
           </a:xfrm>
           <a:prstGeom prst="rect">
             <a:avLst/>
@@ -15034,7 +15034,7 @@
         <p:spPr>
           <a:xfrm>
             <a:off x="11438640" y="6453360"/>
-            <a:ext cx="757440" cy="363960"/>
+            <a:ext cx="757080" cy="363960"/>
           </a:xfrm>
           <a:prstGeom prst="rect">
             <a:avLst/>
@@ -15060,7 +15060,7 @@
                 <a:spcPct val="100000"/>
               </a:lnSpc>
             </a:pPr>
-            <a:fld id="{FFD80C1F-1D21-43FA-97A8-C718E4C8B0AA}" type="slidenum">
+            <a:fld id="{73EB8C4C-3628-4228-8BE1-771793D5BA1D}" type="slidenum">
               <a:rPr b="0" lang="en-US" sz="1800" spc="-1" strike="noStrike">
                 <a:solidFill>
                   <a:srgbClr val="808080"/>
@@ -15088,7 +15088,7 @@
         <p:spPr>
           <a:xfrm>
             <a:off x="912240" y="1268280"/>
-            <a:ext cx="9207360" cy="360720"/>
+            <a:ext cx="9207000" cy="360360"/>
           </a:xfrm>
           <a:prstGeom prst="rect">
             <a:avLst/>
@@ -15137,7 +15137,7 @@
         <p:spPr>
           <a:xfrm>
             <a:off x="0" y="0"/>
-            <a:ext cx="3051360" cy="561240"/>
+            <a:ext cx="3051000" cy="560880"/>
           </a:xfrm>
           <a:prstGeom prst="rect">
             <a:avLst/>
@@ -15160,7 +15160,7 @@
         <p:spPr>
           <a:xfrm>
             <a:off x="7430400" y="134640"/>
-            <a:ext cx="3697200" cy="513360"/>
+            <a:ext cx="3696840" cy="513000"/>
           </a:xfrm>
           <a:prstGeom prst="rect">
             <a:avLst/>
@@ -15179,7 +15179,7 @@
         <p:spPr>
           <a:xfrm>
             <a:off x="11444760" y="0"/>
-            <a:ext cx="740520" cy="6849360"/>
+            <a:ext cx="740160" cy="6849000"/>
           </a:xfrm>
           <a:prstGeom prst="rect">
             <a:avLst/>
@@ -15228,7 +15228,7 @@
         <p:spPr>
           <a:xfrm>
             <a:off x="11438640" y="6453360"/>
-            <a:ext cx="757440" cy="363960"/>
+            <a:ext cx="757080" cy="363960"/>
           </a:xfrm>
           <a:prstGeom prst="rect">
             <a:avLst/>
@@ -15254,7 +15254,7 @@
                 <a:spcPct val="100000"/>
               </a:lnSpc>
             </a:pPr>
-            <a:fld id="{554FCF9A-7433-410E-A24D-7C67046B4209}" type="slidenum">
+            <a:fld id="{9163BBF6-5885-4DDC-BDBD-F9BC252AE8FD}" type="slidenum">
               <a:rPr b="0" lang="en-US" sz="1800" spc="-1" strike="noStrike">
                 <a:solidFill>
                   <a:srgbClr val="808080"/>
@@ -15282,7 +15282,7 @@
         <p:spPr>
           <a:xfrm>
             <a:off x="0" y="6642720"/>
-            <a:ext cx="12183480" cy="211320"/>
+            <a:ext cx="12183120" cy="211320"/>
           </a:xfrm>
           <a:prstGeom prst="rect">
             <a:avLst/>
@@ -15643,7 +15643,7 @@
         <p:spPr>
           <a:xfrm>
             <a:off x="11444760" y="0"/>
-            <a:ext cx="740520" cy="6849360"/>
+            <a:ext cx="740160" cy="6849000"/>
           </a:xfrm>
           <a:prstGeom prst="rect">
             <a:avLst/>
@@ -15692,7 +15692,7 @@
         <p:spPr>
           <a:xfrm>
             <a:off x="11438640" y="6453360"/>
-            <a:ext cx="757440" cy="363960"/>
+            <a:ext cx="757080" cy="363960"/>
           </a:xfrm>
           <a:prstGeom prst="rect">
             <a:avLst/>
@@ -15718,7 +15718,7 @@
                 <a:spcPct val="100000"/>
               </a:lnSpc>
             </a:pPr>
-            <a:fld id="{7173871A-89CE-4B54-98F6-37E9D5F39EEB}" type="slidenum">
+            <a:fld id="{4B7CB74B-478D-4FED-BD91-DEDAF1071EBB}" type="slidenum">
               <a:rPr b="0" lang="en-US" sz="1800" spc="-1" strike="noStrike">
                 <a:solidFill>
                   <a:srgbClr val="808080"/>
@@ -15746,7 +15746,7 @@
         <p:spPr>
           <a:xfrm>
             <a:off x="912240" y="1268280"/>
-            <a:ext cx="9207360" cy="360720"/>
+            <a:ext cx="9207000" cy="360360"/>
           </a:xfrm>
           <a:prstGeom prst="rect">
             <a:avLst/>
@@ -15795,7 +15795,7 @@
         <p:spPr>
           <a:xfrm>
             <a:off x="0" y="0"/>
-            <a:ext cx="3051360" cy="561240"/>
+            <a:ext cx="3051000" cy="560880"/>
           </a:xfrm>
           <a:prstGeom prst="rect">
             <a:avLst/>
@@ -15818,7 +15818,7 @@
         <p:spPr>
           <a:xfrm>
             <a:off x="7430400" y="134640"/>
-            <a:ext cx="3697200" cy="513360"/>
+            <a:ext cx="3696840" cy="513000"/>
           </a:xfrm>
           <a:prstGeom prst="rect">
             <a:avLst/>
@@ -15837,7 +15837,7 @@
         <p:spPr>
           <a:xfrm>
             <a:off x="11444760" y="0"/>
-            <a:ext cx="740520" cy="6849360"/>
+            <a:ext cx="740160" cy="6849000"/>
           </a:xfrm>
           <a:prstGeom prst="rect">
             <a:avLst/>
@@ -15886,7 +15886,7 @@
         <p:spPr>
           <a:xfrm>
             <a:off x="11438640" y="6453360"/>
-            <a:ext cx="757440" cy="363960"/>
+            <a:ext cx="757080" cy="363960"/>
           </a:xfrm>
           <a:prstGeom prst="rect">
             <a:avLst/>
@@ -15912,7 +15912,7 @@
                 <a:spcPct val="100000"/>
               </a:lnSpc>
             </a:pPr>
-            <a:fld id="{F3EBA052-6A5C-4C44-8A36-333D051E4C4F}" type="slidenum">
+            <a:fld id="{BD766019-9CF1-481A-A7C5-7501BF797D75}" type="slidenum">
               <a:rPr b="0" lang="en-US" sz="1800" spc="-1" strike="noStrike">
                 <a:solidFill>
                   <a:srgbClr val="808080"/>
@@ -15940,7 +15940,7 @@
         <p:spPr>
           <a:xfrm>
             <a:off x="0" y="6642720"/>
-            <a:ext cx="12183480" cy="211320"/>
+            <a:ext cx="12183120" cy="211320"/>
           </a:xfrm>
           <a:prstGeom prst="rect">
             <a:avLst/>
@@ -16526,7 +16526,7 @@
         <p:spPr>
           <a:xfrm>
             <a:off x="11444760" y="0"/>
-            <a:ext cx="740520" cy="6849360"/>
+            <a:ext cx="740160" cy="6849000"/>
           </a:xfrm>
           <a:prstGeom prst="rect">
             <a:avLst/>
@@ -16575,7 +16575,7 @@
         <p:spPr>
           <a:xfrm>
             <a:off x="11438640" y="6453360"/>
-            <a:ext cx="757440" cy="363960"/>
+            <a:ext cx="757080" cy="363960"/>
           </a:xfrm>
           <a:prstGeom prst="rect">
             <a:avLst/>
@@ -16601,7 +16601,7 @@
                 <a:spcPct val="100000"/>
               </a:lnSpc>
             </a:pPr>
-            <a:fld id="{902540D0-CF4A-4DD6-97DF-8F5FA2DF16C9}" type="slidenum">
+            <a:fld id="{2C266957-8A85-4AA6-AD8B-C75CFB5B58DC}" type="slidenum">
               <a:rPr b="0" lang="en-US" sz="1800" spc="-1" strike="noStrike">
                 <a:solidFill>
                   <a:srgbClr val="808080"/>
@@ -16629,7 +16629,7 @@
         <p:spPr>
           <a:xfrm>
             <a:off x="912240" y="1268280"/>
-            <a:ext cx="9207360" cy="360720"/>
+            <a:ext cx="9207000" cy="360360"/>
           </a:xfrm>
           <a:prstGeom prst="rect">
             <a:avLst/>
@@ -16678,7 +16678,7 @@
         <p:spPr>
           <a:xfrm>
             <a:off x="0" y="0"/>
-            <a:ext cx="3051360" cy="561240"/>
+            <a:ext cx="3051000" cy="560880"/>
           </a:xfrm>
           <a:prstGeom prst="rect">
             <a:avLst/>
@@ -16701,7 +16701,7 @@
         <p:spPr>
           <a:xfrm>
             <a:off x="7430400" y="134640"/>
-            <a:ext cx="3697200" cy="513360"/>
+            <a:ext cx="3696840" cy="513000"/>
           </a:xfrm>
           <a:prstGeom prst="rect">
             <a:avLst/>
@@ -16720,7 +16720,7 @@
         <p:spPr>
           <a:xfrm>
             <a:off x="11444760" y="0"/>
-            <a:ext cx="740520" cy="6849360"/>
+            <a:ext cx="740160" cy="6849000"/>
           </a:xfrm>
           <a:prstGeom prst="rect">
             <a:avLst/>
@@ -16769,7 +16769,7 @@
         <p:spPr>
           <a:xfrm>
             <a:off x="11438640" y="6453360"/>
-            <a:ext cx="757440" cy="363960"/>
+            <a:ext cx="757080" cy="363960"/>
           </a:xfrm>
           <a:prstGeom prst="rect">
             <a:avLst/>
@@ -16795,7 +16795,7 @@
                 <a:spcPct val="100000"/>
               </a:lnSpc>
             </a:pPr>
-            <a:fld id="{C1656862-1C28-4667-BFE4-0BE151D34B9E}" type="slidenum">
+            <a:fld id="{F70497DE-E3B0-4CF9-AA22-8190621138EE}" type="slidenum">
               <a:rPr b="0" lang="en-US" sz="1800" spc="-1" strike="noStrike">
                 <a:solidFill>
                   <a:srgbClr val="808080"/>
@@ -16823,7 +16823,7 @@
         <p:spPr>
           <a:xfrm>
             <a:off x="0" y="6642720"/>
-            <a:ext cx="12183480" cy="211320"/>
+            <a:ext cx="12183120" cy="211320"/>
           </a:xfrm>
           <a:prstGeom prst="rect">
             <a:avLst/>
@@ -16959,7 +16959,7 @@
         <p:spPr>
           <a:xfrm>
             <a:off x="11444760" y="0"/>
-            <a:ext cx="740520" cy="6849360"/>
+            <a:ext cx="740160" cy="6849000"/>
           </a:xfrm>
           <a:prstGeom prst="rect">
             <a:avLst/>
@@ -17008,7 +17008,7 @@
         <p:spPr>
           <a:xfrm>
             <a:off x="11438640" y="6453360"/>
-            <a:ext cx="757440" cy="363960"/>
+            <a:ext cx="757080" cy="363960"/>
           </a:xfrm>
           <a:prstGeom prst="rect">
             <a:avLst/>
@@ -17034,7 +17034,7 @@
                 <a:spcPct val="100000"/>
               </a:lnSpc>
             </a:pPr>
-            <a:fld id="{39541E03-8236-41D2-B949-29CD6E610A23}" type="slidenum">
+            <a:fld id="{25CEB757-1A78-4E96-9095-FB9C94679190}" type="slidenum">
               <a:rPr b="0" lang="en-US" sz="1800" spc="-1" strike="noStrike">
                 <a:solidFill>
                   <a:srgbClr val="808080"/>
@@ -17062,7 +17062,7 @@
         <p:spPr>
           <a:xfrm>
             <a:off x="912240" y="1268280"/>
-            <a:ext cx="9207360" cy="360720"/>
+            <a:ext cx="9207000" cy="360360"/>
           </a:xfrm>
           <a:prstGeom prst="rect">
             <a:avLst/>
@@ -17111,7 +17111,7 @@
         <p:spPr>
           <a:xfrm>
             <a:off x="0" y="0"/>
-            <a:ext cx="3051360" cy="561240"/>
+            <a:ext cx="3051000" cy="560880"/>
           </a:xfrm>
           <a:prstGeom prst="rect">
             <a:avLst/>
@@ -17134,7 +17134,7 @@
         <p:spPr>
           <a:xfrm>
             <a:off x="7430400" y="134640"/>
-            <a:ext cx="3697200" cy="513360"/>
+            <a:ext cx="3696840" cy="513000"/>
           </a:xfrm>
           <a:prstGeom prst="rect">
             <a:avLst/>
@@ -17153,7 +17153,7 @@
         <p:spPr>
           <a:xfrm>
             <a:off x="11444760" y="0"/>
-            <a:ext cx="740520" cy="6849360"/>
+            <a:ext cx="740160" cy="6849000"/>
           </a:xfrm>
           <a:prstGeom prst="rect">
             <a:avLst/>
@@ -17202,7 +17202,7 @@
         <p:spPr>
           <a:xfrm>
             <a:off x="11438640" y="6453360"/>
-            <a:ext cx="757440" cy="363960"/>
+            <a:ext cx="757080" cy="363960"/>
           </a:xfrm>
           <a:prstGeom prst="rect">
             <a:avLst/>
@@ -17228,7 +17228,7 @@
                 <a:spcPct val="100000"/>
               </a:lnSpc>
             </a:pPr>
-            <a:fld id="{742FE99D-9FFA-4718-B19D-E7F4D616A164}" type="slidenum">
+            <a:fld id="{8BA3474D-F39B-45D9-808B-084A4A7D1397}" type="slidenum">
               <a:rPr b="0" lang="en-US" sz="1800" spc="-1" strike="noStrike">
                 <a:solidFill>
                   <a:srgbClr val="808080"/>
@@ -17256,7 +17256,7 @@
         <p:spPr>
           <a:xfrm>
             <a:off x="0" y="6642720"/>
-            <a:ext cx="12183480" cy="211320"/>
+            <a:ext cx="12183120" cy="211320"/>
           </a:xfrm>
           <a:prstGeom prst="rect">
             <a:avLst/>
@@ -17343,7 +17343,7 @@
         <p:spPr>
           <a:xfrm>
             <a:off x="11444760" y="0"/>
-            <a:ext cx="740520" cy="6849360"/>
+            <a:ext cx="740160" cy="6849000"/>
           </a:xfrm>
           <a:prstGeom prst="rect">
             <a:avLst/>
@@ -17392,7 +17392,7 @@
         <p:spPr>
           <a:xfrm>
             <a:off x="11438640" y="6453360"/>
-            <a:ext cx="757440" cy="363960"/>
+            <a:ext cx="757080" cy="363960"/>
           </a:xfrm>
           <a:prstGeom prst="rect">
             <a:avLst/>
@@ -17418,7 +17418,7 @@
                 <a:spcPct val="100000"/>
               </a:lnSpc>
             </a:pPr>
-            <a:fld id="{69F5E208-B99A-41C3-8C9B-33D0A5DDAD99}" type="slidenum">
+            <a:fld id="{1C5A5159-CA05-4157-AE11-22317FF1B82C}" type="slidenum">
               <a:rPr b="0" lang="en-US" sz="1800" spc="-1" strike="noStrike">
                 <a:solidFill>
                   <a:srgbClr val="808080"/>
@@ -17446,7 +17446,7 @@
         <p:spPr>
           <a:xfrm>
             <a:off x="912240" y="1268280"/>
-            <a:ext cx="9207360" cy="360720"/>
+            <a:ext cx="9207000" cy="360360"/>
           </a:xfrm>
           <a:prstGeom prst="rect">
             <a:avLst/>
@@ -17495,7 +17495,7 @@
         <p:spPr>
           <a:xfrm>
             <a:off x="0" y="0"/>
-            <a:ext cx="3051360" cy="561240"/>
+            <a:ext cx="3051000" cy="560880"/>
           </a:xfrm>
           <a:prstGeom prst="rect">
             <a:avLst/>
@@ -17518,7 +17518,7 @@
         <p:spPr>
           <a:xfrm>
             <a:off x="7430400" y="134640"/>
-            <a:ext cx="3697200" cy="513360"/>
+            <a:ext cx="3696840" cy="513000"/>
           </a:xfrm>
           <a:prstGeom prst="rect">
             <a:avLst/>
@@ -17537,7 +17537,7 @@
         <p:spPr>
           <a:xfrm>
             <a:off x="912240" y="1268280"/>
-            <a:ext cx="9207360" cy="360720"/>
+            <a:ext cx="9207000" cy="360360"/>
           </a:xfrm>
           <a:prstGeom prst="rect">
             <a:avLst/>
@@ -17582,7 +17582,7 @@
         <p:spPr>
           <a:xfrm>
             <a:off x="11444760" y="0"/>
-            <a:ext cx="740520" cy="6849360"/>
+            <a:ext cx="740160" cy="6849000"/>
           </a:xfrm>
           <a:prstGeom prst="rect">
             <a:avLst/>
@@ -17631,7 +17631,7 @@
         <p:spPr>
           <a:xfrm>
             <a:off x="0" y="6642720"/>
-            <a:ext cx="12183480" cy="211320"/>
+            <a:ext cx="12183120" cy="211320"/>
           </a:xfrm>
           <a:prstGeom prst="rect">
             <a:avLst/>
@@ -18442,7 +18442,7 @@
         <p:spPr>
           <a:xfrm>
             <a:off x="11444760" y="0"/>
-            <a:ext cx="740520" cy="6849360"/>
+            <a:ext cx="740160" cy="6849000"/>
           </a:xfrm>
           <a:prstGeom prst="rect">
             <a:avLst/>
@@ -18491,7 +18491,7 @@
         <p:spPr>
           <a:xfrm>
             <a:off x="11438640" y="6453360"/>
-            <a:ext cx="757440" cy="363960"/>
+            <a:ext cx="757080" cy="363960"/>
           </a:xfrm>
           <a:prstGeom prst="rect">
             <a:avLst/>
@@ -18517,7 +18517,7 @@
                 <a:spcPct val="100000"/>
               </a:lnSpc>
             </a:pPr>
-            <a:fld id="{2A7472F8-A756-4D03-A04C-D1784F7AA615}" type="slidenum">
+            <a:fld id="{6DC03568-3EA4-477A-A930-1C8541EA679C}" type="slidenum">
               <a:rPr b="0" lang="en-US" sz="1800" spc="-1" strike="noStrike">
                 <a:solidFill>
                   <a:srgbClr val="808080"/>
@@ -18545,7 +18545,7 @@
         <p:spPr>
           <a:xfrm>
             <a:off x="912240" y="1268280"/>
-            <a:ext cx="9207360" cy="360720"/>
+            <a:ext cx="9207000" cy="360360"/>
           </a:xfrm>
           <a:prstGeom prst="rect">
             <a:avLst/>
@@ -18594,7 +18594,7 @@
         <p:spPr>
           <a:xfrm>
             <a:off x="0" y="0"/>
-            <a:ext cx="3051360" cy="561240"/>
+            <a:ext cx="3051000" cy="560880"/>
           </a:xfrm>
           <a:prstGeom prst="rect">
             <a:avLst/>
@@ -18617,7 +18617,7 @@
         <p:spPr>
           <a:xfrm>
             <a:off x="7430400" y="134640"/>
-            <a:ext cx="3697200" cy="513360"/>
+            <a:ext cx="3696840" cy="513000"/>
           </a:xfrm>
           <a:prstGeom prst="rect">
             <a:avLst/>
@@ -18636,7 +18636,7 @@
         <p:spPr>
           <a:xfrm>
             <a:off x="912240" y="1268280"/>
-            <a:ext cx="9207360" cy="360720"/>
+            <a:ext cx="9207000" cy="360360"/>
           </a:xfrm>
           <a:prstGeom prst="rect">
             <a:avLst/>
@@ -18681,7 +18681,7 @@
         <p:spPr>
           <a:xfrm>
             <a:off x="11444760" y="0"/>
-            <a:ext cx="740520" cy="6849360"/>
+            <a:ext cx="740160" cy="6849000"/>
           </a:xfrm>
           <a:prstGeom prst="rect">
             <a:avLst/>
@@ -18730,7 +18730,7 @@
         <p:spPr>
           <a:xfrm>
             <a:off x="0" y="6642720"/>
-            <a:ext cx="12183480" cy="211320"/>
+            <a:ext cx="12183120" cy="211320"/>
           </a:xfrm>
           <a:prstGeom prst="rect">
             <a:avLst/>
@@ -19316,7 +19316,7 @@
         <p:spPr>
           <a:xfrm>
             <a:off x="11444760" y="0"/>
-            <a:ext cx="740520" cy="6849360"/>
+            <a:ext cx="740160" cy="6849000"/>
           </a:xfrm>
           <a:prstGeom prst="rect">
             <a:avLst/>
@@ -19365,7 +19365,7 @@
         <p:spPr>
           <a:xfrm>
             <a:off x="11438640" y="6453360"/>
-            <a:ext cx="757440" cy="363960"/>
+            <a:ext cx="757080" cy="363960"/>
           </a:xfrm>
           <a:prstGeom prst="rect">
             <a:avLst/>
@@ -19391,7 +19391,7 @@
                 <a:spcPct val="100000"/>
               </a:lnSpc>
             </a:pPr>
-            <a:fld id="{8AD7B90B-1753-42DC-BF72-AD0258E6A941}" type="slidenum">
+            <a:fld id="{93513EDD-5B0B-4301-98F8-BE14FF9179DA}" type="slidenum">
               <a:rPr b="0" lang="en-US" sz="1800" spc="-1" strike="noStrike">
                 <a:solidFill>
                   <a:srgbClr val="808080"/>
@@ -19419,7 +19419,7 @@
         <p:spPr>
           <a:xfrm>
             <a:off x="912240" y="1268280"/>
-            <a:ext cx="9207360" cy="360720"/>
+            <a:ext cx="9207000" cy="360360"/>
           </a:xfrm>
           <a:prstGeom prst="rect">
             <a:avLst/>
@@ -19468,7 +19468,7 @@
         <p:spPr>
           <a:xfrm>
             <a:off x="0" y="0"/>
-            <a:ext cx="3051360" cy="561240"/>
+            <a:ext cx="3051000" cy="560880"/>
           </a:xfrm>
           <a:prstGeom prst="rect">
             <a:avLst/>
@@ -19491,7 +19491,7 @@
         <p:spPr>
           <a:xfrm>
             <a:off x="7430400" y="134640"/>
-            <a:ext cx="3697200" cy="513360"/>
+            <a:ext cx="3696840" cy="513000"/>
           </a:xfrm>
           <a:prstGeom prst="rect">
             <a:avLst/>
@@ -19510,7 +19510,7 @@
         <p:spPr>
           <a:xfrm>
             <a:off x="912240" y="1268280"/>
-            <a:ext cx="9207360" cy="360720"/>
+            <a:ext cx="9207000" cy="360360"/>
           </a:xfrm>
           <a:prstGeom prst="rect">
             <a:avLst/>
@@ -19555,7 +19555,7 @@
         <p:spPr>
           <a:xfrm>
             <a:off x="11444760" y="0"/>
-            <a:ext cx="740520" cy="6849360"/>
+            <a:ext cx="740160" cy="6849000"/>
           </a:xfrm>
           <a:prstGeom prst="rect">
             <a:avLst/>
@@ -19604,7 +19604,7 @@
         <p:spPr>
           <a:xfrm>
             <a:off x="0" y="6642720"/>
-            <a:ext cx="12183480" cy="211320"/>
+            <a:ext cx="12183120" cy="211320"/>
           </a:xfrm>
           <a:prstGeom prst="rect">
             <a:avLst/>
@@ -20640,7 +20640,7 @@
         <p:spPr>
           <a:xfrm>
             <a:off x="11444760" y="0"/>
-            <a:ext cx="740520" cy="6849360"/>
+            <a:ext cx="740160" cy="6849000"/>
           </a:xfrm>
           <a:prstGeom prst="rect">
             <a:avLst/>
@@ -20689,7 +20689,7 @@
         <p:spPr>
           <a:xfrm>
             <a:off x="11438640" y="6453360"/>
-            <a:ext cx="757440" cy="363960"/>
+            <a:ext cx="757080" cy="363960"/>
           </a:xfrm>
           <a:prstGeom prst="rect">
             <a:avLst/>
@@ -20715,7 +20715,7 @@
                 <a:spcPct val="100000"/>
               </a:lnSpc>
             </a:pPr>
-            <a:fld id="{7BB89B14-8FD2-45D7-A09F-EAD191E31001}" type="slidenum">
+            <a:fld id="{D8ED4588-6EDE-4F1E-AB66-07DD40535D7D}" type="slidenum">
               <a:rPr b="0" lang="en-US" sz="1800" spc="-1" strike="noStrike">
                 <a:solidFill>
                   <a:srgbClr val="808080"/>
@@ -20743,7 +20743,7 @@
         <p:spPr>
           <a:xfrm>
             <a:off x="912240" y="1268280"/>
-            <a:ext cx="9207360" cy="360720"/>
+            <a:ext cx="9207000" cy="360360"/>
           </a:xfrm>
           <a:prstGeom prst="rect">
             <a:avLst/>
@@ -20792,7 +20792,7 @@
         <p:spPr>
           <a:xfrm>
             <a:off x="0" y="0"/>
-            <a:ext cx="3051360" cy="561240"/>
+            <a:ext cx="3051000" cy="560880"/>
           </a:xfrm>
           <a:prstGeom prst="rect">
             <a:avLst/>
@@ -20815,7 +20815,7 @@
         <p:spPr>
           <a:xfrm>
             <a:off x="7430400" y="134640"/>
-            <a:ext cx="3697200" cy="513360"/>
+            <a:ext cx="3696840" cy="513000"/>
           </a:xfrm>
           <a:prstGeom prst="rect">
             <a:avLst/>
@@ -20834,7 +20834,7 @@
         <p:spPr>
           <a:xfrm>
             <a:off x="912240" y="1268280"/>
-            <a:ext cx="9207360" cy="360720"/>
+            <a:ext cx="9207000" cy="360360"/>
           </a:xfrm>
           <a:prstGeom prst="rect">
             <a:avLst/>
@@ -20879,7 +20879,7 @@
         <p:spPr>
           <a:xfrm>
             <a:off x="11444760" y="0"/>
-            <a:ext cx="740520" cy="6849360"/>
+            <a:ext cx="740160" cy="6849000"/>
           </a:xfrm>
           <a:prstGeom prst="rect">
             <a:avLst/>
@@ -20928,7 +20928,7 @@
         <p:spPr>
           <a:xfrm>
             <a:off x="0" y="6642720"/>
-            <a:ext cx="12183480" cy="211320"/>
+            <a:ext cx="12183120" cy="211320"/>
           </a:xfrm>
           <a:prstGeom prst="rect">
             <a:avLst/>
@@ -21015,7 +21015,7 @@
         <p:spPr>
           <a:xfrm>
             <a:off x="11444760" y="0"/>
-            <a:ext cx="740520" cy="6849360"/>
+            <a:ext cx="740160" cy="6849000"/>
           </a:xfrm>
           <a:prstGeom prst="rect">
             <a:avLst/>
@@ -21064,7 +21064,7 @@
         <p:spPr>
           <a:xfrm>
             <a:off x="11438640" y="6453360"/>
-            <a:ext cx="757440" cy="363960"/>
+            <a:ext cx="757080" cy="363960"/>
           </a:xfrm>
           <a:prstGeom prst="rect">
             <a:avLst/>
@@ -21090,7 +21090,7 @@
                 <a:spcPct val="100000"/>
               </a:lnSpc>
             </a:pPr>
-            <a:fld id="{D751DBAA-5C3D-4992-8310-EC11CA0DC0D9}" type="slidenum">
+            <a:fld id="{E69E8D78-8B53-4FEF-B3A7-ED587A7F737C}" type="slidenum">
               <a:rPr b="0" lang="en-US" sz="1800" spc="-1" strike="noStrike">
                 <a:solidFill>
                   <a:srgbClr val="808080"/>
@@ -21118,7 +21118,7 @@
         <p:spPr>
           <a:xfrm>
             <a:off x="912240" y="1268280"/>
-            <a:ext cx="9207360" cy="360720"/>
+            <a:ext cx="9207000" cy="360360"/>
           </a:xfrm>
           <a:prstGeom prst="rect">
             <a:avLst/>
@@ -21167,7 +21167,7 @@
         <p:spPr>
           <a:xfrm>
             <a:off x="0" y="0"/>
-            <a:ext cx="3051360" cy="561240"/>
+            <a:ext cx="3051000" cy="560880"/>
           </a:xfrm>
           <a:prstGeom prst="rect">
             <a:avLst/>
@@ -21190,7 +21190,7 @@
         <p:spPr>
           <a:xfrm>
             <a:off x="7430400" y="134640"/>
-            <a:ext cx="3697200" cy="513360"/>
+            <a:ext cx="3696840" cy="513000"/>
           </a:xfrm>
           <a:prstGeom prst="rect">
             <a:avLst/>
@@ -21209,7 +21209,7 @@
         <p:spPr>
           <a:xfrm>
             <a:off x="912240" y="1268280"/>
-            <a:ext cx="9207360" cy="360720"/>
+            <a:ext cx="9207000" cy="360360"/>
           </a:xfrm>
           <a:prstGeom prst="rect">
             <a:avLst/>
@@ -21254,7 +21254,7 @@
         <p:spPr>
           <a:xfrm>
             <a:off x="11444760" y="0"/>
-            <a:ext cx="740520" cy="6849360"/>
+            <a:ext cx="740160" cy="6849000"/>
           </a:xfrm>
           <a:prstGeom prst="rect">
             <a:avLst/>
@@ -21303,7 +21303,7 @@
         <p:spPr>
           <a:xfrm>
             <a:off x="0" y="6642720"/>
-            <a:ext cx="12183480" cy="211320"/>
+            <a:ext cx="12183120" cy="211320"/>
           </a:xfrm>
           <a:prstGeom prst="rect">
             <a:avLst/>
@@ -21664,7 +21664,7 @@
         <p:spPr>
           <a:xfrm>
             <a:off x="11444760" y="0"/>
-            <a:ext cx="740520" cy="6849360"/>
+            <a:ext cx="740160" cy="6849000"/>
           </a:xfrm>
           <a:prstGeom prst="rect">
             <a:avLst/>
@@ -21713,7 +21713,7 @@
         <p:spPr>
           <a:xfrm>
             <a:off x="11438640" y="6453360"/>
-            <a:ext cx="757440" cy="363960"/>
+            <a:ext cx="757080" cy="363960"/>
           </a:xfrm>
           <a:prstGeom prst="rect">
             <a:avLst/>
@@ -21739,7 +21739,7 @@
                 <a:spcPct val="100000"/>
               </a:lnSpc>
             </a:pPr>
-            <a:fld id="{B4DA4055-2422-4909-B448-A48C658D2B7E}" type="slidenum">
+            <a:fld id="{076A83AF-FA53-4F66-89AD-6E5CA336FEFF}" type="slidenum">
               <a:rPr b="0" lang="en-US" sz="1800" spc="-1" strike="noStrike">
                 <a:solidFill>
                   <a:srgbClr val="808080"/>
@@ -21767,7 +21767,7 @@
         <p:spPr>
           <a:xfrm>
             <a:off x="912240" y="1268280"/>
-            <a:ext cx="9207360" cy="360720"/>
+            <a:ext cx="9207000" cy="360360"/>
           </a:xfrm>
           <a:prstGeom prst="rect">
             <a:avLst/>
@@ -21816,7 +21816,7 @@
         <p:spPr>
           <a:xfrm>
             <a:off x="0" y="0"/>
-            <a:ext cx="3051360" cy="561240"/>
+            <a:ext cx="3051000" cy="560880"/>
           </a:xfrm>
           <a:prstGeom prst="rect">
             <a:avLst/>
@@ -21839,7 +21839,7 @@
         <p:spPr>
           <a:xfrm>
             <a:off x="7430400" y="134640"/>
-            <a:ext cx="3697200" cy="513360"/>
+            <a:ext cx="3696840" cy="513000"/>
           </a:xfrm>
           <a:prstGeom prst="rect">
             <a:avLst/>
@@ -21858,7 +21858,7 @@
         <p:spPr>
           <a:xfrm>
             <a:off x="912240" y="1268280"/>
-            <a:ext cx="9207360" cy="360720"/>
+            <a:ext cx="9207000" cy="360360"/>
           </a:xfrm>
           <a:prstGeom prst="rect">
             <a:avLst/>
@@ -21903,7 +21903,7 @@
         <p:spPr>
           <a:xfrm>
             <a:off x="11444760" y="0"/>
-            <a:ext cx="740520" cy="6849360"/>
+            <a:ext cx="740160" cy="6849000"/>
           </a:xfrm>
           <a:prstGeom prst="rect">
             <a:avLst/>
@@ -21952,7 +21952,7 @@
         <p:spPr>
           <a:xfrm>
             <a:off x="0" y="6642720"/>
-            <a:ext cx="12183480" cy="211320"/>
+            <a:ext cx="12183120" cy="211320"/>
           </a:xfrm>
           <a:prstGeom prst="rect">
             <a:avLst/>
@@ -22313,7 +22313,7 @@
         <p:spPr>
           <a:xfrm>
             <a:off x="11444760" y="0"/>
-            <a:ext cx="740520" cy="6849360"/>
+            <a:ext cx="740160" cy="6849000"/>
           </a:xfrm>
           <a:prstGeom prst="rect">
             <a:avLst/>
@@ -22362,7 +22362,7 @@
         <p:spPr>
           <a:xfrm>
             <a:off x="11438640" y="6453360"/>
-            <a:ext cx="757440" cy="363960"/>
+            <a:ext cx="757080" cy="363960"/>
           </a:xfrm>
           <a:prstGeom prst="rect">
             <a:avLst/>
@@ -22388,7 +22388,7 @@
                 <a:spcPct val="100000"/>
               </a:lnSpc>
             </a:pPr>
-            <a:fld id="{F4263431-50C8-4CCF-80F9-DD8B66385785}" type="slidenum">
+            <a:fld id="{1EBBF75A-7386-4011-9201-31FC0D72729F}" type="slidenum">
               <a:rPr b="0" lang="en-US" sz="1800" spc="-1" strike="noStrike">
                 <a:solidFill>
                   <a:srgbClr val="808080"/>
@@ -22416,7 +22416,7 @@
         <p:spPr>
           <a:xfrm>
             <a:off x="912240" y="1268280"/>
-            <a:ext cx="9207360" cy="360720"/>
+            <a:ext cx="9207000" cy="360360"/>
           </a:xfrm>
           <a:prstGeom prst="rect">
             <a:avLst/>
@@ -22465,7 +22465,7 @@
         <p:spPr>
           <a:xfrm>
             <a:off x="0" y="0"/>
-            <a:ext cx="3051360" cy="561240"/>
+            <a:ext cx="3051000" cy="560880"/>
           </a:xfrm>
           <a:prstGeom prst="rect">
             <a:avLst/>
@@ -22488,7 +22488,7 @@
         <p:spPr>
           <a:xfrm>
             <a:off x="7430400" y="134640"/>
-            <a:ext cx="3697200" cy="513360"/>
+            <a:ext cx="3696840" cy="513000"/>
           </a:xfrm>
           <a:prstGeom prst="rect">
             <a:avLst/>
@@ -22507,7 +22507,7 @@
         <p:spPr>
           <a:xfrm>
             <a:off x="912240" y="1268280"/>
-            <a:ext cx="9207360" cy="360720"/>
+            <a:ext cx="9207000" cy="360360"/>
           </a:xfrm>
           <a:prstGeom prst="rect">
             <a:avLst/>
@@ -22552,7 +22552,7 @@
         <p:spPr>
           <a:xfrm>
             <a:off x="11444760" y="0"/>
-            <a:ext cx="740520" cy="6849360"/>
+            <a:ext cx="740160" cy="6849000"/>
           </a:xfrm>
           <a:prstGeom prst="rect">
             <a:avLst/>
@@ -22601,7 +22601,7 @@
         <p:spPr>
           <a:xfrm>
             <a:off x="0" y="6642720"/>
-            <a:ext cx="12183480" cy="211320"/>
+            <a:ext cx="12183120" cy="211320"/>
           </a:xfrm>
           <a:prstGeom prst="rect">
             <a:avLst/>
@@ -22955,7 +22955,7 @@
         <p:spPr>
           <a:xfrm>
             <a:off x="527400" y="1412640"/>
-            <a:ext cx="10360440" cy="1146960"/>
+            <a:ext cx="10360080" cy="1146600"/>
           </a:xfrm>
           <a:prstGeom prst="rect">
             <a:avLst/>
@@ -23009,7 +23009,7 @@
         <p:spPr>
           <a:xfrm>
             <a:off x="527400" y="2852640"/>
-            <a:ext cx="10360440" cy="2367720"/>
+            <a:ext cx="10360080" cy="2367360"/>
           </a:xfrm>
           <a:prstGeom prst="rect">
             <a:avLst/>
@@ -23243,7 +23243,7 @@
         <p:spPr>
           <a:xfrm>
             <a:off x="539640" y="764640"/>
-            <a:ext cx="10744560" cy="495360"/>
+            <a:ext cx="10744200" cy="495000"/>
           </a:xfrm>
           <a:prstGeom prst="rect">
             <a:avLst/>
@@ -24760,7 +24760,7 @@
         <p:spPr>
           <a:xfrm>
             <a:off x="539640" y="764640"/>
-            <a:ext cx="10737720" cy="488520"/>
+            <a:ext cx="10737360" cy="488160"/>
           </a:xfrm>
           <a:prstGeom prst="rect">
             <a:avLst/>
@@ -24814,7 +24814,7 @@
         <p:spPr>
           <a:xfrm>
             <a:off x="539640" y="1268280"/>
-            <a:ext cx="10737720" cy="5025240"/>
+            <a:ext cx="10737360" cy="5024880"/>
           </a:xfrm>
           <a:prstGeom prst="rect">
             <a:avLst/>
@@ -25273,7 +25273,7 @@
         <p:spPr>
           <a:xfrm>
             <a:off x="539640" y="764640"/>
-            <a:ext cx="10736280" cy="487080"/>
+            <a:ext cx="10735920" cy="486720"/>
           </a:xfrm>
           <a:prstGeom prst="rect">
             <a:avLst/>
@@ -25353,7 +25353,7 @@
         <p:spPr>
           <a:xfrm>
             <a:off x="539640" y="1268640"/>
-            <a:ext cx="10736280" cy="5023800"/>
+            <a:ext cx="10735920" cy="5023440"/>
           </a:xfrm>
           <a:prstGeom prst="rect">
             <a:avLst/>
@@ -25864,7 +25864,7 @@
         <p:spPr>
           <a:xfrm>
             <a:off x="539640" y="764640"/>
-            <a:ext cx="10744560" cy="495360"/>
+            <a:ext cx="10744200" cy="495000"/>
           </a:xfrm>
           <a:prstGeom prst="rect">
             <a:avLst/>
@@ -25918,7 +25918,7 @@
         <p:spPr>
           <a:xfrm>
             <a:off x="539640" y="1268280"/>
-            <a:ext cx="10744560" cy="5032080"/>
+            <a:ext cx="10744200" cy="5031720"/>
           </a:xfrm>
           <a:prstGeom prst="rect">
             <a:avLst/>
@@ -26214,7 +26214,7 @@
         <p:spPr>
           <a:xfrm>
             <a:off x="539640" y="764640"/>
-            <a:ext cx="10737720" cy="488520"/>
+            <a:ext cx="10737360" cy="488160"/>
           </a:xfrm>
           <a:prstGeom prst="rect">
             <a:avLst/>
@@ -26268,7 +26268,7 @@
         <p:spPr>
           <a:xfrm>
             <a:off x="539640" y="1268280"/>
-            <a:ext cx="10737720" cy="5025240"/>
+            <a:ext cx="10737360" cy="5024880"/>
           </a:xfrm>
           <a:prstGeom prst="rect">
             <a:avLst/>
@@ -26542,7 +26542,7 @@
         <p:spPr>
           <a:xfrm>
             <a:off x="539640" y="764640"/>
-            <a:ext cx="10744560" cy="495360"/>
+            <a:ext cx="10744200" cy="495000"/>
           </a:xfrm>
           <a:prstGeom prst="rect">
             <a:avLst/>
@@ -26596,7 +26596,7 @@
         <p:spPr>
           <a:xfrm>
             <a:off x="539640" y="1268640"/>
-            <a:ext cx="10744560" cy="5032080"/>
+            <a:ext cx="10744200" cy="5031720"/>
           </a:xfrm>
           <a:prstGeom prst="rect">
             <a:avLst/>
@@ -26948,7 +26948,7 @@
         <p:spPr>
           <a:xfrm>
             <a:off x="539640" y="764640"/>
-            <a:ext cx="10744560" cy="495360"/>
+            <a:ext cx="10744200" cy="495000"/>
           </a:xfrm>
           <a:prstGeom prst="rect">
             <a:avLst/>
@@ -27002,7 +27002,7 @@
         <p:spPr>
           <a:xfrm>
             <a:off x="539640" y="1268280"/>
-            <a:ext cx="10744560" cy="5032080"/>
+            <a:ext cx="10744200" cy="5031720"/>
           </a:xfrm>
           <a:prstGeom prst="rect">
             <a:avLst/>
@@ -27149,7 +27149,7 @@
         <p:spPr>
           <a:xfrm>
             <a:off x="6489720" y="2132640"/>
-            <a:ext cx="514080" cy="493920"/>
+            <a:ext cx="513720" cy="493560"/>
           </a:xfrm>
           <a:prstGeom prst="star5">
             <a:avLst>
@@ -27210,7 +27210,7 @@
         <p:spPr>
           <a:xfrm>
             <a:off x="4294080" y="2247480"/>
-            <a:ext cx="2282400" cy="363960"/>
+            <a:ext cx="2282040" cy="363960"/>
           </a:xfrm>
           <a:prstGeom prst="rect">
             <a:avLst/>
@@ -27294,7 +27294,7 @@
         <p:spPr>
           <a:xfrm>
             <a:off x="539640" y="764640"/>
-            <a:ext cx="10744560" cy="495360"/>
+            <a:ext cx="10744200" cy="495000"/>
           </a:xfrm>
           <a:prstGeom prst="rect">
             <a:avLst/>
@@ -27348,7 +27348,7 @@
         <p:spPr>
           <a:xfrm>
             <a:off x="539640" y="1268640"/>
-            <a:ext cx="10744560" cy="5032080"/>
+            <a:ext cx="10744200" cy="5031720"/>
           </a:xfrm>
           <a:prstGeom prst="rect">
             <a:avLst/>
@@ -27705,7 +27705,7 @@
         <p:spPr>
           <a:xfrm>
             <a:off x="335520" y="1268640"/>
-            <a:ext cx="10744560" cy="5032080"/>
+            <a:ext cx="10744200" cy="5031720"/>
           </a:xfrm>
           <a:prstGeom prst="rect">
             <a:avLst/>
@@ -27765,7 +27765,7 @@
         <p:spPr>
           <a:xfrm>
             <a:off x="335520" y="764640"/>
-            <a:ext cx="10744560" cy="495360"/>
+            <a:ext cx="10744200" cy="495000"/>
           </a:xfrm>
           <a:prstGeom prst="rect">
             <a:avLst/>
@@ -27840,7 +27840,7 @@
         <p:spPr>
           <a:xfrm>
             <a:off x="539640" y="764640"/>
-            <a:ext cx="10744560" cy="495360"/>
+            <a:ext cx="10744200" cy="495000"/>
           </a:xfrm>
           <a:prstGeom prst="rect">
             <a:avLst/>
@@ -27898,7 +27898,7 @@
         <p:spPr>
           <a:xfrm>
             <a:off x="2684520" y="1323360"/>
-            <a:ext cx="1467360" cy="2168640"/>
+            <a:ext cx="1467000" cy="2168280"/>
           </a:xfrm>
           <a:prstGeom prst="rect">
             <a:avLst/>
@@ -27921,7 +27921,7 @@
         <p:spPr>
           <a:xfrm>
             <a:off x="7269840" y="1716120"/>
-            <a:ext cx="1781280" cy="1773360"/>
+            <a:ext cx="1780920" cy="1773000"/>
           </a:xfrm>
           <a:prstGeom prst="rect">
             <a:avLst/>
@@ -27940,7 +27940,7 @@
         <p:spPr>
           <a:xfrm>
             <a:off x="1620000" y="3439440"/>
-            <a:ext cx="3632040" cy="673560"/>
+            <a:ext cx="3631680" cy="673200"/>
           </a:xfrm>
           <a:prstGeom prst="rect">
             <a:avLst/>
@@ -27997,7 +27997,7 @@
         <p:spPr>
           <a:xfrm>
             <a:off x="6322680" y="3460320"/>
-            <a:ext cx="3632040" cy="673560"/>
+            <a:ext cx="3631680" cy="673200"/>
           </a:xfrm>
           <a:prstGeom prst="rect">
             <a:avLst/>
@@ -28054,7 +28054,7 @@
         <p:spPr>
           <a:xfrm>
             <a:off x="1311840" y="5920200"/>
-            <a:ext cx="3625200" cy="666720"/>
+            <a:ext cx="3624840" cy="666360"/>
           </a:xfrm>
           <a:prstGeom prst="rect">
             <a:avLst/>
@@ -28099,7 +28099,7 @@
         <p:spPr>
           <a:xfrm>
             <a:off x="3950280" y="5903280"/>
-            <a:ext cx="3625200" cy="666720"/>
+            <a:ext cx="3624840" cy="666360"/>
           </a:xfrm>
           <a:prstGeom prst="rect">
             <a:avLst/>
@@ -28155,13 +28155,13 @@
         </p:nvPicPr>
         <p:blipFill>
           <a:blip r:embed="rId3"/>
-          <a:srcRect l="23619" t="21357" r="23505" b="11529"/>
+          <a:srcRect l="23612" t="21360" r="23507" b="11519"/>
           <a:stretch/>
         </p:blipFill>
         <p:spPr>
           <a:xfrm>
             <a:off x="4860360" y="4140360"/>
-            <a:ext cx="1799280" cy="1799280"/>
+            <a:ext cx="1798920" cy="1798920"/>
           </a:xfrm>
           <a:prstGeom prst="rect">
             <a:avLst/>
@@ -28210,7 +28210,7 @@
         <p:spPr>
           <a:xfrm>
             <a:off x="542880" y="721800"/>
-            <a:ext cx="10350360" cy="491040"/>
+            <a:ext cx="10350000" cy="490680"/>
           </a:xfrm>
           <a:prstGeom prst="rect">
             <a:avLst/>
@@ -28264,7 +28264,7 @@
         <p:spPr>
           <a:xfrm>
             <a:off x="451800" y="1709280"/>
-            <a:ext cx="8217720" cy="4345920"/>
+            <a:ext cx="8217360" cy="4345560"/>
           </a:xfrm>
           <a:prstGeom prst="rect">
             <a:avLst/>
@@ -28309,7 +28309,7 @@
         <p:spPr>
           <a:xfrm>
             <a:off x="609480" y="1769400"/>
-            <a:ext cx="10580760" cy="4848840"/>
+            <a:ext cx="10580400" cy="4848480"/>
           </a:xfrm>
           <a:prstGeom prst="rect">
             <a:avLst/>
@@ -28738,7 +28738,7 @@
         <p:spPr>
           <a:xfrm>
             <a:off x="542880" y="721800"/>
-            <a:ext cx="10350360" cy="491040"/>
+            <a:ext cx="10350000" cy="490680"/>
           </a:xfrm>
           <a:prstGeom prst="rect">
             <a:avLst/>
@@ -28792,7 +28792,7 @@
         <p:spPr>
           <a:xfrm>
             <a:off x="451800" y="1709280"/>
-            <a:ext cx="8217720" cy="4345920"/>
+            <a:ext cx="8217360" cy="4345560"/>
           </a:xfrm>
           <a:prstGeom prst="rect">
             <a:avLst/>
@@ -28837,7 +28837,7 @@
         <p:spPr>
           <a:xfrm>
             <a:off x="609480" y="1769400"/>
-            <a:ext cx="10580760" cy="4848840"/>
+            <a:ext cx="10580400" cy="4848480"/>
           </a:xfrm>
           <a:prstGeom prst="rect">
             <a:avLst/>
@@ -29337,7 +29337,7 @@
         <p:spPr>
           <a:xfrm>
             <a:off x="542880" y="721800"/>
-            <a:ext cx="10350360" cy="491040"/>
+            <a:ext cx="10350000" cy="490680"/>
           </a:xfrm>
           <a:prstGeom prst="rect">
             <a:avLst/>
@@ -29391,7 +29391,7 @@
         <p:spPr>
           <a:xfrm>
             <a:off x="451800" y="1709280"/>
-            <a:ext cx="8217720" cy="4345920"/>
+            <a:ext cx="8217360" cy="4345560"/>
           </a:xfrm>
           <a:prstGeom prst="rect">
             <a:avLst/>
@@ -29436,7 +29436,7 @@
         <p:spPr>
           <a:xfrm>
             <a:off x="609480" y="1769400"/>
-            <a:ext cx="10580760" cy="4848840"/>
+            <a:ext cx="10580400" cy="4848480"/>
           </a:xfrm>
           <a:prstGeom prst="rect">
             <a:avLst/>
@@ -29785,7 +29785,7 @@
         <p:spPr>
           <a:xfrm>
             <a:off x="542880" y="721800"/>
-            <a:ext cx="10350360" cy="491040"/>
+            <a:ext cx="10350000" cy="490680"/>
           </a:xfrm>
           <a:prstGeom prst="rect">
             <a:avLst/>
@@ -29839,7 +29839,7 @@
         <p:spPr>
           <a:xfrm>
             <a:off x="451800" y="1709280"/>
-            <a:ext cx="8217720" cy="4345920"/>
+            <a:ext cx="8217360" cy="4345560"/>
           </a:xfrm>
           <a:prstGeom prst="rect">
             <a:avLst/>
@@ -29884,7 +29884,7 @@
         <p:spPr>
           <a:xfrm>
             <a:off x="609480" y="1769400"/>
-            <a:ext cx="10580760" cy="4848840"/>
+            <a:ext cx="10580400" cy="4848480"/>
           </a:xfrm>
           <a:prstGeom prst="rect">
             <a:avLst/>
@@ -30089,7 +30089,7 @@
         <p:spPr>
           <a:xfrm>
             <a:off x="539640" y="764640"/>
-            <a:ext cx="10744560" cy="495360"/>
+            <a:ext cx="10744200" cy="495000"/>
           </a:xfrm>
           <a:prstGeom prst="rect">
             <a:avLst/>
@@ -30143,7 +30143,7 @@
         <p:spPr>
           <a:xfrm>
             <a:off x="539640" y="1268280"/>
-            <a:ext cx="10744560" cy="5032080"/>
+            <a:ext cx="10744200" cy="5031720"/>
           </a:xfrm>
           <a:prstGeom prst="rect">
             <a:avLst/>
@@ -30304,7 +30304,7 @@
         <p:spPr>
           <a:xfrm>
             <a:off x="542880" y="721800"/>
-            <a:ext cx="10353240" cy="493920"/>
+            <a:ext cx="10352880" cy="493560"/>
           </a:xfrm>
           <a:prstGeom prst="rect">
             <a:avLst/>
@@ -30362,7 +30362,7 @@
         <p:spPr>
           <a:xfrm>
             <a:off x="542880" y="2387520"/>
-            <a:ext cx="10098360" cy="2075760"/>
+            <a:ext cx="10098000" cy="2075400"/>
           </a:xfrm>
           <a:prstGeom prst="rect">
             <a:avLst/>
@@ -30411,7 +30411,7 @@
         <p:spPr>
           <a:xfrm>
             <a:off x="539640" y="764640"/>
-            <a:ext cx="10737720" cy="488520"/>
+            <a:ext cx="10737360" cy="488160"/>
           </a:xfrm>
           <a:prstGeom prst="rect">
             <a:avLst/>

</xml_diff>